<commit_message>
making all the programs to work for sensor data
</commit_message>
<xml_diff>
--- a/QL_Presentation1.pptx
+++ b/QL_Presentation1.pptx
@@ -5,14 +5,14 @@
     <p:sldMasterId id="2147483660" r:id="rId1"/>
   </p:sldMasterIdLst>
   <p:notesMasterIdLst>
-    <p:notesMasterId r:id="rId18"/>
+    <p:notesMasterId r:id="rId20"/>
   </p:notesMasterIdLst>
   <p:sldIdLst>
     <p:sldId id="256" r:id="rId2"/>
     <p:sldId id="271" r:id="rId3"/>
     <p:sldId id="272" r:id="rId4"/>
-    <p:sldId id="263" r:id="rId5"/>
-    <p:sldId id="264" r:id="rId6"/>
+    <p:sldId id="264" r:id="rId5"/>
+    <p:sldId id="263" r:id="rId6"/>
     <p:sldId id="262" r:id="rId7"/>
     <p:sldId id="260" r:id="rId8"/>
     <p:sldId id="268" r:id="rId9"/>
@@ -20,10 +20,12 @@
     <p:sldId id="266" r:id="rId11"/>
     <p:sldId id="267" r:id="rId12"/>
     <p:sldId id="265" r:id="rId13"/>
-    <p:sldId id="259" r:id="rId14"/>
-    <p:sldId id="258" r:id="rId15"/>
+    <p:sldId id="258" r:id="rId14"/>
+    <p:sldId id="259" r:id="rId15"/>
     <p:sldId id="269" r:id="rId16"/>
-    <p:sldId id="270" r:id="rId17"/>
+    <p:sldId id="276" r:id="rId17"/>
+    <p:sldId id="270" r:id="rId18"/>
+    <p:sldId id="275" r:id="rId19"/>
   </p:sldIdLst>
   <p:sldSz cx="9144000" cy="6858000" type="screen4x3"/>
   <p:notesSz cx="6858000" cy="9144000"/>
@@ -946,8 +948,8 @@
         </a:p>
       </dgm:t>
     </dgm:pt>
-    <dgm:pt modelId="{918714CD-279F-5E40-89A5-BB2440A1CD27}">
-      <dgm:prSet phldrT="[Text]">
+    <dgm:pt modelId="{F604EA65-73D1-954E-A8FE-534013E80908}">
+      <dgm:prSet phldrT="[Text]" custT="1">
         <dgm:style>
           <a:lnRef idx="3">
             <a:schemeClr val="lt1"/>
@@ -969,68 +971,10 @@
         <a:lstStyle/>
         <a:p>
           <a:r>
-            <a:rPr lang="en-US" dirty="0" smtClean="0"/>
-            <a:t>Weather</a:t>
-          </a:r>
-        </a:p>
-        <a:p>
-          <a:r>
-            <a:rPr lang="en-US" dirty="0" smtClean="0"/>
-            <a:t>Data</a:t>
-          </a:r>
-          <a:endParaRPr lang="en-US" dirty="0"/>
-        </a:p>
-      </dgm:t>
-    </dgm:pt>
-    <dgm:pt modelId="{E9A8B2C3-5496-9547-88DF-89BAD41C369A}" type="parTrans" cxnId="{92DC7FED-DABE-1049-91EA-FB1B7FAF6E8C}">
-      <dgm:prSet/>
-      <dgm:spPr/>
-      <dgm:t>
-        <a:bodyPr/>
-        <a:lstStyle/>
-        <a:p>
-          <a:endParaRPr lang="en-US"/>
-        </a:p>
-      </dgm:t>
-    </dgm:pt>
-    <dgm:pt modelId="{D5714AA4-C375-9349-9211-44241022F149}" type="sibTrans" cxnId="{92DC7FED-DABE-1049-91EA-FB1B7FAF6E8C}">
-      <dgm:prSet/>
-      <dgm:spPr/>
-      <dgm:t>
-        <a:bodyPr/>
-        <a:lstStyle/>
-        <a:p>
-          <a:endParaRPr lang="en-US"/>
-        </a:p>
-      </dgm:t>
-    </dgm:pt>
-    <dgm:pt modelId="{F604EA65-73D1-954E-A8FE-534013E80908}">
-      <dgm:prSet phldrT="[Text]">
-        <dgm:style>
-          <a:lnRef idx="3">
-            <a:schemeClr val="lt1"/>
-          </a:lnRef>
-          <a:fillRef idx="1">
-            <a:schemeClr val="accent4"/>
-          </a:fillRef>
-          <a:effectRef idx="1">
-            <a:schemeClr val="accent4"/>
-          </a:effectRef>
-          <a:fontRef idx="minor">
-            <a:schemeClr val="lt1"/>
-          </a:fontRef>
-        </dgm:style>
-      </dgm:prSet>
-      <dgm:spPr/>
-      <dgm:t>
-        <a:bodyPr/>
-        <a:lstStyle/>
-        <a:p>
-          <a:r>
-            <a:rPr lang="en-US" dirty="0" smtClean="0"/>
+            <a:rPr lang="en-US" sz="1400" dirty="0" smtClean="0"/>
             <a:t>Temperature</a:t>
           </a:r>
-          <a:endParaRPr lang="en-US" dirty="0"/>
+          <a:endParaRPr lang="en-US" sz="1400" dirty="0"/>
         </a:p>
       </dgm:t>
     </dgm:pt>
@@ -1057,7 +1001,7 @@
       </dgm:t>
     </dgm:pt>
     <dgm:pt modelId="{0AE97914-583D-A94A-AB2A-BCC5506CF2B8}">
-      <dgm:prSet phldrT="[Text]">
+      <dgm:prSet phldrT="[Text]" custT="1">
         <dgm:style>
           <a:lnRef idx="3">
             <a:schemeClr val="lt1"/>
@@ -1079,10 +1023,10 @@
         <a:lstStyle/>
         <a:p>
           <a:r>
-            <a:rPr lang="en-US" dirty="0" smtClean="0"/>
+            <a:rPr lang="en-US" sz="1400" dirty="0" smtClean="0"/>
             <a:t>Cold</a:t>
           </a:r>
-          <a:endParaRPr lang="en-US" dirty="0"/>
+          <a:endParaRPr lang="en-US" sz="1400" dirty="0"/>
         </a:p>
       </dgm:t>
     </dgm:pt>
@@ -1093,7 +1037,7 @@
         <a:bodyPr/>
         <a:lstStyle/>
         <a:p>
-          <a:endParaRPr lang="en-US"/>
+          <a:endParaRPr lang="en-US" sz="1400"/>
         </a:p>
       </dgm:t>
     </dgm:pt>
@@ -1109,7 +1053,7 @@
       </dgm:t>
     </dgm:pt>
     <dgm:pt modelId="{B7E3636F-96A0-E74C-929D-68F911C87D79}">
-      <dgm:prSet phldrT="[Text]">
+      <dgm:prSet phldrT="[Text]" custT="1">
         <dgm:style>
           <a:lnRef idx="3">
             <a:schemeClr val="lt1"/>
@@ -1131,10 +1075,10 @@
         <a:lstStyle/>
         <a:p>
           <a:r>
-            <a:rPr lang="en-US" dirty="0" smtClean="0"/>
+            <a:rPr lang="en-US" sz="1400" dirty="0" smtClean="0"/>
             <a:t>Normal</a:t>
           </a:r>
-          <a:endParaRPr lang="en-US" dirty="0"/>
+          <a:endParaRPr lang="en-US" sz="1400" dirty="0"/>
         </a:p>
       </dgm:t>
     </dgm:pt>
@@ -1145,7 +1089,7 @@
         <a:bodyPr/>
         <a:lstStyle/>
         <a:p>
-          <a:endParaRPr lang="en-US"/>
+          <a:endParaRPr lang="en-US" sz="1400"/>
         </a:p>
       </dgm:t>
     </dgm:pt>
@@ -1160,8 +1104,8 @@
         </a:p>
       </dgm:t>
     </dgm:pt>
-    <dgm:pt modelId="{BCF40B22-C7EC-404C-94D2-4398C6B29AF7}">
-      <dgm:prSet phldrT="[Text]">
+    <dgm:pt modelId="{A9C4808A-9065-314D-869C-950B5CB7E289}">
+      <dgm:prSet phldrT="[Text]" custT="1">
         <dgm:style>
           <a:lnRef idx="3">
             <a:schemeClr val="lt1"/>
@@ -1183,14 +1127,25 @@
         <a:lstStyle/>
         <a:p>
           <a:r>
-            <a:rPr lang="en-US" dirty="0" smtClean="0"/>
-            <a:t>wind</a:t>
+            <a:rPr lang="en-US" sz="1400" dirty="0" smtClean="0"/>
+            <a:t>Hot</a:t>
           </a:r>
-          <a:endParaRPr lang="en-US" dirty="0"/>
+          <a:endParaRPr lang="en-US" sz="1400" dirty="0"/>
         </a:p>
       </dgm:t>
     </dgm:pt>
-    <dgm:pt modelId="{0DDC6811-B4A3-3A48-85B2-F546724B5332}" type="parTrans" cxnId="{68251984-4631-2244-827D-BA9897BD433B}">
+    <dgm:pt modelId="{26604E32-3ED8-1A4C-9ADA-1EB56BF0D799}" type="parTrans" cxnId="{094B111E-6122-FE4D-B5C4-521C1DDE7B5A}">
+      <dgm:prSet/>
+      <dgm:spPr/>
+      <dgm:t>
+        <a:bodyPr/>
+        <a:lstStyle/>
+        <a:p>
+          <a:endParaRPr lang="en-US" sz="1400"/>
+        </a:p>
+      </dgm:t>
+    </dgm:pt>
+    <dgm:pt modelId="{BAA06BA3-5454-434F-B78E-B6A1E1FFD60C}" type="sibTrans" cxnId="{094B111E-6122-FE4D-B5C4-521C1DDE7B5A}">
       <dgm:prSet/>
       <dgm:spPr/>
       <dgm:t>
@@ -1201,19 +1156,8 @@
         </a:p>
       </dgm:t>
     </dgm:pt>
-    <dgm:pt modelId="{5298A55F-BDB7-9B44-A782-29184B91A849}" type="sibTrans" cxnId="{68251984-4631-2244-827D-BA9897BD433B}">
-      <dgm:prSet/>
-      <dgm:spPr/>
-      <dgm:t>
-        <a:bodyPr/>
-        <a:lstStyle/>
-        <a:p>
-          <a:endParaRPr lang="en-US"/>
-        </a:p>
-      </dgm:t>
-    </dgm:pt>
-    <dgm:pt modelId="{96A8C5FE-01FE-DE43-B422-E5A0D567CB91}">
-      <dgm:prSet phldrT="[Text]">
+    <dgm:pt modelId="{A3721915-87A5-3646-AF33-9B3A1FEA796C}">
+      <dgm:prSet phldrT="[Text]" custT="1">
         <dgm:style>
           <a:lnRef idx="3">
             <a:schemeClr val="lt1"/>
@@ -1235,37 +1179,15 @@
         <a:lstStyle/>
         <a:p>
           <a:r>
-            <a:rPr lang="en-US" dirty="0" err="1" smtClean="0"/>
-            <a:t>NoWindy</a:t>
+            <a:rPr lang="en-US" sz="1400" dirty="0" smtClean="0"/>
+            <a:t>More Windy</a:t>
           </a:r>
-          <a:endParaRPr lang="en-US" dirty="0"/>
+          <a:endParaRPr lang="en-US" sz="1400" dirty="0"/>
         </a:p>
       </dgm:t>
     </dgm:pt>
-    <dgm:pt modelId="{E0347BEF-C86C-4849-845F-07B8E269DD54}" type="parTrans" cxnId="{85D02D09-22A7-6E4F-B5EC-C18CF1162DF9}">
-      <dgm:prSet/>
-      <dgm:spPr/>
-      <dgm:t>
-        <a:bodyPr/>
-        <a:lstStyle/>
-        <a:p>
-          <a:endParaRPr lang="en-US"/>
-        </a:p>
-      </dgm:t>
-    </dgm:pt>
-    <dgm:pt modelId="{707AFEF1-38AF-6A42-AF1A-1FCB653FAD4C}" type="sibTrans" cxnId="{85D02D09-22A7-6E4F-B5EC-C18CF1162DF9}">
-      <dgm:prSet/>
-      <dgm:spPr/>
-      <dgm:t>
-        <a:bodyPr/>
-        <a:lstStyle/>
-        <a:p>
-          <a:endParaRPr lang="en-US"/>
-        </a:p>
-      </dgm:t>
-    </dgm:pt>
-    <dgm:pt modelId="{A9C4808A-9065-314D-869C-950B5CB7E289}">
-      <dgm:prSet phldrT="[Text]">
+    <dgm:pt modelId="{4EE6B9FE-93FE-B948-836B-BB26D0ED9CD5}">
+      <dgm:prSet phldrT="[Text]" custT="1">
         <dgm:style>
           <a:lnRef idx="3">
             <a:schemeClr val="lt1"/>
@@ -1287,37 +1209,15 @@
         <a:lstStyle/>
         <a:p>
           <a:r>
-            <a:rPr lang="en-US" dirty="0" smtClean="0"/>
-            <a:t>Hot</a:t>
+            <a:rPr lang="en-US" sz="1400" dirty="0" smtClean="0"/>
+            <a:t>Less Windy</a:t>
           </a:r>
-          <a:endParaRPr lang="en-US" dirty="0"/>
+          <a:endParaRPr lang="en-US" sz="1400" dirty="0"/>
         </a:p>
       </dgm:t>
     </dgm:pt>
-    <dgm:pt modelId="{26604E32-3ED8-1A4C-9ADA-1EB56BF0D799}" type="parTrans" cxnId="{094B111E-6122-FE4D-B5C4-521C1DDE7B5A}">
-      <dgm:prSet/>
-      <dgm:spPr/>
-      <dgm:t>
-        <a:bodyPr/>
-        <a:lstStyle/>
-        <a:p>
-          <a:endParaRPr lang="en-US"/>
-        </a:p>
-      </dgm:t>
-    </dgm:pt>
-    <dgm:pt modelId="{BAA06BA3-5454-434F-B78E-B6A1E1FFD60C}" type="sibTrans" cxnId="{094B111E-6122-FE4D-B5C4-521C1DDE7B5A}">
-      <dgm:prSet/>
-      <dgm:spPr/>
-      <dgm:t>
-        <a:bodyPr/>
-        <a:lstStyle/>
-        <a:p>
-          <a:endParaRPr lang="en-US"/>
-        </a:p>
-      </dgm:t>
-    </dgm:pt>
-    <dgm:pt modelId="{A3721915-87A5-3646-AF33-9B3A1FEA796C}">
-      <dgm:prSet phldrT="[Text]">
+    <dgm:pt modelId="{96A8C5FE-01FE-DE43-B422-E5A0D567CB91}">
+      <dgm:prSet phldrT="[Text]" custT="1">
         <dgm:style>
           <a:lnRef idx="3">
             <a:schemeClr val="lt1"/>
@@ -1339,14 +1239,55 @@
         <a:lstStyle/>
         <a:p>
           <a:r>
-            <a:rPr lang="en-US" dirty="0" err="1" smtClean="0"/>
-            <a:t>MoreWindy</a:t>
+            <a:rPr lang="en-US" sz="1400" dirty="0" smtClean="0"/>
+            <a:t>No Windy</a:t>
           </a:r>
-          <a:endParaRPr lang="en-US" dirty="0"/>
+          <a:endParaRPr lang="en-US" sz="1400" dirty="0"/>
         </a:p>
       </dgm:t>
     </dgm:pt>
-    <dgm:pt modelId="{04C0799E-C50F-414C-8045-FFEB88FEFA4A}" type="parTrans" cxnId="{34AA9C2C-F3AC-4749-8EAD-A54CA83AD9A3}">
+    <dgm:pt modelId="{BCF40B22-C7EC-404C-94D2-4398C6B29AF7}">
+      <dgm:prSet phldrT="[Text]" custT="1">
+        <dgm:style>
+          <a:lnRef idx="3">
+            <a:schemeClr val="lt1"/>
+          </a:lnRef>
+          <a:fillRef idx="1">
+            <a:schemeClr val="accent4"/>
+          </a:fillRef>
+          <a:effectRef idx="1">
+            <a:schemeClr val="accent4"/>
+          </a:effectRef>
+          <a:fontRef idx="minor">
+            <a:schemeClr val="lt1"/>
+          </a:fontRef>
+        </dgm:style>
+      </dgm:prSet>
+      <dgm:spPr/>
+      <dgm:t>
+        <a:bodyPr/>
+        <a:lstStyle/>
+        <a:p>
+          <a:r>
+            <a:rPr lang="en-US" sz="1400" dirty="0" smtClean="0"/>
+            <a:t>wind</a:t>
+          </a:r>
+          <a:endParaRPr lang="en-US" sz="1400" dirty="0"/>
+        </a:p>
+      </dgm:t>
+    </dgm:pt>
+    <dgm:pt modelId="{5298A55F-BDB7-9B44-A782-29184B91A849}" type="sibTrans" cxnId="{68251984-4631-2244-827D-BA9897BD433B}">
+      <dgm:prSet/>
+      <dgm:spPr/>
+      <dgm:t>
+        <a:bodyPr/>
+        <a:lstStyle/>
+        <a:p>
+          <a:endParaRPr lang="en-US"/>
+        </a:p>
+      </dgm:t>
+    </dgm:pt>
+    <dgm:pt modelId="{0DDC6811-B4A3-3A48-85B2-F546724B5332}" type="parTrans" cxnId="{68251984-4631-2244-827D-BA9897BD433B}">
       <dgm:prSet/>
       <dgm:spPr/>
       <dgm:t>
@@ -1368,44 +1309,14 @@
         </a:p>
       </dgm:t>
     </dgm:pt>
-    <dgm:pt modelId="{4EE6B9FE-93FE-B948-836B-BB26D0ED9CD5}">
-      <dgm:prSet phldrT="[Text]">
-        <dgm:style>
-          <a:lnRef idx="3">
-            <a:schemeClr val="lt1"/>
-          </a:lnRef>
-          <a:fillRef idx="1">
-            <a:schemeClr val="accent4"/>
-          </a:fillRef>
-          <a:effectRef idx="1">
-            <a:schemeClr val="accent4"/>
-          </a:effectRef>
-          <a:fontRef idx="minor">
-            <a:schemeClr val="lt1"/>
-          </a:fontRef>
-        </dgm:style>
-      </dgm:prSet>
-      <dgm:spPr/>
-      <dgm:t>
-        <a:bodyPr/>
-        <a:lstStyle/>
-        <a:p>
-          <a:r>
-            <a:rPr lang="en-US" dirty="0" err="1" smtClean="0"/>
-            <a:t>LessWindy</a:t>
-          </a:r>
-          <a:endParaRPr lang="en-US" dirty="0"/>
-        </a:p>
-      </dgm:t>
-    </dgm:pt>
-    <dgm:pt modelId="{0F81557E-325E-CB47-A3E3-A75EA97A8C49}" type="parTrans" cxnId="{4A4F2CDF-F7C4-5E43-A554-2DBD1C9A471D}">
+    <dgm:pt modelId="{04C0799E-C50F-414C-8045-FFEB88FEFA4A}" type="parTrans" cxnId="{34AA9C2C-F3AC-4749-8EAD-A54CA83AD9A3}">
       <dgm:prSet/>
       <dgm:spPr/>
       <dgm:t>
         <a:bodyPr/>
         <a:lstStyle/>
         <a:p>
-          <a:endParaRPr lang="en-US"/>
+          <a:endParaRPr lang="en-US" sz="1400"/>
         </a:p>
       </dgm:t>
     </dgm:pt>
@@ -1417,6 +1328,39 @@
         <a:lstStyle/>
         <a:p>
           <a:endParaRPr lang="en-US"/>
+        </a:p>
+      </dgm:t>
+    </dgm:pt>
+    <dgm:pt modelId="{0F81557E-325E-CB47-A3E3-A75EA97A8C49}" type="parTrans" cxnId="{4A4F2CDF-F7C4-5E43-A554-2DBD1C9A471D}">
+      <dgm:prSet/>
+      <dgm:spPr/>
+      <dgm:t>
+        <a:bodyPr/>
+        <a:lstStyle/>
+        <a:p>
+          <a:endParaRPr lang="en-US" sz="1400"/>
+        </a:p>
+      </dgm:t>
+    </dgm:pt>
+    <dgm:pt modelId="{707AFEF1-38AF-6A42-AF1A-1FCB653FAD4C}" type="sibTrans" cxnId="{85D02D09-22A7-6E4F-B5EC-C18CF1162DF9}">
+      <dgm:prSet/>
+      <dgm:spPr/>
+      <dgm:t>
+        <a:bodyPr/>
+        <a:lstStyle/>
+        <a:p>
+          <a:endParaRPr lang="en-US"/>
+        </a:p>
+      </dgm:t>
+    </dgm:pt>
+    <dgm:pt modelId="{E0347BEF-C86C-4849-845F-07B8E269DD54}" type="parTrans" cxnId="{85D02D09-22A7-6E4F-B5EC-C18CF1162DF9}">
+      <dgm:prSet/>
+      <dgm:spPr/>
+      <dgm:t>
+        <a:bodyPr/>
+        <a:lstStyle/>
+        <a:p>
+          <a:endParaRPr lang="en-US" sz="1400"/>
         </a:p>
       </dgm:t>
     </dgm:pt>
@@ -1439,20 +1383,20 @@
         </a:p>
       </dgm:t>
     </dgm:pt>
-    <dgm:pt modelId="{0A92AA72-E6D3-B44C-886A-063760756F53}" type="pres">
-      <dgm:prSet presAssocID="{918714CD-279F-5E40-89A5-BB2440A1CD27}" presName="hierRoot1" presStyleCnt="0"/>
+    <dgm:pt modelId="{0107323B-AB6A-DF46-9558-F2A00573E742}" type="pres">
+      <dgm:prSet presAssocID="{F604EA65-73D1-954E-A8FE-534013E80908}" presName="hierRoot1" presStyleCnt="0"/>
       <dgm:spPr/>
     </dgm:pt>
-    <dgm:pt modelId="{E0338EFA-EB90-4749-BE00-89A527AC7B8F}" type="pres">
-      <dgm:prSet presAssocID="{918714CD-279F-5E40-89A5-BB2440A1CD27}" presName="composite" presStyleCnt="0"/>
+    <dgm:pt modelId="{2446556B-6860-6343-AFF8-7804F9617D9C}" type="pres">
+      <dgm:prSet presAssocID="{F604EA65-73D1-954E-A8FE-534013E80908}" presName="composite" presStyleCnt="0"/>
       <dgm:spPr/>
     </dgm:pt>
-    <dgm:pt modelId="{07DEC678-BC37-564E-9AE0-8AA8BB6DF9E7}" type="pres">
-      <dgm:prSet presAssocID="{918714CD-279F-5E40-89A5-BB2440A1CD27}" presName="background" presStyleLbl="node0" presStyleIdx="0" presStyleCnt="1"/>
+    <dgm:pt modelId="{42A43388-E789-394D-B76A-66E3123703CA}" type="pres">
+      <dgm:prSet presAssocID="{F604EA65-73D1-954E-A8FE-534013E80908}" presName="background" presStyleLbl="node0" presStyleIdx="0" presStyleCnt="2"/>
       <dgm:spPr/>
     </dgm:pt>
-    <dgm:pt modelId="{837E5A63-2D47-3642-AE80-CA6243691F17}" type="pres">
-      <dgm:prSet presAssocID="{918714CD-279F-5E40-89A5-BB2440A1CD27}" presName="text" presStyleLbl="fgAcc0" presStyleIdx="0" presStyleCnt="1" custScaleX="164718" custScaleY="128635">
+    <dgm:pt modelId="{4F044C4F-D103-3645-A702-541F3D427E00}" type="pres">
+      <dgm:prSet presAssocID="{F604EA65-73D1-954E-A8FE-534013E80908}" presName="text" presStyleLbl="fgAcc0" presStyleIdx="0" presStyleCnt="2" custScaleX="165560">
         <dgm:presLayoutVars>
           <dgm:chPref val="3"/>
         </dgm:presLayoutVars>
@@ -1466,12 +1410,12 @@
         </a:p>
       </dgm:t>
     </dgm:pt>
-    <dgm:pt modelId="{3C7FCF96-07C1-2A44-B3CE-3AFD4BE3468A}" type="pres">
-      <dgm:prSet presAssocID="{918714CD-279F-5E40-89A5-BB2440A1CD27}" presName="hierChild2" presStyleCnt="0"/>
+    <dgm:pt modelId="{E3BC0BB4-33CB-C646-92AA-E0EDE2DDB1F6}" type="pres">
+      <dgm:prSet presAssocID="{F604EA65-73D1-954E-A8FE-534013E80908}" presName="hierChild2" presStyleCnt="0"/>
       <dgm:spPr/>
     </dgm:pt>
-    <dgm:pt modelId="{2A3D3039-5583-714F-8BDC-C6AD22EF8074}" type="pres">
-      <dgm:prSet presAssocID="{B6880E06-5329-4744-B608-36A1B2408450}" presName="Name10" presStyleLbl="parChTrans1D2" presStyleIdx="0" presStyleCnt="2"/>
+    <dgm:pt modelId="{590EF2DA-D985-BA47-B7F5-D2720ABACD73}" type="pres">
+      <dgm:prSet presAssocID="{A16FE1D5-FDBE-2C4D-90B5-D96F7E9E9B75}" presName="Name10" presStyleLbl="parChTrans1D2" presStyleIdx="0" presStyleCnt="6"/>
       <dgm:spPr/>
       <dgm:t>
         <a:bodyPr/>
@@ -1481,20 +1425,20 @@
         </a:p>
       </dgm:t>
     </dgm:pt>
-    <dgm:pt modelId="{9E664918-C144-2C4E-821E-6BDD42CDB021}" type="pres">
-      <dgm:prSet presAssocID="{F604EA65-73D1-954E-A8FE-534013E80908}" presName="hierRoot2" presStyleCnt="0"/>
+    <dgm:pt modelId="{8D5D2210-75B0-D74E-BB80-FE7F17402A07}" type="pres">
+      <dgm:prSet presAssocID="{0AE97914-583D-A94A-AB2A-BCC5506CF2B8}" presName="hierRoot2" presStyleCnt="0"/>
       <dgm:spPr/>
     </dgm:pt>
-    <dgm:pt modelId="{DD20F403-E31D-514A-A2C8-463107A2B8A5}" type="pres">
-      <dgm:prSet presAssocID="{F604EA65-73D1-954E-A8FE-534013E80908}" presName="composite2" presStyleCnt="0"/>
+    <dgm:pt modelId="{995A08D6-34EF-A54F-9998-00A116BFBE21}" type="pres">
+      <dgm:prSet presAssocID="{0AE97914-583D-A94A-AB2A-BCC5506CF2B8}" presName="composite2" presStyleCnt="0"/>
       <dgm:spPr/>
     </dgm:pt>
-    <dgm:pt modelId="{F0962C2B-55C7-FB49-9E5C-A504ADF92E67}" type="pres">
-      <dgm:prSet presAssocID="{F604EA65-73D1-954E-A8FE-534013E80908}" presName="background2" presStyleLbl="node2" presStyleIdx="0" presStyleCnt="2"/>
+    <dgm:pt modelId="{8863B2E7-4766-2D4A-88CF-3F3C0CCD0A5B}" type="pres">
+      <dgm:prSet presAssocID="{0AE97914-583D-A94A-AB2A-BCC5506CF2B8}" presName="background2" presStyleLbl="node2" presStyleIdx="0" presStyleCnt="6"/>
       <dgm:spPr/>
     </dgm:pt>
-    <dgm:pt modelId="{4916C6DF-8AF5-8A41-BA74-68BDC2D7CC4A}" type="pres">
-      <dgm:prSet presAssocID="{F604EA65-73D1-954E-A8FE-534013E80908}" presName="text2" presStyleLbl="fgAcc2" presStyleIdx="0" presStyleCnt="2" custScaleX="114729" custScaleY="118134">
+    <dgm:pt modelId="{90B71D96-D16C-A44D-ADA7-6D2B5C54E7BE}" type="pres">
+      <dgm:prSet presAssocID="{0AE97914-583D-A94A-AB2A-BCC5506CF2B8}" presName="text2" presStyleLbl="fgAcc2" presStyleIdx="0" presStyleCnt="6">
         <dgm:presLayoutVars>
           <dgm:chPref val="3"/>
         </dgm:presLayoutVars>
@@ -1508,12 +1452,12 @@
         </a:p>
       </dgm:t>
     </dgm:pt>
-    <dgm:pt modelId="{27C0DA51-8322-2846-8943-BF109491D235}" type="pres">
-      <dgm:prSet presAssocID="{F604EA65-73D1-954E-A8FE-534013E80908}" presName="hierChild3" presStyleCnt="0"/>
+    <dgm:pt modelId="{DC23F4AF-A32D-3B4C-B791-07337666AA40}" type="pres">
+      <dgm:prSet presAssocID="{0AE97914-583D-A94A-AB2A-BCC5506CF2B8}" presName="hierChild3" presStyleCnt="0"/>
       <dgm:spPr/>
     </dgm:pt>
-    <dgm:pt modelId="{F482AE1D-3B50-CF43-BA82-91C028E061EC}" type="pres">
-      <dgm:prSet presAssocID="{A16FE1D5-FDBE-2C4D-90B5-D96F7E9E9B75}" presName="Name17" presStyleLbl="parChTrans1D3" presStyleIdx="0" presStyleCnt="6"/>
+    <dgm:pt modelId="{0BF4E42F-688A-F044-B96F-3A49E18DBF13}" type="pres">
+      <dgm:prSet presAssocID="{57E2E002-084F-B249-A1AE-8432B453165B}" presName="Name10" presStyleLbl="parChTrans1D2" presStyleIdx="1" presStyleCnt="6"/>
       <dgm:spPr/>
       <dgm:t>
         <a:bodyPr/>
@@ -1523,20 +1467,20 @@
         </a:p>
       </dgm:t>
     </dgm:pt>
-    <dgm:pt modelId="{75E6EE6F-DE11-4948-A2C7-BDE93D7BCBEB}" type="pres">
-      <dgm:prSet presAssocID="{0AE97914-583D-A94A-AB2A-BCC5506CF2B8}" presName="hierRoot3" presStyleCnt="0"/>
+    <dgm:pt modelId="{0FF0FA75-092D-724A-B6BC-C98A3E18B25E}" type="pres">
+      <dgm:prSet presAssocID="{B7E3636F-96A0-E74C-929D-68F911C87D79}" presName="hierRoot2" presStyleCnt="0"/>
       <dgm:spPr/>
     </dgm:pt>
-    <dgm:pt modelId="{1F37A5AB-3E92-9E4B-AF85-FC366FFB3D41}" type="pres">
-      <dgm:prSet presAssocID="{0AE97914-583D-A94A-AB2A-BCC5506CF2B8}" presName="composite3" presStyleCnt="0"/>
+    <dgm:pt modelId="{C7CA74DC-A0AB-D04D-9134-A1319C4EF94B}" type="pres">
+      <dgm:prSet presAssocID="{B7E3636F-96A0-E74C-929D-68F911C87D79}" presName="composite2" presStyleCnt="0"/>
       <dgm:spPr/>
     </dgm:pt>
-    <dgm:pt modelId="{8F676DE6-2465-FF40-A0CF-4DCA5A8C93F4}" type="pres">
-      <dgm:prSet presAssocID="{0AE97914-583D-A94A-AB2A-BCC5506CF2B8}" presName="background3" presStyleLbl="node3" presStyleIdx="0" presStyleCnt="6"/>
+    <dgm:pt modelId="{6915BA8F-E5BB-CF47-B884-BC88373432C7}" type="pres">
+      <dgm:prSet presAssocID="{B7E3636F-96A0-E74C-929D-68F911C87D79}" presName="background2" presStyleLbl="node2" presStyleIdx="1" presStyleCnt="6"/>
       <dgm:spPr/>
     </dgm:pt>
-    <dgm:pt modelId="{C46DA6D4-BB47-BB43-BA94-8E99D7176E77}" type="pres">
-      <dgm:prSet presAssocID="{0AE97914-583D-A94A-AB2A-BCC5506CF2B8}" presName="text3" presStyleLbl="fgAcc3" presStyleIdx="0" presStyleCnt="6" custScaleX="48859" custScaleY="62683">
+    <dgm:pt modelId="{9D57D76D-EAEE-B640-912A-8397C909ED0A}" type="pres">
+      <dgm:prSet presAssocID="{B7E3636F-96A0-E74C-929D-68F911C87D79}" presName="text2" presStyleLbl="fgAcc2" presStyleIdx="1" presStyleCnt="6">
         <dgm:presLayoutVars>
           <dgm:chPref val="3"/>
         </dgm:presLayoutVars>
@@ -1550,12 +1494,12 @@
         </a:p>
       </dgm:t>
     </dgm:pt>
-    <dgm:pt modelId="{DD365824-4BE7-2A49-887D-2C93E155B9D4}" type="pres">
-      <dgm:prSet presAssocID="{0AE97914-583D-A94A-AB2A-BCC5506CF2B8}" presName="hierChild4" presStyleCnt="0"/>
+    <dgm:pt modelId="{4C79BC58-CBD8-4240-85D5-26BAC63EFAB9}" type="pres">
+      <dgm:prSet presAssocID="{B7E3636F-96A0-E74C-929D-68F911C87D79}" presName="hierChild3" presStyleCnt="0"/>
       <dgm:spPr/>
     </dgm:pt>
-    <dgm:pt modelId="{F81187F8-5EF9-AD4C-9413-51E8301CB19E}" type="pres">
-      <dgm:prSet presAssocID="{57E2E002-084F-B249-A1AE-8432B453165B}" presName="Name17" presStyleLbl="parChTrans1D3" presStyleIdx="1" presStyleCnt="6"/>
+    <dgm:pt modelId="{D1A7E394-6619-8F4A-BD4C-BE06A5AAA2EF}" type="pres">
+      <dgm:prSet presAssocID="{26604E32-3ED8-1A4C-9ADA-1EB56BF0D799}" presName="Name10" presStyleLbl="parChTrans1D2" presStyleIdx="2" presStyleCnt="6"/>
       <dgm:spPr/>
       <dgm:t>
         <a:bodyPr/>
@@ -1565,20 +1509,20 @@
         </a:p>
       </dgm:t>
     </dgm:pt>
-    <dgm:pt modelId="{76E49F5A-2765-CE44-90FC-B04B0709CADD}" type="pres">
-      <dgm:prSet presAssocID="{B7E3636F-96A0-E74C-929D-68F911C87D79}" presName="hierRoot3" presStyleCnt="0"/>
+    <dgm:pt modelId="{2B4A707B-F0A4-5443-803E-0F7362D4C172}" type="pres">
+      <dgm:prSet presAssocID="{A9C4808A-9065-314D-869C-950B5CB7E289}" presName="hierRoot2" presStyleCnt="0"/>
       <dgm:spPr/>
     </dgm:pt>
-    <dgm:pt modelId="{F37EC31D-7783-0A41-9092-B98D39F16D83}" type="pres">
-      <dgm:prSet presAssocID="{B7E3636F-96A0-E74C-929D-68F911C87D79}" presName="composite3" presStyleCnt="0"/>
+    <dgm:pt modelId="{62F3E46A-EC02-914E-A046-51BD1AF67DDE}" type="pres">
+      <dgm:prSet presAssocID="{A9C4808A-9065-314D-869C-950B5CB7E289}" presName="composite2" presStyleCnt="0"/>
       <dgm:spPr/>
     </dgm:pt>
-    <dgm:pt modelId="{31778C90-318B-804F-B9BE-B948D5E00C24}" type="pres">
-      <dgm:prSet presAssocID="{B7E3636F-96A0-E74C-929D-68F911C87D79}" presName="background3" presStyleLbl="node3" presStyleIdx="1" presStyleCnt="6"/>
+    <dgm:pt modelId="{89F92768-DEE1-F24B-BB2B-4A9861A71A8E}" type="pres">
+      <dgm:prSet presAssocID="{A9C4808A-9065-314D-869C-950B5CB7E289}" presName="background2" presStyleLbl="node2" presStyleIdx="2" presStyleCnt="6"/>
       <dgm:spPr/>
     </dgm:pt>
-    <dgm:pt modelId="{78714293-9687-BF4F-9E80-096454577EA3}" type="pres">
-      <dgm:prSet presAssocID="{B7E3636F-96A0-E74C-929D-68F911C87D79}" presName="text3" presStyleLbl="fgAcc3" presStyleIdx="1" presStyleCnt="6" custFlipVert="0" custScaleY="73325">
+    <dgm:pt modelId="{D6790B64-5B54-934D-BB79-A873EB8D769C}" type="pres">
+      <dgm:prSet presAssocID="{A9C4808A-9065-314D-869C-950B5CB7E289}" presName="text2" presStyleLbl="fgAcc2" presStyleIdx="2" presStyleCnt="6">
         <dgm:presLayoutVars>
           <dgm:chPref val="3"/>
         </dgm:presLayoutVars>
@@ -1592,35 +1536,24 @@
         </a:p>
       </dgm:t>
     </dgm:pt>
-    <dgm:pt modelId="{A54ECB7C-B4E1-0A4C-A445-3E283DB5D939}" type="pres">
-      <dgm:prSet presAssocID="{B7E3636F-96A0-E74C-929D-68F911C87D79}" presName="hierChild4" presStyleCnt="0"/>
+    <dgm:pt modelId="{3C25AC02-E3A0-E84A-BAAF-D45EF7AF8842}" type="pres">
+      <dgm:prSet presAssocID="{A9C4808A-9065-314D-869C-950B5CB7E289}" presName="hierChild3" presStyleCnt="0"/>
       <dgm:spPr/>
     </dgm:pt>
-    <dgm:pt modelId="{F6E206C8-35B9-3E45-B035-AA752A83E72E}" type="pres">
-      <dgm:prSet presAssocID="{26604E32-3ED8-1A4C-9ADA-1EB56BF0D799}" presName="Name17" presStyleLbl="parChTrans1D3" presStyleIdx="2" presStyleCnt="6"/>
-      <dgm:spPr/>
-      <dgm:t>
-        <a:bodyPr/>
-        <a:lstStyle/>
-        <a:p>
-          <a:endParaRPr lang="en-US"/>
-        </a:p>
-      </dgm:t>
-    </dgm:pt>
-    <dgm:pt modelId="{D1E0C0C6-E2B5-3C44-B788-78BE961EE38C}" type="pres">
-      <dgm:prSet presAssocID="{A9C4808A-9065-314D-869C-950B5CB7E289}" presName="hierRoot3" presStyleCnt="0"/>
+    <dgm:pt modelId="{0CAEACC3-7BAB-DB44-AB00-D17A37B7D3B6}" type="pres">
+      <dgm:prSet presAssocID="{BCF40B22-C7EC-404C-94D2-4398C6B29AF7}" presName="hierRoot1" presStyleCnt="0"/>
       <dgm:spPr/>
     </dgm:pt>
-    <dgm:pt modelId="{CB87C407-EB24-7244-B5BF-9351B0302D62}" type="pres">
-      <dgm:prSet presAssocID="{A9C4808A-9065-314D-869C-950B5CB7E289}" presName="composite3" presStyleCnt="0"/>
+    <dgm:pt modelId="{1D9A6981-BA88-B446-BC5F-EACDB990937F}" type="pres">
+      <dgm:prSet presAssocID="{BCF40B22-C7EC-404C-94D2-4398C6B29AF7}" presName="composite" presStyleCnt="0"/>
       <dgm:spPr/>
     </dgm:pt>
-    <dgm:pt modelId="{491ACA98-546C-784D-A6A9-1F6DD84AFF99}" type="pres">
-      <dgm:prSet presAssocID="{A9C4808A-9065-314D-869C-950B5CB7E289}" presName="background3" presStyleLbl="node3" presStyleIdx="2" presStyleCnt="6"/>
+    <dgm:pt modelId="{EEBBDB83-3136-3A4F-B23B-8632C65EDB26}" type="pres">
+      <dgm:prSet presAssocID="{BCF40B22-C7EC-404C-94D2-4398C6B29AF7}" presName="background" presStyleLbl="node0" presStyleIdx="1" presStyleCnt="2"/>
       <dgm:spPr/>
     </dgm:pt>
-    <dgm:pt modelId="{DB7282DC-FD82-794B-8CA8-FE8E5F581CB9}" type="pres">
-      <dgm:prSet presAssocID="{A9C4808A-9065-314D-869C-950B5CB7E289}" presName="text3" presStyleLbl="fgAcc3" presStyleIdx="2" presStyleCnt="6" custScaleX="53843" custScaleY="49313">
+    <dgm:pt modelId="{3D60D745-F8DA-3646-8840-889561662A91}" type="pres">
+      <dgm:prSet presAssocID="{BCF40B22-C7EC-404C-94D2-4398C6B29AF7}" presName="text" presStyleLbl="fgAcc0" presStyleIdx="1" presStyleCnt="2">
         <dgm:presLayoutVars>
           <dgm:chPref val="3"/>
         </dgm:presLayoutVars>
@@ -1634,12 +1567,12 @@
         </a:p>
       </dgm:t>
     </dgm:pt>
-    <dgm:pt modelId="{F8666701-1BC2-DF4D-9698-E041837FD862}" type="pres">
-      <dgm:prSet presAssocID="{A9C4808A-9065-314D-869C-950B5CB7E289}" presName="hierChild4" presStyleCnt="0"/>
+    <dgm:pt modelId="{11B7D9FB-407F-C545-BDD0-7A73E84071B1}" type="pres">
+      <dgm:prSet presAssocID="{BCF40B22-C7EC-404C-94D2-4398C6B29AF7}" presName="hierChild2" presStyleCnt="0"/>
       <dgm:spPr/>
     </dgm:pt>
-    <dgm:pt modelId="{51CAB5F6-625F-1C48-AB17-7D6F98039BA8}" type="pres">
-      <dgm:prSet presAssocID="{0DDC6811-B4A3-3A48-85B2-F546724B5332}" presName="Name10" presStyleLbl="parChTrans1D2" presStyleIdx="1" presStyleCnt="2"/>
+    <dgm:pt modelId="{620BF8B5-5C40-4449-AE61-18BC564B1BA7}" type="pres">
+      <dgm:prSet presAssocID="{E0347BEF-C86C-4849-845F-07B8E269DD54}" presName="Name10" presStyleLbl="parChTrans1D2" presStyleIdx="3" presStyleCnt="6"/>
       <dgm:spPr/>
       <dgm:t>
         <a:bodyPr/>
@@ -1649,20 +1582,20 @@
         </a:p>
       </dgm:t>
     </dgm:pt>
-    <dgm:pt modelId="{1217F6FB-6BBB-D849-8779-D3A52736F63B}" type="pres">
-      <dgm:prSet presAssocID="{BCF40B22-C7EC-404C-94D2-4398C6B29AF7}" presName="hierRoot2" presStyleCnt="0"/>
+    <dgm:pt modelId="{6E51DB57-01D5-A94B-924F-5BA6EDE3C824}" type="pres">
+      <dgm:prSet presAssocID="{96A8C5FE-01FE-DE43-B422-E5A0D567CB91}" presName="hierRoot2" presStyleCnt="0"/>
       <dgm:spPr/>
     </dgm:pt>
-    <dgm:pt modelId="{D54B2CB3-5015-F44D-BA39-FC76AEAA7E18}" type="pres">
-      <dgm:prSet presAssocID="{BCF40B22-C7EC-404C-94D2-4398C6B29AF7}" presName="composite2" presStyleCnt="0"/>
+    <dgm:pt modelId="{C8E91609-6896-2440-BA23-AB467E136493}" type="pres">
+      <dgm:prSet presAssocID="{96A8C5FE-01FE-DE43-B422-E5A0D567CB91}" presName="composite2" presStyleCnt="0"/>
       <dgm:spPr/>
     </dgm:pt>
-    <dgm:pt modelId="{29D5443D-4F14-0A40-808C-7EAD0336EF94}" type="pres">
-      <dgm:prSet presAssocID="{BCF40B22-C7EC-404C-94D2-4398C6B29AF7}" presName="background2" presStyleLbl="node2" presStyleIdx="1" presStyleCnt="2"/>
+    <dgm:pt modelId="{833DC58F-C0F0-D742-B666-0C1D0D48F60C}" type="pres">
+      <dgm:prSet presAssocID="{96A8C5FE-01FE-DE43-B422-E5A0D567CB91}" presName="background2" presStyleLbl="node2" presStyleIdx="3" presStyleCnt="6"/>
       <dgm:spPr/>
     </dgm:pt>
-    <dgm:pt modelId="{F39C15BE-639B-4E4F-9384-794712B1DC40}" type="pres">
-      <dgm:prSet presAssocID="{BCF40B22-C7EC-404C-94D2-4398C6B29AF7}" presName="text2" presStyleLbl="fgAcc2" presStyleIdx="1" presStyleCnt="2" custScaleX="153984">
+    <dgm:pt modelId="{E953BFC6-3860-9341-8D3D-88AF6BEFEB72}" type="pres">
+      <dgm:prSet presAssocID="{96A8C5FE-01FE-DE43-B422-E5A0D567CB91}" presName="text2" presStyleLbl="fgAcc2" presStyleIdx="3" presStyleCnt="6" custScaleX="122133">
         <dgm:presLayoutVars>
           <dgm:chPref val="3"/>
         </dgm:presLayoutVars>
@@ -1676,12 +1609,12 @@
         </a:p>
       </dgm:t>
     </dgm:pt>
-    <dgm:pt modelId="{7562ECB6-0FC5-1F43-959F-58606AEEFDD2}" type="pres">
-      <dgm:prSet presAssocID="{BCF40B22-C7EC-404C-94D2-4398C6B29AF7}" presName="hierChild3" presStyleCnt="0"/>
+    <dgm:pt modelId="{F5DF654D-E1A2-E548-8808-A6552F51CBC2}" type="pres">
+      <dgm:prSet presAssocID="{96A8C5FE-01FE-DE43-B422-E5A0D567CB91}" presName="hierChild3" presStyleCnt="0"/>
       <dgm:spPr/>
     </dgm:pt>
-    <dgm:pt modelId="{0483006D-72A5-8A45-82C0-D7DA3A137B9E}" type="pres">
-      <dgm:prSet presAssocID="{E0347BEF-C86C-4849-845F-07B8E269DD54}" presName="Name17" presStyleLbl="parChTrans1D3" presStyleIdx="3" presStyleCnt="6"/>
+    <dgm:pt modelId="{A28A8720-84CB-4744-95E4-D8D388FCF11A}" type="pres">
+      <dgm:prSet presAssocID="{0F81557E-325E-CB47-A3E3-A75EA97A8C49}" presName="Name10" presStyleLbl="parChTrans1D2" presStyleIdx="4" presStyleCnt="6"/>
       <dgm:spPr/>
       <dgm:t>
         <a:bodyPr/>
@@ -1691,20 +1624,20 @@
         </a:p>
       </dgm:t>
     </dgm:pt>
-    <dgm:pt modelId="{6EF79B2E-06E4-924B-9631-127D442CF567}" type="pres">
-      <dgm:prSet presAssocID="{96A8C5FE-01FE-DE43-B422-E5A0D567CB91}" presName="hierRoot3" presStyleCnt="0"/>
+    <dgm:pt modelId="{8E43A59E-5D59-BC4E-804F-BF3A0521DE0D}" type="pres">
+      <dgm:prSet presAssocID="{4EE6B9FE-93FE-B948-836B-BB26D0ED9CD5}" presName="hierRoot2" presStyleCnt="0"/>
       <dgm:spPr/>
     </dgm:pt>
-    <dgm:pt modelId="{26AF29CE-A452-9D44-A499-623C1761A500}" type="pres">
-      <dgm:prSet presAssocID="{96A8C5FE-01FE-DE43-B422-E5A0D567CB91}" presName="composite3" presStyleCnt="0"/>
+    <dgm:pt modelId="{2F2DC0C8-4912-A345-BDF9-7F5356E563D6}" type="pres">
+      <dgm:prSet presAssocID="{4EE6B9FE-93FE-B948-836B-BB26D0ED9CD5}" presName="composite2" presStyleCnt="0"/>
       <dgm:spPr/>
     </dgm:pt>
-    <dgm:pt modelId="{C4467734-F559-C747-871B-2770F85BFB4A}" type="pres">
-      <dgm:prSet presAssocID="{96A8C5FE-01FE-DE43-B422-E5A0D567CB91}" presName="background3" presStyleLbl="node3" presStyleIdx="3" presStyleCnt="6"/>
+    <dgm:pt modelId="{89E4FA6F-6389-0847-AFB9-8EA95E095831}" type="pres">
+      <dgm:prSet presAssocID="{4EE6B9FE-93FE-B948-836B-BB26D0ED9CD5}" presName="background2" presStyleLbl="node2" presStyleIdx="4" presStyleCnt="6"/>
       <dgm:spPr/>
     </dgm:pt>
-    <dgm:pt modelId="{5D13620B-D745-704E-806A-F05283395C15}" type="pres">
-      <dgm:prSet presAssocID="{96A8C5FE-01FE-DE43-B422-E5A0D567CB91}" presName="text3" presStyleLbl="fgAcc3" presStyleIdx="3" presStyleCnt="6" custScaleY="66489">
+    <dgm:pt modelId="{81D41B1E-72C8-4D42-ADDE-9C3B1A52E816}" type="pres">
+      <dgm:prSet presAssocID="{4EE6B9FE-93FE-B948-836B-BB26D0ED9CD5}" presName="text2" presStyleLbl="fgAcc2" presStyleIdx="4" presStyleCnt="6" custScaleX="112798">
         <dgm:presLayoutVars>
           <dgm:chPref val="3"/>
         </dgm:presLayoutVars>
@@ -1718,12 +1651,12 @@
         </a:p>
       </dgm:t>
     </dgm:pt>
-    <dgm:pt modelId="{64F066FE-5E55-A54B-95A9-933E5CCC9ED5}" type="pres">
-      <dgm:prSet presAssocID="{96A8C5FE-01FE-DE43-B422-E5A0D567CB91}" presName="hierChild4" presStyleCnt="0"/>
+    <dgm:pt modelId="{BE06FB04-6CFE-3443-9E81-A97809EAB354}" type="pres">
+      <dgm:prSet presAssocID="{4EE6B9FE-93FE-B948-836B-BB26D0ED9CD5}" presName="hierChild3" presStyleCnt="0"/>
       <dgm:spPr/>
     </dgm:pt>
-    <dgm:pt modelId="{7B38567B-5E3A-764A-889B-A0290AAD4014}" type="pres">
-      <dgm:prSet presAssocID="{0F81557E-325E-CB47-A3E3-A75EA97A8C49}" presName="Name17" presStyleLbl="parChTrans1D3" presStyleIdx="4" presStyleCnt="6"/>
+    <dgm:pt modelId="{E11751C9-D22C-974C-9FC6-B4293E9375D7}" type="pres">
+      <dgm:prSet presAssocID="{04C0799E-C50F-414C-8045-FFEB88FEFA4A}" presName="Name10" presStyleLbl="parChTrans1D2" presStyleIdx="5" presStyleCnt="6"/>
       <dgm:spPr/>
       <dgm:t>
         <a:bodyPr/>
@@ -1733,20 +1666,20 @@
         </a:p>
       </dgm:t>
     </dgm:pt>
-    <dgm:pt modelId="{F9E1D7B7-E63B-4F4E-8177-DDD5EF327EDC}" type="pres">
-      <dgm:prSet presAssocID="{4EE6B9FE-93FE-B948-836B-BB26D0ED9CD5}" presName="hierRoot3" presStyleCnt="0"/>
+    <dgm:pt modelId="{06F61F93-548E-DA4F-85F5-DF5EFB7B6546}" type="pres">
+      <dgm:prSet presAssocID="{A3721915-87A5-3646-AF33-9B3A1FEA796C}" presName="hierRoot2" presStyleCnt="0"/>
       <dgm:spPr/>
     </dgm:pt>
-    <dgm:pt modelId="{E38F9DEC-94F8-044C-B78D-1C67BACBF068}" type="pres">
-      <dgm:prSet presAssocID="{4EE6B9FE-93FE-B948-836B-BB26D0ED9CD5}" presName="composite3" presStyleCnt="0"/>
+    <dgm:pt modelId="{44521429-0B79-764F-BCC1-48BA2368D925}" type="pres">
+      <dgm:prSet presAssocID="{A3721915-87A5-3646-AF33-9B3A1FEA796C}" presName="composite2" presStyleCnt="0"/>
       <dgm:spPr/>
     </dgm:pt>
-    <dgm:pt modelId="{BB645DFB-1D5B-E04D-A575-097CCE9F8326}" type="pres">
-      <dgm:prSet presAssocID="{4EE6B9FE-93FE-B948-836B-BB26D0ED9CD5}" presName="background3" presStyleLbl="node3" presStyleIdx="4" presStyleCnt="6"/>
+    <dgm:pt modelId="{C206AF34-3CF9-7F44-8ADF-9F08E6FB7353}" type="pres">
+      <dgm:prSet presAssocID="{A3721915-87A5-3646-AF33-9B3A1FEA796C}" presName="background2" presStyleLbl="node2" presStyleIdx="5" presStyleCnt="6"/>
       <dgm:spPr/>
     </dgm:pt>
-    <dgm:pt modelId="{C3BCD9F2-CE96-C64B-9406-0132E98D9D6A}" type="pres">
-      <dgm:prSet presAssocID="{4EE6B9FE-93FE-B948-836B-BB26D0ED9CD5}" presName="text3" presStyleLbl="fgAcc3" presStyleIdx="4" presStyleCnt="6" custScaleY="66570">
+    <dgm:pt modelId="{1EA23272-974B-EC42-8EFD-82C1FAAC5D1A}" type="pres">
+      <dgm:prSet presAssocID="{A3721915-87A5-3646-AF33-9B3A1FEA796C}" presName="text2" presStyleLbl="fgAcc2" presStyleIdx="5" presStyleCnt="6" custScaleX="132346">
         <dgm:presLayoutVars>
           <dgm:chPref val="3"/>
         </dgm:presLayoutVars>
@@ -1760,134 +1693,81 @@
         </a:p>
       </dgm:t>
     </dgm:pt>
-    <dgm:pt modelId="{A99E6919-27D9-DB4C-89E5-75C2534945CB}" type="pres">
-      <dgm:prSet presAssocID="{4EE6B9FE-93FE-B948-836B-BB26D0ED9CD5}" presName="hierChild4" presStyleCnt="0"/>
-      <dgm:spPr/>
-    </dgm:pt>
-    <dgm:pt modelId="{33AEB7CA-F4DF-184D-879C-D3B7CBCB7D90}" type="pres">
-      <dgm:prSet presAssocID="{04C0799E-C50F-414C-8045-FFEB88FEFA4A}" presName="Name17" presStyleLbl="parChTrans1D3" presStyleIdx="5" presStyleCnt="6"/>
-      <dgm:spPr/>
-      <dgm:t>
-        <a:bodyPr/>
-        <a:lstStyle/>
-        <a:p>
-          <a:endParaRPr lang="en-US"/>
-        </a:p>
-      </dgm:t>
-    </dgm:pt>
-    <dgm:pt modelId="{447737E1-FB0E-C64F-A216-EDAA0D7806E2}" type="pres">
-      <dgm:prSet presAssocID="{A3721915-87A5-3646-AF33-9B3A1FEA796C}" presName="hierRoot3" presStyleCnt="0"/>
-      <dgm:spPr/>
-    </dgm:pt>
-    <dgm:pt modelId="{F9046206-9B6A-3342-8AD5-01160CB42970}" type="pres">
-      <dgm:prSet presAssocID="{A3721915-87A5-3646-AF33-9B3A1FEA796C}" presName="composite3" presStyleCnt="0"/>
-      <dgm:spPr/>
-    </dgm:pt>
-    <dgm:pt modelId="{D494E851-CFB4-5946-8B29-0322940042F7}" type="pres">
-      <dgm:prSet presAssocID="{A3721915-87A5-3646-AF33-9B3A1FEA796C}" presName="background3" presStyleLbl="node3" presStyleIdx="5" presStyleCnt="6"/>
-      <dgm:spPr/>
-    </dgm:pt>
-    <dgm:pt modelId="{BEAF30A9-F729-3F4D-9D20-52FE540827B7}" type="pres">
-      <dgm:prSet presAssocID="{A3721915-87A5-3646-AF33-9B3A1FEA796C}" presName="text3" presStyleLbl="fgAcc3" presStyleIdx="5" presStyleCnt="6" custScaleY="90582">
-        <dgm:presLayoutVars>
-          <dgm:chPref val="3"/>
-        </dgm:presLayoutVars>
-      </dgm:prSet>
-      <dgm:spPr/>
-      <dgm:t>
-        <a:bodyPr/>
-        <a:lstStyle/>
-        <a:p>
-          <a:endParaRPr lang="en-US"/>
-        </a:p>
-      </dgm:t>
-    </dgm:pt>
-    <dgm:pt modelId="{AAA852CA-B7B5-2343-BA3F-97B35363B10E}" type="pres">
-      <dgm:prSet presAssocID="{A3721915-87A5-3646-AF33-9B3A1FEA796C}" presName="hierChild4" presStyleCnt="0"/>
+    <dgm:pt modelId="{8234F220-D709-174A-B68A-15C76B12A8AB}" type="pres">
+      <dgm:prSet presAssocID="{A3721915-87A5-3646-AF33-9B3A1FEA796C}" presName="hierChild3" presStyleCnt="0"/>
       <dgm:spPr/>
     </dgm:pt>
   </dgm:ptLst>
   <dgm:cxnLst>
-    <dgm:cxn modelId="{92DC7FED-DABE-1049-91EA-FB1B7FAF6E8C}" srcId="{97EE45D7-A8EE-E442-842B-B201F88F4711}" destId="{918714CD-279F-5E40-89A5-BB2440A1CD27}" srcOrd="0" destOrd="0" parTransId="{E9A8B2C3-5496-9547-88DF-89BAD41C369A}" sibTransId="{D5714AA4-C375-9349-9211-44241022F149}"/>
-    <dgm:cxn modelId="{1DAFA737-A059-F448-862D-6B03F04970CB}" type="presOf" srcId="{0DDC6811-B4A3-3A48-85B2-F546724B5332}" destId="{51CAB5F6-625F-1C48-AB17-7D6F98039BA8}" srcOrd="0" destOrd="0" presId="urn:microsoft.com/office/officeart/2005/8/layout/hierarchy1"/>
-    <dgm:cxn modelId="{1671155C-5ABE-9640-B1ED-83F10BA79F03}" type="presOf" srcId="{57E2E002-084F-B249-A1AE-8432B453165B}" destId="{F81187F8-5EF9-AD4C-9413-51E8301CB19E}" srcOrd="0" destOrd="0" presId="urn:microsoft.com/office/officeart/2005/8/layout/hierarchy1"/>
-    <dgm:cxn modelId="{06E9C5DE-764D-064E-8B36-11C05FD3CB2D}" type="presOf" srcId="{0F81557E-325E-CB47-A3E3-A75EA97A8C49}" destId="{7B38567B-5E3A-764A-889B-A0290AAD4014}" srcOrd="0" destOrd="0" presId="urn:microsoft.com/office/officeart/2005/8/layout/hierarchy1"/>
+    <dgm:cxn modelId="{68251984-4631-2244-827D-BA9897BD433B}" srcId="{97EE45D7-A8EE-E442-842B-B201F88F4711}" destId="{BCF40B22-C7EC-404C-94D2-4398C6B29AF7}" srcOrd="1" destOrd="0" parTransId="{0DDC6811-B4A3-3A48-85B2-F546724B5332}" sibTransId="{5298A55F-BDB7-9B44-A782-29184B91A849}"/>
+    <dgm:cxn modelId="{ABBAF1AB-72D5-CD4C-920E-ED8FD50CF8A0}" type="presOf" srcId="{A9C4808A-9065-314D-869C-950B5CB7E289}" destId="{D6790B64-5B54-934D-BB79-A873EB8D769C}" srcOrd="0" destOrd="0" presId="urn:microsoft.com/office/officeart/2005/8/layout/hierarchy1"/>
+    <dgm:cxn modelId="{43F09173-BB82-D547-AB78-067116574F37}" type="presOf" srcId="{B7E3636F-96A0-E74C-929D-68F911C87D79}" destId="{9D57D76D-EAEE-B640-912A-8397C909ED0A}" srcOrd="0" destOrd="0" presId="urn:microsoft.com/office/officeart/2005/8/layout/hierarchy1"/>
+    <dgm:cxn modelId="{47CF20D6-C290-6D4D-8170-04E2842810B6}" type="presOf" srcId="{BCF40B22-C7EC-404C-94D2-4398C6B29AF7}" destId="{3D60D745-F8DA-3646-8840-889561662A91}" srcOrd="0" destOrd="0" presId="urn:microsoft.com/office/officeart/2005/8/layout/hierarchy1"/>
     <dgm:cxn modelId="{094B111E-6122-FE4D-B5C4-521C1DDE7B5A}" srcId="{F604EA65-73D1-954E-A8FE-534013E80908}" destId="{A9C4808A-9065-314D-869C-950B5CB7E289}" srcOrd="2" destOrd="0" parTransId="{26604E32-3ED8-1A4C-9ADA-1EB56BF0D799}" sibTransId="{BAA06BA3-5454-434F-B78E-B6A1E1FFD60C}"/>
-    <dgm:cxn modelId="{A3AD57C7-8509-204E-B9AF-875F3BCA99D8}" type="presOf" srcId="{B6880E06-5329-4744-B608-36A1B2408450}" destId="{2A3D3039-5583-714F-8BDC-C6AD22EF8074}" srcOrd="0" destOrd="0" presId="urn:microsoft.com/office/officeart/2005/8/layout/hierarchy1"/>
-    <dgm:cxn modelId="{BC3F0307-537D-3345-B073-0366142CB74F}" type="presOf" srcId="{F604EA65-73D1-954E-A8FE-534013E80908}" destId="{4916C6DF-8AF5-8A41-BA74-68BDC2D7CC4A}" srcOrd="0" destOrd="0" presId="urn:microsoft.com/office/officeart/2005/8/layout/hierarchy1"/>
+    <dgm:cxn modelId="{F85443C0-9ED4-0D44-9BD2-3E24915B06C6}" srcId="{97EE45D7-A8EE-E442-842B-B201F88F4711}" destId="{F604EA65-73D1-954E-A8FE-534013E80908}" srcOrd="0" destOrd="0" parTransId="{B6880E06-5329-4744-B608-36A1B2408450}" sibTransId="{A4D60EF1-8DD9-B64D-AB53-9A6E5BDC77FC}"/>
     <dgm:cxn modelId="{4A4F2CDF-F7C4-5E43-A554-2DBD1C9A471D}" srcId="{BCF40B22-C7EC-404C-94D2-4398C6B29AF7}" destId="{4EE6B9FE-93FE-B948-836B-BB26D0ED9CD5}" srcOrd="1" destOrd="0" parTransId="{0F81557E-325E-CB47-A3E3-A75EA97A8C49}" sibTransId="{A31DF7AE-7974-6544-A428-E5FC669C54E5}"/>
-    <dgm:cxn modelId="{2F1097C4-F8E9-224E-87C5-19257EC8366D}" type="presOf" srcId="{4EE6B9FE-93FE-B948-836B-BB26D0ED9CD5}" destId="{C3BCD9F2-CE96-C64B-9406-0132E98D9D6A}" srcOrd="0" destOrd="0" presId="urn:microsoft.com/office/officeart/2005/8/layout/hierarchy1"/>
-    <dgm:cxn modelId="{06E1003B-F8E0-824E-95E8-0510FADAD9D1}" type="presOf" srcId="{26604E32-3ED8-1A4C-9ADA-1EB56BF0D799}" destId="{F6E206C8-35B9-3E45-B035-AA752A83E72E}" srcOrd="0" destOrd="0" presId="urn:microsoft.com/office/officeart/2005/8/layout/hierarchy1"/>
-    <dgm:cxn modelId="{3804A9E2-E7E5-8F4C-9396-D73D172EB6DE}" type="presOf" srcId="{B7E3636F-96A0-E74C-929D-68F911C87D79}" destId="{78714293-9687-BF4F-9E80-096454577EA3}" srcOrd="0" destOrd="0" presId="urn:microsoft.com/office/officeart/2005/8/layout/hierarchy1"/>
-    <dgm:cxn modelId="{675A6EE7-855D-764F-A970-5FB1242F7961}" type="presOf" srcId="{96A8C5FE-01FE-DE43-B422-E5A0D567CB91}" destId="{5D13620B-D745-704E-806A-F05283395C15}" srcOrd="0" destOrd="0" presId="urn:microsoft.com/office/officeart/2005/8/layout/hierarchy1"/>
-    <dgm:cxn modelId="{1B2A5D2E-A84C-6347-A006-95ED4A60002C}" type="presOf" srcId="{E0347BEF-C86C-4849-845F-07B8E269DD54}" destId="{0483006D-72A5-8A45-82C0-D7DA3A137B9E}" srcOrd="0" destOrd="0" presId="urn:microsoft.com/office/officeart/2005/8/layout/hierarchy1"/>
-    <dgm:cxn modelId="{80C564CA-1776-244E-8AC8-67105E053E36}" type="presOf" srcId="{04C0799E-C50F-414C-8045-FFEB88FEFA4A}" destId="{33AEB7CA-F4DF-184D-879C-D3B7CBCB7D90}" srcOrd="0" destOrd="0" presId="urn:microsoft.com/office/officeart/2005/8/layout/hierarchy1"/>
+    <dgm:cxn modelId="{749D0C21-C11E-6A4E-AC1F-79874F6235F5}" type="presOf" srcId="{A16FE1D5-FDBE-2C4D-90B5-D96F7E9E9B75}" destId="{590EF2DA-D985-BA47-B7F5-D2720ABACD73}" srcOrd="0" destOrd="0" presId="urn:microsoft.com/office/officeart/2005/8/layout/hierarchy1"/>
+    <dgm:cxn modelId="{55D8C59E-D3A5-5D48-AFD7-8B859DFB79E2}" type="presOf" srcId="{A3721915-87A5-3646-AF33-9B3A1FEA796C}" destId="{1EA23272-974B-EC42-8EFD-82C1FAAC5D1A}" srcOrd="0" destOrd="0" presId="urn:microsoft.com/office/officeart/2005/8/layout/hierarchy1"/>
+    <dgm:cxn modelId="{1716F1DF-F588-A549-8211-4F25C1286601}" type="presOf" srcId="{F604EA65-73D1-954E-A8FE-534013E80908}" destId="{4F044C4F-D103-3645-A702-541F3D427E00}" srcOrd="0" destOrd="0" presId="urn:microsoft.com/office/officeart/2005/8/layout/hierarchy1"/>
+    <dgm:cxn modelId="{C56BECE2-6062-7347-B9CF-93535C465A88}" type="presOf" srcId="{96A8C5FE-01FE-DE43-B422-E5A0D567CB91}" destId="{E953BFC6-3860-9341-8D3D-88AF6BEFEB72}" srcOrd="0" destOrd="0" presId="urn:microsoft.com/office/officeart/2005/8/layout/hierarchy1"/>
+    <dgm:cxn modelId="{22AE856F-48F7-3B46-8632-7813BECF037E}" srcId="{F604EA65-73D1-954E-A8FE-534013E80908}" destId="{0AE97914-583D-A94A-AB2A-BCC5506CF2B8}" srcOrd="0" destOrd="0" parTransId="{A16FE1D5-FDBE-2C4D-90B5-D96F7E9E9B75}" sibTransId="{686A12CA-52A6-3343-8481-1AC0CFF4DCF0}"/>
+    <dgm:cxn modelId="{7DB55C90-B513-C94A-B2B1-4D3C460F92AD}" type="presOf" srcId="{4EE6B9FE-93FE-B948-836B-BB26D0ED9CD5}" destId="{81D41B1E-72C8-4D42-ADDE-9C3B1A52E816}" srcOrd="0" destOrd="0" presId="urn:microsoft.com/office/officeart/2005/8/layout/hierarchy1"/>
+    <dgm:cxn modelId="{67EA6F78-9762-544D-91F0-DB3EAB06A353}" type="presOf" srcId="{57E2E002-084F-B249-A1AE-8432B453165B}" destId="{0BF4E42F-688A-F044-B96F-3A49E18DBF13}" srcOrd="0" destOrd="0" presId="urn:microsoft.com/office/officeart/2005/8/layout/hierarchy1"/>
+    <dgm:cxn modelId="{34AA9C2C-F3AC-4749-8EAD-A54CA83AD9A3}" srcId="{BCF40B22-C7EC-404C-94D2-4398C6B29AF7}" destId="{A3721915-87A5-3646-AF33-9B3A1FEA796C}" srcOrd="2" destOrd="0" parTransId="{04C0799E-C50F-414C-8045-FFEB88FEFA4A}" sibTransId="{D39195B5-2096-4341-A954-D5D1A186D8DC}"/>
+    <dgm:cxn modelId="{F1EC96B6-DF2A-8B45-962D-79378782E2B3}" type="presOf" srcId="{26604E32-3ED8-1A4C-9ADA-1EB56BF0D799}" destId="{D1A7E394-6619-8F4A-BD4C-BE06A5AAA2EF}" srcOrd="0" destOrd="0" presId="urn:microsoft.com/office/officeart/2005/8/layout/hierarchy1"/>
+    <dgm:cxn modelId="{32104F5E-D9AE-5D48-A182-0FC17A656440}" type="presOf" srcId="{04C0799E-C50F-414C-8045-FFEB88FEFA4A}" destId="{E11751C9-D22C-974C-9FC6-B4293E9375D7}" srcOrd="0" destOrd="0" presId="urn:microsoft.com/office/officeart/2005/8/layout/hierarchy1"/>
+    <dgm:cxn modelId="{5B7E06D7-B1DE-6F4D-8DAA-212F4B4E75EB}" type="presOf" srcId="{E0347BEF-C86C-4849-845F-07B8E269DD54}" destId="{620BF8B5-5C40-4449-AE61-18BC564B1BA7}" srcOrd="0" destOrd="0" presId="urn:microsoft.com/office/officeart/2005/8/layout/hierarchy1"/>
+    <dgm:cxn modelId="{3092E79D-BA99-F448-AA2B-785D85E56DD4}" srcId="{F604EA65-73D1-954E-A8FE-534013E80908}" destId="{B7E3636F-96A0-E74C-929D-68F911C87D79}" srcOrd="1" destOrd="0" parTransId="{57E2E002-084F-B249-A1AE-8432B453165B}" sibTransId="{20BC55F9-E14A-4F40-AA55-2A6580B8DB38}"/>
+    <dgm:cxn modelId="{C59995C9-CC75-D34B-B299-C7EB1724A691}" type="presOf" srcId="{97EE45D7-A8EE-E442-842B-B201F88F4711}" destId="{E5AB22EF-411E-3048-94DA-53ADBE0D639F}" srcOrd="0" destOrd="0" presId="urn:microsoft.com/office/officeart/2005/8/layout/hierarchy1"/>
+    <dgm:cxn modelId="{DD075F70-CE9F-3C4D-A0F5-F0BAEC36B0B3}" type="presOf" srcId="{0F81557E-325E-CB47-A3E3-A75EA97A8C49}" destId="{A28A8720-84CB-4744-95E4-D8D388FCF11A}" srcOrd="0" destOrd="0" presId="urn:microsoft.com/office/officeart/2005/8/layout/hierarchy1"/>
     <dgm:cxn modelId="{85D02D09-22A7-6E4F-B5EC-C18CF1162DF9}" srcId="{BCF40B22-C7EC-404C-94D2-4398C6B29AF7}" destId="{96A8C5FE-01FE-DE43-B422-E5A0D567CB91}" srcOrd="0" destOrd="0" parTransId="{E0347BEF-C86C-4849-845F-07B8E269DD54}" sibTransId="{707AFEF1-38AF-6A42-AF1A-1FCB653FAD4C}"/>
-    <dgm:cxn modelId="{C5CF53FD-3686-824E-83A6-F0E4DECB2F26}" type="presOf" srcId="{A16FE1D5-FDBE-2C4D-90B5-D96F7E9E9B75}" destId="{F482AE1D-3B50-CF43-BA82-91C028E061EC}" srcOrd="0" destOrd="0" presId="urn:microsoft.com/office/officeart/2005/8/layout/hierarchy1"/>
-    <dgm:cxn modelId="{B1FBBB31-4A47-1147-9AF6-CC155BD02BA0}" type="presOf" srcId="{A9C4808A-9065-314D-869C-950B5CB7E289}" destId="{DB7282DC-FD82-794B-8CA8-FE8E5F581CB9}" srcOrd="0" destOrd="0" presId="urn:microsoft.com/office/officeart/2005/8/layout/hierarchy1"/>
-    <dgm:cxn modelId="{73D49EF6-295C-EC4C-BB7F-A20628B4C61B}" type="presOf" srcId="{918714CD-279F-5E40-89A5-BB2440A1CD27}" destId="{837E5A63-2D47-3642-AE80-CA6243691F17}" srcOrd="0" destOrd="0" presId="urn:microsoft.com/office/officeart/2005/8/layout/hierarchy1"/>
-    <dgm:cxn modelId="{1A33373D-6373-4046-8400-1E978C4F6896}" type="presOf" srcId="{BCF40B22-C7EC-404C-94D2-4398C6B29AF7}" destId="{F39C15BE-639B-4E4F-9384-794712B1DC40}" srcOrd="0" destOrd="0" presId="urn:microsoft.com/office/officeart/2005/8/layout/hierarchy1"/>
-    <dgm:cxn modelId="{34AA9C2C-F3AC-4749-8EAD-A54CA83AD9A3}" srcId="{BCF40B22-C7EC-404C-94D2-4398C6B29AF7}" destId="{A3721915-87A5-3646-AF33-9B3A1FEA796C}" srcOrd="2" destOrd="0" parTransId="{04C0799E-C50F-414C-8045-FFEB88FEFA4A}" sibTransId="{D39195B5-2096-4341-A954-D5D1A186D8DC}"/>
-    <dgm:cxn modelId="{5F8DCA54-2ACC-CF42-AF2A-66D318F98974}" type="presOf" srcId="{0AE97914-583D-A94A-AB2A-BCC5506CF2B8}" destId="{C46DA6D4-BB47-BB43-BA94-8E99D7176E77}" srcOrd="0" destOrd="0" presId="urn:microsoft.com/office/officeart/2005/8/layout/hierarchy1"/>
-    <dgm:cxn modelId="{C59995C9-CC75-D34B-B299-C7EB1724A691}" type="presOf" srcId="{97EE45D7-A8EE-E442-842B-B201F88F4711}" destId="{E5AB22EF-411E-3048-94DA-53ADBE0D639F}" srcOrd="0" destOrd="0" presId="urn:microsoft.com/office/officeart/2005/8/layout/hierarchy1"/>
-    <dgm:cxn modelId="{22AE856F-48F7-3B46-8632-7813BECF037E}" srcId="{F604EA65-73D1-954E-A8FE-534013E80908}" destId="{0AE97914-583D-A94A-AB2A-BCC5506CF2B8}" srcOrd="0" destOrd="0" parTransId="{A16FE1D5-FDBE-2C4D-90B5-D96F7E9E9B75}" sibTransId="{686A12CA-52A6-3343-8481-1AC0CFF4DCF0}"/>
-    <dgm:cxn modelId="{68251984-4631-2244-827D-BA9897BD433B}" srcId="{918714CD-279F-5E40-89A5-BB2440A1CD27}" destId="{BCF40B22-C7EC-404C-94D2-4398C6B29AF7}" srcOrd="1" destOrd="0" parTransId="{0DDC6811-B4A3-3A48-85B2-F546724B5332}" sibTransId="{5298A55F-BDB7-9B44-A782-29184B91A849}"/>
-    <dgm:cxn modelId="{3092E79D-BA99-F448-AA2B-785D85E56DD4}" srcId="{F604EA65-73D1-954E-A8FE-534013E80908}" destId="{B7E3636F-96A0-E74C-929D-68F911C87D79}" srcOrd="1" destOrd="0" parTransId="{57E2E002-084F-B249-A1AE-8432B453165B}" sibTransId="{20BC55F9-E14A-4F40-AA55-2A6580B8DB38}"/>
-    <dgm:cxn modelId="{0EE48FE7-B5D0-B44F-BA87-6A3DCA5AC38A}" type="presOf" srcId="{A3721915-87A5-3646-AF33-9B3A1FEA796C}" destId="{BEAF30A9-F729-3F4D-9D20-52FE540827B7}" srcOrd="0" destOrd="0" presId="urn:microsoft.com/office/officeart/2005/8/layout/hierarchy1"/>
-    <dgm:cxn modelId="{F85443C0-9ED4-0D44-9BD2-3E24915B06C6}" srcId="{918714CD-279F-5E40-89A5-BB2440A1CD27}" destId="{F604EA65-73D1-954E-A8FE-534013E80908}" srcOrd="0" destOrd="0" parTransId="{B6880E06-5329-4744-B608-36A1B2408450}" sibTransId="{A4D60EF1-8DD9-B64D-AB53-9A6E5BDC77FC}"/>
-    <dgm:cxn modelId="{0CCDE0EA-4F12-4F4A-8C96-CB7844005256}" type="presParOf" srcId="{E5AB22EF-411E-3048-94DA-53ADBE0D639F}" destId="{0A92AA72-E6D3-B44C-886A-063760756F53}" srcOrd="0" destOrd="0" presId="urn:microsoft.com/office/officeart/2005/8/layout/hierarchy1"/>
-    <dgm:cxn modelId="{0636AA67-7F3E-F944-A06E-E5ABB0EA768A}" type="presParOf" srcId="{0A92AA72-E6D3-B44C-886A-063760756F53}" destId="{E0338EFA-EB90-4749-BE00-89A527AC7B8F}" srcOrd="0" destOrd="0" presId="urn:microsoft.com/office/officeart/2005/8/layout/hierarchy1"/>
-    <dgm:cxn modelId="{4FEF77C4-5B17-4546-980F-394D6563239F}" type="presParOf" srcId="{E0338EFA-EB90-4749-BE00-89A527AC7B8F}" destId="{07DEC678-BC37-564E-9AE0-8AA8BB6DF9E7}" srcOrd="0" destOrd="0" presId="urn:microsoft.com/office/officeart/2005/8/layout/hierarchy1"/>
-    <dgm:cxn modelId="{372A784D-AAFD-454D-9D29-206971A000D1}" type="presParOf" srcId="{E0338EFA-EB90-4749-BE00-89A527AC7B8F}" destId="{837E5A63-2D47-3642-AE80-CA6243691F17}" srcOrd="1" destOrd="0" presId="urn:microsoft.com/office/officeart/2005/8/layout/hierarchy1"/>
-    <dgm:cxn modelId="{D2BDD63D-0B39-1140-8BC0-14285873A379}" type="presParOf" srcId="{0A92AA72-E6D3-B44C-886A-063760756F53}" destId="{3C7FCF96-07C1-2A44-B3CE-3AFD4BE3468A}" srcOrd="1" destOrd="0" presId="urn:microsoft.com/office/officeart/2005/8/layout/hierarchy1"/>
-    <dgm:cxn modelId="{99F87F30-9B30-B74B-99F8-223F97F8992B}" type="presParOf" srcId="{3C7FCF96-07C1-2A44-B3CE-3AFD4BE3468A}" destId="{2A3D3039-5583-714F-8BDC-C6AD22EF8074}" srcOrd="0" destOrd="0" presId="urn:microsoft.com/office/officeart/2005/8/layout/hierarchy1"/>
-    <dgm:cxn modelId="{EC91DED8-914F-C44E-A413-6B3B05C668F6}" type="presParOf" srcId="{3C7FCF96-07C1-2A44-B3CE-3AFD4BE3468A}" destId="{9E664918-C144-2C4E-821E-6BDD42CDB021}" srcOrd="1" destOrd="0" presId="urn:microsoft.com/office/officeart/2005/8/layout/hierarchy1"/>
-    <dgm:cxn modelId="{178E1697-CEE9-9B49-93E0-9C30F80E4810}" type="presParOf" srcId="{9E664918-C144-2C4E-821E-6BDD42CDB021}" destId="{DD20F403-E31D-514A-A2C8-463107A2B8A5}" srcOrd="0" destOrd="0" presId="urn:microsoft.com/office/officeart/2005/8/layout/hierarchy1"/>
-    <dgm:cxn modelId="{985D3D87-26DF-B241-ABED-13DFD84245F0}" type="presParOf" srcId="{DD20F403-E31D-514A-A2C8-463107A2B8A5}" destId="{F0962C2B-55C7-FB49-9E5C-A504ADF92E67}" srcOrd="0" destOrd="0" presId="urn:microsoft.com/office/officeart/2005/8/layout/hierarchy1"/>
-    <dgm:cxn modelId="{9C6BB192-47CB-004B-8272-284B3A2E36C8}" type="presParOf" srcId="{DD20F403-E31D-514A-A2C8-463107A2B8A5}" destId="{4916C6DF-8AF5-8A41-BA74-68BDC2D7CC4A}" srcOrd="1" destOrd="0" presId="urn:microsoft.com/office/officeart/2005/8/layout/hierarchy1"/>
-    <dgm:cxn modelId="{6E842647-DC24-C741-9437-BC4CFB2B59C2}" type="presParOf" srcId="{9E664918-C144-2C4E-821E-6BDD42CDB021}" destId="{27C0DA51-8322-2846-8943-BF109491D235}" srcOrd="1" destOrd="0" presId="urn:microsoft.com/office/officeart/2005/8/layout/hierarchy1"/>
-    <dgm:cxn modelId="{BF11CF0E-AB14-7442-BC73-E40DE6E533A1}" type="presParOf" srcId="{27C0DA51-8322-2846-8943-BF109491D235}" destId="{F482AE1D-3B50-CF43-BA82-91C028E061EC}" srcOrd="0" destOrd="0" presId="urn:microsoft.com/office/officeart/2005/8/layout/hierarchy1"/>
-    <dgm:cxn modelId="{4E64BBBC-4AB0-1F4C-B8E9-EF4E7BA74D63}" type="presParOf" srcId="{27C0DA51-8322-2846-8943-BF109491D235}" destId="{75E6EE6F-DE11-4948-A2C7-BDE93D7BCBEB}" srcOrd="1" destOrd="0" presId="urn:microsoft.com/office/officeart/2005/8/layout/hierarchy1"/>
-    <dgm:cxn modelId="{27324225-B5E2-B847-A62F-C4DCE8727682}" type="presParOf" srcId="{75E6EE6F-DE11-4948-A2C7-BDE93D7BCBEB}" destId="{1F37A5AB-3E92-9E4B-AF85-FC366FFB3D41}" srcOrd="0" destOrd="0" presId="urn:microsoft.com/office/officeart/2005/8/layout/hierarchy1"/>
-    <dgm:cxn modelId="{2CDF45D7-5E50-FA4D-9474-DAAD2DF0DD14}" type="presParOf" srcId="{1F37A5AB-3E92-9E4B-AF85-FC366FFB3D41}" destId="{8F676DE6-2465-FF40-A0CF-4DCA5A8C93F4}" srcOrd="0" destOrd="0" presId="urn:microsoft.com/office/officeart/2005/8/layout/hierarchy1"/>
-    <dgm:cxn modelId="{F3B24A6C-2AC2-8143-94CE-D07D8A8386E3}" type="presParOf" srcId="{1F37A5AB-3E92-9E4B-AF85-FC366FFB3D41}" destId="{C46DA6D4-BB47-BB43-BA94-8E99D7176E77}" srcOrd="1" destOrd="0" presId="urn:microsoft.com/office/officeart/2005/8/layout/hierarchy1"/>
-    <dgm:cxn modelId="{58F4E0B3-20D8-564E-B643-9A37D8BF5914}" type="presParOf" srcId="{75E6EE6F-DE11-4948-A2C7-BDE93D7BCBEB}" destId="{DD365824-4BE7-2A49-887D-2C93E155B9D4}" srcOrd="1" destOrd="0" presId="urn:microsoft.com/office/officeart/2005/8/layout/hierarchy1"/>
-    <dgm:cxn modelId="{012191D4-1745-2A49-93A8-249B637E61C4}" type="presParOf" srcId="{27C0DA51-8322-2846-8943-BF109491D235}" destId="{F81187F8-5EF9-AD4C-9413-51E8301CB19E}" srcOrd="2" destOrd="0" presId="urn:microsoft.com/office/officeart/2005/8/layout/hierarchy1"/>
-    <dgm:cxn modelId="{B17DEA3C-8ADD-4249-AFB6-5A66B3A6CDDE}" type="presParOf" srcId="{27C0DA51-8322-2846-8943-BF109491D235}" destId="{76E49F5A-2765-CE44-90FC-B04B0709CADD}" srcOrd="3" destOrd="0" presId="urn:microsoft.com/office/officeart/2005/8/layout/hierarchy1"/>
-    <dgm:cxn modelId="{0F7FFDF9-A41D-B546-9A2B-9695B84F728D}" type="presParOf" srcId="{76E49F5A-2765-CE44-90FC-B04B0709CADD}" destId="{F37EC31D-7783-0A41-9092-B98D39F16D83}" srcOrd="0" destOrd="0" presId="urn:microsoft.com/office/officeart/2005/8/layout/hierarchy1"/>
-    <dgm:cxn modelId="{D7903B7A-667F-6C45-A555-8C0AD1EEB017}" type="presParOf" srcId="{F37EC31D-7783-0A41-9092-B98D39F16D83}" destId="{31778C90-318B-804F-B9BE-B948D5E00C24}" srcOrd="0" destOrd="0" presId="urn:microsoft.com/office/officeart/2005/8/layout/hierarchy1"/>
-    <dgm:cxn modelId="{F0107C5C-5C91-D24E-88B3-C03C687A269D}" type="presParOf" srcId="{F37EC31D-7783-0A41-9092-B98D39F16D83}" destId="{78714293-9687-BF4F-9E80-096454577EA3}" srcOrd="1" destOrd="0" presId="urn:microsoft.com/office/officeart/2005/8/layout/hierarchy1"/>
-    <dgm:cxn modelId="{51F7EBC2-6385-0F47-AC1D-24ABE6C749F9}" type="presParOf" srcId="{76E49F5A-2765-CE44-90FC-B04B0709CADD}" destId="{A54ECB7C-B4E1-0A4C-A445-3E283DB5D939}" srcOrd="1" destOrd="0" presId="urn:microsoft.com/office/officeart/2005/8/layout/hierarchy1"/>
-    <dgm:cxn modelId="{F0526DD0-EEE9-6E42-A8C2-5D6C5307AB3D}" type="presParOf" srcId="{27C0DA51-8322-2846-8943-BF109491D235}" destId="{F6E206C8-35B9-3E45-B035-AA752A83E72E}" srcOrd="4" destOrd="0" presId="urn:microsoft.com/office/officeart/2005/8/layout/hierarchy1"/>
-    <dgm:cxn modelId="{6A5FA367-9C2B-ED4B-89CA-65D3EC3B59D4}" type="presParOf" srcId="{27C0DA51-8322-2846-8943-BF109491D235}" destId="{D1E0C0C6-E2B5-3C44-B788-78BE961EE38C}" srcOrd="5" destOrd="0" presId="urn:microsoft.com/office/officeart/2005/8/layout/hierarchy1"/>
-    <dgm:cxn modelId="{C95980A0-9313-6F43-A105-F13E2841F147}" type="presParOf" srcId="{D1E0C0C6-E2B5-3C44-B788-78BE961EE38C}" destId="{CB87C407-EB24-7244-B5BF-9351B0302D62}" srcOrd="0" destOrd="0" presId="urn:microsoft.com/office/officeart/2005/8/layout/hierarchy1"/>
-    <dgm:cxn modelId="{8BE7189D-1180-3942-A16B-225A9084FA36}" type="presParOf" srcId="{CB87C407-EB24-7244-B5BF-9351B0302D62}" destId="{491ACA98-546C-784D-A6A9-1F6DD84AFF99}" srcOrd="0" destOrd="0" presId="urn:microsoft.com/office/officeart/2005/8/layout/hierarchy1"/>
-    <dgm:cxn modelId="{B468D579-A426-7044-8D05-CF40D782A6B3}" type="presParOf" srcId="{CB87C407-EB24-7244-B5BF-9351B0302D62}" destId="{DB7282DC-FD82-794B-8CA8-FE8E5F581CB9}" srcOrd="1" destOrd="0" presId="urn:microsoft.com/office/officeart/2005/8/layout/hierarchy1"/>
-    <dgm:cxn modelId="{04EA9122-D6B7-5845-B392-109C619BDF25}" type="presParOf" srcId="{D1E0C0C6-E2B5-3C44-B788-78BE961EE38C}" destId="{F8666701-1BC2-DF4D-9698-E041837FD862}" srcOrd="1" destOrd="0" presId="urn:microsoft.com/office/officeart/2005/8/layout/hierarchy1"/>
-    <dgm:cxn modelId="{A8C0B47A-6958-CC4D-917E-EB415FE34C33}" type="presParOf" srcId="{3C7FCF96-07C1-2A44-B3CE-3AFD4BE3468A}" destId="{51CAB5F6-625F-1C48-AB17-7D6F98039BA8}" srcOrd="2" destOrd="0" presId="urn:microsoft.com/office/officeart/2005/8/layout/hierarchy1"/>
-    <dgm:cxn modelId="{53ED716C-C17D-514F-9813-A10399176BF8}" type="presParOf" srcId="{3C7FCF96-07C1-2A44-B3CE-3AFD4BE3468A}" destId="{1217F6FB-6BBB-D849-8779-D3A52736F63B}" srcOrd="3" destOrd="0" presId="urn:microsoft.com/office/officeart/2005/8/layout/hierarchy1"/>
-    <dgm:cxn modelId="{8829E6E6-CFC4-1C44-8A49-18A2965E6EC7}" type="presParOf" srcId="{1217F6FB-6BBB-D849-8779-D3A52736F63B}" destId="{D54B2CB3-5015-F44D-BA39-FC76AEAA7E18}" srcOrd="0" destOrd="0" presId="urn:microsoft.com/office/officeart/2005/8/layout/hierarchy1"/>
-    <dgm:cxn modelId="{EAD42D97-EBFC-714F-9063-2E7A1D57743A}" type="presParOf" srcId="{D54B2CB3-5015-F44D-BA39-FC76AEAA7E18}" destId="{29D5443D-4F14-0A40-808C-7EAD0336EF94}" srcOrd="0" destOrd="0" presId="urn:microsoft.com/office/officeart/2005/8/layout/hierarchy1"/>
-    <dgm:cxn modelId="{5D568D9F-BE54-BE4F-8FC2-3D8EF627B566}" type="presParOf" srcId="{D54B2CB3-5015-F44D-BA39-FC76AEAA7E18}" destId="{F39C15BE-639B-4E4F-9384-794712B1DC40}" srcOrd="1" destOrd="0" presId="urn:microsoft.com/office/officeart/2005/8/layout/hierarchy1"/>
-    <dgm:cxn modelId="{3DA7434C-8364-E546-AC95-E5C69E28D056}" type="presParOf" srcId="{1217F6FB-6BBB-D849-8779-D3A52736F63B}" destId="{7562ECB6-0FC5-1F43-959F-58606AEEFDD2}" srcOrd="1" destOrd="0" presId="urn:microsoft.com/office/officeart/2005/8/layout/hierarchy1"/>
-    <dgm:cxn modelId="{CD905162-5AB7-B54C-B2D0-A010BDDBAC43}" type="presParOf" srcId="{7562ECB6-0FC5-1F43-959F-58606AEEFDD2}" destId="{0483006D-72A5-8A45-82C0-D7DA3A137B9E}" srcOrd="0" destOrd="0" presId="urn:microsoft.com/office/officeart/2005/8/layout/hierarchy1"/>
-    <dgm:cxn modelId="{5C869191-8E81-004A-9771-F4FE8D4AAD4D}" type="presParOf" srcId="{7562ECB6-0FC5-1F43-959F-58606AEEFDD2}" destId="{6EF79B2E-06E4-924B-9631-127D442CF567}" srcOrd="1" destOrd="0" presId="urn:microsoft.com/office/officeart/2005/8/layout/hierarchy1"/>
-    <dgm:cxn modelId="{58150C3B-7EEB-5D49-86D1-F97924ECF974}" type="presParOf" srcId="{6EF79B2E-06E4-924B-9631-127D442CF567}" destId="{26AF29CE-A452-9D44-A499-623C1761A500}" srcOrd="0" destOrd="0" presId="urn:microsoft.com/office/officeart/2005/8/layout/hierarchy1"/>
-    <dgm:cxn modelId="{A3ABBCCB-8009-154A-94D1-1BEE0FBB19EA}" type="presParOf" srcId="{26AF29CE-A452-9D44-A499-623C1761A500}" destId="{C4467734-F559-C747-871B-2770F85BFB4A}" srcOrd="0" destOrd="0" presId="urn:microsoft.com/office/officeart/2005/8/layout/hierarchy1"/>
-    <dgm:cxn modelId="{97E485A1-4C19-5E40-88A6-F9472FE1AA52}" type="presParOf" srcId="{26AF29CE-A452-9D44-A499-623C1761A500}" destId="{5D13620B-D745-704E-806A-F05283395C15}" srcOrd="1" destOrd="0" presId="urn:microsoft.com/office/officeart/2005/8/layout/hierarchy1"/>
-    <dgm:cxn modelId="{886565CE-6B93-A643-B3F2-CAD6B767F2BC}" type="presParOf" srcId="{6EF79B2E-06E4-924B-9631-127D442CF567}" destId="{64F066FE-5E55-A54B-95A9-933E5CCC9ED5}" srcOrd="1" destOrd="0" presId="urn:microsoft.com/office/officeart/2005/8/layout/hierarchy1"/>
-    <dgm:cxn modelId="{7BBFA3C8-C8A8-0440-B637-E547C5A7772D}" type="presParOf" srcId="{7562ECB6-0FC5-1F43-959F-58606AEEFDD2}" destId="{7B38567B-5E3A-764A-889B-A0290AAD4014}" srcOrd="2" destOrd="0" presId="urn:microsoft.com/office/officeart/2005/8/layout/hierarchy1"/>
-    <dgm:cxn modelId="{1F8EE9A2-647B-3348-A0C0-414D941898DC}" type="presParOf" srcId="{7562ECB6-0FC5-1F43-959F-58606AEEFDD2}" destId="{F9E1D7B7-E63B-4F4E-8177-DDD5EF327EDC}" srcOrd="3" destOrd="0" presId="urn:microsoft.com/office/officeart/2005/8/layout/hierarchy1"/>
-    <dgm:cxn modelId="{230A451F-F143-3548-9889-A87808605A42}" type="presParOf" srcId="{F9E1D7B7-E63B-4F4E-8177-DDD5EF327EDC}" destId="{E38F9DEC-94F8-044C-B78D-1C67BACBF068}" srcOrd="0" destOrd="0" presId="urn:microsoft.com/office/officeart/2005/8/layout/hierarchy1"/>
-    <dgm:cxn modelId="{FD87A3D2-A824-7C44-8F06-82063B48B5FA}" type="presParOf" srcId="{E38F9DEC-94F8-044C-B78D-1C67BACBF068}" destId="{BB645DFB-1D5B-E04D-A575-097CCE9F8326}" srcOrd="0" destOrd="0" presId="urn:microsoft.com/office/officeart/2005/8/layout/hierarchy1"/>
-    <dgm:cxn modelId="{66383F11-8103-EB4D-8627-7067944A1D1E}" type="presParOf" srcId="{E38F9DEC-94F8-044C-B78D-1C67BACBF068}" destId="{C3BCD9F2-CE96-C64B-9406-0132E98D9D6A}" srcOrd="1" destOrd="0" presId="urn:microsoft.com/office/officeart/2005/8/layout/hierarchy1"/>
-    <dgm:cxn modelId="{7EA90624-0114-F240-A9D8-087BCBFEA342}" type="presParOf" srcId="{F9E1D7B7-E63B-4F4E-8177-DDD5EF327EDC}" destId="{A99E6919-27D9-DB4C-89E5-75C2534945CB}" srcOrd="1" destOrd="0" presId="urn:microsoft.com/office/officeart/2005/8/layout/hierarchy1"/>
-    <dgm:cxn modelId="{D3A45F61-4888-4C48-B1B4-B30411B3A514}" type="presParOf" srcId="{7562ECB6-0FC5-1F43-959F-58606AEEFDD2}" destId="{33AEB7CA-F4DF-184D-879C-D3B7CBCB7D90}" srcOrd="4" destOrd="0" presId="urn:microsoft.com/office/officeart/2005/8/layout/hierarchy1"/>
-    <dgm:cxn modelId="{5765AD3F-EE7C-7446-A9A4-120C61668798}" type="presParOf" srcId="{7562ECB6-0FC5-1F43-959F-58606AEEFDD2}" destId="{447737E1-FB0E-C64F-A216-EDAA0D7806E2}" srcOrd="5" destOrd="0" presId="urn:microsoft.com/office/officeart/2005/8/layout/hierarchy1"/>
-    <dgm:cxn modelId="{AADC5EC7-9F43-F045-9BC2-01BBD880E85F}" type="presParOf" srcId="{447737E1-FB0E-C64F-A216-EDAA0D7806E2}" destId="{F9046206-9B6A-3342-8AD5-01160CB42970}" srcOrd="0" destOrd="0" presId="urn:microsoft.com/office/officeart/2005/8/layout/hierarchy1"/>
-    <dgm:cxn modelId="{D0023965-CFA4-4D48-9D3A-23F8D48C9F58}" type="presParOf" srcId="{F9046206-9B6A-3342-8AD5-01160CB42970}" destId="{D494E851-CFB4-5946-8B29-0322940042F7}" srcOrd="0" destOrd="0" presId="urn:microsoft.com/office/officeart/2005/8/layout/hierarchy1"/>
-    <dgm:cxn modelId="{D5CDCCA0-12D6-D74E-8E48-B3677F1CE365}" type="presParOf" srcId="{F9046206-9B6A-3342-8AD5-01160CB42970}" destId="{BEAF30A9-F729-3F4D-9D20-52FE540827B7}" srcOrd="1" destOrd="0" presId="urn:microsoft.com/office/officeart/2005/8/layout/hierarchy1"/>
-    <dgm:cxn modelId="{FC47B2BE-2BFC-374B-8F00-7EE6301DBA34}" type="presParOf" srcId="{447737E1-FB0E-C64F-A216-EDAA0D7806E2}" destId="{AAA852CA-B7B5-2343-BA3F-97B35363B10E}" srcOrd="1" destOrd="0" presId="urn:microsoft.com/office/officeart/2005/8/layout/hierarchy1"/>
+    <dgm:cxn modelId="{7BC12C14-B2D5-D44C-AD17-6DACA9EF79D1}" type="presOf" srcId="{0AE97914-583D-A94A-AB2A-BCC5506CF2B8}" destId="{90B71D96-D16C-A44D-ADA7-6D2B5C54E7BE}" srcOrd="0" destOrd="0" presId="urn:microsoft.com/office/officeart/2005/8/layout/hierarchy1"/>
+    <dgm:cxn modelId="{9B6155C7-F650-1A47-8B50-6BEA181B5902}" type="presParOf" srcId="{E5AB22EF-411E-3048-94DA-53ADBE0D639F}" destId="{0107323B-AB6A-DF46-9558-F2A00573E742}" srcOrd="0" destOrd="0" presId="urn:microsoft.com/office/officeart/2005/8/layout/hierarchy1"/>
+    <dgm:cxn modelId="{78726C82-9AAF-4B4A-96BC-4456D04A9C02}" type="presParOf" srcId="{0107323B-AB6A-DF46-9558-F2A00573E742}" destId="{2446556B-6860-6343-AFF8-7804F9617D9C}" srcOrd="0" destOrd="0" presId="urn:microsoft.com/office/officeart/2005/8/layout/hierarchy1"/>
+    <dgm:cxn modelId="{FBE48C1B-E080-7B42-8DDB-B14AFEC05495}" type="presParOf" srcId="{2446556B-6860-6343-AFF8-7804F9617D9C}" destId="{42A43388-E789-394D-B76A-66E3123703CA}" srcOrd="0" destOrd="0" presId="urn:microsoft.com/office/officeart/2005/8/layout/hierarchy1"/>
+    <dgm:cxn modelId="{4B4BBA94-2CAF-F94F-86C1-C19D5627A213}" type="presParOf" srcId="{2446556B-6860-6343-AFF8-7804F9617D9C}" destId="{4F044C4F-D103-3645-A702-541F3D427E00}" srcOrd="1" destOrd="0" presId="urn:microsoft.com/office/officeart/2005/8/layout/hierarchy1"/>
+    <dgm:cxn modelId="{8EB9915F-28E7-BF4B-B6E4-440ED498A1F5}" type="presParOf" srcId="{0107323B-AB6A-DF46-9558-F2A00573E742}" destId="{E3BC0BB4-33CB-C646-92AA-E0EDE2DDB1F6}" srcOrd="1" destOrd="0" presId="urn:microsoft.com/office/officeart/2005/8/layout/hierarchy1"/>
+    <dgm:cxn modelId="{7C30B302-7C8A-CF4D-9370-418463192D0B}" type="presParOf" srcId="{E3BC0BB4-33CB-C646-92AA-E0EDE2DDB1F6}" destId="{590EF2DA-D985-BA47-B7F5-D2720ABACD73}" srcOrd="0" destOrd="0" presId="urn:microsoft.com/office/officeart/2005/8/layout/hierarchy1"/>
+    <dgm:cxn modelId="{DD44F9BA-7166-4B48-A063-0D3361AAC26D}" type="presParOf" srcId="{E3BC0BB4-33CB-C646-92AA-E0EDE2DDB1F6}" destId="{8D5D2210-75B0-D74E-BB80-FE7F17402A07}" srcOrd="1" destOrd="0" presId="urn:microsoft.com/office/officeart/2005/8/layout/hierarchy1"/>
+    <dgm:cxn modelId="{2BBB2781-117A-2640-A821-381FFA49294A}" type="presParOf" srcId="{8D5D2210-75B0-D74E-BB80-FE7F17402A07}" destId="{995A08D6-34EF-A54F-9998-00A116BFBE21}" srcOrd="0" destOrd="0" presId="urn:microsoft.com/office/officeart/2005/8/layout/hierarchy1"/>
+    <dgm:cxn modelId="{7BD7DF79-AF37-E144-BD74-466D94D9531D}" type="presParOf" srcId="{995A08D6-34EF-A54F-9998-00A116BFBE21}" destId="{8863B2E7-4766-2D4A-88CF-3F3C0CCD0A5B}" srcOrd="0" destOrd="0" presId="urn:microsoft.com/office/officeart/2005/8/layout/hierarchy1"/>
+    <dgm:cxn modelId="{7190AB65-4D69-B348-9394-2FF5EA13E973}" type="presParOf" srcId="{995A08D6-34EF-A54F-9998-00A116BFBE21}" destId="{90B71D96-D16C-A44D-ADA7-6D2B5C54E7BE}" srcOrd="1" destOrd="0" presId="urn:microsoft.com/office/officeart/2005/8/layout/hierarchy1"/>
+    <dgm:cxn modelId="{79083C86-9B6B-A849-88F6-770343301BEA}" type="presParOf" srcId="{8D5D2210-75B0-D74E-BB80-FE7F17402A07}" destId="{DC23F4AF-A32D-3B4C-B791-07337666AA40}" srcOrd="1" destOrd="0" presId="urn:microsoft.com/office/officeart/2005/8/layout/hierarchy1"/>
+    <dgm:cxn modelId="{9371E4AC-93EA-464D-B836-AF07D66FCEF4}" type="presParOf" srcId="{E3BC0BB4-33CB-C646-92AA-E0EDE2DDB1F6}" destId="{0BF4E42F-688A-F044-B96F-3A49E18DBF13}" srcOrd="2" destOrd="0" presId="urn:microsoft.com/office/officeart/2005/8/layout/hierarchy1"/>
+    <dgm:cxn modelId="{C79B2908-1A2E-0943-873C-0BE38687FA62}" type="presParOf" srcId="{E3BC0BB4-33CB-C646-92AA-E0EDE2DDB1F6}" destId="{0FF0FA75-092D-724A-B6BC-C98A3E18B25E}" srcOrd="3" destOrd="0" presId="urn:microsoft.com/office/officeart/2005/8/layout/hierarchy1"/>
+    <dgm:cxn modelId="{5F6C1D90-CA78-1D4F-A040-6D8FEDF51DDF}" type="presParOf" srcId="{0FF0FA75-092D-724A-B6BC-C98A3E18B25E}" destId="{C7CA74DC-A0AB-D04D-9134-A1319C4EF94B}" srcOrd="0" destOrd="0" presId="urn:microsoft.com/office/officeart/2005/8/layout/hierarchy1"/>
+    <dgm:cxn modelId="{6B31A6AC-F798-1840-B658-27AF7350C2EB}" type="presParOf" srcId="{C7CA74DC-A0AB-D04D-9134-A1319C4EF94B}" destId="{6915BA8F-E5BB-CF47-B884-BC88373432C7}" srcOrd="0" destOrd="0" presId="urn:microsoft.com/office/officeart/2005/8/layout/hierarchy1"/>
+    <dgm:cxn modelId="{33EB132A-FCC1-1146-A913-5F53763C3B63}" type="presParOf" srcId="{C7CA74DC-A0AB-D04D-9134-A1319C4EF94B}" destId="{9D57D76D-EAEE-B640-912A-8397C909ED0A}" srcOrd="1" destOrd="0" presId="urn:microsoft.com/office/officeart/2005/8/layout/hierarchy1"/>
+    <dgm:cxn modelId="{3AF797D6-09D7-8745-8812-078ABEF10F82}" type="presParOf" srcId="{0FF0FA75-092D-724A-B6BC-C98A3E18B25E}" destId="{4C79BC58-CBD8-4240-85D5-26BAC63EFAB9}" srcOrd="1" destOrd="0" presId="urn:microsoft.com/office/officeart/2005/8/layout/hierarchy1"/>
+    <dgm:cxn modelId="{2F1F66E7-7AB8-924B-BC2D-DFA23A2DAAD6}" type="presParOf" srcId="{E3BC0BB4-33CB-C646-92AA-E0EDE2DDB1F6}" destId="{D1A7E394-6619-8F4A-BD4C-BE06A5AAA2EF}" srcOrd="4" destOrd="0" presId="urn:microsoft.com/office/officeart/2005/8/layout/hierarchy1"/>
+    <dgm:cxn modelId="{0977F632-26C6-3949-8BD5-B77FA9742D10}" type="presParOf" srcId="{E3BC0BB4-33CB-C646-92AA-E0EDE2DDB1F6}" destId="{2B4A707B-F0A4-5443-803E-0F7362D4C172}" srcOrd="5" destOrd="0" presId="urn:microsoft.com/office/officeart/2005/8/layout/hierarchy1"/>
+    <dgm:cxn modelId="{728A42AE-015F-2D42-A00E-0A7F992C3D3B}" type="presParOf" srcId="{2B4A707B-F0A4-5443-803E-0F7362D4C172}" destId="{62F3E46A-EC02-914E-A046-51BD1AF67DDE}" srcOrd="0" destOrd="0" presId="urn:microsoft.com/office/officeart/2005/8/layout/hierarchy1"/>
+    <dgm:cxn modelId="{36C70F4D-04D7-0A48-AB87-09C71C35E7A3}" type="presParOf" srcId="{62F3E46A-EC02-914E-A046-51BD1AF67DDE}" destId="{89F92768-DEE1-F24B-BB2B-4A9861A71A8E}" srcOrd="0" destOrd="0" presId="urn:microsoft.com/office/officeart/2005/8/layout/hierarchy1"/>
+    <dgm:cxn modelId="{81277FEA-9859-4E4E-8932-75E93E57A3B3}" type="presParOf" srcId="{62F3E46A-EC02-914E-A046-51BD1AF67DDE}" destId="{D6790B64-5B54-934D-BB79-A873EB8D769C}" srcOrd="1" destOrd="0" presId="urn:microsoft.com/office/officeart/2005/8/layout/hierarchy1"/>
+    <dgm:cxn modelId="{4C01DFC7-19DB-F64F-8A3A-016A3A9633BE}" type="presParOf" srcId="{2B4A707B-F0A4-5443-803E-0F7362D4C172}" destId="{3C25AC02-E3A0-E84A-BAAF-D45EF7AF8842}" srcOrd="1" destOrd="0" presId="urn:microsoft.com/office/officeart/2005/8/layout/hierarchy1"/>
+    <dgm:cxn modelId="{26017396-332D-5247-901A-DF9058F235FB}" type="presParOf" srcId="{E5AB22EF-411E-3048-94DA-53ADBE0D639F}" destId="{0CAEACC3-7BAB-DB44-AB00-D17A37B7D3B6}" srcOrd="1" destOrd="0" presId="urn:microsoft.com/office/officeart/2005/8/layout/hierarchy1"/>
+    <dgm:cxn modelId="{8B0B95DE-0987-8744-BFE3-A88D1065F14C}" type="presParOf" srcId="{0CAEACC3-7BAB-DB44-AB00-D17A37B7D3B6}" destId="{1D9A6981-BA88-B446-BC5F-EACDB990937F}" srcOrd="0" destOrd="0" presId="urn:microsoft.com/office/officeart/2005/8/layout/hierarchy1"/>
+    <dgm:cxn modelId="{FA34383A-C849-3247-B313-81974DE681F9}" type="presParOf" srcId="{1D9A6981-BA88-B446-BC5F-EACDB990937F}" destId="{EEBBDB83-3136-3A4F-B23B-8632C65EDB26}" srcOrd="0" destOrd="0" presId="urn:microsoft.com/office/officeart/2005/8/layout/hierarchy1"/>
+    <dgm:cxn modelId="{CC050982-58EB-A44C-B51F-E5FD1C28BD50}" type="presParOf" srcId="{1D9A6981-BA88-B446-BC5F-EACDB990937F}" destId="{3D60D745-F8DA-3646-8840-889561662A91}" srcOrd="1" destOrd="0" presId="urn:microsoft.com/office/officeart/2005/8/layout/hierarchy1"/>
+    <dgm:cxn modelId="{CA650F10-FD85-1544-92AC-84A033B98FE0}" type="presParOf" srcId="{0CAEACC3-7BAB-DB44-AB00-D17A37B7D3B6}" destId="{11B7D9FB-407F-C545-BDD0-7A73E84071B1}" srcOrd="1" destOrd="0" presId="urn:microsoft.com/office/officeart/2005/8/layout/hierarchy1"/>
+    <dgm:cxn modelId="{2F49EA9F-57D6-8740-90F7-27A50D2C8A34}" type="presParOf" srcId="{11B7D9FB-407F-C545-BDD0-7A73E84071B1}" destId="{620BF8B5-5C40-4449-AE61-18BC564B1BA7}" srcOrd="0" destOrd="0" presId="urn:microsoft.com/office/officeart/2005/8/layout/hierarchy1"/>
+    <dgm:cxn modelId="{B82EB81C-EAE7-7845-9FF0-8201BE3E9E2A}" type="presParOf" srcId="{11B7D9FB-407F-C545-BDD0-7A73E84071B1}" destId="{6E51DB57-01D5-A94B-924F-5BA6EDE3C824}" srcOrd="1" destOrd="0" presId="urn:microsoft.com/office/officeart/2005/8/layout/hierarchy1"/>
+    <dgm:cxn modelId="{79C3ABF7-64DB-0045-8612-54FD7EB7BF73}" type="presParOf" srcId="{6E51DB57-01D5-A94B-924F-5BA6EDE3C824}" destId="{C8E91609-6896-2440-BA23-AB467E136493}" srcOrd="0" destOrd="0" presId="urn:microsoft.com/office/officeart/2005/8/layout/hierarchy1"/>
+    <dgm:cxn modelId="{744D6155-8AA6-FC4E-992B-4A94A725C4F6}" type="presParOf" srcId="{C8E91609-6896-2440-BA23-AB467E136493}" destId="{833DC58F-C0F0-D742-B666-0C1D0D48F60C}" srcOrd="0" destOrd="0" presId="urn:microsoft.com/office/officeart/2005/8/layout/hierarchy1"/>
+    <dgm:cxn modelId="{609CBC9E-D6F2-A749-B147-D6EB9AA1619D}" type="presParOf" srcId="{C8E91609-6896-2440-BA23-AB467E136493}" destId="{E953BFC6-3860-9341-8D3D-88AF6BEFEB72}" srcOrd="1" destOrd="0" presId="urn:microsoft.com/office/officeart/2005/8/layout/hierarchy1"/>
+    <dgm:cxn modelId="{174C44EC-9F68-3344-9BA9-514BB9388EBD}" type="presParOf" srcId="{6E51DB57-01D5-A94B-924F-5BA6EDE3C824}" destId="{F5DF654D-E1A2-E548-8808-A6552F51CBC2}" srcOrd="1" destOrd="0" presId="urn:microsoft.com/office/officeart/2005/8/layout/hierarchy1"/>
+    <dgm:cxn modelId="{AF4093C5-4B70-F84C-AB94-79741E64D223}" type="presParOf" srcId="{11B7D9FB-407F-C545-BDD0-7A73E84071B1}" destId="{A28A8720-84CB-4744-95E4-D8D388FCF11A}" srcOrd="2" destOrd="0" presId="urn:microsoft.com/office/officeart/2005/8/layout/hierarchy1"/>
+    <dgm:cxn modelId="{E13D8163-DBDB-EC46-9579-46C66A089F01}" type="presParOf" srcId="{11B7D9FB-407F-C545-BDD0-7A73E84071B1}" destId="{8E43A59E-5D59-BC4E-804F-BF3A0521DE0D}" srcOrd="3" destOrd="0" presId="urn:microsoft.com/office/officeart/2005/8/layout/hierarchy1"/>
+    <dgm:cxn modelId="{8C6306D9-FF5A-AA45-89EE-A6381ED2915F}" type="presParOf" srcId="{8E43A59E-5D59-BC4E-804F-BF3A0521DE0D}" destId="{2F2DC0C8-4912-A345-BDF9-7F5356E563D6}" srcOrd="0" destOrd="0" presId="urn:microsoft.com/office/officeart/2005/8/layout/hierarchy1"/>
+    <dgm:cxn modelId="{93829D63-234A-C14A-AB58-761CB3C82168}" type="presParOf" srcId="{2F2DC0C8-4912-A345-BDF9-7F5356E563D6}" destId="{89E4FA6F-6389-0847-AFB9-8EA95E095831}" srcOrd="0" destOrd="0" presId="urn:microsoft.com/office/officeart/2005/8/layout/hierarchy1"/>
+    <dgm:cxn modelId="{0023CF23-2E5A-4E4B-BFED-A63DB3A86FA0}" type="presParOf" srcId="{2F2DC0C8-4912-A345-BDF9-7F5356E563D6}" destId="{81D41B1E-72C8-4D42-ADDE-9C3B1A52E816}" srcOrd="1" destOrd="0" presId="urn:microsoft.com/office/officeart/2005/8/layout/hierarchy1"/>
+    <dgm:cxn modelId="{89A72C14-6331-DE41-A814-ED9AC373E550}" type="presParOf" srcId="{8E43A59E-5D59-BC4E-804F-BF3A0521DE0D}" destId="{BE06FB04-6CFE-3443-9E81-A97809EAB354}" srcOrd="1" destOrd="0" presId="urn:microsoft.com/office/officeart/2005/8/layout/hierarchy1"/>
+    <dgm:cxn modelId="{C3199213-3FAA-EE4F-873A-282F6D5B4EF4}" type="presParOf" srcId="{11B7D9FB-407F-C545-BDD0-7A73E84071B1}" destId="{E11751C9-D22C-974C-9FC6-B4293E9375D7}" srcOrd="4" destOrd="0" presId="urn:microsoft.com/office/officeart/2005/8/layout/hierarchy1"/>
+    <dgm:cxn modelId="{4740A514-8774-FE41-A3D7-F87B4EB52F67}" type="presParOf" srcId="{11B7D9FB-407F-C545-BDD0-7A73E84071B1}" destId="{06F61F93-548E-DA4F-85F5-DF5EFB7B6546}" srcOrd="5" destOrd="0" presId="urn:microsoft.com/office/officeart/2005/8/layout/hierarchy1"/>
+    <dgm:cxn modelId="{9F7EEC03-07D7-DA43-86B4-849253C6907A}" type="presParOf" srcId="{06F61F93-548E-DA4F-85F5-DF5EFB7B6546}" destId="{44521429-0B79-764F-BCC1-48BA2368D925}" srcOrd="0" destOrd="0" presId="urn:microsoft.com/office/officeart/2005/8/layout/hierarchy1"/>
+    <dgm:cxn modelId="{6E84BDAA-0685-8F4B-B4F9-5B526268BBC0}" type="presParOf" srcId="{44521429-0B79-764F-BCC1-48BA2368D925}" destId="{C206AF34-3CF9-7F44-8ADF-9F08E6FB7353}" srcOrd="0" destOrd="0" presId="urn:microsoft.com/office/officeart/2005/8/layout/hierarchy1"/>
+    <dgm:cxn modelId="{F435BE16-075F-5D49-9EBE-77263013C931}" type="presParOf" srcId="{44521429-0B79-764F-BCC1-48BA2368D925}" destId="{1EA23272-974B-EC42-8EFD-82C1FAAC5D1A}" srcOrd="1" destOrd="0" presId="urn:microsoft.com/office/officeart/2005/8/layout/hierarchy1"/>
+    <dgm:cxn modelId="{963F1755-542B-314A-8DAB-7417002A7E1D}" type="presParOf" srcId="{06F61F93-548E-DA4F-85F5-DF5EFB7B6546}" destId="{8234F220-D709-174A-B68A-15C76B12A8AB}" srcOrd="1" destOrd="0" presId="urn:microsoft.com/office/officeart/2005/8/layout/hierarchy1"/>
   </dgm:cxnLst>
   <dgm:bg/>
   <dgm:whole/>
@@ -1907,15 +1787,15 @@
       <dsp:cNvGrpSpPr/>
     </dsp:nvGrpSpPr>
     <dsp:grpSpPr/>
-    <dsp:sp modelId="{33AEB7CA-F4DF-184D-879C-D3B7CBCB7D90}">
+    <dsp:sp modelId="{E11751C9-D22C-974C-9FC6-B4293E9375D7}">
       <dsp:nvSpPr>
         <dsp:cNvPr id="0" name=""/>
         <dsp:cNvSpPr/>
       </dsp:nvSpPr>
       <dsp:spPr>
         <a:xfrm>
-          <a:off x="5377224" y="2776611"/>
-          <a:ext cx="1487907" cy="354054"/>
+          <a:off x="5517595" y="2119750"/>
+          <a:ext cx="1345473" cy="280130"/>
         </a:xfrm>
         <a:custGeom>
           <a:avLst/>
@@ -1929,190 +1809,13 @@
                 <a:pt x="0" y="0"/>
               </a:moveTo>
               <a:lnTo>
-                <a:pt x="0" y="241277"/>
+                <a:pt x="0" y="190901"/>
               </a:lnTo>
               <a:lnTo>
-                <a:pt x="1487907" y="241277"/>
+                <a:pt x="1345473" y="190901"/>
               </a:lnTo>
               <a:lnTo>
-                <a:pt x="1487907" y="354054"/>
-              </a:lnTo>
-            </a:path>
-          </a:pathLst>
-        </a:custGeom>
-        <a:noFill/>
-        <a:ln w="12700" cap="flat" cmpd="sng" algn="ctr">
-          <a:solidFill>
-            <a:schemeClr val="dk1">
-              <a:shade val="80000"/>
-              <a:hueOff val="0"/>
-              <a:satOff val="0"/>
-              <a:lumOff val="0"/>
-              <a:alphaOff val="0"/>
-            </a:schemeClr>
-          </a:solidFill>
-          <a:prstDash val="solid"/>
-        </a:ln>
-        <a:effectLst/>
-      </dsp:spPr>
-      <dsp:style>
-        <a:lnRef idx="1">
-          <a:scrgbClr r="0" g="0" b="0"/>
-        </a:lnRef>
-        <a:fillRef idx="0">
-          <a:scrgbClr r="0" g="0" b="0"/>
-        </a:fillRef>
-        <a:effectRef idx="0">
-          <a:scrgbClr r="0" g="0" b="0"/>
-        </a:effectRef>
-        <a:fontRef idx="minor"/>
-      </dsp:style>
-    </dsp:sp>
-    <dsp:sp modelId="{7B38567B-5E3A-764A-889B-A0290AAD4014}">
-      <dsp:nvSpPr>
-        <dsp:cNvPr id="0" name=""/>
-        <dsp:cNvSpPr/>
-      </dsp:nvSpPr>
-      <dsp:spPr>
-        <a:xfrm>
-          <a:off x="5331504" y="2776611"/>
-          <a:ext cx="91440" cy="354054"/>
-        </a:xfrm>
-        <a:custGeom>
-          <a:avLst/>
-          <a:gdLst/>
-          <a:ahLst/>
-          <a:cxnLst/>
-          <a:rect l="0" t="0" r="0" b="0"/>
-          <a:pathLst>
-            <a:path>
-              <a:moveTo>
-                <a:pt x="45720" y="0"/>
-              </a:moveTo>
-              <a:lnTo>
-                <a:pt x="45720" y="354054"/>
-              </a:lnTo>
-            </a:path>
-          </a:pathLst>
-        </a:custGeom>
-        <a:noFill/>
-        <a:ln w="12700" cap="flat" cmpd="sng" algn="ctr">
-          <a:solidFill>
-            <a:schemeClr val="dk1">
-              <a:shade val="80000"/>
-              <a:hueOff val="0"/>
-              <a:satOff val="0"/>
-              <a:lumOff val="0"/>
-              <a:alphaOff val="0"/>
-            </a:schemeClr>
-          </a:solidFill>
-          <a:prstDash val="solid"/>
-        </a:ln>
-        <a:effectLst/>
-      </dsp:spPr>
-      <dsp:style>
-        <a:lnRef idx="1">
-          <a:scrgbClr r="0" g="0" b="0"/>
-        </a:lnRef>
-        <a:fillRef idx="0">
-          <a:scrgbClr r="0" g="0" b="0"/>
-        </a:fillRef>
-        <a:effectRef idx="0">
-          <a:scrgbClr r="0" g="0" b="0"/>
-        </a:effectRef>
-        <a:fontRef idx="minor"/>
-      </dsp:style>
-    </dsp:sp>
-    <dsp:sp modelId="{0483006D-72A5-8A45-82C0-D7DA3A137B9E}">
-      <dsp:nvSpPr>
-        <dsp:cNvPr id="0" name=""/>
-        <dsp:cNvSpPr/>
-      </dsp:nvSpPr>
-      <dsp:spPr>
-        <a:xfrm>
-          <a:off x="3889316" y="2776611"/>
-          <a:ext cx="1487907" cy="354054"/>
-        </a:xfrm>
-        <a:custGeom>
-          <a:avLst/>
-          <a:gdLst/>
-          <a:ahLst/>
-          <a:cxnLst/>
-          <a:rect l="0" t="0" r="0" b="0"/>
-          <a:pathLst>
-            <a:path>
-              <a:moveTo>
-                <a:pt x="1487907" y="0"/>
-              </a:moveTo>
-              <a:lnTo>
-                <a:pt x="1487907" y="241277"/>
-              </a:lnTo>
-              <a:lnTo>
-                <a:pt x="0" y="241277"/>
-              </a:lnTo>
-              <a:lnTo>
-                <a:pt x="0" y="354054"/>
-              </a:lnTo>
-            </a:path>
-          </a:pathLst>
-        </a:custGeom>
-        <a:noFill/>
-        <a:ln w="12700" cap="flat" cmpd="sng" algn="ctr">
-          <a:solidFill>
-            <a:schemeClr val="dk1">
-              <a:shade val="80000"/>
-              <a:hueOff val="0"/>
-              <a:satOff val="0"/>
-              <a:lumOff val="0"/>
-              <a:alphaOff val="0"/>
-            </a:schemeClr>
-          </a:solidFill>
-          <a:prstDash val="solid"/>
-        </a:ln>
-        <a:effectLst/>
-      </dsp:spPr>
-      <dsp:style>
-        <a:lnRef idx="1">
-          <a:scrgbClr r="0" g="0" b="0"/>
-        </a:lnRef>
-        <a:fillRef idx="0">
-          <a:scrgbClr r="0" g="0" b="0"/>
-        </a:fillRef>
-        <a:effectRef idx="0">
-          <a:scrgbClr r="0" g="0" b="0"/>
-        </a:effectRef>
-        <a:fontRef idx="minor"/>
-      </dsp:style>
-    </dsp:sp>
-    <dsp:sp modelId="{51CAB5F6-625F-1C48-AB17-7D6F98039BA8}">
-      <dsp:nvSpPr>
-        <dsp:cNvPr id="0" name=""/>
-        <dsp:cNvSpPr/>
-      </dsp:nvSpPr>
-      <dsp:spPr>
-        <a:xfrm>
-          <a:off x="3560955" y="1649521"/>
-          <a:ext cx="1816269" cy="354054"/>
-        </a:xfrm>
-        <a:custGeom>
-          <a:avLst/>
-          <a:gdLst/>
-          <a:ahLst/>
-          <a:cxnLst/>
-          <a:rect l="0" t="0" r="0" b="0"/>
-          <a:pathLst>
-            <a:path>
-              <a:moveTo>
-                <a:pt x="0" y="0"/>
-              </a:moveTo>
-              <a:lnTo>
-                <a:pt x="0" y="241277"/>
-              </a:lnTo>
-              <a:lnTo>
-                <a:pt x="1816269" y="241277"/>
-              </a:lnTo>
-              <a:lnTo>
-                <a:pt x="1816269" y="354054"/>
+                <a:pt x="1345473" y="280130"/>
               </a:lnTo>
             </a:path>
           </a:pathLst>
@@ -2145,15 +1848,15 @@
         <a:fontRef idx="minor"/>
       </dsp:style>
     </dsp:sp>
-    <dsp:sp modelId="{F6E206C8-35B9-3E45-B035-AA752A83E72E}">
+    <dsp:sp modelId="{A28A8720-84CB-4744-95E4-D8D388FCF11A}">
       <dsp:nvSpPr>
         <dsp:cNvPr id="0" name=""/>
         <dsp:cNvSpPr/>
       </dsp:nvSpPr>
       <dsp:spPr>
         <a:xfrm>
-          <a:off x="1505744" y="2916793"/>
-          <a:ext cx="1176617" cy="354054"/>
+          <a:off x="5422689" y="2119750"/>
+          <a:ext cx="91440" cy="280130"/>
         </a:xfrm>
         <a:custGeom>
           <a:avLst/>
@@ -2164,199 +1867,16 @@
           <a:pathLst>
             <a:path>
               <a:moveTo>
-                <a:pt x="0" y="0"/>
+                <a:pt x="94905" y="0"/>
               </a:moveTo>
               <a:lnTo>
-                <a:pt x="0" y="241277"/>
+                <a:pt x="94905" y="190901"/>
               </a:lnTo>
               <a:lnTo>
-                <a:pt x="1176617" y="241277"/>
+                <a:pt x="45720" y="190901"/>
               </a:lnTo>
               <a:lnTo>
-                <a:pt x="1176617" y="354054"/>
-              </a:lnTo>
-            </a:path>
-          </a:pathLst>
-        </a:custGeom>
-        <a:noFill/>
-        <a:ln w="12700" cap="flat" cmpd="sng" algn="ctr">
-          <a:solidFill>
-            <a:schemeClr val="dk1">
-              <a:shade val="80000"/>
-              <a:hueOff val="0"/>
-              <a:satOff val="0"/>
-              <a:lumOff val="0"/>
-              <a:alphaOff val="0"/>
-            </a:schemeClr>
-          </a:solidFill>
-          <a:prstDash val="solid"/>
-        </a:ln>
-        <a:effectLst/>
-      </dsp:spPr>
-      <dsp:style>
-        <a:lnRef idx="1">
-          <a:scrgbClr r="0" g="0" b="0"/>
-        </a:lnRef>
-        <a:fillRef idx="0">
-          <a:scrgbClr r="0" g="0" b="0"/>
-        </a:fillRef>
-        <a:effectRef idx="0">
-          <a:scrgbClr r="0" g="0" b="0"/>
-        </a:effectRef>
-        <a:fontRef idx="minor"/>
-      </dsp:style>
-    </dsp:sp>
-    <dsp:sp modelId="{F81187F8-5EF9-AD4C-9413-51E8301CB19E}">
-      <dsp:nvSpPr>
-        <dsp:cNvPr id="0" name=""/>
-        <dsp:cNvSpPr/>
-      </dsp:nvSpPr>
-      <dsp:spPr>
-        <a:xfrm>
-          <a:off x="1429687" y="2916793"/>
-          <a:ext cx="91440" cy="354054"/>
-        </a:xfrm>
-        <a:custGeom>
-          <a:avLst/>
-          <a:gdLst/>
-          <a:ahLst/>
-          <a:cxnLst/>
-          <a:rect l="0" t="0" r="0" b="0"/>
-          <a:pathLst>
-            <a:path>
-              <a:moveTo>
-                <a:pt x="76057" y="0"/>
-              </a:moveTo>
-              <a:lnTo>
-                <a:pt x="76057" y="241277"/>
-              </a:lnTo>
-              <a:lnTo>
-                <a:pt x="45720" y="241277"/>
-              </a:lnTo>
-              <a:lnTo>
-                <a:pt x="45720" y="354054"/>
-              </a:lnTo>
-            </a:path>
-          </a:pathLst>
-        </a:custGeom>
-        <a:noFill/>
-        <a:ln w="12700" cap="flat" cmpd="sng" algn="ctr">
-          <a:solidFill>
-            <a:schemeClr val="dk1">
-              <a:shade val="80000"/>
-              <a:hueOff val="0"/>
-              <a:satOff val="0"/>
-              <a:lumOff val="0"/>
-              <a:alphaOff val="0"/>
-            </a:schemeClr>
-          </a:solidFill>
-          <a:prstDash val="solid"/>
-        </a:ln>
-        <a:effectLst/>
-      </dsp:spPr>
-      <dsp:style>
-        <a:lnRef idx="1">
-          <a:scrgbClr r="0" g="0" b="0"/>
-        </a:lnRef>
-        <a:fillRef idx="0">
-          <a:scrgbClr r="0" g="0" b="0"/>
-        </a:fillRef>
-        <a:effectRef idx="0">
-          <a:scrgbClr r="0" g="0" b="0"/>
-        </a:effectRef>
-        <a:fontRef idx="minor"/>
-      </dsp:style>
-    </dsp:sp>
-    <dsp:sp modelId="{F482AE1D-3B50-CF43-BA82-91C028E061EC}">
-      <dsp:nvSpPr>
-        <dsp:cNvPr id="0" name=""/>
-        <dsp:cNvSpPr/>
-      </dsp:nvSpPr>
-      <dsp:spPr>
-        <a:xfrm>
-          <a:off x="298789" y="2916793"/>
-          <a:ext cx="1206954" cy="354054"/>
-        </a:xfrm>
-        <a:custGeom>
-          <a:avLst/>
-          <a:gdLst/>
-          <a:ahLst/>
-          <a:cxnLst/>
-          <a:rect l="0" t="0" r="0" b="0"/>
-          <a:pathLst>
-            <a:path>
-              <a:moveTo>
-                <a:pt x="1206954" y="0"/>
-              </a:moveTo>
-              <a:lnTo>
-                <a:pt x="1206954" y="241277"/>
-              </a:lnTo>
-              <a:lnTo>
-                <a:pt x="0" y="241277"/>
-              </a:lnTo>
-              <a:lnTo>
-                <a:pt x="0" y="354054"/>
-              </a:lnTo>
-            </a:path>
-          </a:pathLst>
-        </a:custGeom>
-        <a:noFill/>
-        <a:ln w="12700" cap="flat" cmpd="sng" algn="ctr">
-          <a:solidFill>
-            <a:schemeClr val="dk1">
-              <a:shade val="80000"/>
-              <a:hueOff val="0"/>
-              <a:satOff val="0"/>
-              <a:lumOff val="0"/>
-              <a:alphaOff val="0"/>
-            </a:schemeClr>
-          </a:solidFill>
-          <a:prstDash val="solid"/>
-        </a:ln>
-        <a:effectLst/>
-      </dsp:spPr>
-      <dsp:style>
-        <a:lnRef idx="1">
-          <a:scrgbClr r="0" g="0" b="0"/>
-        </a:lnRef>
-        <a:fillRef idx="0">
-          <a:scrgbClr r="0" g="0" b="0"/>
-        </a:fillRef>
-        <a:effectRef idx="0">
-          <a:scrgbClr r="0" g="0" b="0"/>
-        </a:effectRef>
-        <a:fontRef idx="minor"/>
-      </dsp:style>
-    </dsp:sp>
-    <dsp:sp modelId="{2A3D3039-5583-714F-8BDC-C6AD22EF8074}">
-      <dsp:nvSpPr>
-        <dsp:cNvPr id="0" name=""/>
-        <dsp:cNvSpPr/>
-      </dsp:nvSpPr>
-      <dsp:spPr>
-        <a:xfrm>
-          <a:off x="1505744" y="1649521"/>
-          <a:ext cx="2055210" cy="354054"/>
-        </a:xfrm>
-        <a:custGeom>
-          <a:avLst/>
-          <a:gdLst/>
-          <a:ahLst/>
-          <a:cxnLst/>
-          <a:rect l="0" t="0" r="0" b="0"/>
-          <a:pathLst>
-            <a:path>
-              <a:moveTo>
-                <a:pt x="2055210" y="0"/>
-              </a:moveTo>
-              <a:lnTo>
-                <a:pt x="2055210" y="241277"/>
-              </a:lnTo>
-              <a:lnTo>
-                <a:pt x="0" y="241277"/>
-              </a:lnTo>
-              <a:lnTo>
-                <a:pt x="0" y="354054"/>
+                <a:pt x="45720" y="280130"/>
               </a:lnTo>
             </a:path>
           </a:pathLst>
@@ -2389,15 +1909,253 @@
         <a:fontRef idx="minor"/>
       </dsp:style>
     </dsp:sp>
-    <dsp:sp modelId="{07DEC678-BC37-564E-9AE0-8AA8BB6DF9E7}">
+    <dsp:sp modelId="{620BF8B5-5C40-4449-AE61-18BC564B1BA7}">
       <dsp:nvSpPr>
         <dsp:cNvPr id="0" name=""/>
         <dsp:cNvSpPr/>
       </dsp:nvSpPr>
       <dsp:spPr>
         <a:xfrm>
-          <a:off x="2558333" y="655126"/>
-          <a:ext cx="2005242" cy="994394"/>
+          <a:off x="4122935" y="2119750"/>
+          <a:ext cx="1394659" cy="280130"/>
+        </a:xfrm>
+        <a:custGeom>
+          <a:avLst/>
+          <a:gdLst/>
+          <a:ahLst/>
+          <a:cxnLst/>
+          <a:rect l="0" t="0" r="0" b="0"/>
+          <a:pathLst>
+            <a:path>
+              <a:moveTo>
+                <a:pt x="1394659" y="0"/>
+              </a:moveTo>
+              <a:lnTo>
+                <a:pt x="1394659" y="190901"/>
+              </a:lnTo>
+              <a:lnTo>
+                <a:pt x="0" y="190901"/>
+              </a:lnTo>
+              <a:lnTo>
+                <a:pt x="0" y="280130"/>
+              </a:lnTo>
+            </a:path>
+          </a:pathLst>
+        </a:custGeom>
+        <a:noFill/>
+        <a:ln w="12700" cap="flat" cmpd="sng" algn="ctr">
+          <a:solidFill>
+            <a:schemeClr val="dk1">
+              <a:shade val="60000"/>
+              <a:hueOff val="0"/>
+              <a:satOff val="0"/>
+              <a:lumOff val="0"/>
+              <a:alphaOff val="0"/>
+            </a:schemeClr>
+          </a:solidFill>
+          <a:prstDash val="solid"/>
+        </a:ln>
+        <a:effectLst/>
+      </dsp:spPr>
+      <dsp:style>
+        <a:lnRef idx="1">
+          <a:scrgbClr r="0" g="0" b="0"/>
+        </a:lnRef>
+        <a:fillRef idx="0">
+          <a:scrgbClr r="0" g="0" b="0"/>
+        </a:fillRef>
+        <a:effectRef idx="0">
+          <a:scrgbClr r="0" g="0" b="0"/>
+        </a:effectRef>
+        <a:fontRef idx="minor"/>
+      </dsp:style>
+    </dsp:sp>
+    <dsp:sp modelId="{D1A7E394-6619-8F4A-BD4C-BE06A5AAA2EF}">
+      <dsp:nvSpPr>
+        <dsp:cNvPr id="0" name=""/>
+        <dsp:cNvSpPr/>
+      </dsp:nvSpPr>
+      <dsp:spPr>
+        <a:xfrm>
+          <a:off x="1661852" y="2119750"/>
+          <a:ext cx="1177245" cy="280130"/>
+        </a:xfrm>
+        <a:custGeom>
+          <a:avLst/>
+          <a:gdLst/>
+          <a:ahLst/>
+          <a:cxnLst/>
+          <a:rect l="0" t="0" r="0" b="0"/>
+          <a:pathLst>
+            <a:path>
+              <a:moveTo>
+                <a:pt x="0" y="0"/>
+              </a:moveTo>
+              <a:lnTo>
+                <a:pt x="0" y="190901"/>
+              </a:lnTo>
+              <a:lnTo>
+                <a:pt x="1177245" y="190901"/>
+              </a:lnTo>
+              <a:lnTo>
+                <a:pt x="1177245" y="280130"/>
+              </a:lnTo>
+            </a:path>
+          </a:pathLst>
+        </a:custGeom>
+        <a:noFill/>
+        <a:ln w="12700" cap="flat" cmpd="sng" algn="ctr">
+          <a:solidFill>
+            <a:schemeClr val="dk1">
+              <a:shade val="60000"/>
+              <a:hueOff val="0"/>
+              <a:satOff val="0"/>
+              <a:lumOff val="0"/>
+              <a:alphaOff val="0"/>
+            </a:schemeClr>
+          </a:solidFill>
+          <a:prstDash val="solid"/>
+        </a:ln>
+        <a:effectLst/>
+      </dsp:spPr>
+      <dsp:style>
+        <a:lnRef idx="1">
+          <a:scrgbClr r="0" g="0" b="0"/>
+        </a:lnRef>
+        <a:fillRef idx="0">
+          <a:scrgbClr r="0" g="0" b="0"/>
+        </a:fillRef>
+        <a:effectRef idx="0">
+          <a:scrgbClr r="0" g="0" b="0"/>
+        </a:effectRef>
+        <a:fontRef idx="minor"/>
+      </dsp:style>
+    </dsp:sp>
+    <dsp:sp modelId="{0BF4E42F-688A-F044-B96F-3A49E18DBF13}">
+      <dsp:nvSpPr>
+        <dsp:cNvPr id="0" name=""/>
+        <dsp:cNvSpPr/>
+      </dsp:nvSpPr>
+      <dsp:spPr>
+        <a:xfrm>
+          <a:off x="1616132" y="2119750"/>
+          <a:ext cx="91440" cy="280130"/>
+        </a:xfrm>
+        <a:custGeom>
+          <a:avLst/>
+          <a:gdLst/>
+          <a:ahLst/>
+          <a:cxnLst/>
+          <a:rect l="0" t="0" r="0" b="0"/>
+          <a:pathLst>
+            <a:path>
+              <a:moveTo>
+                <a:pt x="45720" y="0"/>
+              </a:moveTo>
+              <a:lnTo>
+                <a:pt x="45720" y="280130"/>
+              </a:lnTo>
+            </a:path>
+          </a:pathLst>
+        </a:custGeom>
+        <a:noFill/>
+        <a:ln w="12700" cap="flat" cmpd="sng" algn="ctr">
+          <a:solidFill>
+            <a:schemeClr val="dk1">
+              <a:shade val="60000"/>
+              <a:hueOff val="0"/>
+              <a:satOff val="0"/>
+              <a:lumOff val="0"/>
+              <a:alphaOff val="0"/>
+            </a:schemeClr>
+          </a:solidFill>
+          <a:prstDash val="solid"/>
+        </a:ln>
+        <a:effectLst/>
+      </dsp:spPr>
+      <dsp:style>
+        <a:lnRef idx="1">
+          <a:scrgbClr r="0" g="0" b="0"/>
+        </a:lnRef>
+        <a:fillRef idx="0">
+          <a:scrgbClr r="0" g="0" b="0"/>
+        </a:fillRef>
+        <a:effectRef idx="0">
+          <a:scrgbClr r="0" g="0" b="0"/>
+        </a:effectRef>
+        <a:fontRef idx="minor"/>
+      </dsp:style>
+    </dsp:sp>
+    <dsp:sp modelId="{590EF2DA-D985-BA47-B7F5-D2720ABACD73}">
+      <dsp:nvSpPr>
+        <dsp:cNvPr id="0" name=""/>
+        <dsp:cNvSpPr/>
+      </dsp:nvSpPr>
+      <dsp:spPr>
+        <a:xfrm>
+          <a:off x="484606" y="2119750"/>
+          <a:ext cx="1177245" cy="280130"/>
+        </a:xfrm>
+        <a:custGeom>
+          <a:avLst/>
+          <a:gdLst/>
+          <a:ahLst/>
+          <a:cxnLst/>
+          <a:rect l="0" t="0" r="0" b="0"/>
+          <a:pathLst>
+            <a:path>
+              <a:moveTo>
+                <a:pt x="1177245" y="0"/>
+              </a:moveTo>
+              <a:lnTo>
+                <a:pt x="1177245" y="190901"/>
+              </a:lnTo>
+              <a:lnTo>
+                <a:pt x="0" y="190901"/>
+              </a:lnTo>
+              <a:lnTo>
+                <a:pt x="0" y="280130"/>
+              </a:lnTo>
+            </a:path>
+          </a:pathLst>
+        </a:custGeom>
+        <a:noFill/>
+        <a:ln w="12700" cap="flat" cmpd="sng" algn="ctr">
+          <a:solidFill>
+            <a:schemeClr val="dk1">
+              <a:shade val="60000"/>
+              <a:hueOff val="0"/>
+              <a:satOff val="0"/>
+              <a:lumOff val="0"/>
+              <a:alphaOff val="0"/>
+            </a:schemeClr>
+          </a:solidFill>
+          <a:prstDash val="solid"/>
+        </a:ln>
+        <a:effectLst/>
+      </dsp:spPr>
+      <dsp:style>
+        <a:lnRef idx="1">
+          <a:scrgbClr r="0" g="0" b="0"/>
+        </a:lnRef>
+        <a:fillRef idx="0">
+          <a:scrgbClr r="0" g="0" b="0"/>
+        </a:fillRef>
+        <a:effectRef idx="0">
+          <a:scrgbClr r="0" g="0" b="0"/>
+        </a:effectRef>
+        <a:fontRef idx="minor"/>
+      </dsp:style>
+    </dsp:sp>
+    <dsp:sp modelId="{42A43388-E789-394D-B76A-66E3123703CA}">
+      <dsp:nvSpPr>
+        <dsp:cNvPr id="0" name=""/>
+        <dsp:cNvSpPr/>
+      </dsp:nvSpPr>
+      <dsp:spPr>
+        <a:xfrm>
+          <a:off x="864514" y="1508118"/>
+          <a:ext cx="1594675" cy="611632"/>
         </a:xfrm>
         <a:prstGeom prst="roundRect">
           <a:avLst>
@@ -2439,15 +2197,15 @@
         </a:fontRef>
       </dsp:style>
     </dsp:sp>
-    <dsp:sp modelId="{837E5A63-2D47-3642-AE80-CA6243691F17}">
+    <dsp:sp modelId="{4F044C4F-D103-3645-A702-541F3D427E00}">
       <dsp:nvSpPr>
         <dsp:cNvPr id="0" name=""/>
         <dsp:cNvSpPr/>
       </dsp:nvSpPr>
       <dsp:spPr>
         <a:xfrm>
-          <a:off x="2693598" y="783627"/>
-          <a:ext cx="2005242" cy="994394"/>
+          <a:off x="971536" y="1609789"/>
+          <a:ext cx="1594675" cy="611632"/>
         </a:xfrm>
         <a:prstGeom prst="roundRect">
           <a:avLst>
@@ -2482,12 +2240,12 @@
         </a:fontRef>
       </dsp:style>
       <dsp:txBody>
-        <a:bodyPr spcFirstLastPara="0" vert="horz" wrap="square" lIns="57150" tIns="57150" rIns="57150" bIns="57150" numCol="1" spcCol="1270" anchor="ctr" anchorCtr="0">
+        <a:bodyPr spcFirstLastPara="0" vert="horz" wrap="square" lIns="53340" tIns="53340" rIns="53340" bIns="53340" numCol="1" spcCol="1270" anchor="ctr" anchorCtr="0">
           <a:noAutofit/>
         </a:bodyPr>
         <a:lstStyle/>
         <a:p>
-          <a:pPr lvl="0" algn="ctr" defTabSz="666750">
+          <a:pPr lvl="0" algn="ctr" defTabSz="622300">
             <a:lnSpc>
               <a:spcPct val="90000"/>
             </a:lnSpc>
@@ -2499,43 +2257,26 @@
             </a:spcAft>
           </a:pPr>
           <a:r>
-            <a:rPr lang="en-US" sz="1500" kern="1200" dirty="0" smtClean="0"/>
-            <a:t>Weather</a:t>
+            <a:rPr lang="en-US" sz="1400" kern="1200" dirty="0" smtClean="0"/>
+            <a:t>Temperature</a:t>
           </a:r>
-        </a:p>
-        <a:p>
-          <a:pPr lvl="0" algn="ctr" defTabSz="666750">
-            <a:lnSpc>
-              <a:spcPct val="90000"/>
-            </a:lnSpc>
-            <a:spcBef>
-              <a:spcPct val="0"/>
-            </a:spcBef>
-            <a:spcAft>
-              <a:spcPct val="35000"/>
-            </a:spcAft>
-          </a:pPr>
-          <a:r>
-            <a:rPr lang="en-US" sz="1500" kern="1200" dirty="0" smtClean="0"/>
-            <a:t>Data</a:t>
-          </a:r>
-          <a:endParaRPr lang="en-US" sz="1500" kern="1200" dirty="0"/>
+          <a:endParaRPr lang="en-US" sz="1400" kern="1200" dirty="0"/>
         </a:p>
       </dsp:txBody>
       <dsp:txXfrm>
-        <a:off x="2722723" y="812752"/>
-        <a:ext cx="1946992" cy="936144"/>
+        <a:off x="989450" y="1627703"/>
+        <a:ext cx="1558847" cy="575804"/>
       </dsp:txXfrm>
     </dsp:sp>
-    <dsp:sp modelId="{F0962C2B-55C7-FB49-9E5C-A504ADF92E67}">
+    <dsp:sp modelId="{8863B2E7-4766-2D4A-88CF-3F3C0CCD0A5B}">
       <dsp:nvSpPr>
         <dsp:cNvPr id="0" name=""/>
         <dsp:cNvSpPr/>
       </dsp:nvSpPr>
       <dsp:spPr>
         <a:xfrm>
-          <a:off x="807401" y="2003575"/>
-          <a:ext cx="1396686" cy="913217"/>
+          <a:off x="3006" y="2399881"/>
+          <a:ext cx="963200" cy="611632"/>
         </a:xfrm>
         <a:prstGeom prst="roundRect">
           <a:avLst>
@@ -2577,15 +2318,15 @@
         </a:fontRef>
       </dsp:style>
     </dsp:sp>
-    <dsp:sp modelId="{4916C6DF-8AF5-8A41-BA74-68BDC2D7CC4A}">
+    <dsp:sp modelId="{90B71D96-D16C-A44D-ADA7-6D2B5C54E7BE}">
       <dsp:nvSpPr>
         <dsp:cNvPr id="0" name=""/>
         <dsp:cNvSpPr/>
       </dsp:nvSpPr>
       <dsp:spPr>
         <a:xfrm>
-          <a:off x="942665" y="2132076"/>
-          <a:ext cx="1396686" cy="913217"/>
+          <a:off x="110028" y="2501553"/>
+          <a:ext cx="963200" cy="611632"/>
         </a:xfrm>
         <a:prstGeom prst="roundRect">
           <a:avLst>
@@ -2620,12 +2361,12 @@
         </a:fontRef>
       </dsp:style>
       <dsp:txBody>
-        <a:bodyPr spcFirstLastPara="0" vert="horz" wrap="square" lIns="57150" tIns="57150" rIns="57150" bIns="57150" numCol="1" spcCol="1270" anchor="ctr" anchorCtr="0">
+        <a:bodyPr spcFirstLastPara="0" vert="horz" wrap="square" lIns="53340" tIns="53340" rIns="53340" bIns="53340" numCol="1" spcCol="1270" anchor="ctr" anchorCtr="0">
           <a:noAutofit/>
         </a:bodyPr>
         <a:lstStyle/>
         <a:p>
-          <a:pPr lvl="0" algn="ctr" defTabSz="666750">
+          <a:pPr lvl="0" algn="ctr" defTabSz="622300">
             <a:lnSpc>
               <a:spcPct val="90000"/>
             </a:lnSpc>
@@ -2637,26 +2378,26 @@
             </a:spcAft>
           </a:pPr>
           <a:r>
-            <a:rPr lang="en-US" sz="1500" kern="1200" dirty="0" smtClean="0"/>
-            <a:t>Temperature</a:t>
+            <a:rPr lang="en-US" sz="1400" kern="1200" dirty="0" smtClean="0"/>
+            <a:t>Cold</a:t>
           </a:r>
-          <a:endParaRPr lang="en-US" sz="1500" kern="1200" dirty="0"/>
+          <a:endParaRPr lang="en-US" sz="1400" kern="1200" dirty="0"/>
         </a:p>
       </dsp:txBody>
       <dsp:txXfrm>
-        <a:off x="969412" y="2158823"/>
-        <a:ext cx="1343192" cy="859723"/>
+        <a:off x="127942" y="2519467"/>
+        <a:ext cx="927372" cy="575804"/>
       </dsp:txXfrm>
     </dsp:sp>
-    <dsp:sp modelId="{8F676DE6-2465-FF40-A0CF-4DCA5A8C93F4}">
+    <dsp:sp modelId="{6915BA8F-E5BB-CF47-B884-BC88373432C7}">
       <dsp:nvSpPr>
         <dsp:cNvPr id="0" name=""/>
         <dsp:cNvSpPr/>
       </dsp:nvSpPr>
       <dsp:spPr>
         <a:xfrm>
-          <a:off x="1390" y="3270847"/>
-          <a:ext cx="594799" cy="484561"/>
+          <a:off x="1180251" y="2399881"/>
+          <a:ext cx="963200" cy="611632"/>
         </a:xfrm>
         <a:prstGeom prst="roundRect">
           <a:avLst>
@@ -2698,15 +2439,15 @@
         </a:fontRef>
       </dsp:style>
     </dsp:sp>
-    <dsp:sp modelId="{C46DA6D4-BB47-BB43-BA94-8E99D7176E77}">
+    <dsp:sp modelId="{9D57D76D-EAEE-B640-912A-8397C909ED0A}">
       <dsp:nvSpPr>
         <dsp:cNvPr id="0" name=""/>
         <dsp:cNvSpPr/>
       </dsp:nvSpPr>
       <dsp:spPr>
         <a:xfrm>
-          <a:off x="136654" y="3399348"/>
-          <a:ext cx="594799" cy="484561"/>
+          <a:off x="1287274" y="2501553"/>
+          <a:ext cx="963200" cy="611632"/>
         </a:xfrm>
         <a:prstGeom prst="roundRect">
           <a:avLst>
@@ -2741,12 +2482,12 @@
         </a:fontRef>
       </dsp:style>
       <dsp:txBody>
-        <a:bodyPr spcFirstLastPara="0" vert="horz" wrap="square" lIns="57150" tIns="57150" rIns="57150" bIns="57150" numCol="1" spcCol="1270" anchor="ctr" anchorCtr="0">
+        <a:bodyPr spcFirstLastPara="0" vert="horz" wrap="square" lIns="53340" tIns="53340" rIns="53340" bIns="53340" numCol="1" spcCol="1270" anchor="ctr" anchorCtr="0">
           <a:noAutofit/>
         </a:bodyPr>
         <a:lstStyle/>
         <a:p>
-          <a:pPr lvl="0" algn="ctr" defTabSz="666750">
+          <a:pPr lvl="0" algn="ctr" defTabSz="622300">
             <a:lnSpc>
               <a:spcPct val="90000"/>
             </a:lnSpc>
@@ -2758,26 +2499,26 @@
             </a:spcAft>
           </a:pPr>
           <a:r>
-            <a:rPr lang="en-US" sz="1500" kern="1200" dirty="0" smtClean="0"/>
-            <a:t>Cold</a:t>
+            <a:rPr lang="en-US" sz="1400" kern="1200" dirty="0" smtClean="0"/>
+            <a:t>Normal</a:t>
           </a:r>
-          <a:endParaRPr lang="en-US" sz="1500" kern="1200" dirty="0"/>
+          <a:endParaRPr lang="en-US" sz="1400" kern="1200" dirty="0"/>
         </a:p>
       </dsp:txBody>
       <dsp:txXfrm>
-        <a:off x="150846" y="3413540"/>
-        <a:ext cx="566415" cy="456177"/>
+        <a:off x="1305188" y="2519467"/>
+        <a:ext cx="927372" cy="575804"/>
       </dsp:txXfrm>
     </dsp:sp>
-    <dsp:sp modelId="{31778C90-318B-804F-B9BE-B948D5E00C24}">
+    <dsp:sp modelId="{89F92768-DEE1-F24B-BB2B-4A9861A71A8E}">
       <dsp:nvSpPr>
         <dsp:cNvPr id="0" name=""/>
         <dsp:cNvSpPr/>
       </dsp:nvSpPr>
       <dsp:spPr>
         <a:xfrm>
-          <a:off x="866718" y="3270847"/>
-          <a:ext cx="1217378" cy="566828"/>
+          <a:off x="2357497" y="2399881"/>
+          <a:ext cx="963200" cy="611632"/>
         </a:xfrm>
         <a:prstGeom prst="roundRect">
           <a:avLst>
@@ -2819,15 +2560,15 @@
         </a:fontRef>
       </dsp:style>
     </dsp:sp>
-    <dsp:sp modelId="{78714293-9687-BF4F-9E80-096454577EA3}">
+    <dsp:sp modelId="{D6790B64-5B54-934D-BB79-A873EB8D769C}">
       <dsp:nvSpPr>
         <dsp:cNvPr id="0" name=""/>
         <dsp:cNvSpPr/>
       </dsp:nvSpPr>
       <dsp:spPr>
         <a:xfrm>
-          <a:off x="1001982" y="3399348"/>
-          <a:ext cx="1217378" cy="566828"/>
+          <a:off x="2464519" y="2501553"/>
+          <a:ext cx="963200" cy="611632"/>
         </a:xfrm>
         <a:prstGeom prst="roundRect">
           <a:avLst>
@@ -2862,12 +2603,12 @@
         </a:fontRef>
       </dsp:style>
       <dsp:txBody>
-        <a:bodyPr spcFirstLastPara="0" vert="horz" wrap="square" lIns="57150" tIns="57150" rIns="57150" bIns="57150" numCol="1" spcCol="1270" anchor="ctr" anchorCtr="0">
+        <a:bodyPr spcFirstLastPara="0" vert="horz" wrap="square" lIns="53340" tIns="53340" rIns="53340" bIns="53340" numCol="1" spcCol="1270" anchor="ctr" anchorCtr="0">
           <a:noAutofit/>
         </a:bodyPr>
         <a:lstStyle/>
         <a:p>
-          <a:pPr lvl="0" algn="ctr" defTabSz="666750">
+          <a:pPr lvl="0" algn="ctr" defTabSz="622300">
             <a:lnSpc>
               <a:spcPct val="90000"/>
             </a:lnSpc>
@@ -2879,26 +2620,26 @@
             </a:spcAft>
           </a:pPr>
           <a:r>
-            <a:rPr lang="en-US" sz="1500" kern="1200" dirty="0" smtClean="0"/>
-            <a:t>Normal</a:t>
+            <a:rPr lang="en-US" sz="1400" kern="1200" dirty="0" smtClean="0"/>
+            <a:t>Hot</a:t>
           </a:r>
-          <a:endParaRPr lang="en-US" sz="1500" kern="1200" dirty="0"/>
+          <a:endParaRPr lang="en-US" sz="1400" kern="1200" dirty="0"/>
         </a:p>
       </dsp:txBody>
       <dsp:txXfrm>
-        <a:off x="1018584" y="3415950"/>
-        <a:ext cx="1184174" cy="533624"/>
+        <a:off x="2482433" y="2519467"/>
+        <a:ext cx="927372" cy="575804"/>
       </dsp:txXfrm>
     </dsp:sp>
-    <dsp:sp modelId="{491ACA98-546C-784D-A6A9-1F6DD84AFF99}">
+    <dsp:sp modelId="{EEBBDB83-3136-3A4F-B23B-8632C65EDB26}">
       <dsp:nvSpPr>
         <dsp:cNvPr id="0" name=""/>
         <dsp:cNvSpPr/>
       </dsp:nvSpPr>
       <dsp:spPr>
         <a:xfrm>
-          <a:off x="2354625" y="3270847"/>
-          <a:ext cx="655473" cy="381207"/>
+          <a:off x="5035994" y="1508118"/>
+          <a:ext cx="963200" cy="611632"/>
         </a:xfrm>
         <a:prstGeom prst="roundRect">
           <a:avLst>
@@ -2940,15 +2681,15 @@
         </a:fontRef>
       </dsp:style>
     </dsp:sp>
-    <dsp:sp modelId="{DB7282DC-FD82-794B-8CA8-FE8E5F581CB9}">
+    <dsp:sp modelId="{3D60D745-F8DA-3646-8840-889561662A91}">
       <dsp:nvSpPr>
         <dsp:cNvPr id="0" name=""/>
         <dsp:cNvSpPr/>
       </dsp:nvSpPr>
       <dsp:spPr>
         <a:xfrm>
-          <a:off x="2489889" y="3399348"/>
-          <a:ext cx="655473" cy="381207"/>
+          <a:off x="5143016" y="1609789"/>
+          <a:ext cx="963200" cy="611632"/>
         </a:xfrm>
         <a:prstGeom prst="roundRect">
           <a:avLst>
@@ -2983,12 +2724,12 @@
         </a:fontRef>
       </dsp:style>
       <dsp:txBody>
-        <a:bodyPr spcFirstLastPara="0" vert="horz" wrap="square" lIns="57150" tIns="57150" rIns="57150" bIns="57150" numCol="1" spcCol="1270" anchor="ctr" anchorCtr="0">
+        <a:bodyPr spcFirstLastPara="0" vert="horz" wrap="square" lIns="53340" tIns="53340" rIns="53340" bIns="53340" numCol="1" spcCol="1270" anchor="ctr" anchorCtr="0">
           <a:noAutofit/>
         </a:bodyPr>
         <a:lstStyle/>
         <a:p>
-          <a:pPr lvl="0" algn="ctr" defTabSz="666750">
+          <a:pPr lvl="0" algn="ctr" defTabSz="622300">
             <a:lnSpc>
               <a:spcPct val="90000"/>
             </a:lnSpc>
@@ -3000,26 +2741,26 @@
             </a:spcAft>
           </a:pPr>
           <a:r>
-            <a:rPr lang="en-US" sz="1500" kern="1200" dirty="0" smtClean="0"/>
-            <a:t>Hot</a:t>
+            <a:rPr lang="en-US" sz="1400" kern="1200" dirty="0" smtClean="0"/>
+            <a:t>wind</a:t>
           </a:r>
-          <a:endParaRPr lang="en-US" sz="1500" kern="1200" dirty="0"/>
+          <a:endParaRPr lang="en-US" sz="1400" kern="1200" dirty="0"/>
         </a:p>
       </dsp:txBody>
       <dsp:txXfrm>
-        <a:off x="2501054" y="3410513"/>
-        <a:ext cx="633143" cy="358877"/>
+        <a:off x="5160930" y="1627703"/>
+        <a:ext cx="927372" cy="575804"/>
       </dsp:txXfrm>
     </dsp:sp>
-    <dsp:sp modelId="{29D5443D-4F14-0A40-808C-7EAD0336EF94}">
+    <dsp:sp modelId="{833DC58F-C0F0-D742-B666-0C1D0D48F60C}">
       <dsp:nvSpPr>
         <dsp:cNvPr id="0" name=""/>
         <dsp:cNvSpPr/>
       </dsp:nvSpPr>
       <dsp:spPr>
         <a:xfrm>
-          <a:off x="4439940" y="2003575"/>
-          <a:ext cx="1874568" cy="773035"/>
+          <a:off x="3534742" y="2399881"/>
+          <a:ext cx="1176386" cy="611632"/>
         </a:xfrm>
         <a:prstGeom prst="roundRect">
           <a:avLst>
@@ -3061,15 +2802,15 @@
         </a:fontRef>
       </dsp:style>
     </dsp:sp>
-    <dsp:sp modelId="{F39C15BE-639B-4E4F-9384-794712B1DC40}">
+    <dsp:sp modelId="{E953BFC6-3860-9341-8D3D-88AF6BEFEB72}">
       <dsp:nvSpPr>
         <dsp:cNvPr id="0" name=""/>
         <dsp:cNvSpPr/>
       </dsp:nvSpPr>
       <dsp:spPr>
         <a:xfrm>
-          <a:off x="4575204" y="2132076"/>
-          <a:ext cx="1874568" cy="773035"/>
+          <a:off x="3641765" y="2501553"/>
+          <a:ext cx="1176386" cy="611632"/>
         </a:xfrm>
         <a:prstGeom prst="roundRect">
           <a:avLst>
@@ -3104,12 +2845,12 @@
         </a:fontRef>
       </dsp:style>
       <dsp:txBody>
-        <a:bodyPr spcFirstLastPara="0" vert="horz" wrap="square" lIns="57150" tIns="57150" rIns="57150" bIns="57150" numCol="1" spcCol="1270" anchor="ctr" anchorCtr="0">
+        <a:bodyPr spcFirstLastPara="0" vert="horz" wrap="square" lIns="53340" tIns="53340" rIns="53340" bIns="53340" numCol="1" spcCol="1270" anchor="ctr" anchorCtr="0">
           <a:noAutofit/>
         </a:bodyPr>
         <a:lstStyle/>
         <a:p>
-          <a:pPr lvl="0" algn="ctr" defTabSz="666750">
+          <a:pPr lvl="0" algn="ctr" defTabSz="622300">
             <a:lnSpc>
               <a:spcPct val="90000"/>
             </a:lnSpc>
@@ -3121,26 +2862,26 @@
             </a:spcAft>
           </a:pPr>
           <a:r>
-            <a:rPr lang="en-US" sz="1500" kern="1200" dirty="0" smtClean="0"/>
-            <a:t>wind</a:t>
+            <a:rPr lang="en-US" sz="1400" kern="1200" dirty="0" smtClean="0"/>
+            <a:t>No Windy</a:t>
           </a:r>
-          <a:endParaRPr lang="en-US" sz="1500" kern="1200" dirty="0"/>
+          <a:endParaRPr lang="en-US" sz="1400" kern="1200" dirty="0"/>
         </a:p>
       </dsp:txBody>
       <dsp:txXfrm>
-        <a:off x="4597845" y="2154717"/>
-        <a:ext cx="1829286" cy="727753"/>
+        <a:off x="3659679" y="2519467"/>
+        <a:ext cx="1140558" cy="575804"/>
       </dsp:txXfrm>
     </dsp:sp>
-    <dsp:sp modelId="{C4467734-F559-C747-871B-2770F85BFB4A}">
+    <dsp:sp modelId="{89E4FA6F-6389-0847-AFB9-8EA95E095831}">
       <dsp:nvSpPr>
         <dsp:cNvPr id="0" name=""/>
         <dsp:cNvSpPr/>
       </dsp:nvSpPr>
       <dsp:spPr>
         <a:xfrm>
-          <a:off x="3280627" y="3130665"/>
-          <a:ext cx="1217378" cy="513983"/>
+          <a:off x="4925173" y="2399881"/>
+          <a:ext cx="1086471" cy="611632"/>
         </a:xfrm>
         <a:prstGeom prst="roundRect">
           <a:avLst>
@@ -3182,15 +2923,15 @@
         </a:fontRef>
       </dsp:style>
     </dsp:sp>
-    <dsp:sp modelId="{5D13620B-D745-704E-806A-F05283395C15}">
+    <dsp:sp modelId="{81D41B1E-72C8-4D42-ADDE-9C3B1A52E816}">
       <dsp:nvSpPr>
         <dsp:cNvPr id="0" name=""/>
         <dsp:cNvSpPr/>
       </dsp:nvSpPr>
       <dsp:spPr>
         <a:xfrm>
-          <a:off x="3415891" y="3259166"/>
-          <a:ext cx="1217378" cy="513983"/>
+          <a:off x="5032195" y="2501553"/>
+          <a:ext cx="1086471" cy="611632"/>
         </a:xfrm>
         <a:prstGeom prst="roundRect">
           <a:avLst>
@@ -3225,12 +2966,12 @@
         </a:fontRef>
       </dsp:style>
       <dsp:txBody>
-        <a:bodyPr spcFirstLastPara="0" vert="horz" wrap="square" lIns="57150" tIns="57150" rIns="57150" bIns="57150" numCol="1" spcCol="1270" anchor="ctr" anchorCtr="0">
+        <a:bodyPr spcFirstLastPara="0" vert="horz" wrap="square" lIns="53340" tIns="53340" rIns="53340" bIns="53340" numCol="1" spcCol="1270" anchor="ctr" anchorCtr="0">
           <a:noAutofit/>
         </a:bodyPr>
         <a:lstStyle/>
         <a:p>
-          <a:pPr lvl="0" algn="ctr" defTabSz="666750">
+          <a:pPr lvl="0" algn="ctr" defTabSz="622300">
             <a:lnSpc>
               <a:spcPct val="90000"/>
             </a:lnSpc>
@@ -3242,26 +2983,26 @@
             </a:spcAft>
           </a:pPr>
           <a:r>
-            <a:rPr lang="en-US" sz="1500" kern="1200" dirty="0" err="1" smtClean="0"/>
-            <a:t>NoWindy</a:t>
+            <a:rPr lang="en-US" sz="1400" kern="1200" dirty="0" smtClean="0"/>
+            <a:t>Less Windy</a:t>
           </a:r>
-          <a:endParaRPr lang="en-US" sz="1500" kern="1200" dirty="0"/>
+          <a:endParaRPr lang="en-US" sz="1400" kern="1200" dirty="0"/>
         </a:p>
       </dsp:txBody>
       <dsp:txXfrm>
-        <a:off x="3430945" y="3274220"/>
-        <a:ext cx="1187270" cy="483875"/>
+        <a:off x="5050109" y="2519467"/>
+        <a:ext cx="1050643" cy="575804"/>
       </dsp:txXfrm>
     </dsp:sp>
-    <dsp:sp modelId="{BB645DFB-1D5B-E04D-A575-097CCE9F8326}">
+    <dsp:sp modelId="{C206AF34-3CF9-7F44-8ADF-9F08E6FB7353}">
       <dsp:nvSpPr>
         <dsp:cNvPr id="0" name=""/>
         <dsp:cNvSpPr/>
       </dsp:nvSpPr>
       <dsp:spPr>
         <a:xfrm>
-          <a:off x="4768535" y="3130665"/>
-          <a:ext cx="1217378" cy="514609"/>
+          <a:off x="6225689" y="2399881"/>
+          <a:ext cx="1274757" cy="611632"/>
         </a:xfrm>
         <a:prstGeom prst="roundRect">
           <a:avLst>
@@ -3303,15 +3044,15 @@
         </a:fontRef>
       </dsp:style>
     </dsp:sp>
-    <dsp:sp modelId="{C3BCD9F2-CE96-C64B-9406-0132E98D9D6A}">
+    <dsp:sp modelId="{1EA23272-974B-EC42-8EFD-82C1FAAC5D1A}">
       <dsp:nvSpPr>
         <dsp:cNvPr id="0" name=""/>
         <dsp:cNvSpPr/>
       </dsp:nvSpPr>
       <dsp:spPr>
         <a:xfrm>
-          <a:off x="4903799" y="3259166"/>
-          <a:ext cx="1217378" cy="514609"/>
+          <a:off x="6332711" y="2501553"/>
+          <a:ext cx="1274757" cy="611632"/>
         </a:xfrm>
         <a:prstGeom prst="roundRect">
           <a:avLst>
@@ -3346,12 +3087,12 @@
         </a:fontRef>
       </dsp:style>
       <dsp:txBody>
-        <a:bodyPr spcFirstLastPara="0" vert="horz" wrap="square" lIns="57150" tIns="57150" rIns="57150" bIns="57150" numCol="1" spcCol="1270" anchor="ctr" anchorCtr="0">
+        <a:bodyPr spcFirstLastPara="0" vert="horz" wrap="square" lIns="53340" tIns="53340" rIns="53340" bIns="53340" numCol="1" spcCol="1270" anchor="ctr" anchorCtr="0">
           <a:noAutofit/>
         </a:bodyPr>
         <a:lstStyle/>
         <a:p>
-          <a:pPr lvl="0" algn="ctr" defTabSz="666750">
+          <a:pPr lvl="0" algn="ctr" defTabSz="622300">
             <a:lnSpc>
               <a:spcPct val="90000"/>
             </a:lnSpc>
@@ -3363,136 +3104,15 @@
             </a:spcAft>
           </a:pPr>
           <a:r>
-            <a:rPr lang="en-US" sz="1500" kern="1200" dirty="0" err="1" smtClean="0"/>
-            <a:t>LessWindy</a:t>
+            <a:rPr lang="en-US" sz="1400" kern="1200" dirty="0" smtClean="0"/>
+            <a:t>More Windy</a:t>
           </a:r>
-          <a:endParaRPr lang="en-US" sz="1500" kern="1200" dirty="0"/>
+          <a:endParaRPr lang="en-US" sz="1400" kern="1200" dirty="0"/>
         </a:p>
       </dsp:txBody>
       <dsp:txXfrm>
-        <a:off x="4918871" y="3274238"/>
-        <a:ext cx="1187234" cy="484465"/>
-      </dsp:txXfrm>
-    </dsp:sp>
-    <dsp:sp modelId="{D494E851-CFB4-5946-8B29-0322940042F7}">
-      <dsp:nvSpPr>
-        <dsp:cNvPr id="0" name=""/>
-        <dsp:cNvSpPr/>
-      </dsp:nvSpPr>
-      <dsp:spPr>
-        <a:xfrm>
-          <a:off x="6256442" y="3130665"/>
-          <a:ext cx="1217378" cy="700231"/>
-        </a:xfrm>
-        <a:prstGeom prst="roundRect">
-          <a:avLst>
-            <a:gd name="adj" fmla="val 10000"/>
-          </a:avLst>
-        </a:prstGeom>
-        <a:solidFill>
-          <a:schemeClr val="lt1">
-            <a:hueOff val="0"/>
-            <a:satOff val="0"/>
-            <a:lumOff val="0"/>
-            <a:alphaOff val="0"/>
-          </a:schemeClr>
-        </a:solidFill>
-        <a:ln>
-          <a:noFill/>
-        </a:ln>
-        <a:effectLst/>
-        <a:scene3d>
-          <a:camera prst="obliqueTopRight"/>
-          <a:lightRig rig="threePt" dir="tl"/>
-        </a:scene3d>
-        <a:sp3d>
-          <a:bevelT w="25400" h="25400"/>
-        </a:sp3d>
-      </dsp:spPr>
-      <dsp:style>
-        <a:lnRef idx="0">
-          <a:scrgbClr r="0" g="0" b="0"/>
-        </a:lnRef>
-        <a:fillRef idx="3">
-          <a:scrgbClr r="0" g="0" b="0"/>
-        </a:fillRef>
-        <a:effectRef idx="2">
-          <a:scrgbClr r="0" g="0" b="0"/>
-        </a:effectRef>
-        <a:fontRef idx="minor">
-          <a:schemeClr val="lt1"/>
-        </a:fontRef>
-      </dsp:style>
-    </dsp:sp>
-    <dsp:sp modelId="{BEAF30A9-F729-3F4D-9D20-52FE540827B7}">
-      <dsp:nvSpPr>
-        <dsp:cNvPr id="0" name=""/>
-        <dsp:cNvSpPr/>
-      </dsp:nvSpPr>
-      <dsp:spPr>
-        <a:xfrm>
-          <a:off x="6391706" y="3259166"/>
-          <a:ext cx="1217378" cy="700231"/>
-        </a:xfrm>
-        <a:prstGeom prst="roundRect">
-          <a:avLst>
-            <a:gd name="adj" fmla="val 10000"/>
-          </a:avLst>
-        </a:prstGeom>
-        <a:solidFill>
-          <a:schemeClr val="accent4"/>
-        </a:solidFill>
-        <a:ln w="25400" cap="flat" cmpd="sng" algn="ctr">
-          <a:solidFill>
-            <a:schemeClr val="lt1">
-              <a:alpha val="80000"/>
-            </a:schemeClr>
-          </a:solidFill>
-          <a:prstDash val="solid"/>
-        </a:ln>
-        <a:effectLst/>
-      </dsp:spPr>
-      <dsp:style>
-        <a:lnRef idx="3">
-          <a:schemeClr val="lt1"/>
-        </a:lnRef>
-        <a:fillRef idx="1">
-          <a:schemeClr val="accent4"/>
-        </a:fillRef>
-        <a:effectRef idx="1">
-          <a:schemeClr val="accent4"/>
-        </a:effectRef>
-        <a:fontRef idx="minor">
-          <a:schemeClr val="lt1"/>
-        </a:fontRef>
-      </dsp:style>
-      <dsp:txBody>
-        <a:bodyPr spcFirstLastPara="0" vert="horz" wrap="square" lIns="57150" tIns="57150" rIns="57150" bIns="57150" numCol="1" spcCol="1270" anchor="ctr" anchorCtr="0">
-          <a:noAutofit/>
-        </a:bodyPr>
-        <a:lstStyle/>
-        <a:p>
-          <a:pPr lvl="0" algn="ctr" defTabSz="666750">
-            <a:lnSpc>
-              <a:spcPct val="90000"/>
-            </a:lnSpc>
-            <a:spcBef>
-              <a:spcPct val="0"/>
-            </a:spcBef>
-            <a:spcAft>
-              <a:spcPct val="35000"/>
-            </a:spcAft>
-          </a:pPr>
-          <a:r>
-            <a:rPr lang="en-US" sz="1500" kern="1200" dirty="0" err="1" smtClean="0"/>
-            <a:t>MoreWindy</a:t>
-          </a:r>
-          <a:endParaRPr lang="en-US" sz="1500" kern="1200" dirty="0"/>
-        </a:p>
-      </dsp:txBody>
-      <dsp:txXfrm>
-        <a:off x="6412215" y="3279675"/>
-        <a:ext cx="1176360" cy="659213"/>
+        <a:off x="6350625" y="2519467"/>
+        <a:ext cx="1238929" cy="575804"/>
       </dsp:txXfrm>
     </dsp:sp>
   </dsp:spTree>
@@ -11044,7 +10664,7 @@
           <a:p>
             <a:r>
               <a:rPr lang="en-US" dirty="0" smtClean="0"/>
-              <a:t>LIBRARY USED</a:t>
+              <a:t>COMPONENTS USED</a:t>
             </a:r>
             <a:endParaRPr lang="en-US" dirty="0"/>
           </a:p>
@@ -11069,92 +10689,123 @@
           <a:p>
             <a:r>
               <a:rPr lang="en-US" dirty="0" smtClean="0"/>
-              <a:t>Weather API (</a:t>
-            </a:r>
-            <a:r>
-              <a:rPr lang="en-US" dirty="0" err="1" smtClean="0"/>
-              <a:t>pywapi</a:t>
+              <a:t>ARDUINO </a:t>
             </a:r>
             <a:r>
               <a:rPr lang="en-US" dirty="0" smtClean="0"/>
-              <a:t>)</a:t>
-            </a:r>
-          </a:p>
-          <a:p>
-            <a:pPr lvl="1"/>
+              <a:t>board</a:t>
+            </a:r>
+          </a:p>
+          <a:p>
+            <a:r>
+              <a:rPr lang="en-US" dirty="0" err="1"/>
+              <a:t>NeoPixel</a:t>
+            </a:r>
+            <a:r>
+              <a:rPr lang="en-US" dirty="0"/>
+              <a:t> digital RGB LED Strip</a:t>
+            </a:r>
+          </a:p>
+          <a:p>
+            <a:pPr marL="0" indent="0">
+              <a:buNone/>
+            </a:pPr>
+            <a:r>
+              <a:rPr lang="en-US" dirty="0"/>
+              <a:t>       </a:t>
+            </a:r>
+            <a:r>
+              <a:rPr lang="en-US" dirty="0">
+                <a:hlinkClick r:id="rId2"/>
+              </a:rPr>
+              <a:t>http://www.adafruit.com/products/1138</a:t>
+            </a:r>
+            <a:r>
+              <a:rPr lang="en-US" dirty="0"/>
+              <a:t> </a:t>
+            </a:r>
+            <a:endParaRPr lang="en-US" dirty="0" smtClean="0"/>
+          </a:p>
+          <a:p>
+            <a:r>
+              <a:rPr lang="en-US" dirty="0"/>
+              <a:t>Temperature Sensors(DS18B20)</a:t>
+            </a:r>
+          </a:p>
+          <a:p>
+            <a:pPr marL="0" indent="0">
+              <a:buNone/>
+            </a:pPr>
+            <a:r>
+              <a:rPr lang="en-US" dirty="0"/>
+              <a:t>       http://</a:t>
+            </a:r>
+            <a:r>
+              <a:rPr lang="en-US" dirty="0" err="1"/>
+              <a:t>www.adafruit.com</a:t>
+            </a:r>
+            <a:r>
+              <a:rPr lang="en-US" dirty="0"/>
+              <a:t>/products/</a:t>
+            </a:r>
             <a:r>
               <a:rPr lang="en-US" dirty="0" smtClean="0"/>
-              <a:t>To get weather data from online</a:t>
-            </a:r>
+              <a:t>374</a:t>
+            </a:r>
+            <a:endParaRPr lang="en-US" dirty="0" smtClean="0"/>
           </a:p>
           <a:p>
             <a:r>
               <a:rPr lang="en-US" dirty="0" smtClean="0"/>
-              <a:t>Serial</a:t>
-            </a:r>
-          </a:p>
-          <a:p>
-            <a:pPr lvl="1"/>
+              <a:t>Resistors</a:t>
+            </a:r>
+          </a:p>
+          <a:p>
             <a:r>
               <a:rPr lang="en-US" dirty="0" smtClean="0"/>
-              <a:t>Python module to Communicate between computer and </a:t>
-            </a:r>
-            <a:r>
-              <a:rPr lang="en-US" dirty="0" err="1" smtClean="0"/>
-              <a:t>Arduino</a:t>
-            </a:r>
-            <a:r>
-              <a:rPr lang="en-US" dirty="0" smtClean="0"/>
-              <a:t> via serial </a:t>
-            </a:r>
-            <a:r>
-              <a:rPr lang="en-US" dirty="0" smtClean="0"/>
-              <a:t>port</a:t>
-            </a:r>
-          </a:p>
-          <a:p>
-            <a:r>
-              <a:rPr lang="en-US" dirty="0" err="1" smtClean="0"/>
-              <a:t>Onewire</a:t>
-            </a:r>
-            <a:r>
-              <a:rPr lang="en-US" dirty="0" smtClean="0"/>
-              <a:t>	</a:t>
-            </a:r>
+              <a:t>Jumper wires</a:t>
+            </a:r>
+          </a:p>
+          <a:p>
+            <a:pPr marL="0" indent="0">
+              <a:buNone/>
+            </a:pPr>
             <a:endParaRPr lang="en-US" dirty="0" smtClean="0"/>
           </a:p>
           <a:p>
-            <a:pPr lvl="1"/>
-            <a:r>
-              <a:rPr lang="en-US" dirty="0" smtClean="0"/>
-              <a:t>To </a:t>
-            </a:r>
-            <a:r>
-              <a:rPr lang="en-US" dirty="0" smtClean="0"/>
-              <a:t>get temperature data using indoor </a:t>
-            </a:r>
-            <a:r>
-              <a:rPr lang="en-US" dirty="0" smtClean="0"/>
-              <a:t>sensors</a:t>
-            </a:r>
+            <a:pPr marL="0" indent="0">
+              <a:buNone/>
+            </a:pPr>
             <a:endParaRPr lang="en-US" dirty="0" smtClean="0"/>
           </a:p>
           <a:p>
-            <a:r>
-              <a:rPr lang="en-US" dirty="0" err="1" smtClean="0"/>
-              <a:t>Adafruit_NeoPixel</a:t>
-            </a:r>
+            <a:pPr marL="0" indent="0">
+              <a:buNone/>
+            </a:pPr>
+            <a:endParaRPr lang="en-US" dirty="0"/>
+          </a:p>
+          <a:p>
+            <a:pPr marL="0" indent="0">
+              <a:buNone/>
+            </a:pPr>
+            <a:endParaRPr lang="en-US" dirty="0"/>
+          </a:p>
+          <a:p>
+            <a:pPr marL="0" indent="0">
+              <a:buNone/>
+            </a:pPr>
             <a:endParaRPr lang="en-US" dirty="0" smtClean="0"/>
           </a:p>
           <a:p>
-            <a:pPr lvl="1"/>
-            <a:r>
-              <a:rPr lang="en-US" dirty="0" smtClean="0"/>
-              <a:t>To light led patterns using led strip</a:t>
-            </a:r>
-          </a:p>
-          <a:p>
-            <a:pPr lvl="1"/>
+            <a:pPr marL="0" indent="0">
+              <a:buNone/>
+            </a:pPr>
+            <a:endParaRPr lang="en-US" dirty="0" smtClean="0"/>
+          </a:p>
+          <a:p>
+            <a:endParaRPr lang="en-US" dirty="0" smtClean="0"/>
+          </a:p>
+          <a:p>
             <a:endParaRPr lang="en-US" dirty="0"/>
           </a:p>
         </p:txBody>
@@ -11162,7 +10813,7 @@
     </p:spTree>
     <p:extLst>
       <p:ext uri="{BB962C8B-B14F-4D97-AF65-F5344CB8AC3E}">
-        <p14:creationId xmlns:p14="http://schemas.microsoft.com/office/powerpoint/2010/main" val="2796827819"/>
+        <p14:creationId xmlns:p14="http://schemas.microsoft.com/office/powerpoint/2010/main" val="1986240947"/>
       </p:ext>
     </p:extLst>
   </p:cSld>
@@ -11213,7 +10864,7 @@
           <a:p>
             <a:r>
               <a:rPr lang="en-US" dirty="0" smtClean="0"/>
-              <a:t>COMPONENTS USED</a:t>
+              <a:t>LIBRARY USED</a:t>
             </a:r>
             <a:endParaRPr lang="en-US" dirty="0"/>
           </a:p>
@@ -11238,116 +10889,84 @@
           <a:p>
             <a:r>
               <a:rPr lang="en-US" dirty="0" smtClean="0"/>
-              <a:t>ARDUINO board</a:t>
-            </a:r>
-          </a:p>
-          <a:p>
+              <a:t>Weather API (</a:t>
+            </a:r>
+            <a:r>
+              <a:rPr lang="en-US" dirty="0" err="1" smtClean="0"/>
+              <a:t>pywapi</a:t>
+            </a:r>
             <a:r>
               <a:rPr lang="en-US" dirty="0" smtClean="0"/>
-              <a:t>Resistors</a:t>
-            </a:r>
-          </a:p>
-          <a:p>
+              <a:t>)</a:t>
+            </a:r>
+          </a:p>
+          <a:p>
+            <a:pPr lvl="1"/>
             <a:r>
               <a:rPr lang="en-US" dirty="0" smtClean="0"/>
-              <a:t>Jumper wires</a:t>
+              <a:t>To get weather data from online</a:t>
             </a:r>
           </a:p>
           <a:p>
             <a:r>
               <a:rPr lang="en-US" dirty="0" smtClean="0"/>
-              <a:t>Temperature Sensors(DS18B20)</a:t>
-            </a:r>
-          </a:p>
-          <a:p>
-            <a:pPr marL="0" indent="0">
-              <a:buNone/>
-            </a:pPr>
+              <a:t>Serial</a:t>
+            </a:r>
+          </a:p>
+          <a:p>
+            <a:pPr lvl="1"/>
             <a:r>
               <a:rPr lang="en-US" dirty="0" smtClean="0"/>
-              <a:t>       http</a:t>
-            </a:r>
-            <a:r>
-              <a:rPr lang="en-US" dirty="0"/>
-              <a:t>://</a:t>
-            </a:r>
-            <a:r>
-              <a:rPr lang="en-US" dirty="0" err="1"/>
-              <a:t>www.adafruit.com</a:t>
-            </a:r>
-            <a:r>
-              <a:rPr lang="en-US" dirty="0"/>
-              <a:t>/products/374</a:t>
+              <a:t>Python module to Communicate between computer and Arduino via serial </a:t>
+            </a:r>
+            <a:r>
+              <a:rPr lang="en-US" dirty="0" smtClean="0"/>
+              <a:t>port</a:t>
+            </a:r>
+          </a:p>
+          <a:p>
+            <a:r>
+              <a:rPr lang="en-US" dirty="0" err="1" smtClean="0"/>
+              <a:t>Onewire</a:t>
+            </a:r>
+            <a:r>
+              <a:rPr lang="en-US" dirty="0" smtClean="0"/>
+              <a:t>	</a:t>
             </a:r>
             <a:endParaRPr lang="en-US" dirty="0" smtClean="0"/>
           </a:p>
           <a:p>
+            <a:pPr lvl="1"/>
+            <a:r>
+              <a:rPr lang="en-US" dirty="0" smtClean="0"/>
+              <a:t>To </a:t>
+            </a:r>
+            <a:r>
+              <a:rPr lang="en-US" dirty="0" smtClean="0"/>
+              <a:t>get temperature data using indoor </a:t>
+            </a:r>
+            <a:r>
+              <a:rPr lang="en-US" dirty="0" smtClean="0"/>
+              <a:t>sensors</a:t>
+            </a:r>
+            <a:endParaRPr lang="en-US" dirty="0" smtClean="0"/>
+          </a:p>
+          <a:p>
             <a:r>
               <a:rPr lang="en-US" dirty="0" err="1" smtClean="0"/>
-              <a:t>NeoPixel</a:t>
-            </a:r>
+              <a:t>Adafruit_NeoPixel</a:t>
+            </a:r>
+            <a:endParaRPr lang="en-US" dirty="0" smtClean="0"/>
+          </a:p>
+          <a:p>
+            <a:pPr lvl="1"/>
             <a:r>
               <a:rPr lang="en-US" dirty="0" smtClean="0"/>
-              <a:t> digital RGB LED Strip</a:t>
-            </a:r>
-          </a:p>
-          <a:p>
-            <a:pPr marL="0" indent="0">
-              <a:buNone/>
-            </a:pPr>
-            <a:r>
-              <a:rPr lang="en-US" dirty="0" smtClean="0"/>
-              <a:t>       http://</a:t>
-            </a:r>
-            <a:r>
-              <a:rPr lang="en-US" dirty="0" err="1" smtClean="0"/>
-              <a:t>www.adafruit.com</a:t>
-            </a:r>
-            <a:r>
-              <a:rPr lang="en-US" dirty="0" smtClean="0"/>
-              <a:t>/products/1138 </a:t>
-            </a:r>
-          </a:p>
-          <a:p>
-            <a:pPr marL="0" indent="0">
-              <a:buNone/>
-            </a:pPr>
-            <a:endParaRPr lang="en-US" dirty="0" smtClean="0"/>
-          </a:p>
-          <a:p>
-            <a:pPr marL="0" indent="0">
-              <a:buNone/>
-            </a:pPr>
-            <a:endParaRPr lang="en-US" dirty="0" smtClean="0"/>
-          </a:p>
-          <a:p>
-            <a:pPr marL="0" indent="0">
-              <a:buNone/>
-            </a:pPr>
-            <a:endParaRPr lang="en-US" dirty="0"/>
-          </a:p>
-          <a:p>
-            <a:pPr marL="0" indent="0">
-              <a:buNone/>
-            </a:pPr>
-            <a:endParaRPr lang="en-US" dirty="0"/>
-          </a:p>
-          <a:p>
-            <a:pPr marL="0" indent="0">
-              <a:buNone/>
-            </a:pPr>
-            <a:endParaRPr lang="en-US" dirty="0" smtClean="0"/>
-          </a:p>
-          <a:p>
-            <a:pPr marL="0" indent="0">
-              <a:buNone/>
-            </a:pPr>
-            <a:endParaRPr lang="en-US" dirty="0" smtClean="0"/>
-          </a:p>
-          <a:p>
-            <a:endParaRPr lang="en-US" dirty="0" smtClean="0"/>
-          </a:p>
-          <a:p>
+              <a:t>To light led patterns using led strip</a:t>
+            </a:r>
+          </a:p>
+          <a:p>
+            <a:pPr lvl="1"/>
             <a:endParaRPr lang="en-US" dirty="0"/>
           </a:p>
         </p:txBody>
@@ -11355,7 +10974,7 @@
     </p:spTree>
     <p:extLst>
       <p:ext uri="{BB962C8B-B14F-4D97-AF65-F5344CB8AC3E}">
-        <p14:creationId xmlns:p14="http://schemas.microsoft.com/office/powerpoint/2010/main" val="1986240947"/>
+        <p14:creationId xmlns:p14="http://schemas.microsoft.com/office/powerpoint/2010/main" val="2796827819"/>
       </p:ext>
     </p:extLst>
   </p:cSld>
@@ -11406,7 +11025,7 @@
           <a:p>
             <a:r>
               <a:rPr lang="en-US" dirty="0" smtClean="0"/>
-              <a:t>Future Enhancements</a:t>
+              <a:t>Future work</a:t>
             </a:r>
             <a:endParaRPr lang="en-US" dirty="0"/>
           </a:p>
@@ -11424,7 +11043,9 @@
         </p:nvSpPr>
         <p:spPr/>
         <p:txBody>
-          <a:bodyPr/>
+          <a:bodyPr>
+            <a:normAutofit/>
+          </a:bodyPr>
           <a:lstStyle/>
           <a:p>
             <a:r>
@@ -11443,28 +11064,43 @@
             <a:pPr lvl="1"/>
             <a:r>
               <a:rPr lang="en-US" dirty="0" smtClean="0"/>
-              <a:t>Temp, wind , humidity, rain, precipitation info</a:t>
+              <a:t>Temp, wind , humidity, rain, precipitation</a:t>
             </a:r>
           </a:p>
           <a:p>
             <a:pPr lvl="1"/>
             <a:r>
               <a:rPr lang="en-US" dirty="0" smtClean="0"/>
-              <a:t>Max, Min temp in a day</a:t>
-            </a:r>
-          </a:p>
-          <a:p>
-            <a:pPr lvl="1"/>
+              <a:t>Max, Min temp in a day/week</a:t>
+            </a:r>
+          </a:p>
+          <a:p>
             <a:r>
               <a:rPr lang="en-US" dirty="0" smtClean="0"/>
-              <a:t>Max, min temp over a week</a:t>
+              <a:t>Comparing indoor and outdoor sensors data and coming up with LED patterns to show the differences.</a:t>
             </a:r>
           </a:p>
           <a:p>
             <a:r>
               <a:rPr lang="en-US" dirty="0" smtClean="0"/>
-              <a:t>Comparing indoor and outdoor sensors values on the basis of LED patterns produced.</a:t>
-            </a:r>
+              <a:t>Using </a:t>
+            </a:r>
+            <a:r>
+              <a:rPr lang="en-US" dirty="0" err="1" smtClean="0"/>
+              <a:t>Wifi</a:t>
+            </a:r>
+            <a:r>
+              <a:rPr lang="en-US" dirty="0" smtClean="0"/>
+              <a:t> on Galileo</a:t>
+            </a:r>
+          </a:p>
+          <a:p>
+            <a:r>
+              <a:rPr lang="en-US" dirty="0" smtClean="0"/>
+              <a:t>Fix the modules to work on Galileo</a:t>
+            </a:r>
+          </a:p>
+          <a:p>
             <a:endParaRPr lang="en-US" dirty="0"/>
           </a:p>
         </p:txBody>
@@ -11521,7 +11157,11 @@
           <a:bodyPr/>
           <a:lstStyle/>
           <a:p>
-            <a:endParaRPr lang="en-US"/>
+            <a:r>
+              <a:rPr lang="en-US" dirty="0" smtClean="0"/>
+              <a:t>Challenges</a:t>
+            </a:r>
+            <a:endParaRPr lang="en-US" dirty="0"/>
           </a:p>
         </p:txBody>
       </p:sp>
@@ -11540,6 +11180,105 @@
           <a:bodyPr/>
           <a:lstStyle/>
           <a:p>
+            <a:endParaRPr lang="en-US" dirty="0"/>
+          </a:p>
+        </p:txBody>
+      </p:sp>
+    </p:spTree>
+    <p:extLst>
+      <p:ext uri="{BB962C8B-B14F-4D97-AF65-F5344CB8AC3E}">
+        <p14:creationId xmlns:p14="http://schemas.microsoft.com/office/powerpoint/2010/main" val="3032770816"/>
+      </p:ext>
+    </p:extLst>
+  </p:cSld>
+  <p:clrMapOvr>
+    <a:masterClrMapping/>
+  </p:clrMapOvr>
+</p:sld>
+</file>
+
+<file path=ppt/slides/slide17.xml><?xml version="1.0" encoding="utf-8"?>
+<p:sld xmlns:a="http://schemas.openxmlformats.org/drawingml/2006/main" xmlns:r="http://schemas.openxmlformats.org/officeDocument/2006/relationships" xmlns:p="http://schemas.openxmlformats.org/presentationml/2006/main">
+  <p:cSld>
+    <p:spTree>
+      <p:nvGrpSpPr>
+        <p:cNvPr id="1" name=""/>
+        <p:cNvGrpSpPr/>
+        <p:nvPr/>
+      </p:nvGrpSpPr>
+      <p:grpSpPr>
+        <a:xfrm>
+          <a:off x="0" y="0"/>
+          <a:ext cx="0" cy="0"/>
+          <a:chOff x="0" y="0"/>
+          <a:chExt cx="0" cy="0"/>
+        </a:xfrm>
+      </p:grpSpPr>
+      <p:sp>
+        <p:nvSpPr>
+          <p:cNvPr id="2" name="Title 1"/>
+          <p:cNvSpPr>
+            <a:spLocks noGrp="1"/>
+          </p:cNvSpPr>
+          <p:nvPr>
+            <p:ph type="title"/>
+          </p:nvPr>
+        </p:nvSpPr>
+        <p:spPr/>
+        <p:txBody>
+          <a:bodyPr/>
+          <a:lstStyle/>
+          <a:p>
+            <a:endParaRPr lang="en-US"/>
+          </a:p>
+        </p:txBody>
+      </p:sp>
+      <p:sp>
+        <p:nvSpPr>
+          <p:cNvPr id="3" name="Content Placeholder 2"/>
+          <p:cNvSpPr>
+            <a:spLocks noGrp="1"/>
+          </p:cNvSpPr>
+          <p:nvPr>
+            <p:ph idx="1"/>
+          </p:nvPr>
+        </p:nvSpPr>
+        <p:spPr/>
+        <p:txBody>
+          <a:bodyPr/>
+          <a:lstStyle/>
+          <a:p>
+            <a:r>
+              <a:rPr lang="en-US" dirty="0" err="1"/>
+              <a:t>Github</a:t>
+            </a:r>
+            <a:r>
+              <a:rPr lang="en-US" dirty="0"/>
+              <a:t> link: https://</a:t>
+            </a:r>
+            <a:r>
+              <a:rPr lang="en-US" dirty="0" err="1"/>
+              <a:t>github.com</a:t>
+            </a:r>
+            <a:r>
+              <a:rPr lang="en-US" dirty="0"/>
+              <a:t>/</a:t>
+            </a:r>
+            <a:r>
+              <a:rPr lang="en-US" dirty="0" err="1"/>
+              <a:t>sasmita</a:t>
+            </a:r>
+            <a:r>
+              <a:rPr lang="en-US" dirty="0"/>
+              <a:t>/</a:t>
+            </a:r>
+            <a:r>
+              <a:rPr lang="en-US" dirty="0" err="1" smtClean="0"/>
+              <a:t>QuantumLight</a:t>
+            </a:r>
+            <a:endParaRPr lang="en-US" dirty="0" smtClean="0"/>
+          </a:p>
+          <a:p>
             <a:r>
               <a:rPr lang="en-US" dirty="0" smtClean="0"/>
               <a:t>References </a:t>
@@ -11607,41 +11346,6 @@
           <a:p>
             <a:pPr lvl="1"/>
             <a:endParaRPr lang="en-US" dirty="0" smtClean="0"/>
-          </a:p>
-          <a:p>
-            <a:r>
-              <a:rPr lang="en-US" dirty="0" err="1" smtClean="0"/>
-              <a:t>Github</a:t>
-            </a:r>
-            <a:r>
-              <a:rPr lang="en-US" dirty="0" smtClean="0"/>
-              <a:t> </a:t>
-            </a:r>
-            <a:r>
-              <a:rPr lang="en-US" dirty="0"/>
-              <a:t>link: https://</a:t>
-            </a:r>
-            <a:r>
-              <a:rPr lang="en-US" dirty="0" err="1"/>
-              <a:t>github.com</a:t>
-            </a:r>
-            <a:r>
-              <a:rPr lang="en-US" dirty="0"/>
-              <a:t>/</a:t>
-            </a:r>
-            <a:r>
-              <a:rPr lang="en-US" dirty="0" err="1"/>
-              <a:t>sasmita</a:t>
-            </a:r>
-            <a:r>
-              <a:rPr lang="en-US" dirty="0"/>
-              <a:t>/</a:t>
-            </a:r>
-            <a:r>
-              <a:rPr lang="en-US" dirty="0" err="1"/>
-              <a:t>QuantumLight</a:t>
-            </a:r>
-            <a:endParaRPr lang="en-US" dirty="0"/>
           </a:p>
         </p:txBody>
       </p:sp>
@@ -11649,6 +11353,90 @@
     <p:extLst>
       <p:ext uri="{BB962C8B-B14F-4D97-AF65-F5344CB8AC3E}">
         <p14:creationId xmlns:p14="http://schemas.microsoft.com/office/powerpoint/2010/main" val="1935744794"/>
+      </p:ext>
+    </p:extLst>
+  </p:cSld>
+  <p:clrMapOvr>
+    <a:masterClrMapping/>
+  </p:clrMapOvr>
+  <p:timing>
+    <p:tnLst>
+      <p:par>
+        <p:cTn xmlns:p14="http://schemas.microsoft.com/office/powerpoint/2010/main" id="1" dur="indefinite" restart="never" nodeType="tmRoot"/>
+      </p:par>
+    </p:tnLst>
+  </p:timing>
+</p:sld>
+</file>
+
+<file path=ppt/slides/slide18.xml><?xml version="1.0" encoding="utf-8"?>
+<p:sld xmlns:a="http://schemas.openxmlformats.org/drawingml/2006/main" xmlns:r="http://schemas.openxmlformats.org/officeDocument/2006/relationships" xmlns:p="http://schemas.openxmlformats.org/presentationml/2006/main">
+  <p:cSld>
+    <p:spTree>
+      <p:nvGrpSpPr>
+        <p:cNvPr id="1" name=""/>
+        <p:cNvGrpSpPr/>
+        <p:nvPr/>
+      </p:nvGrpSpPr>
+      <p:grpSpPr>
+        <a:xfrm>
+          <a:off x="0" y="0"/>
+          <a:ext cx="0" cy="0"/>
+          <a:chOff x="0" y="0"/>
+          <a:chExt cx="0" cy="0"/>
+        </a:xfrm>
+      </p:grpSpPr>
+      <p:sp>
+        <p:nvSpPr>
+          <p:cNvPr id="3" name="Content Placeholder 2"/>
+          <p:cNvSpPr>
+            <a:spLocks noGrp="1"/>
+          </p:cNvSpPr>
+          <p:nvPr>
+            <p:ph idx="1"/>
+          </p:nvPr>
+        </p:nvSpPr>
+        <p:spPr>
+          <a:xfrm>
+            <a:off x="1114424" y="1995714"/>
+            <a:ext cx="7610476" cy="2697239"/>
+          </a:xfrm>
+        </p:spPr>
+        <p:txBody>
+          <a:bodyPr>
+            <a:normAutofit/>
+          </a:bodyPr>
+          <a:lstStyle/>
+          <a:p>
+            <a:pPr marL="0" indent="0">
+              <a:buNone/>
+            </a:pPr>
+            <a:r>
+              <a:rPr lang="en-US" sz="3200" dirty="0"/>
+              <a:t>	</a:t>
+            </a:r>
+            <a:endParaRPr lang="en-US" sz="5400" dirty="0" smtClean="0"/>
+          </a:p>
+          <a:p>
+            <a:pPr marL="0" indent="0">
+              <a:buNone/>
+            </a:pPr>
+            <a:r>
+              <a:rPr lang="en-US" sz="5400" dirty="0"/>
+              <a:t>	</a:t>
+            </a:r>
+            <a:r>
+              <a:rPr lang="en-US" sz="5400" dirty="0" smtClean="0"/>
+              <a:t>QUESTIONS ??</a:t>
+            </a:r>
+            <a:endParaRPr lang="en-US" sz="5400" dirty="0"/>
+          </a:p>
+        </p:txBody>
+      </p:sp>
+    </p:spTree>
+    <p:extLst>
+      <p:ext uri="{BB962C8B-B14F-4D97-AF65-F5344CB8AC3E}">
+        <p14:creationId xmlns:p14="http://schemas.microsoft.com/office/powerpoint/2010/main" val="3830823051"/>
       </p:ext>
     </p:extLst>
   </p:cSld>
@@ -11733,7 +11521,14 @@
               <a:rPr lang="en-US" sz="2400" dirty="0" smtClean="0"/>
               <a:t>Quantifying the input data and displaying various LED patterns based on quantification.</a:t>
             </a:r>
-            <a:endParaRPr lang="en-US" sz="2400" dirty="0"/>
+          </a:p>
+          <a:p>
+            <a:pPr lvl="4"/>
+            <a:r>
+              <a:rPr lang="en-US" sz="2200" dirty="0" smtClean="0"/>
+              <a:t>Quantifying Weather data</a:t>
+            </a:r>
+            <a:endParaRPr lang="en-US" sz="2200" dirty="0"/>
           </a:p>
         </p:txBody>
       </p:sp>
@@ -11905,96 +11700,11 @@
           <a:p>
             <a:r>
               <a:rPr lang="en-US" dirty="0" smtClean="0"/>
-              <a:t>Classifying Weather data</a:t>
-            </a:r>
-            <a:endParaRPr lang="en-US" dirty="0"/>
-          </a:p>
-        </p:txBody>
-      </p:sp>
-      <p:graphicFrame>
-        <p:nvGraphicFramePr>
-          <p:cNvPr id="4" name="Content Placeholder 3"/>
-          <p:cNvGraphicFramePr>
-            <a:graphicFrameLocks noGrp="1"/>
-          </p:cNvGraphicFramePr>
-          <p:nvPr>
-            <p:ph idx="1"/>
-            <p:extLst>
-              <p:ext uri="{D42A27DB-BD31-4B8C-83A1-F6EECF244321}">
-                <p14:modId xmlns:p14="http://schemas.microsoft.com/office/powerpoint/2010/main" val="2926447918"/>
-              </p:ext>
-            </p:extLst>
-          </p:nvPr>
-        </p:nvGraphicFramePr>
-        <p:xfrm>
-          <a:off x="1114424" y="2236696"/>
-          <a:ext cx="7610476" cy="4621304"/>
-        </p:xfrm>
-        <a:graphic>
-          <a:graphicData uri="http://schemas.openxmlformats.org/drawingml/2006/diagram">
-            <dgm:relIds xmlns:dgm="http://schemas.openxmlformats.org/drawingml/2006/diagram" xmlns:r="http://schemas.openxmlformats.org/officeDocument/2006/relationships" r:dm="rId2" r:lo="rId3" r:qs="rId4" r:cs="rId5"/>
-          </a:graphicData>
-        </a:graphic>
-      </p:graphicFrame>
-    </p:spTree>
-    <p:extLst>
-      <p:ext uri="{BB962C8B-B14F-4D97-AF65-F5344CB8AC3E}">
-        <p14:creationId xmlns:p14="http://schemas.microsoft.com/office/powerpoint/2010/main" val="1210066714"/>
-      </p:ext>
-    </p:extLst>
-  </p:cSld>
-  <p:clrMapOvr>
-    <a:masterClrMapping/>
-  </p:clrMapOvr>
-  <p:timing>
-    <p:tnLst>
-      <p:par>
-        <p:cTn xmlns:p14="http://schemas.microsoft.com/office/powerpoint/2010/main" id="1" dur="indefinite" restart="never" nodeType="tmRoot"/>
-      </p:par>
-    </p:tnLst>
-  </p:timing>
-</p:sld>
-</file>
-
-<file path=ppt/slides/slide5.xml><?xml version="1.0" encoding="utf-8"?>
-<p:sld xmlns:a="http://schemas.openxmlformats.org/drawingml/2006/main" xmlns:r="http://schemas.openxmlformats.org/officeDocument/2006/relationships" xmlns:p="http://schemas.openxmlformats.org/presentationml/2006/main">
-  <p:cSld>
-    <p:spTree>
-      <p:nvGrpSpPr>
-        <p:cNvPr id="1" name=""/>
-        <p:cNvGrpSpPr/>
-        <p:nvPr/>
-      </p:nvGrpSpPr>
-      <p:grpSpPr>
-        <a:xfrm>
-          <a:off x="0" y="0"/>
-          <a:ext cx="0" cy="0"/>
-          <a:chOff x="0" y="0"/>
-          <a:chExt cx="0" cy="0"/>
-        </a:xfrm>
-      </p:grpSpPr>
-      <p:sp>
-        <p:nvSpPr>
-          <p:cNvPr id="2" name="Title 1"/>
-          <p:cNvSpPr>
-            <a:spLocks noGrp="1"/>
-          </p:cNvSpPr>
-          <p:nvPr>
-            <p:ph type="title"/>
-          </p:nvPr>
-        </p:nvSpPr>
-        <p:spPr/>
-        <p:txBody>
-          <a:bodyPr/>
-          <a:lstStyle/>
-          <a:p>
-            <a:r>
-              <a:rPr lang="en-US" dirty="0" err="1" smtClean="0"/>
-              <a:t>QuantumLight</a:t>
+              <a:t>Quantum Light </a:t>
             </a:r>
             <a:r>
               <a:rPr lang="en-US" dirty="0" smtClean="0"/>
-              <a:t> : Block diagram</a:t>
+              <a:t>: Block diagram</a:t>
             </a:r>
             <a:endParaRPr lang="en-US" dirty="0"/>
           </a:p>
@@ -12186,7 +11896,7 @@
               <a:t>Using </a:t>
             </a:r>
             <a:r>
-              <a:rPr lang="en-US" dirty="0" err="1" smtClean="0"/>
+              <a:rPr lang="en-US" dirty="0" smtClean="0"/>
               <a:t>Arduino</a:t>
             </a:r>
             <a:endParaRPr lang="en-US" dirty="0"/>
@@ -12677,6 +12387,91 @@
 </p:sld>
 </file>
 
+<file path=ppt/slides/slide5.xml><?xml version="1.0" encoding="utf-8"?>
+<p:sld xmlns:a="http://schemas.openxmlformats.org/drawingml/2006/main" xmlns:r="http://schemas.openxmlformats.org/officeDocument/2006/relationships" xmlns:p="http://schemas.openxmlformats.org/presentationml/2006/main">
+  <p:cSld>
+    <p:spTree>
+      <p:nvGrpSpPr>
+        <p:cNvPr id="1" name=""/>
+        <p:cNvGrpSpPr/>
+        <p:nvPr/>
+      </p:nvGrpSpPr>
+      <p:grpSpPr>
+        <a:xfrm>
+          <a:off x="0" y="0"/>
+          <a:ext cx="0" cy="0"/>
+          <a:chOff x="0" y="0"/>
+          <a:chExt cx="0" cy="0"/>
+        </a:xfrm>
+      </p:grpSpPr>
+      <p:sp>
+        <p:nvSpPr>
+          <p:cNvPr id="2" name="Title 1"/>
+          <p:cNvSpPr>
+            <a:spLocks noGrp="1"/>
+          </p:cNvSpPr>
+          <p:nvPr>
+            <p:ph type="title"/>
+          </p:nvPr>
+        </p:nvSpPr>
+        <p:spPr/>
+        <p:txBody>
+          <a:bodyPr/>
+          <a:lstStyle/>
+          <a:p>
+            <a:r>
+              <a:rPr lang="en-US" dirty="0" smtClean="0"/>
+              <a:t>Classifying Weather data</a:t>
+            </a:r>
+            <a:endParaRPr lang="en-US" dirty="0"/>
+          </a:p>
+        </p:txBody>
+      </p:sp>
+      <p:graphicFrame>
+        <p:nvGraphicFramePr>
+          <p:cNvPr id="4" name="Content Placeholder 3"/>
+          <p:cNvGraphicFramePr>
+            <a:graphicFrameLocks noGrp="1"/>
+          </p:cNvGraphicFramePr>
+          <p:nvPr>
+            <p:ph idx="1"/>
+            <p:extLst>
+              <p:ext uri="{D42A27DB-BD31-4B8C-83A1-F6EECF244321}">
+                <p14:modId xmlns:p14="http://schemas.microsoft.com/office/powerpoint/2010/main" val="3477113763"/>
+              </p:ext>
+            </p:extLst>
+          </p:nvPr>
+        </p:nvGraphicFramePr>
+        <p:xfrm>
+          <a:off x="1114424" y="2236696"/>
+          <a:ext cx="7610476" cy="4621304"/>
+        </p:xfrm>
+        <a:graphic>
+          <a:graphicData uri="http://schemas.openxmlformats.org/drawingml/2006/diagram">
+            <dgm:relIds xmlns:dgm="http://schemas.openxmlformats.org/drawingml/2006/diagram" xmlns:r="http://schemas.openxmlformats.org/officeDocument/2006/relationships" r:dm="rId2" r:lo="rId3" r:qs="rId4" r:cs="rId5"/>
+          </a:graphicData>
+        </a:graphic>
+      </p:graphicFrame>
+    </p:spTree>
+    <p:extLst>
+      <p:ext uri="{BB962C8B-B14F-4D97-AF65-F5344CB8AC3E}">
+        <p14:creationId xmlns:p14="http://schemas.microsoft.com/office/powerpoint/2010/main" val="1210066714"/>
+      </p:ext>
+    </p:extLst>
+  </p:cSld>
+  <p:clrMapOvr>
+    <a:masterClrMapping/>
+  </p:clrMapOvr>
+  <p:timing>
+    <p:tnLst>
+      <p:par>
+        <p:cTn xmlns:p14="http://schemas.microsoft.com/office/powerpoint/2010/main" id="1" dur="indefinite" restart="never" nodeType="tmRoot"/>
+      </p:par>
+    </p:tnLst>
+  </p:timing>
+</p:sld>
+</file>
+
 <file path=ppt/slides/slide6.xml><?xml version="1.0" encoding="utf-8"?>
 <p:sld xmlns:a="http://schemas.openxmlformats.org/drawingml/2006/main" xmlns:r="http://schemas.openxmlformats.org/officeDocument/2006/relationships" xmlns:p="http://schemas.openxmlformats.org/presentationml/2006/main">
   <p:cSld>
@@ -12729,14 +12524,14 @@
             <p:ph idx="1"/>
             <p:extLst>
               <p:ext uri="{D42A27DB-BD31-4B8C-83A1-F6EECF244321}">
-                <p14:modId xmlns:p14="http://schemas.microsoft.com/office/powerpoint/2010/main" val="3892728545"/>
+                <p14:modId xmlns:p14="http://schemas.microsoft.com/office/powerpoint/2010/main" val="3524098972"/>
               </p:ext>
             </p:extLst>
           </p:nvPr>
         </p:nvGraphicFramePr>
         <p:xfrm>
           <a:off x="1172151" y="2480121"/>
-          <a:ext cx="7010368" cy="3708400"/>
+          <a:ext cx="7415468" cy="3708400"/>
         </p:xfrm>
         <a:graphic>
           <a:graphicData uri="http://schemas.openxmlformats.org/drawingml/2006/table">
@@ -12745,9 +12540,9 @@
                 <a:tableStyleId>{5940675A-B579-460E-94D1-54222C63F5DA}</a:tableStyleId>
               </a:tblPr>
               <a:tblGrid>
-                <a:gridCol w="2132605"/>
-                <a:gridCol w="2092531"/>
-                <a:gridCol w="2785232"/>
+                <a:gridCol w="2255839"/>
+                <a:gridCol w="2213450"/>
+                <a:gridCol w="2946179"/>
               </a:tblGrid>
               <a:tr h="370840">
                 <a:tc>
@@ -12889,11 +12684,7 @@
                     <a:p>
                       <a:r>
                         <a:rPr lang="en-US" dirty="0" smtClean="0"/>
-                        <a:t>1 =&gt; </a:t>
-                      </a:r>
-                      <a:r>
-                        <a:rPr lang="en-US" dirty="0" err="1" smtClean="0"/>
-                        <a:t>ColdLessWindy</a:t>
+                        <a:t>1 =&gt; Cold Less Windy</a:t>
                       </a:r>
                       <a:endParaRPr lang="en-US" dirty="0"/>
                     </a:p>
@@ -12937,11 +12728,7 @@
                     <a:p>
                       <a:r>
                         <a:rPr lang="en-US" dirty="0" smtClean="0"/>
-                        <a:t>2 =&gt; </a:t>
-                      </a:r>
-                      <a:r>
-                        <a:rPr lang="en-US" dirty="0" err="1" smtClean="0"/>
-                        <a:t>ColdMoreWindy</a:t>
+                        <a:t>2 =&gt; Cold More Windy</a:t>
                       </a:r>
                       <a:endParaRPr lang="en-US" dirty="0"/>
                     </a:p>
@@ -12985,11 +12772,7 @@
                     <a:p>
                       <a:r>
                         <a:rPr lang="en-US" dirty="0" smtClean="0"/>
-                        <a:t>3 =&gt; </a:t>
-                      </a:r>
-                      <a:r>
-                        <a:rPr lang="en-US" dirty="0" err="1" smtClean="0"/>
-                        <a:t>NormalNoWindy</a:t>
+                        <a:t>3 =&gt; Normal No Windy</a:t>
                       </a:r>
                       <a:endParaRPr lang="en-US" dirty="0"/>
                     </a:p>
@@ -13033,11 +12816,7 @@
                     <a:p>
                       <a:r>
                         <a:rPr lang="en-US" dirty="0" smtClean="0"/>
-                        <a:t>4 =&gt; </a:t>
-                      </a:r>
-                      <a:r>
-                        <a:rPr lang="en-US" dirty="0" err="1" smtClean="0"/>
-                        <a:t>NormalLessWindy</a:t>
+                        <a:t>4 =&gt; Normal Less Windy</a:t>
                       </a:r>
                       <a:endParaRPr lang="en-US" dirty="0"/>
                     </a:p>
@@ -13089,11 +12868,7 @@
                       </a:r>
                       <a:r>
                         <a:rPr lang="en-US" dirty="0" smtClean="0"/>
-                        <a:t>=&gt; </a:t>
-                      </a:r>
-                      <a:r>
-                        <a:rPr lang="en-US" dirty="0" err="1" smtClean="0"/>
-                        <a:t>NormalMoreWindy</a:t>
+                        <a:t>=&gt; Normal More Windy</a:t>
                       </a:r>
                       <a:endParaRPr lang="en-US" dirty="0"/>
                     </a:p>
@@ -13137,11 +12912,7 @@
                     <a:p>
                       <a:r>
                         <a:rPr lang="en-US" dirty="0" smtClean="0"/>
-                        <a:t>6 =&gt; </a:t>
-                      </a:r>
-                      <a:r>
-                        <a:rPr lang="en-US" dirty="0" err="1" smtClean="0"/>
-                        <a:t>HotNoWindy</a:t>
+                        <a:t>6 =&gt; Hot No Windy</a:t>
                       </a:r>
                       <a:endParaRPr lang="en-US" dirty="0"/>
                     </a:p>
@@ -13185,11 +12956,7 @@
                     <a:p>
                       <a:r>
                         <a:rPr lang="en-US" dirty="0" smtClean="0"/>
-                        <a:t>7 =&gt; </a:t>
-                      </a:r>
-                      <a:r>
-                        <a:rPr lang="en-US" dirty="0" err="1" smtClean="0"/>
-                        <a:t>HotLessWindy</a:t>
+                        <a:t>7 =&gt; Hot Less Windy</a:t>
                       </a:r>
                       <a:endParaRPr lang="en-US" dirty="0"/>
                     </a:p>
@@ -13233,11 +13000,7 @@
                     <a:p>
                       <a:r>
                         <a:rPr lang="en-US" dirty="0" smtClean="0"/>
-                        <a:t>8 =&gt; </a:t>
-                      </a:r>
-                      <a:r>
-                        <a:rPr lang="en-US" dirty="0" err="1" smtClean="0"/>
-                        <a:t>HotMoreWindy</a:t>
+                        <a:t>8 =&gt; Hot More Windy</a:t>
                       </a:r>
                       <a:endParaRPr lang="en-US" dirty="0"/>
                     </a:p>
@@ -13305,15 +13068,7 @@
           <a:p>
             <a:r>
               <a:rPr lang="en-US" dirty="0" smtClean="0"/>
-              <a:t>Connecting </a:t>
-            </a:r>
-            <a:r>
-              <a:rPr lang="en-US" dirty="0" err="1" smtClean="0"/>
-              <a:t>Arduino</a:t>
-            </a:r>
-            <a:r>
-              <a:rPr lang="en-US" dirty="0" smtClean="0"/>
-              <a:t> and LED strip</a:t>
+              <a:t>Connecting Arduino and LED strip</a:t>
             </a:r>
             <a:endParaRPr lang="en-US" dirty="0"/>
           </a:p>
@@ -13587,7 +13342,7 @@
           <a:p>
             <a:r>
               <a:rPr lang="en-US" dirty="0" smtClean="0"/>
-              <a:t>Small Video snippets</a:t>
+              <a:t>Results</a:t>
             </a:r>
             <a:endParaRPr lang="en-US" dirty="0"/>
           </a:p>
@@ -13613,13 +13368,7 @@
             <a:pPr marL="0" indent="0">
               <a:buNone/>
             </a:pPr>
-            <a:endParaRPr lang="en-US" sz="2400" dirty="0" smtClean="0"/>
-          </a:p>
-          <a:p>
-            <a:pPr marL="0" indent="0">
-              <a:buNone/>
-            </a:pPr>
-            <a:endParaRPr lang="en-US" sz="2800" smtClean="0"/>
+            <a:endParaRPr lang="en-US" sz="2800" dirty="0" smtClean="0"/>
           </a:p>
           <a:p>
             <a:pPr marL="0" indent="0">

</xml_diff>

<commit_message>
Updated few slides with graphs
</commit_message>
<xml_diff>
--- a/QL_Presentation1.pptx
+++ b/QL_Presentation1.pptx
@@ -5,7 +5,7 @@
     <p:sldMasterId id="2147483660" r:id="rId1"/>
   </p:sldMasterIdLst>
   <p:notesMasterIdLst>
-    <p:notesMasterId r:id="rId23"/>
+    <p:notesMasterId r:id="rId26"/>
   </p:notesMasterIdLst>
   <p:sldIdLst>
     <p:sldId id="256" r:id="rId2"/>
@@ -13,7 +13,7 @@
     <p:sldId id="264" r:id="rId4"/>
     <p:sldId id="263" r:id="rId5"/>
     <p:sldId id="262" r:id="rId6"/>
-    <p:sldId id="260" r:id="rId7"/>
+    <p:sldId id="281" r:id="rId7"/>
     <p:sldId id="268" r:id="rId8"/>
     <p:sldId id="280" r:id="rId9"/>
     <p:sldId id="277" r:id="rId10"/>
@@ -21,14 +21,17 @@
     <p:sldId id="266" r:id="rId12"/>
     <p:sldId id="267" r:id="rId13"/>
     <p:sldId id="265" r:id="rId14"/>
-    <p:sldId id="279" r:id="rId15"/>
-    <p:sldId id="278" r:id="rId16"/>
-    <p:sldId id="258" r:id="rId17"/>
-    <p:sldId id="259" r:id="rId18"/>
-    <p:sldId id="276" r:id="rId19"/>
-    <p:sldId id="269" r:id="rId20"/>
-    <p:sldId id="270" r:id="rId21"/>
-    <p:sldId id="275" r:id="rId22"/>
+    <p:sldId id="285" r:id="rId15"/>
+    <p:sldId id="279" r:id="rId16"/>
+    <p:sldId id="282" r:id="rId17"/>
+    <p:sldId id="283" r:id="rId18"/>
+    <p:sldId id="284" r:id="rId19"/>
+    <p:sldId id="258" r:id="rId20"/>
+    <p:sldId id="259" r:id="rId21"/>
+    <p:sldId id="276" r:id="rId22"/>
+    <p:sldId id="269" r:id="rId23"/>
+    <p:sldId id="270" r:id="rId24"/>
+    <p:sldId id="275" r:id="rId25"/>
   </p:sldIdLst>
   <p:sldSz cx="9144000" cy="6858000" type="screen4x3"/>
   <p:notesSz cx="6858000" cy="9144000"/>
@@ -10771,9 +10774,9 @@
           <a:p>
             <a:r>
               <a:rPr lang="en-US" dirty="0" smtClean="0"/>
-              <a:t>Classification Details</a:t>
-            </a:r>
-            <a:endParaRPr lang="en-US" dirty="0"/>
+              <a:t>Data Collection &amp; Parsing</a:t>
+            </a:r>
+            <a:endParaRPr lang="en-IN" dirty="0"/>
           </a:p>
         </p:txBody>
       </p:sp>
@@ -10792,14 +10795,38 @@
           <a:bodyPr/>
           <a:lstStyle/>
           <a:p>
-            <a:endParaRPr lang="en-US"/>
+            <a:r>
+              <a:rPr lang="en-US" dirty="0" smtClean="0"/>
+              <a:t>Python</a:t>
+            </a:r>
+          </a:p>
+          <a:p>
+            <a:r>
+              <a:rPr lang="en-US" dirty="0" err="1" smtClean="0"/>
+              <a:t>Yahooweather</a:t>
+            </a:r>
+            <a:r>
+              <a:rPr lang="en-US" dirty="0" smtClean="0"/>
+              <a:t> – to collect weather data’s</a:t>
+            </a:r>
+          </a:p>
+          <a:p>
+            <a:r>
+              <a:rPr lang="en-US" dirty="0" smtClean="0"/>
+              <a:t>Parsing data to collect current temperature &amp; </a:t>
+            </a:r>
+            <a:r>
+              <a:rPr lang="en-US" dirty="0" err="1" smtClean="0"/>
+              <a:t>windspeed</a:t>
+            </a:r>
+            <a:endParaRPr lang="en-IN" dirty="0"/>
           </a:p>
         </p:txBody>
       </p:sp>
     </p:spTree>
     <p:extLst>
       <p:ext uri="{BB962C8B-B14F-4D97-AF65-F5344CB8AC3E}">
-        <p14:creationId xmlns:p14="http://schemas.microsoft.com/office/powerpoint/2010/main" val="501075537"/>
+        <p14:creationId xmlns:p14="http://schemas.microsoft.com/office/powerpoint/2010/main" val="1956328756"/>
       </p:ext>
     </p:extLst>
   </p:cSld>
@@ -10850,7 +10877,7 @@
           <a:p>
             <a:r>
               <a:rPr lang="en-US" dirty="0" smtClean="0"/>
-              <a:t>Graphs</a:t>
+              <a:t>Classification Details</a:t>
             </a:r>
             <a:endParaRPr lang="en-US" dirty="0"/>
           </a:p>
@@ -10878,7 +10905,7 @@
     </p:spTree>
     <p:extLst>
       <p:ext uri="{BB962C8B-B14F-4D97-AF65-F5344CB8AC3E}">
-        <p14:creationId xmlns:p14="http://schemas.microsoft.com/office/powerpoint/2010/main" val="3355245206"/>
+        <p14:creationId xmlns:p14="http://schemas.microsoft.com/office/powerpoint/2010/main" val="501075537"/>
       </p:ext>
     </p:extLst>
   </p:cSld>
@@ -10922,163 +10949,56 @@
             <p:ph type="title"/>
           </p:nvPr>
         </p:nvSpPr>
-        <p:spPr/>
+        <p:spPr>
+          <a:xfrm>
+            <a:off x="0" y="209456"/>
+            <a:ext cx="8913813" cy="914400"/>
+          </a:xfrm>
+        </p:spPr>
         <p:txBody>
           <a:bodyPr/>
           <a:lstStyle/>
           <a:p>
             <a:r>
               <a:rPr lang="en-US" dirty="0" smtClean="0"/>
-              <a:t>COMPONENTS USED</a:t>
+              <a:t>Graphs – Temp Vs Time</a:t>
             </a:r>
             <a:endParaRPr lang="en-US" dirty="0"/>
           </a:p>
         </p:txBody>
       </p:sp>
-      <p:sp>
-        <p:nvSpPr>
-          <p:cNvPr id="3" name="Content Placeholder 2"/>
-          <p:cNvSpPr>
-            <a:spLocks noGrp="1"/>
-          </p:cNvSpPr>
+      <p:pic>
+        <p:nvPicPr>
+          <p:cNvPr id="1027" name="Picture 3" descr="C:\Users\betcy\Desktop\t1.jpg"/>
+          <p:cNvPicPr>
+            <a:picLocks noGrp="1" noChangeAspect="1" noChangeArrowheads="1"/>
+          </p:cNvPicPr>
           <p:nvPr>
             <p:ph idx="1"/>
           </p:nvPr>
-        </p:nvSpPr>
-        <p:spPr/>
-        <p:txBody>
-          <a:bodyPr>
-            <a:normAutofit lnSpcReduction="10000"/>
-          </a:bodyPr>
-          <a:lstStyle/>
-          <a:p>
-            <a:r>
-              <a:rPr lang="en-US" dirty="0" smtClean="0"/>
-              <a:t>ARDUINO </a:t>
-            </a:r>
-            <a:r>
-              <a:rPr lang="en-US" dirty="0" smtClean="0"/>
-              <a:t>board</a:t>
-            </a:r>
-          </a:p>
-          <a:p>
-            <a:r>
-              <a:rPr lang="en-US" dirty="0" err="1"/>
-              <a:t>NeoPixel</a:t>
-            </a:r>
-            <a:r>
-              <a:rPr lang="en-US" dirty="0"/>
-              <a:t> digital RGB LED Strip</a:t>
-            </a:r>
-          </a:p>
-          <a:p>
-            <a:pPr marL="0" indent="0">
-              <a:buNone/>
-            </a:pPr>
-            <a:r>
-              <a:rPr lang="en-US" dirty="0"/>
-              <a:t>       </a:t>
-            </a:r>
-            <a:r>
-              <a:rPr lang="en-US" dirty="0">
-                <a:hlinkClick r:id="rId2"/>
-              </a:rPr>
-              <a:t>http://www.adafruit.com/products/1138</a:t>
-            </a:r>
-            <a:r>
-              <a:rPr lang="en-US" dirty="0"/>
-              <a:t> </a:t>
-            </a:r>
-            <a:endParaRPr lang="en-US" dirty="0" smtClean="0"/>
-          </a:p>
-          <a:p>
-            <a:r>
-              <a:rPr lang="en-US" dirty="0"/>
-              <a:t>Temperature Sensors(DS18B20)</a:t>
-            </a:r>
-          </a:p>
-          <a:p>
-            <a:pPr marL="0" indent="0">
-              <a:buNone/>
-            </a:pPr>
-            <a:r>
-              <a:rPr lang="en-US" dirty="0"/>
-              <a:t>       http://</a:t>
-            </a:r>
-            <a:r>
-              <a:rPr lang="en-US" dirty="0" err="1"/>
-              <a:t>www.adafruit.com</a:t>
-            </a:r>
-            <a:r>
-              <a:rPr lang="en-US" dirty="0"/>
-              <a:t>/products/</a:t>
-            </a:r>
-            <a:r>
-              <a:rPr lang="en-US" dirty="0" smtClean="0"/>
-              <a:t>374</a:t>
-            </a:r>
-            <a:endParaRPr lang="en-US" dirty="0" smtClean="0"/>
-          </a:p>
-          <a:p>
-            <a:r>
-              <a:rPr lang="en-US" dirty="0" smtClean="0"/>
-              <a:t>Resistors</a:t>
-            </a:r>
-          </a:p>
-          <a:p>
-            <a:r>
-              <a:rPr lang="en-US" dirty="0" smtClean="0"/>
-              <a:t>Jumper wires</a:t>
-            </a:r>
-          </a:p>
-          <a:p>
-            <a:pPr marL="0" indent="0">
-              <a:buNone/>
-            </a:pPr>
-            <a:endParaRPr lang="en-US" dirty="0" smtClean="0"/>
-          </a:p>
-          <a:p>
-            <a:pPr marL="0" indent="0">
-              <a:buNone/>
-            </a:pPr>
-            <a:endParaRPr lang="en-US" dirty="0" smtClean="0"/>
-          </a:p>
-          <a:p>
-            <a:pPr marL="0" indent="0">
-              <a:buNone/>
-            </a:pPr>
-            <a:endParaRPr lang="en-US" dirty="0"/>
-          </a:p>
-          <a:p>
-            <a:pPr marL="0" indent="0">
-              <a:buNone/>
-            </a:pPr>
-            <a:endParaRPr lang="en-US" dirty="0"/>
-          </a:p>
-          <a:p>
-            <a:pPr marL="0" indent="0">
-              <a:buNone/>
-            </a:pPr>
-            <a:endParaRPr lang="en-US" dirty="0" smtClean="0"/>
-          </a:p>
-          <a:p>
-            <a:pPr marL="0" indent="0">
-              <a:buNone/>
-            </a:pPr>
-            <a:endParaRPr lang="en-US" dirty="0" smtClean="0"/>
-          </a:p>
-          <a:p>
-            <a:endParaRPr lang="en-US" dirty="0" smtClean="0"/>
-          </a:p>
-          <a:p>
-            <a:endParaRPr lang="en-US" dirty="0"/>
-          </a:p>
-        </p:txBody>
-      </p:sp>
+        </p:nvPicPr>
+        <p:blipFill>
+          <a:blip r:embed="rId2" cstate="print"/>
+          <a:srcRect/>
+          <a:stretch>
+            <a:fillRect/>
+          </a:stretch>
+        </p:blipFill>
+        <p:spPr bwMode="auto">
+          <a:xfrm>
+            <a:off x="862884" y="1389051"/>
+            <a:ext cx="7508383" cy="5153417"/>
+          </a:xfrm>
+          <a:prstGeom prst="rect">
+            <a:avLst/>
+          </a:prstGeom>
+          <a:noFill/>
+        </p:spPr>
+      </p:pic>
     </p:spTree>
     <p:extLst>
       <p:ext uri="{BB962C8B-B14F-4D97-AF65-F5344CB8AC3E}">
-        <p14:creationId xmlns:p14="http://schemas.microsoft.com/office/powerpoint/2010/main" val="1986240947"/>
+        <p14:creationId xmlns:p14="http://schemas.microsoft.com/office/powerpoint/2010/main" val="2177146048"/>
       </p:ext>
     </p:extLst>
   </p:cSld>
@@ -11122,124 +11042,60 @@
             <p:ph type="title"/>
           </p:nvPr>
         </p:nvSpPr>
-        <p:spPr/>
+        <p:spPr>
+          <a:xfrm>
+            <a:off x="0" y="209456"/>
+            <a:ext cx="8913813" cy="914400"/>
+          </a:xfrm>
+        </p:spPr>
         <p:txBody>
           <a:bodyPr/>
           <a:lstStyle/>
           <a:p>
             <a:r>
+              <a:rPr lang="en-US" dirty="0" err="1" smtClean="0"/>
+              <a:t>WindSpeed</a:t>
+            </a:r>
+            <a:r>
               <a:rPr lang="en-US" dirty="0" smtClean="0"/>
-              <a:t>LIBRARY USED</a:t>
-            </a:r>
-            <a:endParaRPr lang="en-US" dirty="0"/>
+              <a:t> Vs Time</a:t>
+            </a:r>
+            <a:endParaRPr lang="en-IN" dirty="0"/>
           </a:p>
         </p:txBody>
       </p:sp>
-      <p:sp>
-        <p:nvSpPr>
-          <p:cNvPr id="3" name="Content Placeholder 2"/>
-          <p:cNvSpPr>
-            <a:spLocks noGrp="1"/>
-          </p:cNvSpPr>
+      <p:pic>
+        <p:nvPicPr>
+          <p:cNvPr id="2050" name="Picture 2" descr="C:\Psu\QL\final\wt.jpg"/>
+          <p:cNvPicPr>
+            <a:picLocks noGrp="1" noChangeAspect="1" noChangeArrowheads="1"/>
+          </p:cNvPicPr>
           <p:nvPr>
             <p:ph idx="1"/>
           </p:nvPr>
-        </p:nvSpPr>
-        <p:spPr/>
-        <p:txBody>
-          <a:bodyPr>
-            <a:normAutofit lnSpcReduction="10000"/>
-          </a:bodyPr>
-          <a:lstStyle/>
-          <a:p>
-            <a:r>
-              <a:rPr lang="en-US" dirty="0" smtClean="0"/>
-              <a:t>Weather API (</a:t>
-            </a:r>
-            <a:r>
-              <a:rPr lang="en-US" dirty="0" err="1" smtClean="0"/>
-              <a:t>pywapi</a:t>
-            </a:r>
-            <a:r>
-              <a:rPr lang="en-US" dirty="0" smtClean="0"/>
-              <a:t>)</a:t>
-            </a:r>
-          </a:p>
-          <a:p>
-            <a:pPr lvl="1"/>
-            <a:r>
-              <a:rPr lang="en-US" dirty="0" smtClean="0"/>
-              <a:t>To get weather data from online</a:t>
-            </a:r>
-          </a:p>
-          <a:p>
-            <a:r>
-              <a:rPr lang="en-US" dirty="0" smtClean="0"/>
-              <a:t>Serial</a:t>
-            </a:r>
-          </a:p>
-          <a:p>
-            <a:pPr lvl="1"/>
-            <a:r>
-              <a:rPr lang="en-US" dirty="0" smtClean="0"/>
-              <a:t>Python module to Communicate between computer and Arduino via serial </a:t>
-            </a:r>
-            <a:r>
-              <a:rPr lang="en-US" dirty="0" smtClean="0"/>
-              <a:t>port</a:t>
-            </a:r>
-          </a:p>
-          <a:p>
-            <a:r>
-              <a:rPr lang="en-US" dirty="0" err="1" smtClean="0"/>
-              <a:t>Onewire</a:t>
-            </a:r>
-            <a:r>
-              <a:rPr lang="en-US" dirty="0" smtClean="0"/>
-              <a:t>	</a:t>
-            </a:r>
-            <a:endParaRPr lang="en-US" dirty="0" smtClean="0"/>
-          </a:p>
-          <a:p>
-            <a:pPr lvl="1"/>
-            <a:r>
-              <a:rPr lang="en-US" dirty="0" smtClean="0"/>
-              <a:t>To </a:t>
-            </a:r>
-            <a:r>
-              <a:rPr lang="en-US" dirty="0" smtClean="0"/>
-              <a:t>get temperature data using indoor </a:t>
-            </a:r>
-            <a:r>
-              <a:rPr lang="en-US" dirty="0" smtClean="0"/>
-              <a:t>sensors</a:t>
-            </a:r>
-            <a:endParaRPr lang="en-US" dirty="0" smtClean="0"/>
-          </a:p>
-          <a:p>
-            <a:r>
-              <a:rPr lang="en-US" dirty="0" err="1" smtClean="0"/>
-              <a:t>Adafruit_NeoPixel</a:t>
-            </a:r>
-            <a:endParaRPr lang="en-US" dirty="0" smtClean="0"/>
-          </a:p>
-          <a:p>
-            <a:pPr lvl="1"/>
-            <a:r>
-              <a:rPr lang="en-US" dirty="0" smtClean="0"/>
-              <a:t>To light led patterns using led strip</a:t>
-            </a:r>
-          </a:p>
-          <a:p>
-            <a:pPr lvl="1"/>
-            <a:endParaRPr lang="en-US" dirty="0"/>
-          </a:p>
-        </p:txBody>
-      </p:sp>
+        </p:nvPicPr>
+        <p:blipFill>
+          <a:blip r:embed="rId2" cstate="print"/>
+          <a:srcRect/>
+          <a:stretch>
+            <a:fillRect/>
+          </a:stretch>
+        </p:blipFill>
+        <p:spPr bwMode="auto">
+          <a:xfrm>
+            <a:off x="837127" y="1380170"/>
+            <a:ext cx="7392473" cy="5175176"/>
+          </a:xfrm>
+          <a:prstGeom prst="rect">
+            <a:avLst/>
+          </a:prstGeom>
+          <a:noFill/>
+        </p:spPr>
+      </p:pic>
     </p:spTree>
     <p:extLst>
       <p:ext uri="{BB962C8B-B14F-4D97-AF65-F5344CB8AC3E}">
-        <p14:creationId xmlns:p14="http://schemas.microsoft.com/office/powerpoint/2010/main" val="2796827819"/>
+        <p14:creationId xmlns:p14="http://schemas.microsoft.com/office/powerpoint/2010/main" val="4059595715"/>
       </p:ext>
     </p:extLst>
   </p:cSld>
@@ -11283,16 +11139,29 @@
             <p:ph type="title"/>
           </p:nvPr>
         </p:nvSpPr>
-        <p:spPr/>
+        <p:spPr>
+          <a:xfrm>
+            <a:off x="0" y="209456"/>
+            <a:ext cx="8913813" cy="914400"/>
+          </a:xfrm>
+        </p:spPr>
         <p:txBody>
           <a:bodyPr/>
           <a:lstStyle/>
           <a:p>
             <a:r>
               <a:rPr lang="en-US" dirty="0" smtClean="0"/>
-              <a:t>Challenges</a:t>
-            </a:r>
-            <a:endParaRPr lang="en-US" dirty="0"/>
+              <a:t>Temp/</a:t>
+            </a:r>
+            <a:r>
+              <a:rPr lang="en-US" dirty="0" err="1" smtClean="0"/>
+              <a:t>WindSpeed</a:t>
+            </a:r>
+            <a:r>
+              <a:rPr lang="en-US" dirty="0" smtClean="0"/>
+              <a:t> Vs Time</a:t>
+            </a:r>
+            <a:endParaRPr lang="en-IN" dirty="0"/>
           </a:p>
         </p:txBody>
       </p:sp>
@@ -11311,14 +11180,40 @@
           <a:bodyPr/>
           <a:lstStyle/>
           <a:p>
-            <a:endParaRPr lang="en-US" dirty="0"/>
+            <a:endParaRPr lang="en-IN"/>
           </a:p>
         </p:txBody>
       </p:sp>
+      <p:pic>
+        <p:nvPicPr>
+          <p:cNvPr id="3074" name="Picture 2" descr="C:\Users\betcy\Desktop\twt.jpg"/>
+          <p:cNvPicPr>
+            <a:picLocks noChangeAspect="1" noChangeArrowheads="1"/>
+          </p:cNvPicPr>
+          <p:nvPr/>
+        </p:nvPicPr>
+        <p:blipFill>
+          <a:blip r:embed="rId2" cstate="print"/>
+          <a:srcRect/>
+          <a:stretch>
+            <a:fillRect/>
+          </a:stretch>
+        </p:blipFill>
+        <p:spPr bwMode="auto">
+          <a:xfrm>
+            <a:off x="505566" y="1371734"/>
+            <a:ext cx="8213434" cy="5267325"/>
+          </a:xfrm>
+          <a:prstGeom prst="rect">
+            <a:avLst/>
+          </a:prstGeom>
+          <a:noFill/>
+        </p:spPr>
+      </p:pic>
     </p:spTree>
     <p:extLst>
       <p:ext uri="{BB962C8B-B14F-4D97-AF65-F5344CB8AC3E}">
-        <p14:creationId xmlns:p14="http://schemas.microsoft.com/office/powerpoint/2010/main" val="3032770816"/>
+        <p14:creationId xmlns:p14="http://schemas.microsoft.com/office/powerpoint/2010/main" val="397124458"/>
       </p:ext>
     </p:extLst>
   </p:cSld>
@@ -11369,7 +11264,7 @@
           <a:p>
             <a:r>
               <a:rPr lang="en-US" dirty="0" smtClean="0"/>
-              <a:t>Future work</a:t>
+              <a:t>COMPONENTS USED</a:t>
             </a:r>
             <a:endParaRPr lang="en-US" dirty="0"/>
           </a:p>
@@ -11388,61 +11283,127 @@
         <p:spPr/>
         <p:txBody>
           <a:bodyPr>
-            <a:normAutofit/>
+            <a:normAutofit lnSpcReduction="10000"/>
           </a:bodyPr>
           <a:lstStyle/>
           <a:p>
             <a:r>
               <a:rPr lang="en-US" dirty="0" smtClean="0"/>
-              <a:t>Creating an App that has following features</a:t>
-            </a:r>
-          </a:p>
-          <a:p>
-            <a:pPr lvl="1"/>
+              <a:t>ARDUINO </a:t>
+            </a:r>
             <a:r>
               <a:rPr lang="en-US" dirty="0" smtClean="0"/>
-              <a:t>Picture corresponding to weather data</a:t>
-            </a:r>
-          </a:p>
-          <a:p>
-            <a:pPr lvl="1"/>
+              <a:t>board</a:t>
+            </a:r>
+          </a:p>
+          <a:p>
+            <a:r>
+              <a:rPr lang="en-US" dirty="0" err="1"/>
+              <a:t>NeoPixel</a:t>
+            </a:r>
+            <a:r>
+              <a:rPr lang="en-US" dirty="0"/>
+              <a:t> digital RGB LED Strip</a:t>
+            </a:r>
+          </a:p>
+          <a:p>
+            <a:pPr marL="0" indent="0">
+              <a:buNone/>
+            </a:pPr>
+            <a:r>
+              <a:rPr lang="en-US" dirty="0"/>
+              <a:t>       </a:t>
+            </a:r>
+            <a:r>
+              <a:rPr lang="en-US" dirty="0">
+                <a:hlinkClick r:id="rId2"/>
+              </a:rPr>
+              <a:t>http://www.adafruit.com/products/1138</a:t>
+            </a:r>
+            <a:r>
+              <a:rPr lang="en-US" dirty="0"/>
+              <a:t> </a:t>
+            </a:r>
+            <a:endParaRPr lang="en-US" dirty="0" smtClean="0"/>
+          </a:p>
+          <a:p>
+            <a:r>
+              <a:rPr lang="en-US" dirty="0"/>
+              <a:t>Temperature Sensors(DS18B20)</a:t>
+            </a:r>
+          </a:p>
+          <a:p>
+            <a:pPr marL="0" indent="0">
+              <a:buNone/>
+            </a:pPr>
+            <a:r>
+              <a:rPr lang="en-US" dirty="0"/>
+              <a:t>       http://</a:t>
+            </a:r>
+            <a:r>
+              <a:rPr lang="en-US" dirty="0" err="1"/>
+              <a:t>www.adafruit.com</a:t>
+            </a:r>
+            <a:r>
+              <a:rPr lang="en-US" dirty="0"/>
+              <a:t>/products/</a:t>
+            </a:r>
             <a:r>
               <a:rPr lang="en-US" dirty="0" smtClean="0"/>
-              <a:t>Show temperature, wind , humidity, rain, precipitation</a:t>
-            </a:r>
-          </a:p>
-          <a:p>
-            <a:pPr lvl="1"/>
+              <a:t>374</a:t>
+            </a:r>
+            <a:endParaRPr lang="en-US" dirty="0" smtClean="0"/>
+          </a:p>
+          <a:p>
             <a:r>
               <a:rPr lang="en-US" dirty="0" smtClean="0"/>
-              <a:t>Max, Min temp in a day/week</a:t>
+              <a:t>Resistors</a:t>
             </a:r>
           </a:p>
           <a:p>
             <a:r>
               <a:rPr lang="en-US" dirty="0" smtClean="0"/>
-              <a:t>Comparing indoor and outdoor sensors data and coming up with LED patterns to show the differences.</a:t>
-            </a:r>
-          </a:p>
-          <a:p>
-            <a:r>
-              <a:rPr lang="en-US" dirty="0" smtClean="0"/>
-              <a:t>Using </a:t>
-            </a:r>
-            <a:r>
-              <a:rPr lang="en-US" dirty="0" err="1" smtClean="0"/>
-              <a:t>Wifi</a:t>
-            </a:r>
-            <a:r>
-              <a:rPr lang="en-US" dirty="0" smtClean="0"/>
-              <a:t> on Galileo</a:t>
-            </a:r>
-          </a:p>
-          <a:p>
-            <a:r>
-              <a:rPr lang="en-US" dirty="0" smtClean="0"/>
-              <a:t>Get the modules to work for Galileo</a:t>
-            </a:r>
+              <a:t>Jumper wires</a:t>
+            </a:r>
+          </a:p>
+          <a:p>
+            <a:pPr marL="0" indent="0">
+              <a:buNone/>
+            </a:pPr>
+            <a:endParaRPr lang="en-US" dirty="0" smtClean="0"/>
+          </a:p>
+          <a:p>
+            <a:pPr marL="0" indent="0">
+              <a:buNone/>
+            </a:pPr>
+            <a:endParaRPr lang="en-US" dirty="0" smtClean="0"/>
+          </a:p>
+          <a:p>
+            <a:pPr marL="0" indent="0">
+              <a:buNone/>
+            </a:pPr>
+            <a:endParaRPr lang="en-US" dirty="0"/>
+          </a:p>
+          <a:p>
+            <a:pPr marL="0" indent="0">
+              <a:buNone/>
+            </a:pPr>
+            <a:endParaRPr lang="en-US" dirty="0"/>
+          </a:p>
+          <a:p>
+            <a:pPr marL="0" indent="0">
+              <a:buNone/>
+            </a:pPr>
+            <a:endParaRPr lang="en-US" dirty="0" smtClean="0"/>
+          </a:p>
+          <a:p>
+            <a:pPr marL="0" indent="0">
+              <a:buNone/>
+            </a:pPr>
+            <a:endParaRPr lang="en-US" dirty="0" smtClean="0"/>
+          </a:p>
+          <a:p>
+            <a:endParaRPr lang="en-US" dirty="0" smtClean="0"/>
           </a:p>
           <a:p>
             <a:endParaRPr lang="en-US" dirty="0"/>
@@ -11452,7 +11413,7 @@
     </p:spTree>
     <p:extLst>
       <p:ext uri="{BB962C8B-B14F-4D97-AF65-F5344CB8AC3E}">
-        <p14:creationId xmlns:p14="http://schemas.microsoft.com/office/powerpoint/2010/main" val="2640821237"/>
+        <p14:creationId xmlns:p14="http://schemas.microsoft.com/office/powerpoint/2010/main" val="1986240947"/>
       </p:ext>
     </p:extLst>
   </p:cSld>
@@ -11602,6 +11563,380 @@
           <a:p>
             <a:r>
               <a:rPr lang="en-US" dirty="0" smtClean="0"/>
+              <a:t>LIBRARY USED</a:t>
+            </a:r>
+            <a:endParaRPr lang="en-US" dirty="0"/>
+          </a:p>
+        </p:txBody>
+      </p:sp>
+      <p:sp>
+        <p:nvSpPr>
+          <p:cNvPr id="3" name="Content Placeholder 2"/>
+          <p:cNvSpPr>
+            <a:spLocks noGrp="1"/>
+          </p:cNvSpPr>
+          <p:nvPr>
+            <p:ph idx="1"/>
+          </p:nvPr>
+        </p:nvSpPr>
+        <p:spPr/>
+        <p:txBody>
+          <a:bodyPr>
+            <a:normAutofit lnSpcReduction="10000"/>
+          </a:bodyPr>
+          <a:lstStyle/>
+          <a:p>
+            <a:r>
+              <a:rPr lang="en-US" dirty="0" smtClean="0"/>
+              <a:t>Weather API (</a:t>
+            </a:r>
+            <a:r>
+              <a:rPr lang="en-US" dirty="0" err="1" smtClean="0"/>
+              <a:t>pywapi</a:t>
+            </a:r>
+            <a:r>
+              <a:rPr lang="en-US" dirty="0" smtClean="0"/>
+              <a:t>)</a:t>
+            </a:r>
+          </a:p>
+          <a:p>
+            <a:pPr lvl="1"/>
+            <a:r>
+              <a:rPr lang="en-US" dirty="0" smtClean="0"/>
+              <a:t>To get weather data from online</a:t>
+            </a:r>
+          </a:p>
+          <a:p>
+            <a:r>
+              <a:rPr lang="en-US" dirty="0" smtClean="0"/>
+              <a:t>Serial</a:t>
+            </a:r>
+          </a:p>
+          <a:p>
+            <a:pPr lvl="1"/>
+            <a:r>
+              <a:rPr lang="en-US" dirty="0" smtClean="0"/>
+              <a:t>Python module to Communicate between computer and Arduino via serial </a:t>
+            </a:r>
+            <a:r>
+              <a:rPr lang="en-US" dirty="0" smtClean="0"/>
+              <a:t>port</a:t>
+            </a:r>
+          </a:p>
+          <a:p>
+            <a:r>
+              <a:rPr lang="en-US" dirty="0" err="1" smtClean="0"/>
+              <a:t>Onewire</a:t>
+            </a:r>
+            <a:r>
+              <a:rPr lang="en-US" dirty="0" smtClean="0"/>
+              <a:t>	</a:t>
+            </a:r>
+            <a:endParaRPr lang="en-US" dirty="0" smtClean="0"/>
+          </a:p>
+          <a:p>
+            <a:pPr lvl="1"/>
+            <a:r>
+              <a:rPr lang="en-US" dirty="0" smtClean="0"/>
+              <a:t>To </a:t>
+            </a:r>
+            <a:r>
+              <a:rPr lang="en-US" dirty="0" smtClean="0"/>
+              <a:t>get temperature data using indoor </a:t>
+            </a:r>
+            <a:r>
+              <a:rPr lang="en-US" dirty="0" smtClean="0"/>
+              <a:t>sensors</a:t>
+            </a:r>
+            <a:endParaRPr lang="en-US" dirty="0" smtClean="0"/>
+          </a:p>
+          <a:p>
+            <a:r>
+              <a:rPr lang="en-US" dirty="0" err="1" smtClean="0"/>
+              <a:t>Adafruit_NeoPixel</a:t>
+            </a:r>
+            <a:endParaRPr lang="en-US" dirty="0" smtClean="0"/>
+          </a:p>
+          <a:p>
+            <a:pPr lvl="1"/>
+            <a:r>
+              <a:rPr lang="en-US" dirty="0" smtClean="0"/>
+              <a:t>To light led patterns using led strip</a:t>
+            </a:r>
+          </a:p>
+          <a:p>
+            <a:pPr lvl="1"/>
+            <a:endParaRPr lang="en-US" dirty="0"/>
+          </a:p>
+        </p:txBody>
+      </p:sp>
+    </p:spTree>
+    <p:extLst>
+      <p:ext uri="{BB962C8B-B14F-4D97-AF65-F5344CB8AC3E}">
+        <p14:creationId xmlns:p14="http://schemas.microsoft.com/office/powerpoint/2010/main" val="2796827819"/>
+      </p:ext>
+    </p:extLst>
+  </p:cSld>
+  <p:clrMapOvr>
+    <a:masterClrMapping/>
+  </p:clrMapOvr>
+  <p:timing>
+    <p:tnLst>
+      <p:par>
+        <p:cTn xmlns:p14="http://schemas.microsoft.com/office/powerpoint/2010/main" id="1" dur="indefinite" restart="never" nodeType="tmRoot"/>
+      </p:par>
+    </p:tnLst>
+  </p:timing>
+</p:sld>
+</file>
+
+<file path=ppt/slides/slide21.xml><?xml version="1.0" encoding="utf-8"?>
+<p:sld xmlns:a="http://schemas.openxmlformats.org/drawingml/2006/main" xmlns:r="http://schemas.openxmlformats.org/officeDocument/2006/relationships" xmlns:p="http://schemas.openxmlformats.org/presentationml/2006/main">
+  <p:cSld>
+    <p:spTree>
+      <p:nvGrpSpPr>
+        <p:cNvPr id="1" name=""/>
+        <p:cNvGrpSpPr/>
+        <p:nvPr/>
+      </p:nvGrpSpPr>
+      <p:grpSpPr>
+        <a:xfrm>
+          <a:off x="0" y="0"/>
+          <a:ext cx="0" cy="0"/>
+          <a:chOff x="0" y="0"/>
+          <a:chExt cx="0" cy="0"/>
+        </a:xfrm>
+      </p:grpSpPr>
+      <p:sp>
+        <p:nvSpPr>
+          <p:cNvPr id="2" name="Title 1"/>
+          <p:cNvSpPr>
+            <a:spLocks noGrp="1"/>
+          </p:cNvSpPr>
+          <p:nvPr>
+            <p:ph type="title"/>
+          </p:nvPr>
+        </p:nvSpPr>
+        <p:spPr/>
+        <p:txBody>
+          <a:bodyPr/>
+          <a:lstStyle/>
+          <a:p>
+            <a:r>
+              <a:rPr lang="en-US" dirty="0" smtClean="0"/>
+              <a:t>Challenges</a:t>
+            </a:r>
+            <a:endParaRPr lang="en-US" dirty="0"/>
+          </a:p>
+        </p:txBody>
+      </p:sp>
+      <p:sp>
+        <p:nvSpPr>
+          <p:cNvPr id="3" name="Content Placeholder 2"/>
+          <p:cNvSpPr>
+            <a:spLocks noGrp="1"/>
+          </p:cNvSpPr>
+          <p:nvPr>
+            <p:ph idx="1"/>
+          </p:nvPr>
+        </p:nvSpPr>
+        <p:spPr/>
+        <p:txBody>
+          <a:bodyPr/>
+          <a:lstStyle/>
+          <a:p>
+            <a:endParaRPr lang="en-US" dirty="0"/>
+          </a:p>
+        </p:txBody>
+      </p:sp>
+    </p:spTree>
+    <p:extLst>
+      <p:ext uri="{BB962C8B-B14F-4D97-AF65-F5344CB8AC3E}">
+        <p14:creationId xmlns:p14="http://schemas.microsoft.com/office/powerpoint/2010/main" val="3032770816"/>
+      </p:ext>
+    </p:extLst>
+  </p:cSld>
+  <p:clrMapOvr>
+    <a:masterClrMapping/>
+  </p:clrMapOvr>
+  <p:timing>
+    <p:tnLst>
+      <p:par>
+        <p:cTn xmlns:p14="http://schemas.microsoft.com/office/powerpoint/2010/main" id="1" dur="indefinite" restart="never" nodeType="tmRoot"/>
+      </p:par>
+    </p:tnLst>
+  </p:timing>
+</p:sld>
+</file>
+
+<file path=ppt/slides/slide22.xml><?xml version="1.0" encoding="utf-8"?>
+<p:sld xmlns:a="http://schemas.openxmlformats.org/drawingml/2006/main" xmlns:r="http://schemas.openxmlformats.org/officeDocument/2006/relationships" xmlns:p="http://schemas.openxmlformats.org/presentationml/2006/main">
+  <p:cSld>
+    <p:spTree>
+      <p:nvGrpSpPr>
+        <p:cNvPr id="1" name=""/>
+        <p:cNvGrpSpPr/>
+        <p:nvPr/>
+      </p:nvGrpSpPr>
+      <p:grpSpPr>
+        <a:xfrm>
+          <a:off x="0" y="0"/>
+          <a:ext cx="0" cy="0"/>
+          <a:chOff x="0" y="0"/>
+          <a:chExt cx="0" cy="0"/>
+        </a:xfrm>
+      </p:grpSpPr>
+      <p:sp>
+        <p:nvSpPr>
+          <p:cNvPr id="2" name="Title 1"/>
+          <p:cNvSpPr>
+            <a:spLocks noGrp="1"/>
+          </p:cNvSpPr>
+          <p:nvPr>
+            <p:ph type="title"/>
+          </p:nvPr>
+        </p:nvSpPr>
+        <p:spPr/>
+        <p:txBody>
+          <a:bodyPr/>
+          <a:lstStyle/>
+          <a:p>
+            <a:r>
+              <a:rPr lang="en-US" dirty="0" smtClean="0"/>
+              <a:t>Future work</a:t>
+            </a:r>
+            <a:endParaRPr lang="en-US" dirty="0"/>
+          </a:p>
+        </p:txBody>
+      </p:sp>
+      <p:sp>
+        <p:nvSpPr>
+          <p:cNvPr id="3" name="Content Placeholder 2"/>
+          <p:cNvSpPr>
+            <a:spLocks noGrp="1"/>
+          </p:cNvSpPr>
+          <p:nvPr>
+            <p:ph idx="1"/>
+          </p:nvPr>
+        </p:nvSpPr>
+        <p:spPr/>
+        <p:txBody>
+          <a:bodyPr>
+            <a:normAutofit/>
+          </a:bodyPr>
+          <a:lstStyle/>
+          <a:p>
+            <a:r>
+              <a:rPr lang="en-US" dirty="0" smtClean="0"/>
+              <a:t>Creating an App that has following features</a:t>
+            </a:r>
+          </a:p>
+          <a:p>
+            <a:pPr lvl="1"/>
+            <a:r>
+              <a:rPr lang="en-US" dirty="0" smtClean="0"/>
+              <a:t>Picture corresponding to weather data</a:t>
+            </a:r>
+          </a:p>
+          <a:p>
+            <a:pPr lvl="1"/>
+            <a:r>
+              <a:rPr lang="en-US" dirty="0" smtClean="0"/>
+              <a:t>Show temperature, wind , humidity, rain, precipitation</a:t>
+            </a:r>
+          </a:p>
+          <a:p>
+            <a:pPr lvl="1"/>
+            <a:r>
+              <a:rPr lang="en-US" dirty="0" smtClean="0"/>
+              <a:t>Max, Min temp in a day/week</a:t>
+            </a:r>
+          </a:p>
+          <a:p>
+            <a:r>
+              <a:rPr lang="en-US" dirty="0" smtClean="0"/>
+              <a:t>Comparing indoor and outdoor sensors data and coming up with LED patterns to show the differences.</a:t>
+            </a:r>
+          </a:p>
+          <a:p>
+            <a:r>
+              <a:rPr lang="en-US" dirty="0" smtClean="0"/>
+              <a:t>Using </a:t>
+            </a:r>
+            <a:r>
+              <a:rPr lang="en-US" dirty="0" err="1" smtClean="0"/>
+              <a:t>Wifi</a:t>
+            </a:r>
+            <a:r>
+              <a:rPr lang="en-US" dirty="0" smtClean="0"/>
+              <a:t> on Galileo</a:t>
+            </a:r>
+          </a:p>
+          <a:p>
+            <a:r>
+              <a:rPr lang="en-US" dirty="0" smtClean="0"/>
+              <a:t>Get the modules to work for Galileo</a:t>
+            </a:r>
+          </a:p>
+          <a:p>
+            <a:endParaRPr lang="en-US" dirty="0"/>
+          </a:p>
+        </p:txBody>
+      </p:sp>
+    </p:spTree>
+    <p:extLst>
+      <p:ext uri="{BB962C8B-B14F-4D97-AF65-F5344CB8AC3E}">
+        <p14:creationId xmlns:p14="http://schemas.microsoft.com/office/powerpoint/2010/main" val="2640821237"/>
+      </p:ext>
+    </p:extLst>
+  </p:cSld>
+  <p:clrMapOvr>
+    <a:masterClrMapping/>
+  </p:clrMapOvr>
+  <p:timing>
+    <p:tnLst>
+      <p:par>
+        <p:cTn xmlns:p14="http://schemas.microsoft.com/office/powerpoint/2010/main" id="1" dur="indefinite" restart="never" nodeType="tmRoot"/>
+      </p:par>
+    </p:tnLst>
+  </p:timing>
+</p:sld>
+</file>
+
+<file path=ppt/slides/slide23.xml><?xml version="1.0" encoding="utf-8"?>
+<p:sld xmlns:a="http://schemas.openxmlformats.org/drawingml/2006/main" xmlns:r="http://schemas.openxmlformats.org/officeDocument/2006/relationships" xmlns:p="http://schemas.openxmlformats.org/presentationml/2006/main">
+  <p:cSld>
+    <p:spTree>
+      <p:nvGrpSpPr>
+        <p:cNvPr id="1" name=""/>
+        <p:cNvGrpSpPr/>
+        <p:nvPr/>
+      </p:nvGrpSpPr>
+      <p:grpSpPr>
+        <a:xfrm>
+          <a:off x="0" y="0"/>
+          <a:ext cx="0" cy="0"/>
+          <a:chOff x="0" y="0"/>
+          <a:chExt cx="0" cy="0"/>
+        </a:xfrm>
+      </p:grpSpPr>
+      <p:sp>
+        <p:nvSpPr>
+          <p:cNvPr id="2" name="Title 1"/>
+          <p:cNvSpPr>
+            <a:spLocks noGrp="1"/>
+          </p:cNvSpPr>
+          <p:nvPr>
+            <p:ph type="title"/>
+          </p:nvPr>
+        </p:nvSpPr>
+        <p:spPr/>
+        <p:txBody>
+          <a:bodyPr/>
+          <a:lstStyle/>
+          <a:p>
+            <a:r>
+              <a:rPr lang="en-US" dirty="0" smtClean="0"/>
               <a:t>References</a:t>
             </a:r>
             <a:endParaRPr lang="en-US" dirty="0"/>
@@ -11726,7 +12061,7 @@
 </p:sld>
 </file>
 
-<file path=ppt/slides/slide21.xml><?xml version="1.0" encoding="utf-8"?>
+<file path=ppt/slides/slide24.xml><?xml version="1.0" encoding="utf-8"?>
 <p:sld xmlns:a="http://schemas.openxmlformats.org/drawingml/2006/main" xmlns:r="http://schemas.openxmlformats.org/officeDocument/2006/relationships" xmlns:p="http://schemas.openxmlformats.org/presentationml/2006/main">
   <p:cSld>
     <p:spTree>
@@ -13240,38 +13575,32 @@
       </p:sp>
       <p:pic>
         <p:nvPicPr>
-          <p:cNvPr id="4" name="Content Placeholder 3" descr="displaying_LEDs.png"/>
+          <p:cNvPr id="6" name="Picture 5"/>
           <p:cNvPicPr>
-            <a:picLocks noGrp="1" noChangeAspect="1"/>
+            <a:picLocks noChangeAspect="1"/>
           </p:cNvPicPr>
-          <p:nvPr>
-            <p:ph idx="1"/>
-          </p:nvPr>
+          <p:nvPr/>
         </p:nvPicPr>
         <p:blipFill>
-          <a:blip r:embed="rId2">
-            <a:extLst>
-              <a:ext uri="{28A0092B-C50C-407E-A947-70E740481C1C}">
-                <a14:useLocalDpi xmlns:a14="http://schemas.microsoft.com/office/drawing/2010/main" val="0"/>
-              </a:ext>
-            </a:extLst>
-          </a:blip>
-          <a:srcRect t="8868" b="8868"/>
+          <a:blip r:embed="rId2"/>
           <a:stretch>
             <a:fillRect/>
           </a:stretch>
         </p:blipFill>
         <p:spPr>
           <a:xfrm>
-            <a:off x="551096" y="2456239"/>
-            <a:ext cx="8002872" cy="3810091"/>
+            <a:off x="1133078" y="2375486"/>
+            <a:ext cx="7089518" cy="3746792"/>
           </a:xfrm>
+          <a:prstGeom prst="rect">
+            <a:avLst/>
+          </a:prstGeom>
         </p:spPr>
       </p:pic>
     </p:spTree>
     <p:extLst>
       <p:ext uri="{BB962C8B-B14F-4D97-AF65-F5344CB8AC3E}">
-        <p14:creationId xmlns:p14="http://schemas.microsoft.com/office/powerpoint/2010/main" val="3053069239"/>
+        <p14:creationId xmlns:p14="http://schemas.microsoft.com/office/powerpoint/2010/main" val="3764946307"/>
       </p:ext>
     </p:extLst>
   </p:cSld>
@@ -13332,28 +13661,46 @@
       </p:sp>
       <p:pic>
         <p:nvPicPr>
-          <p:cNvPr id="5" name="Picture 4" descr="photo 2.JPG"/>
+          <p:cNvPr id="11" name="Picture 10"/>
           <p:cNvPicPr>
             <a:picLocks noChangeAspect="1"/>
           </p:cNvPicPr>
           <p:nvPr/>
         </p:nvPicPr>
         <p:blipFill>
-          <a:blip r:embed="rId2">
-            <a:extLst>
-              <a:ext uri="{28A0092B-C50C-407E-A947-70E740481C1C}">
-                <a14:useLocalDpi xmlns:a14="http://schemas.microsoft.com/office/drawing/2010/main" val="0"/>
-              </a:ext>
-            </a:extLst>
-          </a:blip>
+          <a:blip r:embed="rId2"/>
           <a:stretch>
             <a:fillRect/>
           </a:stretch>
         </p:blipFill>
         <p:spPr>
-          <a:xfrm rot="10800000">
-            <a:off x="447521" y="2884713"/>
-            <a:ext cx="4487333" cy="3090333"/>
+          <a:xfrm>
+            <a:off x="1459543" y="2536340"/>
+            <a:ext cx="4069819" cy="3029754"/>
+          </a:xfrm>
+          <a:prstGeom prst="rect">
+            <a:avLst/>
+          </a:prstGeom>
+        </p:spPr>
+      </p:pic>
+      <p:pic>
+        <p:nvPicPr>
+          <p:cNvPr id="12" name="Picture 11"/>
+          <p:cNvPicPr>
+            <a:picLocks noChangeAspect="1"/>
+          </p:cNvPicPr>
+          <p:nvPr/>
+        </p:nvPicPr>
+        <p:blipFill>
+          <a:blip r:embed="rId3"/>
+          <a:stretch>
+            <a:fillRect/>
+          </a:stretch>
+        </p:blipFill>
+        <p:spPr>
+          <a:xfrm>
+            <a:off x="5917859" y="2328544"/>
+            <a:ext cx="1014473" cy="3989611"/>
           </a:xfrm>
           <a:prstGeom prst="rect">
             <a:avLst/>

</xml_diff>

<commit_message>
Updated slides with classification part
</commit_message>
<xml_diff>
--- a/QL_Presentation1.pptx
+++ b/QL_Presentation1.pptx
@@ -5,7 +5,7 @@
     <p:sldMasterId id="2147483660" r:id="rId1"/>
   </p:sldMasterIdLst>
   <p:notesMasterIdLst>
-    <p:notesMasterId r:id="rId26"/>
+    <p:notesMasterId r:id="rId27"/>
   </p:notesMasterIdLst>
   <p:sldIdLst>
     <p:sldId id="256" r:id="rId2"/>
@@ -22,16 +22,17 @@
     <p:sldId id="267" r:id="rId13"/>
     <p:sldId id="265" r:id="rId14"/>
     <p:sldId id="285" r:id="rId15"/>
-    <p:sldId id="279" r:id="rId16"/>
-    <p:sldId id="282" r:id="rId17"/>
-    <p:sldId id="283" r:id="rId18"/>
-    <p:sldId id="284" r:id="rId19"/>
-    <p:sldId id="258" r:id="rId20"/>
-    <p:sldId id="259" r:id="rId21"/>
-    <p:sldId id="276" r:id="rId22"/>
-    <p:sldId id="269" r:id="rId23"/>
-    <p:sldId id="270" r:id="rId24"/>
-    <p:sldId id="275" r:id="rId25"/>
+    <p:sldId id="286" r:id="rId16"/>
+    <p:sldId id="287" r:id="rId17"/>
+    <p:sldId id="282" r:id="rId18"/>
+    <p:sldId id="283" r:id="rId19"/>
+    <p:sldId id="284" r:id="rId20"/>
+    <p:sldId id="258" r:id="rId21"/>
+    <p:sldId id="259" r:id="rId22"/>
+    <p:sldId id="276" r:id="rId23"/>
+    <p:sldId id="269" r:id="rId24"/>
+    <p:sldId id="270" r:id="rId25"/>
+    <p:sldId id="275" r:id="rId26"/>
   </p:sldIdLst>
   <p:sldSz cx="9144000" cy="6858000" type="screen4x3"/>
   <p:notesSz cx="6858000" cy="9144000"/>
@@ -10872,7 +10873,9 @@
         </p:nvSpPr>
         <p:spPr/>
         <p:txBody>
-          <a:bodyPr/>
+          <a:bodyPr>
+            <a:normAutofit/>
+          </a:bodyPr>
           <a:lstStyle/>
           <a:p>
             <a:r>
@@ -10883,29 +10886,582 @@
           </a:p>
         </p:txBody>
       </p:sp>
-      <p:sp>
-        <p:nvSpPr>
-          <p:cNvPr id="3" name="Content Placeholder 2"/>
-          <p:cNvSpPr>
-            <a:spLocks noGrp="1"/>
-          </p:cNvSpPr>
+      <p:graphicFrame>
+        <p:nvGraphicFramePr>
+          <p:cNvPr id="4" name="Content Placeholder 3"/>
+          <p:cNvGraphicFramePr>
+            <a:graphicFrameLocks noGrp="1"/>
+          </p:cNvGraphicFramePr>
           <p:nvPr>
             <p:ph idx="1"/>
+            <p:extLst>
+              <p:ext uri="{D42A27DB-BD31-4B8C-83A1-F6EECF244321}">
+                <p14:modId xmlns:p14="http://schemas.microsoft.com/office/powerpoint/2010/main" val="127333707"/>
+              </p:ext>
+            </p:extLst>
           </p:nvPr>
-        </p:nvSpPr>
-        <p:spPr/>
-        <p:txBody>
-          <a:bodyPr/>
-          <a:lstStyle/>
-          <a:p>
-            <a:endParaRPr lang="en-US"/>
-          </a:p>
-        </p:txBody>
-      </p:sp>
+        </p:nvGraphicFramePr>
+        <p:xfrm>
+          <a:off x="823511" y="2480121"/>
+          <a:ext cx="7415468" cy="3977640"/>
+        </p:xfrm>
+        <a:graphic>
+          <a:graphicData uri="http://schemas.openxmlformats.org/drawingml/2006/table">
+            <a:tbl>
+              <a:tblPr firstRow="1" bandRow="1">
+                <a:tableStyleId>{5940675A-B579-460E-94D1-54222C63F5DA}</a:tableStyleId>
+              </a:tblPr>
+              <a:tblGrid>
+                <a:gridCol w="2255839"/>
+                <a:gridCol w="2213450"/>
+                <a:gridCol w="2946179"/>
+              </a:tblGrid>
+              <a:tr h="370840">
+                <a:tc>
+                  <a:txBody>
+                    <a:bodyPr/>
+                    <a:lstStyle/>
+                    <a:p>
+                      <a:pPr marL="0" marR="0" indent="0" algn="l" defTabSz="914400" rtl="0" eaLnBrk="1" fontAlgn="auto" latinLnBrk="0" hangingPunct="1">
+                        <a:lnSpc>
+                          <a:spcPct val="100000"/>
+                        </a:lnSpc>
+                        <a:spcBef>
+                          <a:spcPts val="0"/>
+                        </a:spcBef>
+                        <a:spcAft>
+                          <a:spcPts val="0"/>
+                        </a:spcAft>
+                        <a:buClrTx/>
+                        <a:buSzTx/>
+                        <a:buFontTx/>
+                        <a:buNone/>
+                        <a:tabLst/>
+                        <a:defRPr/>
+                      </a:pPr>
+                      <a:r>
+                        <a:rPr lang="en-US" dirty="0" smtClean="0"/>
+                        <a:t>  </a:t>
+                      </a:r>
+                      <a:endParaRPr lang="en-US" dirty="0" smtClean="0"/>
+                    </a:p>
+                    <a:p>
+                      <a:pPr marL="0" marR="0" indent="0" algn="l" defTabSz="914400" rtl="0" eaLnBrk="1" fontAlgn="auto" latinLnBrk="0" hangingPunct="1">
+                        <a:lnSpc>
+                          <a:spcPct val="100000"/>
+                        </a:lnSpc>
+                        <a:spcBef>
+                          <a:spcPts val="0"/>
+                        </a:spcBef>
+                        <a:spcAft>
+                          <a:spcPts val="0"/>
+                        </a:spcAft>
+                        <a:buClrTx/>
+                        <a:buSzTx/>
+                        <a:buFontTx/>
+                        <a:buNone/>
+                        <a:tabLst/>
+                        <a:defRPr/>
+                      </a:pPr>
+                      <a:r>
+                        <a:rPr lang="en-US" dirty="0" smtClean="0"/>
+                        <a:t> WEATHER</a:t>
+                      </a:r>
+                      <a:r>
+                        <a:rPr lang="en-US" baseline="0" dirty="0" smtClean="0"/>
+                        <a:t> DATA</a:t>
+                      </a:r>
+                      <a:endParaRPr lang="en-US" dirty="0" smtClean="0"/>
+                    </a:p>
+                  </a:txBody>
+                  <a:tcPr/>
+                </a:tc>
+                <a:tc>
+                  <a:txBody>
+                    <a:bodyPr/>
+                    <a:lstStyle/>
+                    <a:p>
+                      <a:r>
+                        <a:rPr lang="en-US" dirty="0" smtClean="0"/>
+                        <a:t>       </a:t>
+                      </a:r>
+                      <a:r>
+                        <a:rPr lang="en-US" dirty="0" smtClean="0"/>
+                        <a:t>CLASSIFICATION</a:t>
+                      </a:r>
+                      <a:endParaRPr lang="en-US" dirty="0"/>
+                    </a:p>
+                  </a:txBody>
+                  <a:tcPr/>
+                </a:tc>
+                <a:tc>
+                  <a:txBody>
+                    <a:bodyPr/>
+                    <a:lstStyle/>
+                    <a:p>
+                      <a:r>
+                        <a:rPr lang="en-US" dirty="0" smtClean="0"/>
+                        <a:t>    </a:t>
+                      </a:r>
+                      <a:endParaRPr lang="en-US" dirty="0" smtClean="0"/>
+                    </a:p>
+                    <a:p>
+                      <a:r>
+                        <a:rPr lang="en-US" dirty="0" smtClean="0"/>
+                        <a:t>            RANGE</a:t>
+                      </a:r>
+                      <a:endParaRPr lang="en-US" dirty="0"/>
+                    </a:p>
+                  </a:txBody>
+                  <a:tcPr/>
+                </a:tc>
+              </a:tr>
+              <a:tr h="370840">
+                <a:tc rowSpan="3">
+                  <a:txBody>
+                    <a:bodyPr/>
+                    <a:lstStyle/>
+                    <a:p>
+                      <a:endParaRPr lang="en-US" dirty="0" smtClean="0"/>
+                    </a:p>
+                    <a:p>
+                      <a:r>
+                        <a:rPr lang="en-US" dirty="0" smtClean="0"/>
+                        <a:t>TEMPERATURE</a:t>
+                      </a:r>
+                      <a:endParaRPr lang="en-US" dirty="0"/>
+                    </a:p>
+                  </a:txBody>
+                  <a:tcPr>
+                    <a:solidFill>
+                      <a:schemeClr val="accent6">
+                        <a:lumMod val="20000"/>
+                        <a:lumOff val="80000"/>
+                      </a:schemeClr>
+                    </a:solidFill>
+                  </a:tcPr>
+                </a:tc>
+                <a:tc>
+                  <a:txBody>
+                    <a:bodyPr/>
+                    <a:lstStyle/>
+                    <a:p>
+                      <a:r>
+                        <a:rPr lang="en-US" dirty="0" smtClean="0"/>
+                        <a:t>0</a:t>
+                      </a:r>
+                      <a:endParaRPr lang="en-US" dirty="0"/>
+                    </a:p>
+                  </a:txBody>
+                  <a:tcPr/>
+                </a:tc>
+                <a:tc>
+                  <a:txBody>
+                    <a:bodyPr/>
+                    <a:lstStyle/>
+                    <a:p>
+                      <a:r>
+                        <a:rPr lang="en-US" dirty="0" smtClean="0"/>
+                        <a:t>&lt;=10</a:t>
+                      </a:r>
+                      <a:endParaRPr lang="en-US" dirty="0"/>
+                    </a:p>
+                  </a:txBody>
+                  <a:tcPr>
+                    <a:solidFill>
+                      <a:schemeClr val="accent4">
+                        <a:lumMod val="75000"/>
+                      </a:schemeClr>
+                    </a:solidFill>
+                  </a:tcPr>
+                </a:tc>
+              </a:tr>
+              <a:tr h="370840">
+                <a:tc vMerge="1">
+                  <a:txBody>
+                    <a:bodyPr/>
+                    <a:lstStyle/>
+                    <a:p>
+                      <a:endParaRPr lang="en-US" dirty="0"/>
+                    </a:p>
+                  </a:txBody>
+                  <a:tcPr/>
+                </a:tc>
+                <a:tc>
+                  <a:txBody>
+                    <a:bodyPr/>
+                    <a:lstStyle/>
+                    <a:p>
+                      <a:r>
+                        <a:rPr lang="en-US" dirty="0" smtClean="0"/>
+                        <a:t>1</a:t>
+                      </a:r>
+                      <a:endParaRPr lang="en-US" dirty="0"/>
+                    </a:p>
+                  </a:txBody>
+                  <a:tcPr/>
+                </a:tc>
+                <a:tc>
+                  <a:txBody>
+                    <a:bodyPr/>
+                    <a:lstStyle/>
+                    <a:p>
+                      <a:r>
+                        <a:rPr lang="en-US" dirty="0" smtClean="0"/>
+                        <a:t>&gt; 10 and &lt;= 20</a:t>
+                      </a:r>
+                      <a:endParaRPr lang="en-US" dirty="0"/>
+                    </a:p>
+                  </a:txBody>
+                  <a:tcPr>
+                    <a:solidFill>
+                      <a:srgbClr val="FF9BF2"/>
+                    </a:solidFill>
+                  </a:tcPr>
+                </a:tc>
+              </a:tr>
+              <a:tr h="370840">
+                <a:tc vMerge="1">
+                  <a:txBody>
+                    <a:bodyPr/>
+                    <a:lstStyle/>
+                    <a:p>
+                      <a:endParaRPr lang="en-US" dirty="0"/>
+                    </a:p>
+                  </a:txBody>
+                  <a:tcPr/>
+                </a:tc>
+                <a:tc>
+                  <a:txBody>
+                    <a:bodyPr/>
+                    <a:lstStyle/>
+                    <a:p>
+                      <a:r>
+                        <a:rPr lang="en-US" dirty="0" smtClean="0"/>
+                        <a:t>2</a:t>
+                      </a:r>
+                      <a:endParaRPr lang="en-US" dirty="0"/>
+                    </a:p>
+                  </a:txBody>
+                  <a:tcPr/>
+                </a:tc>
+                <a:tc>
+                  <a:txBody>
+                    <a:bodyPr/>
+                    <a:lstStyle/>
+                    <a:p>
+                      <a:r>
+                        <a:rPr lang="en-US" dirty="0" smtClean="0"/>
+                        <a:t>20 and above</a:t>
+                      </a:r>
+                      <a:endParaRPr lang="en-US" dirty="0"/>
+                    </a:p>
+                  </a:txBody>
+                  <a:tcPr>
+                    <a:solidFill>
+                      <a:srgbClr val="FF0000"/>
+                    </a:solidFill>
+                  </a:tcPr>
+                </a:tc>
+              </a:tr>
+              <a:tr h="370840">
+                <a:tc rowSpan="3">
+                  <a:txBody>
+                    <a:bodyPr/>
+                    <a:lstStyle/>
+                    <a:p>
+                      <a:endParaRPr lang="en-US" dirty="0" smtClean="0"/>
+                    </a:p>
+                    <a:p>
+                      <a:r>
+                        <a:rPr lang="en-US" dirty="0" smtClean="0"/>
+                        <a:t>WIND SPEED</a:t>
+                      </a:r>
+                      <a:endParaRPr lang="en-US" dirty="0"/>
+                    </a:p>
+                  </a:txBody>
+                  <a:tcPr>
+                    <a:solidFill>
+                      <a:srgbClr val="ECEFE2"/>
+                    </a:solidFill>
+                  </a:tcPr>
+                </a:tc>
+                <a:tc>
+                  <a:txBody>
+                    <a:bodyPr/>
+                    <a:lstStyle/>
+                    <a:p>
+                      <a:r>
+                        <a:rPr lang="en-US" dirty="0" smtClean="0"/>
+                        <a:t>0</a:t>
+                      </a:r>
+                      <a:endParaRPr lang="en-US" dirty="0"/>
+                    </a:p>
+                  </a:txBody>
+                  <a:tcPr/>
+                </a:tc>
+                <a:tc>
+                  <a:txBody>
+                    <a:bodyPr/>
+                    <a:lstStyle/>
+                    <a:p>
+                      <a:r>
+                        <a:rPr lang="en-US" dirty="0" smtClean="0"/>
+                        <a:t>&lt;= 5</a:t>
+                      </a:r>
+                      <a:endParaRPr lang="en-US" dirty="0"/>
+                    </a:p>
+                  </a:txBody>
+                  <a:tcPr>
+                    <a:solidFill>
+                      <a:schemeClr val="accent4">
+                        <a:lumMod val="75000"/>
+                      </a:schemeClr>
+                    </a:solidFill>
+                  </a:tcPr>
+                </a:tc>
+              </a:tr>
+              <a:tr h="370840">
+                <a:tc vMerge="1">
+                  <a:txBody>
+                    <a:bodyPr/>
+                    <a:lstStyle/>
+                    <a:p>
+                      <a:endParaRPr lang="en-US" dirty="0"/>
+                    </a:p>
+                  </a:txBody>
+                  <a:tcPr/>
+                </a:tc>
+                <a:tc>
+                  <a:txBody>
+                    <a:bodyPr/>
+                    <a:lstStyle/>
+                    <a:p>
+                      <a:r>
+                        <a:rPr lang="en-US" dirty="0" smtClean="0"/>
+                        <a:t>1</a:t>
+                      </a:r>
+                      <a:endParaRPr lang="en-US" dirty="0"/>
+                    </a:p>
+                  </a:txBody>
+                  <a:tcPr/>
+                </a:tc>
+                <a:tc>
+                  <a:txBody>
+                    <a:bodyPr/>
+                    <a:lstStyle/>
+                    <a:p>
+                      <a:r>
+                        <a:rPr lang="en-US" dirty="0" smtClean="0"/>
+                        <a:t>&gt;5 and &lt;= 10</a:t>
+                      </a:r>
+                      <a:endParaRPr lang="en-US" dirty="0"/>
+                    </a:p>
+                  </a:txBody>
+                  <a:tcPr>
+                    <a:solidFill>
+                      <a:srgbClr val="FF9BF2"/>
+                    </a:solidFill>
+                  </a:tcPr>
+                </a:tc>
+              </a:tr>
+              <a:tr h="370840">
+                <a:tc vMerge="1">
+                  <a:txBody>
+                    <a:bodyPr/>
+                    <a:lstStyle/>
+                    <a:p>
+                      <a:endParaRPr lang="en-US" dirty="0"/>
+                    </a:p>
+                  </a:txBody>
+                  <a:tcPr/>
+                </a:tc>
+                <a:tc>
+                  <a:txBody>
+                    <a:bodyPr/>
+                    <a:lstStyle/>
+                    <a:p>
+                      <a:r>
+                        <a:rPr lang="en-US" dirty="0" smtClean="0"/>
+                        <a:t>2</a:t>
+                      </a:r>
+                      <a:endParaRPr lang="en-US" dirty="0"/>
+                    </a:p>
+                  </a:txBody>
+                  <a:tcPr/>
+                </a:tc>
+                <a:tc>
+                  <a:txBody>
+                    <a:bodyPr/>
+                    <a:lstStyle/>
+                    <a:p>
+                      <a:r>
+                        <a:rPr lang="en-US" dirty="0" smtClean="0"/>
+                        <a:t>10 and above</a:t>
+                      </a:r>
+                      <a:endParaRPr lang="en-US" dirty="0"/>
+                    </a:p>
+                  </a:txBody>
+                  <a:tcPr>
+                    <a:solidFill>
+                      <a:srgbClr val="FF0000"/>
+                    </a:solidFill>
+                  </a:tcPr>
+                </a:tc>
+              </a:tr>
+              <a:tr h="370840">
+                <a:tc rowSpan="3">
+                  <a:txBody>
+                    <a:bodyPr/>
+                    <a:lstStyle/>
+                    <a:p>
+                      <a:endParaRPr lang="en-US" dirty="0" smtClean="0"/>
+                    </a:p>
+                    <a:p>
+                      <a:r>
+                        <a:rPr lang="en-US" dirty="0" smtClean="0"/>
+                        <a:t>HUMIDITY</a:t>
+                      </a:r>
+                      <a:endParaRPr lang="en-US" dirty="0"/>
+                    </a:p>
+                  </a:txBody>
+                  <a:tcPr>
+                    <a:solidFill>
+                      <a:srgbClr val="ECEFE2"/>
+                    </a:solidFill>
+                  </a:tcPr>
+                </a:tc>
+                <a:tc>
+                  <a:txBody>
+                    <a:bodyPr/>
+                    <a:lstStyle/>
+                    <a:p>
+                      <a:r>
+                        <a:rPr lang="en-US" dirty="0" smtClean="0"/>
+                        <a:t>0</a:t>
+                      </a:r>
+                      <a:endParaRPr lang="en-US" dirty="0"/>
+                    </a:p>
+                  </a:txBody>
+                  <a:tcPr/>
+                </a:tc>
+                <a:tc>
+                  <a:txBody>
+                    <a:bodyPr/>
+                    <a:lstStyle/>
+                    <a:p>
+                      <a:r>
+                        <a:rPr lang="en-US" dirty="0" smtClean="0"/>
+                        <a:t>&lt;= 50</a:t>
+                      </a:r>
+                      <a:endParaRPr lang="en-US" dirty="0"/>
+                    </a:p>
+                  </a:txBody>
+                  <a:tcPr>
+                    <a:solidFill>
+                      <a:schemeClr val="accent4">
+                        <a:lumMod val="75000"/>
+                      </a:schemeClr>
+                    </a:solidFill>
+                  </a:tcPr>
+                </a:tc>
+              </a:tr>
+              <a:tr h="370840">
+                <a:tc vMerge="1">
+                  <a:txBody>
+                    <a:bodyPr/>
+                    <a:lstStyle/>
+                    <a:p>
+                      <a:endParaRPr lang="en-US" dirty="0"/>
+                    </a:p>
+                  </a:txBody>
+                  <a:tcPr/>
+                </a:tc>
+                <a:tc>
+                  <a:txBody>
+                    <a:bodyPr/>
+                    <a:lstStyle/>
+                    <a:p>
+                      <a:r>
+                        <a:rPr lang="en-US" dirty="0" smtClean="0"/>
+                        <a:t>1</a:t>
+                      </a:r>
+                      <a:endParaRPr lang="en-US" dirty="0"/>
+                    </a:p>
+                  </a:txBody>
+                  <a:tcPr/>
+                </a:tc>
+                <a:tc>
+                  <a:txBody>
+                    <a:bodyPr/>
+                    <a:lstStyle/>
+                    <a:p>
+                      <a:r>
+                        <a:rPr lang="en-US" dirty="0" smtClean="0"/>
+                        <a:t>&gt; 50 and &lt;= 75</a:t>
+                      </a:r>
+                      <a:endParaRPr lang="en-US" dirty="0"/>
+                    </a:p>
+                  </a:txBody>
+                  <a:tcPr>
+                    <a:solidFill>
+                      <a:srgbClr val="FF9BF2"/>
+                    </a:solidFill>
+                  </a:tcPr>
+                </a:tc>
+              </a:tr>
+              <a:tr h="370840">
+                <a:tc vMerge="1">
+                  <a:txBody>
+                    <a:bodyPr/>
+                    <a:lstStyle/>
+                    <a:p>
+                      <a:endParaRPr lang="en-US" dirty="0"/>
+                    </a:p>
+                  </a:txBody>
+                  <a:tcPr/>
+                </a:tc>
+                <a:tc>
+                  <a:txBody>
+                    <a:bodyPr/>
+                    <a:lstStyle/>
+                    <a:p>
+                      <a:r>
+                        <a:rPr lang="en-US" dirty="0" smtClean="0"/>
+                        <a:t>2</a:t>
+                      </a:r>
+                      <a:endParaRPr lang="en-US" dirty="0"/>
+                    </a:p>
+                  </a:txBody>
+                  <a:tcPr/>
+                </a:tc>
+                <a:tc>
+                  <a:txBody>
+                    <a:bodyPr/>
+                    <a:lstStyle/>
+                    <a:p>
+                      <a:r>
+                        <a:rPr lang="en-US" dirty="0" smtClean="0"/>
+                        <a:t>75 and above</a:t>
+                      </a:r>
+                      <a:endParaRPr lang="en-US" dirty="0"/>
+                    </a:p>
+                  </a:txBody>
+                  <a:tcPr>
+                    <a:solidFill>
+                      <a:srgbClr val="FF0000"/>
+                    </a:solidFill>
+                  </a:tcPr>
+                </a:tc>
+              </a:tr>
+            </a:tbl>
+          </a:graphicData>
+        </a:graphic>
+      </p:graphicFrame>
     </p:spTree>
     <p:extLst>
       <p:ext uri="{BB962C8B-B14F-4D97-AF65-F5344CB8AC3E}">
-        <p14:creationId xmlns:p14="http://schemas.microsoft.com/office/powerpoint/2010/main" val="501075537"/>
+        <p14:creationId xmlns:p14="http://schemas.microsoft.com/office/powerpoint/2010/main" val="1049087673"/>
       </p:ext>
     </p:extLst>
   </p:cSld>
@@ -10949,56 +11505,461 @@
             <p:ph type="title"/>
           </p:nvPr>
         </p:nvSpPr>
-        <p:spPr>
-          <a:xfrm>
-            <a:off x="0" y="209456"/>
-            <a:ext cx="8913813" cy="914400"/>
-          </a:xfrm>
-        </p:spPr>
+        <p:spPr/>
         <p:txBody>
-          <a:bodyPr/>
+          <a:bodyPr>
+            <a:normAutofit/>
+          </a:bodyPr>
           <a:lstStyle/>
           <a:p>
             <a:r>
               <a:rPr lang="en-US" dirty="0" smtClean="0"/>
-              <a:t>Graphs – Temp Vs Time</a:t>
+              <a:t>Classification Details</a:t>
             </a:r>
             <a:endParaRPr lang="en-US" dirty="0"/>
           </a:p>
         </p:txBody>
       </p:sp>
-      <p:pic>
-        <p:nvPicPr>
-          <p:cNvPr id="1027" name="Picture 3" descr="C:\Users\betcy\Desktop\t1.jpg"/>
-          <p:cNvPicPr>
-            <a:picLocks noGrp="1" noChangeAspect="1" noChangeArrowheads="1"/>
-          </p:cNvPicPr>
+      <p:graphicFrame>
+        <p:nvGraphicFramePr>
+          <p:cNvPr id="4" name="Content Placeholder 3"/>
+          <p:cNvGraphicFramePr>
+            <a:graphicFrameLocks noGrp="1"/>
+          </p:cNvGraphicFramePr>
           <p:nvPr>
             <p:ph idx="1"/>
+            <p:extLst>
+              <p:ext uri="{D42A27DB-BD31-4B8C-83A1-F6EECF244321}">
+                <p14:modId xmlns:p14="http://schemas.microsoft.com/office/powerpoint/2010/main" val="168034825"/>
+              </p:ext>
+            </p:extLst>
           </p:nvPr>
-        </p:nvPicPr>
-        <p:blipFill>
-          <a:blip r:embed="rId2" cstate="print"/>
-          <a:srcRect/>
-          <a:stretch>
-            <a:fillRect/>
-          </a:stretch>
-        </p:blipFill>
-        <p:spPr bwMode="auto">
-          <a:xfrm>
-            <a:off x="862884" y="1389051"/>
-            <a:ext cx="7508383" cy="5153417"/>
-          </a:xfrm>
-          <a:prstGeom prst="rect">
-            <a:avLst/>
-          </a:prstGeom>
-          <a:noFill/>
-        </p:spPr>
-      </p:pic>
+        </p:nvGraphicFramePr>
+        <p:xfrm>
+          <a:off x="1033468" y="2527775"/>
+          <a:ext cx="6698854" cy="3420493"/>
+        </p:xfrm>
+        <a:graphic>
+          <a:graphicData uri="http://schemas.openxmlformats.org/drawingml/2006/table">
+            <a:tbl>
+              <a:tblPr firstRow="1" bandRow="1">
+                <a:tableStyleId>{5940675A-B579-460E-94D1-54222C63F5DA}</a:tableStyleId>
+              </a:tblPr>
+              <a:tblGrid>
+                <a:gridCol w="2037840"/>
+                <a:gridCol w="1999547"/>
+                <a:gridCol w="2661467"/>
+              </a:tblGrid>
+              <a:tr h="772369">
+                <a:tc>
+                  <a:txBody>
+                    <a:bodyPr/>
+                    <a:lstStyle/>
+                    <a:p>
+                      <a:pPr marL="0" marR="0" indent="0" algn="l" defTabSz="914400" rtl="0" eaLnBrk="1" fontAlgn="auto" latinLnBrk="0" hangingPunct="1">
+                        <a:lnSpc>
+                          <a:spcPct val="100000"/>
+                        </a:lnSpc>
+                        <a:spcBef>
+                          <a:spcPts val="0"/>
+                        </a:spcBef>
+                        <a:spcAft>
+                          <a:spcPts val="0"/>
+                        </a:spcAft>
+                        <a:buClrTx/>
+                        <a:buSzTx/>
+                        <a:buFontTx/>
+                        <a:buNone/>
+                        <a:tabLst/>
+                        <a:defRPr/>
+                      </a:pPr>
+                      <a:r>
+                        <a:rPr lang="en-US" dirty="0" smtClean="0"/>
+                        <a:t>  </a:t>
+                      </a:r>
+                      <a:endParaRPr lang="en-US" dirty="0" smtClean="0"/>
+                    </a:p>
+                    <a:p>
+                      <a:pPr marL="0" marR="0" indent="0" algn="l" defTabSz="914400" rtl="0" eaLnBrk="1" fontAlgn="auto" latinLnBrk="0" hangingPunct="1">
+                        <a:lnSpc>
+                          <a:spcPct val="100000"/>
+                        </a:lnSpc>
+                        <a:spcBef>
+                          <a:spcPts val="0"/>
+                        </a:spcBef>
+                        <a:spcAft>
+                          <a:spcPts val="0"/>
+                        </a:spcAft>
+                        <a:buClrTx/>
+                        <a:buSzTx/>
+                        <a:buFontTx/>
+                        <a:buNone/>
+                        <a:tabLst/>
+                        <a:defRPr/>
+                      </a:pPr>
+                      <a:r>
+                        <a:rPr lang="en-US" dirty="0" smtClean="0"/>
+                        <a:t> WEATHER</a:t>
+                      </a:r>
+                      <a:r>
+                        <a:rPr lang="en-US" baseline="0" dirty="0" smtClean="0"/>
+                        <a:t> DATA</a:t>
+                      </a:r>
+                      <a:endParaRPr lang="en-US" dirty="0" smtClean="0"/>
+                    </a:p>
+                  </a:txBody>
+                  <a:tcPr/>
+                </a:tc>
+                <a:tc>
+                  <a:txBody>
+                    <a:bodyPr/>
+                    <a:lstStyle/>
+                    <a:p>
+                      <a:r>
+                        <a:rPr lang="en-US" dirty="0" smtClean="0"/>
+                        <a:t>       </a:t>
+                      </a:r>
+                      <a:r>
+                        <a:rPr lang="en-US" dirty="0" smtClean="0"/>
+                        <a:t>CLASSIFICATION</a:t>
+                      </a:r>
+                      <a:endParaRPr lang="en-US" dirty="0"/>
+                    </a:p>
+                  </a:txBody>
+                  <a:tcPr/>
+                </a:tc>
+                <a:tc>
+                  <a:txBody>
+                    <a:bodyPr/>
+                    <a:lstStyle/>
+                    <a:p>
+                      <a:r>
+                        <a:rPr lang="en-US" dirty="0" smtClean="0"/>
+                        <a:t>    </a:t>
+                      </a:r>
+                      <a:endParaRPr lang="en-US" dirty="0" smtClean="0"/>
+                    </a:p>
+                    <a:p>
+                      <a:r>
+                        <a:rPr lang="en-US" dirty="0" smtClean="0"/>
+                        <a:t>            RANGE</a:t>
+                      </a:r>
+                      <a:endParaRPr lang="en-US" dirty="0"/>
+                    </a:p>
+                  </a:txBody>
+                  <a:tcPr/>
+                </a:tc>
+              </a:tr>
+              <a:tr h="441354">
+                <a:tc rowSpan="3">
+                  <a:txBody>
+                    <a:bodyPr/>
+                    <a:lstStyle/>
+                    <a:p>
+                      <a:endParaRPr lang="en-US" dirty="0" smtClean="0"/>
+                    </a:p>
+                    <a:p>
+                      <a:r>
+                        <a:rPr lang="en-US" dirty="0" smtClean="0"/>
+                        <a:t>WIND CHILL</a:t>
+                      </a:r>
+                      <a:endParaRPr lang="en-US" dirty="0"/>
+                    </a:p>
+                  </a:txBody>
+                  <a:tcPr>
+                    <a:solidFill>
+                      <a:srgbClr val="ECEFE2"/>
+                    </a:solidFill>
+                  </a:tcPr>
+                </a:tc>
+                <a:tc>
+                  <a:txBody>
+                    <a:bodyPr/>
+                    <a:lstStyle/>
+                    <a:p>
+                      <a:r>
+                        <a:rPr lang="en-US" dirty="0" smtClean="0"/>
+                        <a:t>0</a:t>
+                      </a:r>
+                      <a:endParaRPr lang="en-US" dirty="0"/>
+                    </a:p>
+                  </a:txBody>
+                  <a:tcPr/>
+                </a:tc>
+                <a:tc>
+                  <a:txBody>
+                    <a:bodyPr/>
+                    <a:lstStyle/>
+                    <a:p>
+                      <a:r>
+                        <a:rPr lang="en-US" sz="1800" b="0" i="0" u="none" strike="noStrike" kern="1200" dirty="0" smtClean="0">
+                          <a:solidFill>
+                            <a:schemeClr val="tx1"/>
+                          </a:solidFill>
+                          <a:latin typeface="+mn-lt"/>
+                          <a:ea typeface="+mn-ea"/>
+                          <a:cs typeface="+mn-cs"/>
+                        </a:rPr>
+                        <a:t>&lt;= 5</a:t>
+                      </a:r>
+                      <a:endParaRPr lang="en-US" sz="1800" b="0" i="0" u="none" strike="noStrike" kern="1200" dirty="0" smtClean="0">
+                        <a:solidFill>
+                          <a:schemeClr val="tx1"/>
+                        </a:solidFill>
+                        <a:latin typeface="+mn-lt"/>
+                        <a:ea typeface="+mn-ea"/>
+                        <a:cs typeface="+mn-cs"/>
+                      </a:endParaRPr>
+                    </a:p>
+                  </a:txBody>
+                  <a:tcPr>
+                    <a:solidFill>
+                      <a:schemeClr val="accent4">
+                        <a:lumMod val="75000"/>
+                      </a:schemeClr>
+                    </a:solidFill>
+                  </a:tcPr>
+                </a:tc>
+              </a:tr>
+              <a:tr h="441354">
+                <a:tc vMerge="1">
+                  <a:txBody>
+                    <a:bodyPr/>
+                    <a:lstStyle/>
+                    <a:p>
+                      <a:endParaRPr lang="en-US" dirty="0"/>
+                    </a:p>
+                  </a:txBody>
+                  <a:tcPr/>
+                </a:tc>
+                <a:tc>
+                  <a:txBody>
+                    <a:bodyPr/>
+                    <a:lstStyle/>
+                    <a:p>
+                      <a:r>
+                        <a:rPr lang="en-US" dirty="0" smtClean="0"/>
+                        <a:t>1</a:t>
+                      </a:r>
+                      <a:endParaRPr lang="en-US" dirty="0"/>
+                    </a:p>
+                  </a:txBody>
+                  <a:tcPr/>
+                </a:tc>
+                <a:tc>
+                  <a:txBody>
+                    <a:bodyPr/>
+                    <a:lstStyle/>
+                    <a:p>
+                      <a:r>
+                        <a:rPr lang="en-US" dirty="0" smtClean="0"/>
+                        <a:t>&gt; 5 and &lt;= 10</a:t>
+                      </a:r>
+                      <a:endParaRPr lang="en-US" dirty="0"/>
+                    </a:p>
+                  </a:txBody>
+                  <a:tcPr>
+                    <a:solidFill>
+                      <a:srgbClr val="FA97FF"/>
+                    </a:solidFill>
+                  </a:tcPr>
+                </a:tc>
+              </a:tr>
+              <a:tr h="441354">
+                <a:tc vMerge="1">
+                  <a:txBody>
+                    <a:bodyPr/>
+                    <a:lstStyle/>
+                    <a:p>
+                      <a:endParaRPr lang="en-US" dirty="0"/>
+                    </a:p>
+                  </a:txBody>
+                  <a:tcPr/>
+                </a:tc>
+                <a:tc>
+                  <a:txBody>
+                    <a:bodyPr/>
+                    <a:lstStyle/>
+                    <a:p>
+                      <a:r>
+                        <a:rPr lang="en-US" dirty="0" smtClean="0"/>
+                        <a:t>2</a:t>
+                      </a:r>
+                      <a:endParaRPr lang="en-US" dirty="0"/>
+                    </a:p>
+                  </a:txBody>
+                  <a:tcPr/>
+                </a:tc>
+                <a:tc>
+                  <a:txBody>
+                    <a:bodyPr/>
+                    <a:lstStyle/>
+                    <a:p>
+                      <a:r>
+                        <a:rPr lang="en-US" dirty="0" smtClean="0"/>
+                        <a:t>10 and above</a:t>
+                      </a:r>
+                      <a:endParaRPr lang="en-US" dirty="0"/>
+                    </a:p>
+                  </a:txBody>
+                  <a:tcPr>
+                    <a:solidFill>
+                      <a:srgbClr val="FF0000"/>
+                    </a:solidFill>
+                  </a:tcPr>
+                </a:tc>
+              </a:tr>
+              <a:tr h="441354">
+                <a:tc rowSpan="3">
+                  <a:txBody>
+                    <a:bodyPr/>
+                    <a:lstStyle/>
+                    <a:p>
+                      <a:endParaRPr lang="en-US" dirty="0" smtClean="0"/>
+                    </a:p>
+                    <a:p>
+                      <a:r>
+                        <a:rPr lang="en-US" dirty="0" smtClean="0"/>
+                        <a:t>WIND DIRECTION</a:t>
+                      </a:r>
+                      <a:endParaRPr lang="en-US" dirty="0"/>
+                    </a:p>
+                  </a:txBody>
+                  <a:tcPr>
+                    <a:solidFill>
+                      <a:srgbClr val="ECEFE2"/>
+                    </a:solidFill>
+                  </a:tcPr>
+                </a:tc>
+                <a:tc>
+                  <a:txBody>
+                    <a:bodyPr/>
+                    <a:lstStyle/>
+                    <a:p>
+                      <a:r>
+                        <a:rPr lang="en-US" dirty="0" smtClean="0"/>
+                        <a:t>0</a:t>
+                      </a:r>
+                      <a:endParaRPr lang="en-US" dirty="0"/>
+                    </a:p>
+                  </a:txBody>
+                  <a:tcPr/>
+                </a:tc>
+                <a:tc>
+                  <a:txBody>
+                    <a:bodyPr/>
+                    <a:lstStyle/>
+                    <a:p>
+                      <a:r>
+                        <a:rPr lang="en-US" dirty="0" smtClean="0"/>
+                        <a:t>&lt;= 5</a:t>
+                      </a:r>
+                      <a:endParaRPr lang="en-US" dirty="0"/>
+                    </a:p>
+                  </a:txBody>
+                  <a:tcPr>
+                    <a:solidFill>
+                      <a:srgbClr val="2C9AE5"/>
+                    </a:solidFill>
+                  </a:tcPr>
+                </a:tc>
+              </a:tr>
+              <a:tr h="441354">
+                <a:tc vMerge="1">
+                  <a:txBody>
+                    <a:bodyPr/>
+                    <a:lstStyle/>
+                    <a:p>
+                      <a:endParaRPr lang="en-US" dirty="0"/>
+                    </a:p>
+                  </a:txBody>
+                  <a:tcPr/>
+                </a:tc>
+                <a:tc>
+                  <a:txBody>
+                    <a:bodyPr/>
+                    <a:lstStyle/>
+                    <a:p>
+                      <a:r>
+                        <a:rPr lang="en-US" dirty="0" smtClean="0"/>
+                        <a:t>1</a:t>
+                      </a:r>
+                      <a:endParaRPr lang="en-US" dirty="0"/>
+                    </a:p>
+                  </a:txBody>
+                  <a:tcPr/>
+                </a:tc>
+                <a:tc>
+                  <a:txBody>
+                    <a:bodyPr/>
+                    <a:lstStyle/>
+                    <a:p>
+                      <a:r>
+                        <a:rPr lang="en-US" dirty="0" smtClean="0"/>
+                        <a:t>&gt;5 and &lt;= 10</a:t>
+                      </a:r>
+                      <a:endParaRPr lang="en-US" dirty="0"/>
+                    </a:p>
+                  </a:txBody>
+                  <a:tcPr>
+                    <a:solidFill>
+                      <a:srgbClr val="FA97FF"/>
+                    </a:solidFill>
+                  </a:tcPr>
+                </a:tc>
+              </a:tr>
+              <a:tr h="441354">
+                <a:tc vMerge="1">
+                  <a:txBody>
+                    <a:bodyPr/>
+                    <a:lstStyle/>
+                    <a:p>
+                      <a:endParaRPr lang="en-US" dirty="0"/>
+                    </a:p>
+                  </a:txBody>
+                  <a:tcPr/>
+                </a:tc>
+                <a:tc>
+                  <a:txBody>
+                    <a:bodyPr/>
+                    <a:lstStyle/>
+                    <a:p>
+                      <a:r>
+                        <a:rPr lang="en-US" dirty="0" smtClean="0"/>
+                        <a:t>2</a:t>
+                      </a:r>
+                      <a:endParaRPr lang="en-US" dirty="0"/>
+                    </a:p>
+                  </a:txBody>
+                  <a:tcPr/>
+                </a:tc>
+                <a:tc>
+                  <a:txBody>
+                    <a:bodyPr/>
+                    <a:lstStyle/>
+                    <a:p>
+                      <a:r>
+                        <a:rPr lang="en-US" dirty="0" smtClean="0"/>
+                        <a:t>10 and above</a:t>
+                      </a:r>
+                      <a:endParaRPr lang="en-US" dirty="0"/>
+                    </a:p>
+                  </a:txBody>
+                  <a:tcPr>
+                    <a:solidFill>
+                      <a:srgbClr val="FF0000"/>
+                    </a:solidFill>
+                  </a:tcPr>
+                </a:tc>
+              </a:tr>
+            </a:tbl>
+          </a:graphicData>
+        </a:graphic>
+      </p:graphicFrame>
     </p:spTree>
     <p:extLst>
       <p:ext uri="{BB962C8B-B14F-4D97-AF65-F5344CB8AC3E}">
-        <p14:creationId xmlns:p14="http://schemas.microsoft.com/office/powerpoint/2010/main" val="2177146048"/>
+        <p14:creationId xmlns:p14="http://schemas.microsoft.com/office/powerpoint/2010/main" val="541711243"/>
       </p:ext>
     </p:extLst>
   </p:cSld>
@@ -11053,20 +12014,16 @@
           <a:lstStyle/>
           <a:p>
             <a:r>
-              <a:rPr lang="en-US" dirty="0" err="1" smtClean="0"/>
-              <a:t>WindSpeed</a:t>
-            </a:r>
-            <a:r>
               <a:rPr lang="en-US" dirty="0" smtClean="0"/>
-              <a:t> Vs Time</a:t>
-            </a:r>
-            <a:endParaRPr lang="en-IN" dirty="0"/>
+              <a:t>Graphs – Temp Vs Time</a:t>
+            </a:r>
+            <a:endParaRPr lang="en-US" dirty="0"/>
           </a:p>
         </p:txBody>
       </p:sp>
       <p:pic>
         <p:nvPicPr>
-          <p:cNvPr id="2050" name="Picture 2" descr="C:\Psu\QL\final\wt.jpg"/>
+          <p:cNvPr id="1027" name="Picture 3" descr="C:\Users\betcy\Desktop\t1.jpg"/>
           <p:cNvPicPr>
             <a:picLocks noGrp="1" noChangeAspect="1" noChangeArrowheads="1"/>
           </p:cNvPicPr>
@@ -11083,8 +12040,8 @@
         </p:blipFill>
         <p:spPr bwMode="auto">
           <a:xfrm>
-            <a:off x="837127" y="1380170"/>
-            <a:ext cx="7392473" cy="5175176"/>
+            <a:off x="862884" y="1389051"/>
+            <a:ext cx="7508383" cy="5153417"/>
           </a:xfrm>
           <a:prstGeom prst="rect">
             <a:avLst/>
@@ -11095,7 +12052,7 @@
     </p:spTree>
     <p:extLst>
       <p:ext uri="{BB962C8B-B14F-4D97-AF65-F5344CB8AC3E}">
-        <p14:creationId xmlns:p14="http://schemas.microsoft.com/office/powerpoint/2010/main" val="4059595715"/>
+        <p14:creationId xmlns:p14="http://schemas.microsoft.com/office/powerpoint/2010/main" val="2177146048"/>
       </p:ext>
     </p:extLst>
   </p:cSld>
@@ -11150,10 +12107,6 @@
           <a:lstStyle/>
           <a:p>
             <a:r>
-              <a:rPr lang="en-US" dirty="0" smtClean="0"/>
-              <a:t>Temp/</a:t>
-            </a:r>
-            <a:r>
               <a:rPr lang="en-US" dirty="0" err="1" smtClean="0"/>
               <a:t>WindSpeed</a:t>
             </a:r>
@@ -11162,35 +12115,18 @@
               <a:t> Vs Time</a:t>
             </a:r>
             <a:endParaRPr lang="en-IN" dirty="0"/>
-          </a:p>
-        </p:txBody>
-      </p:sp>
-      <p:sp>
-        <p:nvSpPr>
-          <p:cNvPr id="3" name="Content Placeholder 2"/>
-          <p:cNvSpPr>
-            <a:spLocks noGrp="1"/>
-          </p:cNvSpPr>
-          <p:nvPr>
-            <p:ph idx="1"/>
-          </p:nvPr>
-        </p:nvSpPr>
-        <p:spPr/>
-        <p:txBody>
-          <a:bodyPr/>
-          <a:lstStyle/>
-          <a:p>
-            <a:endParaRPr lang="en-IN"/>
           </a:p>
         </p:txBody>
       </p:sp>
       <p:pic>
         <p:nvPicPr>
-          <p:cNvPr id="3074" name="Picture 2" descr="C:\Users\betcy\Desktop\twt.jpg"/>
+          <p:cNvPr id="2050" name="Picture 2" descr="C:\Psu\QL\final\wt.jpg"/>
           <p:cNvPicPr>
-            <a:picLocks noChangeAspect="1" noChangeArrowheads="1"/>
+            <a:picLocks noGrp="1" noChangeAspect="1" noChangeArrowheads="1"/>
           </p:cNvPicPr>
-          <p:nvPr/>
+          <p:nvPr>
+            <p:ph idx="1"/>
+          </p:nvPr>
         </p:nvPicPr>
         <p:blipFill>
           <a:blip r:embed="rId2" cstate="print"/>
@@ -11201,8 +12137,8 @@
         </p:blipFill>
         <p:spPr bwMode="auto">
           <a:xfrm>
-            <a:off x="505566" y="1371734"/>
-            <a:ext cx="8213434" cy="5267325"/>
+            <a:off x="837127" y="1380170"/>
+            <a:ext cx="7392473" cy="5175176"/>
           </a:xfrm>
           <a:prstGeom prst="rect">
             <a:avLst/>
@@ -11213,7 +12149,7 @@
     </p:spTree>
     <p:extLst>
       <p:ext uri="{BB962C8B-B14F-4D97-AF65-F5344CB8AC3E}">
-        <p14:creationId xmlns:p14="http://schemas.microsoft.com/office/powerpoint/2010/main" val="397124458"/>
+        <p14:creationId xmlns:p14="http://schemas.microsoft.com/office/powerpoint/2010/main" val="4059595715"/>
       </p:ext>
     </p:extLst>
   </p:cSld>
@@ -11257,16 +12193,29 @@
             <p:ph type="title"/>
           </p:nvPr>
         </p:nvSpPr>
-        <p:spPr/>
+        <p:spPr>
+          <a:xfrm>
+            <a:off x="0" y="209456"/>
+            <a:ext cx="8913813" cy="914400"/>
+          </a:xfrm>
+        </p:spPr>
         <p:txBody>
           <a:bodyPr/>
           <a:lstStyle/>
           <a:p>
             <a:r>
               <a:rPr lang="en-US" dirty="0" smtClean="0"/>
-              <a:t>COMPONENTS USED</a:t>
-            </a:r>
-            <a:endParaRPr lang="en-US" dirty="0"/>
+              <a:t>Temp/</a:t>
+            </a:r>
+            <a:r>
+              <a:rPr lang="en-US" dirty="0" err="1" smtClean="0"/>
+              <a:t>WindSpeed</a:t>
+            </a:r>
+            <a:r>
+              <a:rPr lang="en-US" dirty="0" smtClean="0"/>
+              <a:t> Vs Time</a:t>
+            </a:r>
+            <a:endParaRPr lang="en-IN" dirty="0"/>
           </a:p>
         </p:txBody>
       </p:sp>
@@ -11282,138 +12231,43 @@
         </p:nvSpPr>
         <p:spPr/>
         <p:txBody>
-          <a:bodyPr>
-            <a:normAutofit lnSpcReduction="10000"/>
-          </a:bodyPr>
+          <a:bodyPr/>
           <a:lstStyle/>
           <a:p>
-            <a:r>
-              <a:rPr lang="en-US" dirty="0" smtClean="0"/>
-              <a:t>ARDUINO </a:t>
-            </a:r>
-            <a:r>
-              <a:rPr lang="en-US" dirty="0" smtClean="0"/>
-              <a:t>board</a:t>
-            </a:r>
-          </a:p>
-          <a:p>
-            <a:r>
-              <a:rPr lang="en-US" dirty="0" err="1"/>
-              <a:t>NeoPixel</a:t>
-            </a:r>
-            <a:r>
-              <a:rPr lang="en-US" dirty="0"/>
-              <a:t> digital RGB LED Strip</a:t>
-            </a:r>
-          </a:p>
-          <a:p>
-            <a:pPr marL="0" indent="0">
-              <a:buNone/>
-            </a:pPr>
-            <a:r>
-              <a:rPr lang="en-US" dirty="0"/>
-              <a:t>       </a:t>
-            </a:r>
-            <a:r>
-              <a:rPr lang="en-US" dirty="0">
-                <a:hlinkClick r:id="rId2"/>
-              </a:rPr>
-              <a:t>http://www.adafruit.com/products/1138</a:t>
-            </a:r>
-            <a:r>
-              <a:rPr lang="en-US" dirty="0"/>
-              <a:t> </a:t>
-            </a:r>
-            <a:endParaRPr lang="en-US" dirty="0" smtClean="0"/>
-          </a:p>
-          <a:p>
-            <a:r>
-              <a:rPr lang="en-US" dirty="0"/>
-              <a:t>Temperature Sensors(DS18B20)</a:t>
-            </a:r>
-          </a:p>
-          <a:p>
-            <a:pPr marL="0" indent="0">
-              <a:buNone/>
-            </a:pPr>
-            <a:r>
-              <a:rPr lang="en-US" dirty="0"/>
-              <a:t>       http://</a:t>
-            </a:r>
-            <a:r>
-              <a:rPr lang="en-US" dirty="0" err="1"/>
-              <a:t>www.adafruit.com</a:t>
-            </a:r>
-            <a:r>
-              <a:rPr lang="en-US" dirty="0"/>
-              <a:t>/products/</a:t>
-            </a:r>
-            <a:r>
-              <a:rPr lang="en-US" dirty="0" smtClean="0"/>
-              <a:t>374</a:t>
-            </a:r>
-            <a:endParaRPr lang="en-US" dirty="0" smtClean="0"/>
-          </a:p>
-          <a:p>
-            <a:r>
-              <a:rPr lang="en-US" dirty="0" smtClean="0"/>
-              <a:t>Resistors</a:t>
-            </a:r>
-          </a:p>
-          <a:p>
-            <a:r>
-              <a:rPr lang="en-US" dirty="0" smtClean="0"/>
-              <a:t>Jumper wires</a:t>
-            </a:r>
-          </a:p>
-          <a:p>
-            <a:pPr marL="0" indent="0">
-              <a:buNone/>
-            </a:pPr>
-            <a:endParaRPr lang="en-US" dirty="0" smtClean="0"/>
-          </a:p>
-          <a:p>
-            <a:pPr marL="0" indent="0">
-              <a:buNone/>
-            </a:pPr>
-            <a:endParaRPr lang="en-US" dirty="0" smtClean="0"/>
-          </a:p>
-          <a:p>
-            <a:pPr marL="0" indent="0">
-              <a:buNone/>
-            </a:pPr>
-            <a:endParaRPr lang="en-US" dirty="0"/>
-          </a:p>
-          <a:p>
-            <a:pPr marL="0" indent="0">
-              <a:buNone/>
-            </a:pPr>
-            <a:endParaRPr lang="en-US" dirty="0"/>
-          </a:p>
-          <a:p>
-            <a:pPr marL="0" indent="0">
-              <a:buNone/>
-            </a:pPr>
-            <a:endParaRPr lang="en-US" dirty="0" smtClean="0"/>
-          </a:p>
-          <a:p>
-            <a:pPr marL="0" indent="0">
-              <a:buNone/>
-            </a:pPr>
-            <a:endParaRPr lang="en-US" dirty="0" smtClean="0"/>
-          </a:p>
-          <a:p>
-            <a:endParaRPr lang="en-US" dirty="0" smtClean="0"/>
-          </a:p>
-          <a:p>
-            <a:endParaRPr lang="en-US" dirty="0"/>
+            <a:endParaRPr lang="en-IN"/>
           </a:p>
         </p:txBody>
       </p:sp>
+      <p:pic>
+        <p:nvPicPr>
+          <p:cNvPr id="3074" name="Picture 2" descr="C:\Users\betcy\Desktop\twt.jpg"/>
+          <p:cNvPicPr>
+            <a:picLocks noChangeAspect="1" noChangeArrowheads="1"/>
+          </p:cNvPicPr>
+          <p:nvPr/>
+        </p:nvPicPr>
+        <p:blipFill>
+          <a:blip r:embed="rId2" cstate="print"/>
+          <a:srcRect/>
+          <a:stretch>
+            <a:fillRect/>
+          </a:stretch>
+        </p:blipFill>
+        <p:spPr bwMode="auto">
+          <a:xfrm>
+            <a:off x="505566" y="1371734"/>
+            <a:ext cx="8213434" cy="5267325"/>
+          </a:xfrm>
+          <a:prstGeom prst="rect">
+            <a:avLst/>
+          </a:prstGeom>
+          <a:noFill/>
+        </p:spPr>
+      </p:pic>
     </p:spTree>
     <p:extLst>
       <p:ext uri="{BB962C8B-B14F-4D97-AF65-F5344CB8AC3E}">
-        <p14:creationId xmlns:p14="http://schemas.microsoft.com/office/powerpoint/2010/main" val="1986240947"/>
+        <p14:creationId xmlns:p14="http://schemas.microsoft.com/office/powerpoint/2010/main" val="397124458"/>
       </p:ext>
     </p:extLst>
   </p:cSld>
@@ -11563,7 +12417,7 @@
           <a:p>
             <a:r>
               <a:rPr lang="en-US" dirty="0" smtClean="0"/>
-              <a:t>LIBRARY USED</a:t>
+              <a:t>COMPONENTS USED</a:t>
             </a:r>
             <a:endParaRPr lang="en-US" dirty="0"/>
           </a:p>
@@ -11588,84 +12442,123 @@
           <a:p>
             <a:r>
               <a:rPr lang="en-US" dirty="0" smtClean="0"/>
-              <a:t>Weather API (</a:t>
-            </a:r>
-            <a:r>
-              <a:rPr lang="en-US" dirty="0" err="1" smtClean="0"/>
-              <a:t>pywapi</a:t>
+              <a:t>ARDUINO </a:t>
             </a:r>
             <a:r>
               <a:rPr lang="en-US" dirty="0" smtClean="0"/>
-              <a:t>)</a:t>
-            </a:r>
-          </a:p>
-          <a:p>
-            <a:pPr lvl="1"/>
+              <a:t>board</a:t>
+            </a:r>
+          </a:p>
+          <a:p>
+            <a:r>
+              <a:rPr lang="en-US" dirty="0" err="1"/>
+              <a:t>NeoPixel</a:t>
+            </a:r>
+            <a:r>
+              <a:rPr lang="en-US" dirty="0"/>
+              <a:t> digital RGB LED Strip</a:t>
+            </a:r>
+          </a:p>
+          <a:p>
+            <a:pPr marL="0" indent="0">
+              <a:buNone/>
+            </a:pPr>
+            <a:r>
+              <a:rPr lang="en-US" dirty="0"/>
+              <a:t>       </a:t>
+            </a:r>
+            <a:r>
+              <a:rPr lang="en-US" dirty="0">
+                <a:hlinkClick r:id="rId2"/>
+              </a:rPr>
+              <a:t>http://www.adafruit.com/products/1138</a:t>
+            </a:r>
+            <a:r>
+              <a:rPr lang="en-US" dirty="0"/>
+              <a:t> </a:t>
+            </a:r>
+            <a:endParaRPr lang="en-US" dirty="0" smtClean="0"/>
+          </a:p>
+          <a:p>
+            <a:r>
+              <a:rPr lang="en-US" dirty="0"/>
+              <a:t>Temperature Sensors(DS18B20)</a:t>
+            </a:r>
+          </a:p>
+          <a:p>
+            <a:pPr marL="0" indent="0">
+              <a:buNone/>
+            </a:pPr>
+            <a:r>
+              <a:rPr lang="en-US" dirty="0"/>
+              <a:t>       http://</a:t>
+            </a:r>
+            <a:r>
+              <a:rPr lang="en-US" dirty="0" err="1"/>
+              <a:t>www.adafruit.com</a:t>
+            </a:r>
+            <a:r>
+              <a:rPr lang="en-US" dirty="0"/>
+              <a:t>/products/</a:t>
+            </a:r>
             <a:r>
               <a:rPr lang="en-US" dirty="0" smtClean="0"/>
-              <a:t>To get weather data from online</a:t>
-            </a:r>
+              <a:t>374</a:t>
+            </a:r>
+            <a:endParaRPr lang="en-US" dirty="0" smtClean="0"/>
           </a:p>
           <a:p>
             <a:r>
               <a:rPr lang="en-US" dirty="0" smtClean="0"/>
-              <a:t>Serial</a:t>
-            </a:r>
-          </a:p>
-          <a:p>
-            <a:pPr lvl="1"/>
+              <a:t>Resistors</a:t>
+            </a:r>
+          </a:p>
+          <a:p>
             <a:r>
               <a:rPr lang="en-US" dirty="0" smtClean="0"/>
-              <a:t>Python module to Communicate between computer and Arduino via serial </a:t>
-            </a:r>
-            <a:r>
-              <a:rPr lang="en-US" dirty="0" smtClean="0"/>
-              <a:t>port</a:t>
-            </a:r>
-          </a:p>
-          <a:p>
-            <a:r>
-              <a:rPr lang="en-US" dirty="0" err="1" smtClean="0"/>
-              <a:t>Onewire</a:t>
-            </a:r>
-            <a:r>
-              <a:rPr lang="en-US" dirty="0" smtClean="0"/>
-              <a:t>	</a:t>
-            </a:r>
+              <a:t>Jumper wires</a:t>
+            </a:r>
+          </a:p>
+          <a:p>
+            <a:pPr marL="0" indent="0">
+              <a:buNone/>
+            </a:pPr>
             <a:endParaRPr lang="en-US" dirty="0" smtClean="0"/>
           </a:p>
           <a:p>
-            <a:pPr lvl="1"/>
-            <a:r>
-              <a:rPr lang="en-US" dirty="0" smtClean="0"/>
-              <a:t>To </a:t>
-            </a:r>
-            <a:r>
-              <a:rPr lang="en-US" dirty="0" smtClean="0"/>
-              <a:t>get temperature data using indoor </a:t>
-            </a:r>
-            <a:r>
-              <a:rPr lang="en-US" dirty="0" smtClean="0"/>
-              <a:t>sensors</a:t>
-            </a:r>
+            <a:pPr marL="0" indent="0">
+              <a:buNone/>
+            </a:pPr>
             <a:endParaRPr lang="en-US" dirty="0" smtClean="0"/>
           </a:p>
           <a:p>
-            <a:r>
-              <a:rPr lang="en-US" dirty="0" err="1" smtClean="0"/>
-              <a:t>Adafruit_NeoPixel</a:t>
-            </a:r>
+            <a:pPr marL="0" indent="0">
+              <a:buNone/>
+            </a:pPr>
+            <a:endParaRPr lang="en-US" dirty="0"/>
+          </a:p>
+          <a:p>
+            <a:pPr marL="0" indent="0">
+              <a:buNone/>
+            </a:pPr>
+            <a:endParaRPr lang="en-US" dirty="0"/>
+          </a:p>
+          <a:p>
+            <a:pPr marL="0" indent="0">
+              <a:buNone/>
+            </a:pPr>
             <a:endParaRPr lang="en-US" dirty="0" smtClean="0"/>
           </a:p>
           <a:p>
-            <a:pPr lvl="1"/>
-            <a:r>
-              <a:rPr lang="en-US" dirty="0" smtClean="0"/>
-              <a:t>To light led patterns using led strip</a:t>
-            </a:r>
-          </a:p>
-          <a:p>
-            <a:pPr lvl="1"/>
+            <a:pPr marL="0" indent="0">
+              <a:buNone/>
+            </a:pPr>
+            <a:endParaRPr lang="en-US" dirty="0" smtClean="0"/>
+          </a:p>
+          <a:p>
+            <a:endParaRPr lang="en-US" dirty="0" smtClean="0"/>
+          </a:p>
+          <a:p>
             <a:endParaRPr lang="en-US" dirty="0"/>
           </a:p>
         </p:txBody>
@@ -11673,7 +12566,7 @@
     </p:spTree>
     <p:extLst>
       <p:ext uri="{BB962C8B-B14F-4D97-AF65-F5344CB8AC3E}">
-        <p14:creationId xmlns:p14="http://schemas.microsoft.com/office/powerpoint/2010/main" val="2796827819"/>
+        <p14:creationId xmlns:p14="http://schemas.microsoft.com/office/powerpoint/2010/main" val="1986240947"/>
       </p:ext>
     </p:extLst>
   </p:cSld>
@@ -11724,7 +12617,7 @@
           <a:p>
             <a:r>
               <a:rPr lang="en-US" dirty="0" smtClean="0"/>
-              <a:t>Challenges</a:t>
+              <a:t>LIBRARY USED</a:t>
             </a:r>
             <a:endParaRPr lang="en-US" dirty="0"/>
           </a:p>
@@ -11742,9 +12635,91 @@
         </p:nvSpPr>
         <p:spPr/>
         <p:txBody>
-          <a:bodyPr/>
+          <a:bodyPr>
+            <a:normAutofit lnSpcReduction="10000"/>
+          </a:bodyPr>
           <a:lstStyle/>
           <a:p>
+            <a:r>
+              <a:rPr lang="en-US" dirty="0" smtClean="0"/>
+              <a:t>Weather API (</a:t>
+            </a:r>
+            <a:r>
+              <a:rPr lang="en-US" dirty="0" err="1" smtClean="0"/>
+              <a:t>pywapi</a:t>
+            </a:r>
+            <a:r>
+              <a:rPr lang="en-US" dirty="0" smtClean="0"/>
+              <a:t>)</a:t>
+            </a:r>
+          </a:p>
+          <a:p>
+            <a:pPr lvl="1"/>
+            <a:r>
+              <a:rPr lang="en-US" dirty="0" smtClean="0"/>
+              <a:t>To get weather data from online</a:t>
+            </a:r>
+          </a:p>
+          <a:p>
+            <a:r>
+              <a:rPr lang="en-US" dirty="0" smtClean="0"/>
+              <a:t>Serial</a:t>
+            </a:r>
+          </a:p>
+          <a:p>
+            <a:pPr lvl="1"/>
+            <a:r>
+              <a:rPr lang="en-US" dirty="0" smtClean="0"/>
+              <a:t>Python module to Communicate between computer and Arduino via serial </a:t>
+            </a:r>
+            <a:r>
+              <a:rPr lang="en-US" dirty="0" smtClean="0"/>
+              <a:t>port</a:t>
+            </a:r>
+          </a:p>
+          <a:p>
+            <a:r>
+              <a:rPr lang="en-US" dirty="0" err="1" smtClean="0"/>
+              <a:t>Onewire</a:t>
+            </a:r>
+            <a:r>
+              <a:rPr lang="en-US" dirty="0" smtClean="0"/>
+              <a:t>	</a:t>
+            </a:r>
+            <a:endParaRPr lang="en-US" dirty="0" smtClean="0"/>
+          </a:p>
+          <a:p>
+            <a:pPr lvl="1"/>
+            <a:r>
+              <a:rPr lang="en-US" dirty="0" smtClean="0"/>
+              <a:t>To </a:t>
+            </a:r>
+            <a:r>
+              <a:rPr lang="en-US" dirty="0" smtClean="0"/>
+              <a:t>get temperature data using indoor </a:t>
+            </a:r>
+            <a:r>
+              <a:rPr lang="en-US" dirty="0" smtClean="0"/>
+              <a:t>sensors</a:t>
+            </a:r>
+            <a:endParaRPr lang="en-US" dirty="0" smtClean="0"/>
+          </a:p>
+          <a:p>
+            <a:r>
+              <a:rPr lang="en-US" dirty="0" err="1" smtClean="0"/>
+              <a:t>Adafruit_NeoPixel</a:t>
+            </a:r>
+            <a:endParaRPr lang="en-US" dirty="0" smtClean="0"/>
+          </a:p>
+          <a:p>
+            <a:pPr lvl="1"/>
+            <a:r>
+              <a:rPr lang="en-US" dirty="0" smtClean="0"/>
+              <a:t>To light led patterns using led strip</a:t>
+            </a:r>
+          </a:p>
+          <a:p>
+            <a:pPr lvl="1"/>
             <a:endParaRPr lang="en-US" dirty="0"/>
           </a:p>
         </p:txBody>
@@ -11752,7 +12727,7 @@
     </p:spTree>
     <p:extLst>
       <p:ext uri="{BB962C8B-B14F-4D97-AF65-F5344CB8AC3E}">
-        <p14:creationId xmlns:p14="http://schemas.microsoft.com/office/powerpoint/2010/main" val="3032770816"/>
+        <p14:creationId xmlns:p14="http://schemas.microsoft.com/office/powerpoint/2010/main" val="2796827819"/>
       </p:ext>
     </p:extLst>
   </p:cSld>
@@ -11803,7 +12778,7 @@
           <a:p>
             <a:r>
               <a:rPr lang="en-US" dirty="0" smtClean="0"/>
-              <a:t>Future work</a:t>
+              <a:t>Challenges</a:t>
             </a:r>
             <a:endParaRPr lang="en-US" dirty="0"/>
           </a:p>
@@ -11821,63 +12796,8 @@
         </p:nvSpPr>
         <p:spPr/>
         <p:txBody>
-          <a:bodyPr>
-            <a:normAutofit/>
-          </a:bodyPr>
+          <a:bodyPr/>
           <a:lstStyle/>
-          <a:p>
-            <a:r>
-              <a:rPr lang="en-US" dirty="0" smtClean="0"/>
-              <a:t>Creating an App that has following features</a:t>
-            </a:r>
-          </a:p>
-          <a:p>
-            <a:pPr lvl="1"/>
-            <a:r>
-              <a:rPr lang="en-US" dirty="0" smtClean="0"/>
-              <a:t>Picture corresponding to weather data</a:t>
-            </a:r>
-          </a:p>
-          <a:p>
-            <a:pPr lvl="1"/>
-            <a:r>
-              <a:rPr lang="en-US" dirty="0" smtClean="0"/>
-              <a:t>Show temperature, wind , humidity, rain, precipitation</a:t>
-            </a:r>
-          </a:p>
-          <a:p>
-            <a:pPr lvl="1"/>
-            <a:r>
-              <a:rPr lang="en-US" dirty="0" smtClean="0"/>
-              <a:t>Max, Min temp in a day/week</a:t>
-            </a:r>
-          </a:p>
-          <a:p>
-            <a:r>
-              <a:rPr lang="en-US" dirty="0" smtClean="0"/>
-              <a:t>Comparing indoor and outdoor sensors data and coming up with LED patterns to show the differences.</a:t>
-            </a:r>
-          </a:p>
-          <a:p>
-            <a:r>
-              <a:rPr lang="en-US" dirty="0" smtClean="0"/>
-              <a:t>Using </a:t>
-            </a:r>
-            <a:r>
-              <a:rPr lang="en-US" dirty="0" err="1" smtClean="0"/>
-              <a:t>Wifi</a:t>
-            </a:r>
-            <a:r>
-              <a:rPr lang="en-US" dirty="0" smtClean="0"/>
-              <a:t> on Galileo</a:t>
-            </a:r>
-          </a:p>
-          <a:p>
-            <a:r>
-              <a:rPr lang="en-US" dirty="0" smtClean="0"/>
-              <a:t>Get the modules to work for Galileo</a:t>
-            </a:r>
-          </a:p>
           <a:p>
             <a:endParaRPr lang="en-US" dirty="0"/>
           </a:p>
@@ -11886,7 +12806,7 @@
     </p:spTree>
     <p:extLst>
       <p:ext uri="{BB962C8B-B14F-4D97-AF65-F5344CB8AC3E}">
-        <p14:creationId xmlns:p14="http://schemas.microsoft.com/office/powerpoint/2010/main" val="2640821237"/>
+        <p14:creationId xmlns:p14="http://schemas.microsoft.com/office/powerpoint/2010/main" val="3032770816"/>
       </p:ext>
     </p:extLst>
   </p:cSld>
@@ -11937,6 +12857,140 @@
           <a:p>
             <a:r>
               <a:rPr lang="en-US" dirty="0" smtClean="0"/>
+              <a:t>Future work</a:t>
+            </a:r>
+            <a:endParaRPr lang="en-US" dirty="0"/>
+          </a:p>
+        </p:txBody>
+      </p:sp>
+      <p:sp>
+        <p:nvSpPr>
+          <p:cNvPr id="3" name="Content Placeholder 2"/>
+          <p:cNvSpPr>
+            <a:spLocks noGrp="1"/>
+          </p:cNvSpPr>
+          <p:nvPr>
+            <p:ph idx="1"/>
+          </p:nvPr>
+        </p:nvSpPr>
+        <p:spPr/>
+        <p:txBody>
+          <a:bodyPr>
+            <a:normAutofit/>
+          </a:bodyPr>
+          <a:lstStyle/>
+          <a:p>
+            <a:r>
+              <a:rPr lang="en-US" dirty="0" smtClean="0"/>
+              <a:t>Creating an App that has following features</a:t>
+            </a:r>
+          </a:p>
+          <a:p>
+            <a:pPr lvl="1"/>
+            <a:r>
+              <a:rPr lang="en-US" dirty="0" smtClean="0"/>
+              <a:t>Picture corresponding to weather data</a:t>
+            </a:r>
+          </a:p>
+          <a:p>
+            <a:pPr lvl="1"/>
+            <a:r>
+              <a:rPr lang="en-US" dirty="0" smtClean="0"/>
+              <a:t>Show temperature, wind , humidity, rain, precipitation</a:t>
+            </a:r>
+          </a:p>
+          <a:p>
+            <a:pPr lvl="1"/>
+            <a:r>
+              <a:rPr lang="en-US" dirty="0" smtClean="0"/>
+              <a:t>Max, Min temp in a day/week</a:t>
+            </a:r>
+          </a:p>
+          <a:p>
+            <a:r>
+              <a:rPr lang="en-US" dirty="0" smtClean="0"/>
+              <a:t>Comparing indoor and outdoor sensors data and coming up with LED patterns to show the differences.</a:t>
+            </a:r>
+          </a:p>
+          <a:p>
+            <a:r>
+              <a:rPr lang="en-US" dirty="0" smtClean="0"/>
+              <a:t>Using </a:t>
+            </a:r>
+            <a:r>
+              <a:rPr lang="en-US" dirty="0" err="1" smtClean="0"/>
+              <a:t>Wifi</a:t>
+            </a:r>
+            <a:r>
+              <a:rPr lang="en-US" dirty="0" smtClean="0"/>
+              <a:t> on Galileo</a:t>
+            </a:r>
+          </a:p>
+          <a:p>
+            <a:r>
+              <a:rPr lang="en-US" dirty="0" smtClean="0"/>
+              <a:t>Get the modules to work for Galileo</a:t>
+            </a:r>
+          </a:p>
+          <a:p>
+            <a:endParaRPr lang="en-US" dirty="0"/>
+          </a:p>
+        </p:txBody>
+      </p:sp>
+    </p:spTree>
+    <p:extLst>
+      <p:ext uri="{BB962C8B-B14F-4D97-AF65-F5344CB8AC3E}">
+        <p14:creationId xmlns:p14="http://schemas.microsoft.com/office/powerpoint/2010/main" val="2640821237"/>
+      </p:ext>
+    </p:extLst>
+  </p:cSld>
+  <p:clrMapOvr>
+    <a:masterClrMapping/>
+  </p:clrMapOvr>
+  <p:timing>
+    <p:tnLst>
+      <p:par>
+        <p:cTn xmlns:p14="http://schemas.microsoft.com/office/powerpoint/2010/main" id="1" dur="indefinite" restart="never" nodeType="tmRoot"/>
+      </p:par>
+    </p:tnLst>
+  </p:timing>
+</p:sld>
+</file>
+
+<file path=ppt/slides/slide24.xml><?xml version="1.0" encoding="utf-8"?>
+<p:sld xmlns:a="http://schemas.openxmlformats.org/drawingml/2006/main" xmlns:r="http://schemas.openxmlformats.org/officeDocument/2006/relationships" xmlns:p="http://schemas.openxmlformats.org/presentationml/2006/main">
+  <p:cSld>
+    <p:spTree>
+      <p:nvGrpSpPr>
+        <p:cNvPr id="1" name=""/>
+        <p:cNvGrpSpPr/>
+        <p:nvPr/>
+      </p:nvGrpSpPr>
+      <p:grpSpPr>
+        <a:xfrm>
+          <a:off x="0" y="0"/>
+          <a:ext cx="0" cy="0"/>
+          <a:chOff x="0" y="0"/>
+          <a:chExt cx="0" cy="0"/>
+        </a:xfrm>
+      </p:grpSpPr>
+      <p:sp>
+        <p:nvSpPr>
+          <p:cNvPr id="2" name="Title 1"/>
+          <p:cNvSpPr>
+            <a:spLocks noGrp="1"/>
+          </p:cNvSpPr>
+          <p:nvPr>
+            <p:ph type="title"/>
+          </p:nvPr>
+        </p:nvSpPr>
+        <p:spPr/>
+        <p:txBody>
+          <a:bodyPr/>
+          <a:lstStyle/>
+          <a:p>
+            <a:r>
+              <a:rPr lang="en-US" dirty="0" smtClean="0"/>
               <a:t>References</a:t>
             </a:r>
             <a:endParaRPr lang="en-US" dirty="0"/>
@@ -12061,7 +13115,7 @@
 </p:sld>
 </file>
 
-<file path=ppt/slides/slide24.xml><?xml version="1.0" encoding="utf-8"?>
+<file path=ppt/slides/slide25.xml><?xml version="1.0" encoding="utf-8"?>
 <p:sld xmlns:a="http://schemas.openxmlformats.org/drawingml/2006/main" xmlns:r="http://schemas.openxmlformats.org/officeDocument/2006/relationships" xmlns:p="http://schemas.openxmlformats.org/presentationml/2006/main">
   <p:cSld>
     <p:spTree>

</xml_diff>

<commit_message>
Updated few slides, added implementation details
</commit_message>
<xml_diff>
--- a/QL_Presentation1.pptx
+++ b/QL_Presentation1.pptx
@@ -5,7 +5,7 @@
     <p:sldMasterId id="2147483660" r:id="rId1"/>
   </p:sldMasterIdLst>
   <p:notesMasterIdLst>
-    <p:notesMasterId r:id="rId27"/>
+    <p:notesMasterId r:id="rId29"/>
   </p:notesMasterIdLst>
   <p:sldIdLst>
     <p:sldId id="256" r:id="rId2"/>
@@ -16,23 +16,25 @@
     <p:sldId id="281" r:id="rId7"/>
     <p:sldId id="268" r:id="rId8"/>
     <p:sldId id="280" r:id="rId9"/>
-    <p:sldId id="277" r:id="rId10"/>
-    <p:sldId id="273" r:id="rId11"/>
-    <p:sldId id="266" r:id="rId12"/>
-    <p:sldId id="267" r:id="rId13"/>
-    <p:sldId id="265" r:id="rId14"/>
-    <p:sldId id="285" r:id="rId15"/>
-    <p:sldId id="286" r:id="rId16"/>
-    <p:sldId id="287" r:id="rId17"/>
-    <p:sldId id="282" r:id="rId18"/>
-    <p:sldId id="283" r:id="rId19"/>
-    <p:sldId id="284" r:id="rId20"/>
-    <p:sldId id="258" r:id="rId21"/>
-    <p:sldId id="259" r:id="rId22"/>
-    <p:sldId id="276" r:id="rId23"/>
-    <p:sldId id="269" r:id="rId24"/>
-    <p:sldId id="270" r:id="rId25"/>
-    <p:sldId id="275" r:id="rId26"/>
+    <p:sldId id="273" r:id="rId10"/>
+    <p:sldId id="266" r:id="rId11"/>
+    <p:sldId id="267" r:id="rId12"/>
+    <p:sldId id="265" r:id="rId13"/>
+    <p:sldId id="285" r:id="rId14"/>
+    <p:sldId id="286" r:id="rId15"/>
+    <p:sldId id="282" r:id="rId16"/>
+    <p:sldId id="283" r:id="rId17"/>
+    <p:sldId id="284" r:id="rId18"/>
+    <p:sldId id="258" r:id="rId19"/>
+    <p:sldId id="259" r:id="rId20"/>
+    <p:sldId id="276" r:id="rId21"/>
+    <p:sldId id="269" r:id="rId22"/>
+    <p:sldId id="270" r:id="rId23"/>
+    <p:sldId id="275" r:id="rId24"/>
+    <p:sldId id="289" r:id="rId25"/>
+    <p:sldId id="287" r:id="rId26"/>
+    <p:sldId id="288" r:id="rId27"/>
+    <p:sldId id="277" r:id="rId28"/>
   </p:sldIdLst>
   <p:sldSz cx="9144000" cy="6858000" type="screen4x3"/>
   <p:notesSz cx="6858000" cy="9144000"/>
@@ -1706,29 +1708,29 @@
     </dgm:pt>
   </dgm:ptLst>
   <dgm:cxnLst>
+    <dgm:cxn modelId="{749D0C21-C11E-6A4E-AC1F-79874F6235F5}" type="presOf" srcId="{A16FE1D5-FDBE-2C4D-90B5-D96F7E9E9B75}" destId="{590EF2DA-D985-BA47-B7F5-D2720ABACD73}" srcOrd="0" destOrd="0" presId="urn:microsoft.com/office/officeart/2005/8/layout/hierarchy1"/>
+    <dgm:cxn modelId="{5B7E06D7-B1DE-6F4D-8DAA-212F4B4E75EB}" type="presOf" srcId="{E0347BEF-C86C-4849-845F-07B8E269DD54}" destId="{620BF8B5-5C40-4449-AE61-18BC564B1BA7}" srcOrd="0" destOrd="0" presId="urn:microsoft.com/office/officeart/2005/8/layout/hierarchy1"/>
+    <dgm:cxn modelId="{094B111E-6122-FE4D-B5C4-521C1DDE7B5A}" srcId="{F604EA65-73D1-954E-A8FE-534013E80908}" destId="{A9C4808A-9065-314D-869C-950B5CB7E289}" srcOrd="2" destOrd="0" parTransId="{26604E32-3ED8-1A4C-9ADA-1EB56BF0D799}" sibTransId="{BAA06BA3-5454-434F-B78E-B6A1E1FFD60C}"/>
+    <dgm:cxn modelId="{43F09173-BB82-D547-AB78-067116574F37}" type="presOf" srcId="{B7E3636F-96A0-E74C-929D-68F911C87D79}" destId="{9D57D76D-EAEE-B640-912A-8397C909ED0A}" srcOrd="0" destOrd="0" presId="urn:microsoft.com/office/officeart/2005/8/layout/hierarchy1"/>
+    <dgm:cxn modelId="{4A4F2CDF-F7C4-5E43-A554-2DBD1C9A471D}" srcId="{BCF40B22-C7EC-404C-94D2-4398C6B29AF7}" destId="{4EE6B9FE-93FE-B948-836B-BB26D0ED9CD5}" srcOrd="1" destOrd="0" parTransId="{0F81557E-325E-CB47-A3E3-A75EA97A8C49}" sibTransId="{A31DF7AE-7974-6544-A428-E5FC669C54E5}"/>
+    <dgm:cxn modelId="{32104F5E-D9AE-5D48-A182-0FC17A656440}" type="presOf" srcId="{04C0799E-C50F-414C-8045-FFEB88FEFA4A}" destId="{E11751C9-D22C-974C-9FC6-B4293E9375D7}" srcOrd="0" destOrd="0" presId="urn:microsoft.com/office/officeart/2005/8/layout/hierarchy1"/>
+    <dgm:cxn modelId="{47CF20D6-C290-6D4D-8170-04E2842810B6}" type="presOf" srcId="{BCF40B22-C7EC-404C-94D2-4398C6B29AF7}" destId="{3D60D745-F8DA-3646-8840-889561662A91}" srcOrd="0" destOrd="0" presId="urn:microsoft.com/office/officeart/2005/8/layout/hierarchy1"/>
+    <dgm:cxn modelId="{F1EC96B6-DF2A-8B45-962D-79378782E2B3}" type="presOf" srcId="{26604E32-3ED8-1A4C-9ADA-1EB56BF0D799}" destId="{D1A7E394-6619-8F4A-BD4C-BE06A5AAA2EF}" srcOrd="0" destOrd="0" presId="urn:microsoft.com/office/officeart/2005/8/layout/hierarchy1"/>
+    <dgm:cxn modelId="{85D02D09-22A7-6E4F-B5EC-C18CF1162DF9}" srcId="{BCF40B22-C7EC-404C-94D2-4398C6B29AF7}" destId="{96A8C5FE-01FE-DE43-B422-E5A0D567CB91}" srcOrd="0" destOrd="0" parTransId="{E0347BEF-C86C-4849-845F-07B8E269DD54}" sibTransId="{707AFEF1-38AF-6A42-AF1A-1FCB653FAD4C}"/>
+    <dgm:cxn modelId="{DD075F70-CE9F-3C4D-A0F5-F0BAEC36B0B3}" type="presOf" srcId="{0F81557E-325E-CB47-A3E3-A75EA97A8C49}" destId="{A28A8720-84CB-4744-95E4-D8D388FCF11A}" srcOrd="0" destOrd="0" presId="urn:microsoft.com/office/officeart/2005/8/layout/hierarchy1"/>
+    <dgm:cxn modelId="{34AA9C2C-F3AC-4749-8EAD-A54CA83AD9A3}" srcId="{BCF40B22-C7EC-404C-94D2-4398C6B29AF7}" destId="{A3721915-87A5-3646-AF33-9B3A1FEA796C}" srcOrd="2" destOrd="0" parTransId="{04C0799E-C50F-414C-8045-FFEB88FEFA4A}" sibTransId="{D39195B5-2096-4341-A954-D5D1A186D8DC}"/>
+    <dgm:cxn modelId="{55D8C59E-D3A5-5D48-AFD7-8B859DFB79E2}" type="presOf" srcId="{A3721915-87A5-3646-AF33-9B3A1FEA796C}" destId="{1EA23272-974B-EC42-8EFD-82C1FAAC5D1A}" srcOrd="0" destOrd="0" presId="urn:microsoft.com/office/officeart/2005/8/layout/hierarchy1"/>
+    <dgm:cxn modelId="{C59995C9-CC75-D34B-B299-C7EB1724A691}" type="presOf" srcId="{97EE45D7-A8EE-E442-842B-B201F88F4711}" destId="{E5AB22EF-411E-3048-94DA-53ADBE0D639F}" srcOrd="0" destOrd="0" presId="urn:microsoft.com/office/officeart/2005/8/layout/hierarchy1"/>
+    <dgm:cxn modelId="{C56BECE2-6062-7347-B9CF-93535C465A88}" type="presOf" srcId="{96A8C5FE-01FE-DE43-B422-E5A0D567CB91}" destId="{E953BFC6-3860-9341-8D3D-88AF6BEFEB72}" srcOrd="0" destOrd="0" presId="urn:microsoft.com/office/officeart/2005/8/layout/hierarchy1"/>
+    <dgm:cxn modelId="{67EA6F78-9762-544D-91F0-DB3EAB06A353}" type="presOf" srcId="{57E2E002-084F-B249-A1AE-8432B453165B}" destId="{0BF4E42F-688A-F044-B96F-3A49E18DBF13}" srcOrd="0" destOrd="0" presId="urn:microsoft.com/office/officeart/2005/8/layout/hierarchy1"/>
+    <dgm:cxn modelId="{22AE856F-48F7-3B46-8632-7813BECF037E}" srcId="{F604EA65-73D1-954E-A8FE-534013E80908}" destId="{0AE97914-583D-A94A-AB2A-BCC5506CF2B8}" srcOrd="0" destOrd="0" parTransId="{A16FE1D5-FDBE-2C4D-90B5-D96F7E9E9B75}" sibTransId="{686A12CA-52A6-3343-8481-1AC0CFF4DCF0}"/>
     <dgm:cxn modelId="{68251984-4631-2244-827D-BA9897BD433B}" srcId="{97EE45D7-A8EE-E442-842B-B201F88F4711}" destId="{BCF40B22-C7EC-404C-94D2-4398C6B29AF7}" srcOrd="1" destOrd="0" parTransId="{0DDC6811-B4A3-3A48-85B2-F546724B5332}" sibTransId="{5298A55F-BDB7-9B44-A782-29184B91A849}"/>
+    <dgm:cxn modelId="{7DB55C90-B513-C94A-B2B1-4D3C460F92AD}" type="presOf" srcId="{4EE6B9FE-93FE-B948-836B-BB26D0ED9CD5}" destId="{81D41B1E-72C8-4D42-ADDE-9C3B1A52E816}" srcOrd="0" destOrd="0" presId="urn:microsoft.com/office/officeart/2005/8/layout/hierarchy1"/>
+    <dgm:cxn modelId="{3092E79D-BA99-F448-AA2B-785D85E56DD4}" srcId="{F604EA65-73D1-954E-A8FE-534013E80908}" destId="{B7E3636F-96A0-E74C-929D-68F911C87D79}" srcOrd="1" destOrd="0" parTransId="{57E2E002-084F-B249-A1AE-8432B453165B}" sibTransId="{20BC55F9-E14A-4F40-AA55-2A6580B8DB38}"/>
+    <dgm:cxn modelId="{1716F1DF-F588-A549-8211-4F25C1286601}" type="presOf" srcId="{F604EA65-73D1-954E-A8FE-534013E80908}" destId="{4F044C4F-D103-3645-A702-541F3D427E00}" srcOrd="0" destOrd="0" presId="urn:microsoft.com/office/officeart/2005/8/layout/hierarchy1"/>
+    <dgm:cxn modelId="{7BC12C14-B2D5-D44C-AD17-6DACA9EF79D1}" type="presOf" srcId="{0AE97914-583D-A94A-AB2A-BCC5506CF2B8}" destId="{90B71D96-D16C-A44D-ADA7-6D2B5C54E7BE}" srcOrd="0" destOrd="0" presId="urn:microsoft.com/office/officeart/2005/8/layout/hierarchy1"/>
+    <dgm:cxn modelId="{F85443C0-9ED4-0D44-9BD2-3E24915B06C6}" srcId="{97EE45D7-A8EE-E442-842B-B201F88F4711}" destId="{F604EA65-73D1-954E-A8FE-534013E80908}" srcOrd="0" destOrd="0" parTransId="{B6880E06-5329-4744-B608-36A1B2408450}" sibTransId="{A4D60EF1-8DD9-B64D-AB53-9A6E5BDC77FC}"/>
     <dgm:cxn modelId="{ABBAF1AB-72D5-CD4C-920E-ED8FD50CF8A0}" type="presOf" srcId="{A9C4808A-9065-314D-869C-950B5CB7E289}" destId="{D6790B64-5B54-934D-BB79-A873EB8D769C}" srcOrd="0" destOrd="0" presId="urn:microsoft.com/office/officeart/2005/8/layout/hierarchy1"/>
-    <dgm:cxn modelId="{43F09173-BB82-D547-AB78-067116574F37}" type="presOf" srcId="{B7E3636F-96A0-E74C-929D-68F911C87D79}" destId="{9D57D76D-EAEE-B640-912A-8397C909ED0A}" srcOrd="0" destOrd="0" presId="urn:microsoft.com/office/officeart/2005/8/layout/hierarchy1"/>
-    <dgm:cxn modelId="{47CF20D6-C290-6D4D-8170-04E2842810B6}" type="presOf" srcId="{BCF40B22-C7EC-404C-94D2-4398C6B29AF7}" destId="{3D60D745-F8DA-3646-8840-889561662A91}" srcOrd="0" destOrd="0" presId="urn:microsoft.com/office/officeart/2005/8/layout/hierarchy1"/>
-    <dgm:cxn modelId="{094B111E-6122-FE4D-B5C4-521C1DDE7B5A}" srcId="{F604EA65-73D1-954E-A8FE-534013E80908}" destId="{A9C4808A-9065-314D-869C-950B5CB7E289}" srcOrd="2" destOrd="0" parTransId="{26604E32-3ED8-1A4C-9ADA-1EB56BF0D799}" sibTransId="{BAA06BA3-5454-434F-B78E-B6A1E1FFD60C}"/>
-    <dgm:cxn modelId="{F85443C0-9ED4-0D44-9BD2-3E24915B06C6}" srcId="{97EE45D7-A8EE-E442-842B-B201F88F4711}" destId="{F604EA65-73D1-954E-A8FE-534013E80908}" srcOrd="0" destOrd="0" parTransId="{B6880E06-5329-4744-B608-36A1B2408450}" sibTransId="{A4D60EF1-8DD9-B64D-AB53-9A6E5BDC77FC}"/>
-    <dgm:cxn modelId="{4A4F2CDF-F7C4-5E43-A554-2DBD1C9A471D}" srcId="{BCF40B22-C7EC-404C-94D2-4398C6B29AF7}" destId="{4EE6B9FE-93FE-B948-836B-BB26D0ED9CD5}" srcOrd="1" destOrd="0" parTransId="{0F81557E-325E-CB47-A3E3-A75EA97A8C49}" sibTransId="{A31DF7AE-7974-6544-A428-E5FC669C54E5}"/>
-    <dgm:cxn modelId="{749D0C21-C11E-6A4E-AC1F-79874F6235F5}" type="presOf" srcId="{A16FE1D5-FDBE-2C4D-90B5-D96F7E9E9B75}" destId="{590EF2DA-D985-BA47-B7F5-D2720ABACD73}" srcOrd="0" destOrd="0" presId="urn:microsoft.com/office/officeart/2005/8/layout/hierarchy1"/>
-    <dgm:cxn modelId="{55D8C59E-D3A5-5D48-AFD7-8B859DFB79E2}" type="presOf" srcId="{A3721915-87A5-3646-AF33-9B3A1FEA796C}" destId="{1EA23272-974B-EC42-8EFD-82C1FAAC5D1A}" srcOrd="0" destOrd="0" presId="urn:microsoft.com/office/officeart/2005/8/layout/hierarchy1"/>
-    <dgm:cxn modelId="{1716F1DF-F588-A549-8211-4F25C1286601}" type="presOf" srcId="{F604EA65-73D1-954E-A8FE-534013E80908}" destId="{4F044C4F-D103-3645-A702-541F3D427E00}" srcOrd="0" destOrd="0" presId="urn:microsoft.com/office/officeart/2005/8/layout/hierarchy1"/>
-    <dgm:cxn modelId="{C56BECE2-6062-7347-B9CF-93535C465A88}" type="presOf" srcId="{96A8C5FE-01FE-DE43-B422-E5A0D567CB91}" destId="{E953BFC6-3860-9341-8D3D-88AF6BEFEB72}" srcOrd="0" destOrd="0" presId="urn:microsoft.com/office/officeart/2005/8/layout/hierarchy1"/>
-    <dgm:cxn modelId="{22AE856F-48F7-3B46-8632-7813BECF037E}" srcId="{F604EA65-73D1-954E-A8FE-534013E80908}" destId="{0AE97914-583D-A94A-AB2A-BCC5506CF2B8}" srcOrd="0" destOrd="0" parTransId="{A16FE1D5-FDBE-2C4D-90B5-D96F7E9E9B75}" sibTransId="{686A12CA-52A6-3343-8481-1AC0CFF4DCF0}"/>
-    <dgm:cxn modelId="{7DB55C90-B513-C94A-B2B1-4D3C460F92AD}" type="presOf" srcId="{4EE6B9FE-93FE-B948-836B-BB26D0ED9CD5}" destId="{81D41B1E-72C8-4D42-ADDE-9C3B1A52E816}" srcOrd="0" destOrd="0" presId="urn:microsoft.com/office/officeart/2005/8/layout/hierarchy1"/>
-    <dgm:cxn modelId="{67EA6F78-9762-544D-91F0-DB3EAB06A353}" type="presOf" srcId="{57E2E002-084F-B249-A1AE-8432B453165B}" destId="{0BF4E42F-688A-F044-B96F-3A49E18DBF13}" srcOrd="0" destOrd="0" presId="urn:microsoft.com/office/officeart/2005/8/layout/hierarchy1"/>
-    <dgm:cxn modelId="{34AA9C2C-F3AC-4749-8EAD-A54CA83AD9A3}" srcId="{BCF40B22-C7EC-404C-94D2-4398C6B29AF7}" destId="{A3721915-87A5-3646-AF33-9B3A1FEA796C}" srcOrd="2" destOrd="0" parTransId="{04C0799E-C50F-414C-8045-FFEB88FEFA4A}" sibTransId="{D39195B5-2096-4341-A954-D5D1A186D8DC}"/>
-    <dgm:cxn modelId="{F1EC96B6-DF2A-8B45-962D-79378782E2B3}" type="presOf" srcId="{26604E32-3ED8-1A4C-9ADA-1EB56BF0D799}" destId="{D1A7E394-6619-8F4A-BD4C-BE06A5AAA2EF}" srcOrd="0" destOrd="0" presId="urn:microsoft.com/office/officeart/2005/8/layout/hierarchy1"/>
-    <dgm:cxn modelId="{32104F5E-D9AE-5D48-A182-0FC17A656440}" type="presOf" srcId="{04C0799E-C50F-414C-8045-FFEB88FEFA4A}" destId="{E11751C9-D22C-974C-9FC6-B4293E9375D7}" srcOrd="0" destOrd="0" presId="urn:microsoft.com/office/officeart/2005/8/layout/hierarchy1"/>
-    <dgm:cxn modelId="{5B7E06D7-B1DE-6F4D-8DAA-212F4B4E75EB}" type="presOf" srcId="{E0347BEF-C86C-4849-845F-07B8E269DD54}" destId="{620BF8B5-5C40-4449-AE61-18BC564B1BA7}" srcOrd="0" destOrd="0" presId="urn:microsoft.com/office/officeart/2005/8/layout/hierarchy1"/>
-    <dgm:cxn modelId="{3092E79D-BA99-F448-AA2B-785D85E56DD4}" srcId="{F604EA65-73D1-954E-A8FE-534013E80908}" destId="{B7E3636F-96A0-E74C-929D-68F911C87D79}" srcOrd="1" destOrd="0" parTransId="{57E2E002-084F-B249-A1AE-8432B453165B}" sibTransId="{20BC55F9-E14A-4F40-AA55-2A6580B8DB38}"/>
-    <dgm:cxn modelId="{C59995C9-CC75-D34B-B299-C7EB1724A691}" type="presOf" srcId="{97EE45D7-A8EE-E442-842B-B201F88F4711}" destId="{E5AB22EF-411E-3048-94DA-53ADBE0D639F}" srcOrd="0" destOrd="0" presId="urn:microsoft.com/office/officeart/2005/8/layout/hierarchy1"/>
-    <dgm:cxn modelId="{DD075F70-CE9F-3C4D-A0F5-F0BAEC36B0B3}" type="presOf" srcId="{0F81557E-325E-CB47-A3E3-A75EA97A8C49}" destId="{A28A8720-84CB-4744-95E4-D8D388FCF11A}" srcOrd="0" destOrd="0" presId="urn:microsoft.com/office/officeart/2005/8/layout/hierarchy1"/>
-    <dgm:cxn modelId="{85D02D09-22A7-6E4F-B5EC-C18CF1162DF9}" srcId="{BCF40B22-C7EC-404C-94D2-4398C6B29AF7}" destId="{96A8C5FE-01FE-DE43-B422-E5A0D567CB91}" srcOrd="0" destOrd="0" parTransId="{E0347BEF-C86C-4849-845F-07B8E269DD54}" sibTransId="{707AFEF1-38AF-6A42-AF1A-1FCB653FAD4C}"/>
-    <dgm:cxn modelId="{7BC12C14-B2D5-D44C-AD17-6DACA9EF79D1}" type="presOf" srcId="{0AE97914-583D-A94A-AB2A-BCC5506CF2B8}" destId="{90B71D96-D16C-A44D-ADA7-6D2B5C54E7BE}" srcOrd="0" destOrd="0" presId="urn:microsoft.com/office/officeart/2005/8/layout/hierarchy1"/>
     <dgm:cxn modelId="{9B6155C7-F650-1A47-8B50-6BEA181B5902}" type="presParOf" srcId="{E5AB22EF-411E-3048-94DA-53ADBE0D639F}" destId="{0107323B-AB6A-DF46-9558-F2A00573E742}" srcOrd="0" destOrd="0" presId="urn:microsoft.com/office/officeart/2005/8/layout/hierarchy1"/>
     <dgm:cxn modelId="{78726C82-9AAF-4B4A-96BC-4456D04A9C02}" type="presParOf" srcId="{0107323B-AB6A-DF46-9558-F2A00573E742}" destId="{2446556B-6860-6343-AFF8-7804F9617D9C}" srcOrd="0" destOrd="0" presId="urn:microsoft.com/office/officeart/2005/8/layout/hierarchy1"/>
     <dgm:cxn modelId="{FBE48C1B-E080-7B42-8DDB-B14AFEC05495}" type="presParOf" srcId="{2446556B-6860-6343-AFF8-7804F9617D9C}" destId="{42A43388-E789-394D-B76A-66E3123703CA}" srcOrd="0" destOrd="0" presId="urn:microsoft.com/office/officeart/2005/8/layout/hierarchy1"/>
@@ -4805,7 +4807,7 @@
           <a:p>
             <a:fld id="{4BE3ACB4-7E95-D64A-ABD7-D9D9C3E05CDD}" type="datetimeFigureOut">
               <a:rPr lang="en-US" smtClean="0"/>
-              <a:t>12/11/13</a:t>
+              <a:t>12/12/13</a:t>
             </a:fld>
             <a:endParaRPr lang="en-US"/>
           </a:p>
@@ -5148,6 +5150,90 @@
     <p:extLst>
       <p:ext uri="{BB962C8B-B14F-4D97-AF65-F5344CB8AC3E}">
         <p14:creationId xmlns:p14="http://schemas.microsoft.com/office/powerpoint/2010/main" val="3602418394"/>
+      </p:ext>
+    </p:extLst>
+  </p:cSld>
+  <p:clrMapOvr>
+    <a:masterClrMapping/>
+  </p:clrMapOvr>
+</p:notes>
+</file>
+
+<file path=ppt/notesSlides/notesSlide2.xml><?xml version="1.0" encoding="utf-8"?>
+<p:notes xmlns:a="http://schemas.openxmlformats.org/drawingml/2006/main" xmlns:r="http://schemas.openxmlformats.org/officeDocument/2006/relationships" xmlns:p="http://schemas.openxmlformats.org/presentationml/2006/main">
+  <p:cSld>
+    <p:spTree>
+      <p:nvGrpSpPr>
+        <p:cNvPr id="1" name=""/>
+        <p:cNvGrpSpPr/>
+        <p:nvPr/>
+      </p:nvGrpSpPr>
+      <p:grpSpPr>
+        <a:xfrm>
+          <a:off x="0" y="0"/>
+          <a:ext cx="0" cy="0"/>
+          <a:chOff x="0" y="0"/>
+          <a:chExt cx="0" cy="0"/>
+        </a:xfrm>
+      </p:grpSpPr>
+      <p:sp>
+        <p:nvSpPr>
+          <p:cNvPr id="2" name="Slide Image Placeholder 1"/>
+          <p:cNvSpPr>
+            <a:spLocks noGrp="1" noRot="1" noChangeAspect="1"/>
+          </p:cNvSpPr>
+          <p:nvPr>
+            <p:ph type="sldImg"/>
+          </p:nvPr>
+        </p:nvSpPr>
+        <p:spPr/>
+      </p:sp>
+      <p:sp>
+        <p:nvSpPr>
+          <p:cNvPr id="3" name="Notes Placeholder 2"/>
+          <p:cNvSpPr>
+            <a:spLocks noGrp="1"/>
+          </p:cNvSpPr>
+          <p:nvPr>
+            <p:ph type="body" idx="1"/>
+          </p:nvPr>
+        </p:nvSpPr>
+        <p:spPr/>
+        <p:txBody>
+          <a:bodyPr/>
+          <a:lstStyle/>
+          <a:p>
+            <a:endParaRPr lang="en-US" dirty="0"/>
+          </a:p>
+        </p:txBody>
+      </p:sp>
+      <p:sp>
+        <p:nvSpPr>
+          <p:cNvPr id="4" name="Slide Number Placeholder 3"/>
+          <p:cNvSpPr>
+            <a:spLocks noGrp="1"/>
+          </p:cNvSpPr>
+          <p:nvPr>
+            <p:ph type="sldNum" sz="quarter" idx="10"/>
+          </p:nvPr>
+        </p:nvSpPr>
+        <p:spPr/>
+        <p:txBody>
+          <a:bodyPr/>
+          <a:lstStyle/>
+          <a:p>
+            <a:fld id="{12EE8BB0-9652-0741-8B58-62F8113235C9}" type="slidenum">
+              <a:rPr lang="en-US" smtClean="0"/>
+              <a:t>20</a:t>
+            </a:fld>
+            <a:endParaRPr lang="en-US"/>
+          </a:p>
+        </p:txBody>
+      </p:sp>
+    </p:spTree>
+    <p:extLst>
+      <p:ext uri="{BB962C8B-B14F-4D97-AF65-F5344CB8AC3E}">
+        <p14:creationId xmlns:p14="http://schemas.microsoft.com/office/powerpoint/2010/main" val="48546827"/>
       </p:ext>
     </p:extLst>
   </p:cSld>
@@ -5376,7 +5462,7 @@
           <a:p>
             <a:fld id="{70FAA508-F0CD-46EA-95FB-26B559A0B5D9}" type="datetimeFigureOut">
               <a:rPr lang="en-US" smtClean="0"/>
-              <a:t>12/11/13</a:t>
+              <a:t>12/12/13</a:t>
             </a:fld>
             <a:endParaRPr lang="en-US"/>
           </a:p>
@@ -5697,7 +5783,7 @@
           <a:p>
             <a:fld id="{70FAA508-F0CD-46EA-95FB-26B559A0B5D9}" type="datetimeFigureOut">
               <a:rPr lang="en-US" smtClean="0"/>
-              <a:t>12/11/13</a:t>
+              <a:t>12/12/13</a:t>
             </a:fld>
             <a:endParaRPr lang="en-US"/>
           </a:p>
@@ -5974,7 +6060,7 @@
           <a:p>
             <a:fld id="{70FAA508-F0CD-46EA-95FB-26B559A0B5D9}" type="datetimeFigureOut">
               <a:rPr lang="en-US" smtClean="0"/>
-              <a:t>12/11/13</a:t>
+              <a:t>12/12/13</a:t>
             </a:fld>
             <a:endParaRPr lang="en-US"/>
           </a:p>
@@ -6268,7 +6354,7 @@
           <a:p>
             <a:fld id="{70FAA508-F0CD-46EA-95FB-26B559A0B5D9}" type="datetimeFigureOut">
               <a:rPr lang="en-US" smtClean="0"/>
-              <a:t>12/11/13</a:t>
+              <a:t>12/12/13</a:t>
             </a:fld>
             <a:endParaRPr lang="en-US"/>
           </a:p>
@@ -6597,7 +6683,7 @@
           <a:p>
             <a:fld id="{70FAA508-F0CD-46EA-95FB-26B559A0B5D9}" type="datetimeFigureOut">
               <a:rPr lang="en-US" smtClean="0"/>
-              <a:t>12/11/13</a:t>
+              <a:t>12/12/13</a:t>
             </a:fld>
             <a:endParaRPr lang="en-US"/>
           </a:p>
@@ -6848,7 +6934,7 @@
           <a:p>
             <a:fld id="{70FAA508-F0CD-46EA-95FB-26B559A0B5D9}" type="datetimeFigureOut">
               <a:rPr lang="en-US" smtClean="0"/>
-              <a:t>12/11/13</a:t>
+              <a:t>12/12/13</a:t>
             </a:fld>
             <a:endParaRPr lang="en-US"/>
           </a:p>
@@ -7027,7 +7113,7 @@
           <a:p>
             <a:fld id="{70FAA508-F0CD-46EA-95FB-26B559A0B5D9}" type="datetimeFigureOut">
               <a:rPr lang="en-US" smtClean="0"/>
-              <a:t>12/11/13</a:t>
+              <a:t>12/12/13</a:t>
             </a:fld>
             <a:endParaRPr lang="en-US"/>
           </a:p>
@@ -7196,7 +7282,7 @@
           <a:p>
             <a:fld id="{70FAA508-F0CD-46EA-95FB-26B559A0B5D9}" type="datetimeFigureOut">
               <a:rPr lang="en-US" smtClean="0"/>
-              <a:t>12/11/13</a:t>
+              <a:t>12/12/13</a:t>
             </a:fld>
             <a:endParaRPr lang="en-US"/>
           </a:p>
@@ -7465,7 +7551,7 @@
           <a:p>
             <a:fld id="{70FAA508-F0CD-46EA-95FB-26B559A0B5D9}" type="datetimeFigureOut">
               <a:rPr lang="en-US" smtClean="0"/>
-              <a:t>12/11/13</a:t>
+              <a:t>12/12/13</a:t>
             </a:fld>
             <a:endParaRPr lang="en-US"/>
           </a:p>
@@ -7772,7 +7858,7 @@
           <a:p>
             <a:fld id="{70FAA508-F0CD-46EA-95FB-26B559A0B5D9}" type="datetimeFigureOut">
               <a:rPr lang="en-US" smtClean="0"/>
-              <a:t>12/11/13</a:t>
+              <a:t>12/12/13</a:t>
             </a:fld>
             <a:endParaRPr lang="en-US"/>
           </a:p>
@@ -8064,7 +8150,7 @@
           <a:p>
             <a:fld id="{70FAA508-F0CD-46EA-95FB-26B559A0B5D9}" type="datetimeFigureOut">
               <a:rPr lang="en-US" smtClean="0"/>
-              <a:t>12/11/13</a:t>
+              <a:t>12/12/13</a:t>
             </a:fld>
             <a:endParaRPr lang="en-US"/>
           </a:p>
@@ -8494,7 +8580,7 @@
           <a:p>
             <a:fld id="{70FAA508-F0CD-46EA-95FB-26B559A0B5D9}" type="datetimeFigureOut">
               <a:rPr lang="en-US" smtClean="0"/>
-              <a:t>12/11/13</a:t>
+              <a:t>12/12/13</a:t>
             </a:fld>
             <a:endParaRPr lang="en-US"/>
           </a:p>
@@ -8840,7 +8926,7 @@
           <a:p>
             <a:fld id="{70FAA508-F0CD-46EA-95FB-26B559A0B5D9}" type="datetimeFigureOut">
               <a:rPr lang="en-US" smtClean="0"/>
-              <a:t>12/11/13</a:t>
+              <a:t>12/12/13</a:t>
             </a:fld>
             <a:endParaRPr lang="en-US"/>
           </a:p>
@@ -8930,7 +9016,7 @@
           <a:p>
             <a:fld id="{70FAA508-F0CD-46EA-95FB-26B559A0B5D9}" type="datetimeFigureOut">
               <a:rPr lang="en-US" smtClean="0"/>
-              <a:t>12/11/13</a:t>
+              <a:t>12/12/13</a:t>
             </a:fld>
             <a:endParaRPr lang="en-US"/>
           </a:p>
@@ -9267,7 +9353,7 @@
           <a:p>
             <a:fld id="{70FAA508-F0CD-46EA-95FB-26B559A0B5D9}" type="datetimeFigureOut">
               <a:rPr lang="en-US" smtClean="0"/>
-              <a:t>12/11/13</a:t>
+              <a:t>12/12/13</a:t>
             </a:fld>
             <a:endParaRPr lang="en-US"/>
           </a:p>
@@ -9479,7 +9565,7 @@
           <a:p>
             <a:fld id="{70FAA508-F0CD-46EA-95FB-26B559A0B5D9}" type="datetimeFigureOut">
               <a:rPr lang="en-US" smtClean="0"/>
-              <a:t>12/11/13</a:t>
+              <a:t>12/12/13</a:t>
             </a:fld>
             <a:endParaRPr lang="en-US"/>
           </a:p>
@@ -10142,128 +10228,12 @@
         </p:nvSpPr>
         <p:spPr/>
         <p:txBody>
-          <a:bodyPr>
-            <a:normAutofit/>
-          </a:bodyPr>
-          <a:lstStyle/>
-          <a:p>
-            <a:r>
-              <a:rPr lang="en-US" dirty="0" smtClean="0"/>
-              <a:t>Results</a:t>
-            </a:r>
-            <a:endParaRPr lang="en-US" dirty="0"/>
-          </a:p>
-        </p:txBody>
-      </p:sp>
-      <p:sp>
-        <p:nvSpPr>
-          <p:cNvPr id="3" name="Content Placeholder 2"/>
-          <p:cNvSpPr>
-            <a:spLocks noGrp="1"/>
-          </p:cNvSpPr>
-          <p:nvPr>
-            <p:ph idx="1"/>
-          </p:nvPr>
-        </p:nvSpPr>
-        <p:spPr/>
-        <p:txBody>
-          <a:bodyPr>
-            <a:normAutofit/>
-          </a:bodyPr>
-          <a:lstStyle/>
-          <a:p>
-            <a:pPr marL="0" indent="0">
-              <a:buNone/>
-            </a:pPr>
-            <a:endParaRPr lang="en-US" sz="2800" dirty="0" smtClean="0"/>
-          </a:p>
-          <a:p>
-            <a:pPr marL="0" indent="0">
-              <a:buNone/>
-            </a:pPr>
-            <a:r>
-              <a:rPr lang="en-US" sz="2800" dirty="0" smtClean="0"/>
-              <a:t>Small </a:t>
-            </a:r>
-            <a:r>
-              <a:rPr lang="en-US" sz="2800" dirty="0"/>
-              <a:t>Video snippet how LED pattern </a:t>
-            </a:r>
-            <a:r>
-              <a:rPr lang="en-US" sz="2800" dirty="0" smtClean="0"/>
-              <a:t>varies based on the input conditions</a:t>
-            </a:r>
-            <a:endParaRPr lang="en-US" sz="2800" dirty="0"/>
-          </a:p>
-        </p:txBody>
-      </p:sp>
-    </p:spTree>
-    <p:extLst>
-      <p:ext uri="{BB962C8B-B14F-4D97-AF65-F5344CB8AC3E}">
-        <p14:creationId xmlns:p14="http://schemas.microsoft.com/office/powerpoint/2010/main" val="3249428159"/>
-      </p:ext>
-    </p:extLst>
-  </p:cSld>
-  <p:clrMapOvr>
-    <a:masterClrMapping/>
-  </p:clrMapOvr>
-  <p:timing>
-    <p:tnLst>
-      <p:par>
-        <p:cTn xmlns:p14="http://schemas.microsoft.com/office/powerpoint/2010/main" id="1" dur="indefinite" restart="never" nodeType="tmRoot"/>
-      </p:par>
-    </p:tnLst>
-  </p:timing>
-</p:sld>
-</file>
-
-<file path=ppt/slides/slide11.xml><?xml version="1.0" encoding="utf-8"?>
-<p:sld xmlns:a="http://schemas.openxmlformats.org/drawingml/2006/main" xmlns:r="http://schemas.openxmlformats.org/officeDocument/2006/relationships" xmlns:p="http://schemas.openxmlformats.org/presentationml/2006/main">
-  <p:cSld>
-    <p:spTree>
-      <p:nvGrpSpPr>
-        <p:cNvPr id="1" name=""/>
-        <p:cNvGrpSpPr/>
-        <p:nvPr/>
-      </p:nvGrpSpPr>
-      <p:grpSpPr>
-        <a:xfrm>
-          <a:off x="0" y="0"/>
-          <a:ext cx="0" cy="0"/>
-          <a:chOff x="0" y="0"/>
-          <a:chExt cx="0" cy="0"/>
-        </a:xfrm>
-      </p:grpSpPr>
-      <p:sp>
-        <p:nvSpPr>
-          <p:cNvPr id="2" name="Title 1"/>
-          <p:cNvSpPr>
-            <a:spLocks noGrp="1"/>
-          </p:cNvSpPr>
-          <p:nvPr>
-            <p:ph type="title"/>
-          </p:nvPr>
-        </p:nvSpPr>
-        <p:spPr/>
-        <p:txBody>
           <a:bodyPr/>
           <a:lstStyle/>
           <a:p>
             <a:r>
               <a:rPr lang="en-US" dirty="0" smtClean="0"/>
-              <a:t>Normal </a:t>
-            </a:r>
-            <a:r>
-              <a:rPr lang="en-US" dirty="0" smtClean="0"/>
-              <a:t>Temp </a:t>
-            </a:r>
-            <a:r>
-              <a:rPr lang="en-US" dirty="0" smtClean="0"/>
-              <a:t>and </a:t>
-            </a:r>
-            <a:r>
-              <a:rPr lang="en-US" dirty="0" smtClean="0"/>
-              <a:t>Less Windy</a:t>
+              <a:t>Normal Temp and Less Windy</a:t>
             </a:r>
             <a:endParaRPr lang="en-US" dirty="0"/>
           </a:p>
@@ -10393,7 +10363,7 @@
 </p:sld>
 </file>
 
-<file path=ppt/slides/slide12.xml><?xml version="1.0" encoding="utf-8"?>
+<file path=ppt/slides/slide11.xml><?xml version="1.0" encoding="utf-8"?>
 <p:sld xmlns:a="http://schemas.openxmlformats.org/drawingml/2006/main" xmlns:r="http://schemas.openxmlformats.org/officeDocument/2006/relationships" xmlns:p="http://schemas.openxmlformats.org/presentationml/2006/main">
   <p:cSld>
     <p:spTree>
@@ -10435,15 +10405,7 @@
             </a:r>
             <a:r>
               <a:rPr lang="en-US" dirty="0" smtClean="0"/>
-              <a:t>emp </a:t>
-            </a:r>
-            <a:r>
-              <a:rPr lang="en-US" dirty="0" smtClean="0"/>
-              <a:t>and </a:t>
-            </a:r>
-            <a:r>
-              <a:rPr lang="en-US" dirty="0" smtClean="0"/>
-              <a:t>No Windy</a:t>
+              <a:t>emp and No Windy</a:t>
             </a:r>
             <a:endParaRPr lang="en-US" dirty="0"/>
           </a:p>
@@ -10573,7 +10535,7 @@
 </p:sld>
 </file>
 
-<file path=ppt/slides/slide13.xml><?xml version="1.0" encoding="utf-8"?>
+<file path=ppt/slides/slide12.xml><?xml version="1.0" encoding="utf-8"?>
 <p:sld xmlns:a="http://schemas.openxmlformats.org/drawingml/2006/main" xmlns:r="http://schemas.openxmlformats.org/officeDocument/2006/relationships" xmlns:p="http://schemas.openxmlformats.org/presentationml/2006/main">
   <p:cSld>
     <p:spTree>
@@ -10607,11 +10569,7 @@
           <a:p>
             <a:r>
               <a:rPr lang="en-US" dirty="0" smtClean="0"/>
-              <a:t>Cold temp and </a:t>
-            </a:r>
-            <a:r>
-              <a:rPr lang="en-US" dirty="0" smtClean="0"/>
-              <a:t>More Windy</a:t>
+              <a:t>Cold temp and More Windy</a:t>
             </a:r>
             <a:endParaRPr lang="en-US" dirty="0"/>
           </a:p>
@@ -10741,7 +10699,7 @@
 </p:sld>
 </file>
 
-<file path=ppt/slides/slide14.xml><?xml version="1.0" encoding="utf-8"?>
+<file path=ppt/slides/slide13.xml><?xml version="1.0" encoding="utf-8"?>
 <p:sld xmlns:a="http://schemas.openxmlformats.org/drawingml/2006/main" xmlns:r="http://schemas.openxmlformats.org/officeDocument/2006/relationships" xmlns:p="http://schemas.openxmlformats.org/presentationml/2006/main">
   <p:cSld>
     <p:spTree>
@@ -10844,7 +10802,7 @@
 </p:sld>
 </file>
 
-<file path=ppt/slides/slide15.xml><?xml version="1.0" encoding="utf-8"?>
+<file path=ppt/slides/slide14.xml><?xml version="1.0" encoding="utf-8"?>
 <p:sld xmlns:a="http://schemas.openxmlformats.org/drawingml/2006/main" xmlns:r="http://schemas.openxmlformats.org/officeDocument/2006/relationships" xmlns:p="http://schemas.openxmlformats.org/presentationml/2006/main">
   <p:cSld>
     <p:spTree>
@@ -10943,7 +10901,6 @@
                         <a:rPr lang="en-US" dirty="0" smtClean="0"/>
                         <a:t>  </a:t>
                       </a:r>
-                      <a:endParaRPr lang="en-US" dirty="0" smtClean="0"/>
                     </a:p>
                     <a:p>
                       <a:pPr marL="0" marR="0" indent="0" algn="l" defTabSz="914400" rtl="0" eaLnBrk="1" fontAlgn="auto" latinLnBrk="0" hangingPunct="1">
@@ -10983,11 +10940,7 @@
                     <a:p>
                       <a:r>
                         <a:rPr lang="en-US" dirty="0" smtClean="0"/>
-                        <a:t>       </a:t>
-                      </a:r>
-                      <a:r>
-                        <a:rPr lang="en-US" dirty="0" smtClean="0"/>
-                        <a:t>CLASSIFICATION</a:t>
+                        <a:t>       CLASSIFICATION</a:t>
                       </a:r>
                       <a:endParaRPr lang="en-US" dirty="0"/>
                     </a:p>
@@ -11003,7 +10956,6 @@
                         <a:rPr lang="en-US" dirty="0" smtClean="0"/>
                         <a:t>    </a:t>
                       </a:r>
-                      <a:endParaRPr lang="en-US" dirty="0" smtClean="0"/>
                     </a:p>
                     <a:p>
                       <a:r>
@@ -11478,7 +11430,1325 @@
 </p:sld>
 </file>
 
+<file path=ppt/slides/slide15.xml><?xml version="1.0" encoding="utf-8"?>
+<p:sld xmlns:a="http://schemas.openxmlformats.org/drawingml/2006/main" xmlns:r="http://schemas.openxmlformats.org/officeDocument/2006/relationships" xmlns:p="http://schemas.openxmlformats.org/presentationml/2006/main">
+  <p:cSld>
+    <p:spTree>
+      <p:nvGrpSpPr>
+        <p:cNvPr id="1" name=""/>
+        <p:cNvGrpSpPr/>
+        <p:nvPr/>
+      </p:nvGrpSpPr>
+      <p:grpSpPr>
+        <a:xfrm>
+          <a:off x="0" y="0"/>
+          <a:ext cx="0" cy="0"/>
+          <a:chOff x="0" y="0"/>
+          <a:chExt cx="0" cy="0"/>
+        </a:xfrm>
+      </p:grpSpPr>
+      <p:sp>
+        <p:nvSpPr>
+          <p:cNvPr id="2" name="Title 1"/>
+          <p:cNvSpPr>
+            <a:spLocks noGrp="1"/>
+          </p:cNvSpPr>
+          <p:nvPr>
+            <p:ph type="title"/>
+          </p:nvPr>
+        </p:nvSpPr>
+        <p:spPr>
+          <a:xfrm>
+            <a:off x="0" y="209456"/>
+            <a:ext cx="8913813" cy="914400"/>
+          </a:xfrm>
+        </p:spPr>
+        <p:txBody>
+          <a:bodyPr/>
+          <a:lstStyle/>
+          <a:p>
+            <a:r>
+              <a:rPr lang="en-US" dirty="0" smtClean="0"/>
+              <a:t>Graphs – Temp Vs Time</a:t>
+            </a:r>
+            <a:endParaRPr lang="en-US" dirty="0"/>
+          </a:p>
+        </p:txBody>
+      </p:sp>
+      <p:pic>
+        <p:nvPicPr>
+          <p:cNvPr id="1027" name="Picture 3" descr="C:\Users\betcy\Desktop\t1.jpg"/>
+          <p:cNvPicPr>
+            <a:picLocks noGrp="1" noChangeAspect="1" noChangeArrowheads="1"/>
+          </p:cNvPicPr>
+          <p:nvPr>
+            <p:ph idx="1"/>
+          </p:nvPr>
+        </p:nvPicPr>
+        <p:blipFill>
+          <a:blip r:embed="rId2" cstate="print"/>
+          <a:srcRect/>
+          <a:stretch>
+            <a:fillRect/>
+          </a:stretch>
+        </p:blipFill>
+        <p:spPr bwMode="auto">
+          <a:xfrm>
+            <a:off x="862884" y="1389051"/>
+            <a:ext cx="7508383" cy="5153417"/>
+          </a:xfrm>
+          <a:prstGeom prst="rect">
+            <a:avLst/>
+          </a:prstGeom>
+          <a:noFill/>
+        </p:spPr>
+      </p:pic>
+    </p:spTree>
+    <p:extLst>
+      <p:ext uri="{BB962C8B-B14F-4D97-AF65-F5344CB8AC3E}">
+        <p14:creationId xmlns:p14="http://schemas.microsoft.com/office/powerpoint/2010/main" val="2177146048"/>
+      </p:ext>
+    </p:extLst>
+  </p:cSld>
+  <p:clrMapOvr>
+    <a:masterClrMapping/>
+  </p:clrMapOvr>
+  <p:timing>
+    <p:tnLst>
+      <p:par>
+        <p:cTn xmlns:p14="http://schemas.microsoft.com/office/powerpoint/2010/main" id="1" dur="indefinite" restart="never" nodeType="tmRoot"/>
+      </p:par>
+    </p:tnLst>
+  </p:timing>
+</p:sld>
+</file>
+
 <file path=ppt/slides/slide16.xml><?xml version="1.0" encoding="utf-8"?>
+<p:sld xmlns:a="http://schemas.openxmlformats.org/drawingml/2006/main" xmlns:r="http://schemas.openxmlformats.org/officeDocument/2006/relationships" xmlns:p="http://schemas.openxmlformats.org/presentationml/2006/main">
+  <p:cSld>
+    <p:spTree>
+      <p:nvGrpSpPr>
+        <p:cNvPr id="1" name=""/>
+        <p:cNvGrpSpPr/>
+        <p:nvPr/>
+      </p:nvGrpSpPr>
+      <p:grpSpPr>
+        <a:xfrm>
+          <a:off x="0" y="0"/>
+          <a:ext cx="0" cy="0"/>
+          <a:chOff x="0" y="0"/>
+          <a:chExt cx="0" cy="0"/>
+        </a:xfrm>
+      </p:grpSpPr>
+      <p:sp>
+        <p:nvSpPr>
+          <p:cNvPr id="2" name="Title 1"/>
+          <p:cNvSpPr>
+            <a:spLocks noGrp="1"/>
+          </p:cNvSpPr>
+          <p:nvPr>
+            <p:ph type="title"/>
+          </p:nvPr>
+        </p:nvSpPr>
+        <p:spPr>
+          <a:xfrm>
+            <a:off x="0" y="209456"/>
+            <a:ext cx="8913813" cy="914400"/>
+          </a:xfrm>
+        </p:spPr>
+        <p:txBody>
+          <a:bodyPr/>
+          <a:lstStyle/>
+          <a:p>
+            <a:r>
+              <a:rPr lang="en-US" dirty="0" err="1" smtClean="0"/>
+              <a:t>WindSpeed</a:t>
+            </a:r>
+            <a:r>
+              <a:rPr lang="en-US" dirty="0" smtClean="0"/>
+              <a:t> Vs Time</a:t>
+            </a:r>
+            <a:endParaRPr lang="en-IN" dirty="0"/>
+          </a:p>
+        </p:txBody>
+      </p:sp>
+      <p:pic>
+        <p:nvPicPr>
+          <p:cNvPr id="2050" name="Picture 2" descr="C:\Psu\QL\final\wt.jpg"/>
+          <p:cNvPicPr>
+            <a:picLocks noGrp="1" noChangeAspect="1" noChangeArrowheads="1"/>
+          </p:cNvPicPr>
+          <p:nvPr>
+            <p:ph idx="1"/>
+          </p:nvPr>
+        </p:nvPicPr>
+        <p:blipFill>
+          <a:blip r:embed="rId2" cstate="print"/>
+          <a:srcRect/>
+          <a:stretch>
+            <a:fillRect/>
+          </a:stretch>
+        </p:blipFill>
+        <p:spPr bwMode="auto">
+          <a:xfrm>
+            <a:off x="837127" y="1380170"/>
+            <a:ext cx="7392473" cy="5175176"/>
+          </a:xfrm>
+          <a:prstGeom prst="rect">
+            <a:avLst/>
+          </a:prstGeom>
+          <a:noFill/>
+        </p:spPr>
+      </p:pic>
+    </p:spTree>
+    <p:extLst>
+      <p:ext uri="{BB962C8B-B14F-4D97-AF65-F5344CB8AC3E}">
+        <p14:creationId xmlns:p14="http://schemas.microsoft.com/office/powerpoint/2010/main" val="4059595715"/>
+      </p:ext>
+    </p:extLst>
+  </p:cSld>
+  <p:clrMapOvr>
+    <a:masterClrMapping/>
+  </p:clrMapOvr>
+  <p:timing>
+    <p:tnLst>
+      <p:par>
+        <p:cTn xmlns:p14="http://schemas.microsoft.com/office/powerpoint/2010/main" id="1" dur="indefinite" restart="never" nodeType="tmRoot"/>
+      </p:par>
+    </p:tnLst>
+  </p:timing>
+</p:sld>
+</file>
+
+<file path=ppt/slides/slide17.xml><?xml version="1.0" encoding="utf-8"?>
+<p:sld xmlns:a="http://schemas.openxmlformats.org/drawingml/2006/main" xmlns:r="http://schemas.openxmlformats.org/officeDocument/2006/relationships" xmlns:p="http://schemas.openxmlformats.org/presentationml/2006/main">
+  <p:cSld>
+    <p:spTree>
+      <p:nvGrpSpPr>
+        <p:cNvPr id="1" name=""/>
+        <p:cNvGrpSpPr/>
+        <p:nvPr/>
+      </p:nvGrpSpPr>
+      <p:grpSpPr>
+        <a:xfrm>
+          <a:off x="0" y="0"/>
+          <a:ext cx="0" cy="0"/>
+          <a:chOff x="0" y="0"/>
+          <a:chExt cx="0" cy="0"/>
+        </a:xfrm>
+      </p:grpSpPr>
+      <p:sp>
+        <p:nvSpPr>
+          <p:cNvPr id="2" name="Title 1"/>
+          <p:cNvSpPr>
+            <a:spLocks noGrp="1"/>
+          </p:cNvSpPr>
+          <p:nvPr>
+            <p:ph type="title"/>
+          </p:nvPr>
+        </p:nvSpPr>
+        <p:spPr>
+          <a:xfrm>
+            <a:off x="0" y="209456"/>
+            <a:ext cx="8913813" cy="914400"/>
+          </a:xfrm>
+        </p:spPr>
+        <p:txBody>
+          <a:bodyPr/>
+          <a:lstStyle/>
+          <a:p>
+            <a:r>
+              <a:rPr lang="en-US" dirty="0" smtClean="0"/>
+              <a:t>Temp/</a:t>
+            </a:r>
+            <a:r>
+              <a:rPr lang="en-US" dirty="0" err="1" smtClean="0"/>
+              <a:t>WindSpeed</a:t>
+            </a:r>
+            <a:r>
+              <a:rPr lang="en-US" dirty="0" smtClean="0"/>
+              <a:t> Vs Time</a:t>
+            </a:r>
+            <a:endParaRPr lang="en-IN" dirty="0"/>
+          </a:p>
+        </p:txBody>
+      </p:sp>
+      <p:sp>
+        <p:nvSpPr>
+          <p:cNvPr id="3" name="Content Placeholder 2"/>
+          <p:cNvSpPr>
+            <a:spLocks noGrp="1"/>
+          </p:cNvSpPr>
+          <p:nvPr>
+            <p:ph idx="1"/>
+          </p:nvPr>
+        </p:nvSpPr>
+        <p:spPr/>
+        <p:txBody>
+          <a:bodyPr/>
+          <a:lstStyle/>
+          <a:p>
+            <a:endParaRPr lang="en-IN"/>
+          </a:p>
+        </p:txBody>
+      </p:sp>
+      <p:pic>
+        <p:nvPicPr>
+          <p:cNvPr id="3074" name="Picture 2" descr="C:\Users\betcy\Desktop\twt.jpg"/>
+          <p:cNvPicPr>
+            <a:picLocks noChangeAspect="1" noChangeArrowheads="1"/>
+          </p:cNvPicPr>
+          <p:nvPr/>
+        </p:nvPicPr>
+        <p:blipFill>
+          <a:blip r:embed="rId2" cstate="print"/>
+          <a:srcRect/>
+          <a:stretch>
+            <a:fillRect/>
+          </a:stretch>
+        </p:blipFill>
+        <p:spPr bwMode="auto">
+          <a:xfrm>
+            <a:off x="505566" y="1371734"/>
+            <a:ext cx="8213434" cy="5267325"/>
+          </a:xfrm>
+          <a:prstGeom prst="rect">
+            <a:avLst/>
+          </a:prstGeom>
+          <a:noFill/>
+        </p:spPr>
+      </p:pic>
+    </p:spTree>
+    <p:extLst>
+      <p:ext uri="{BB962C8B-B14F-4D97-AF65-F5344CB8AC3E}">
+        <p14:creationId xmlns:p14="http://schemas.microsoft.com/office/powerpoint/2010/main" val="397124458"/>
+      </p:ext>
+    </p:extLst>
+  </p:cSld>
+  <p:clrMapOvr>
+    <a:masterClrMapping/>
+  </p:clrMapOvr>
+  <p:timing>
+    <p:tnLst>
+      <p:par>
+        <p:cTn xmlns:p14="http://schemas.microsoft.com/office/powerpoint/2010/main" id="1" dur="indefinite" restart="never" nodeType="tmRoot"/>
+      </p:par>
+    </p:tnLst>
+  </p:timing>
+</p:sld>
+</file>
+
+<file path=ppt/slides/slide18.xml><?xml version="1.0" encoding="utf-8"?>
+<p:sld xmlns:a="http://schemas.openxmlformats.org/drawingml/2006/main" xmlns:r="http://schemas.openxmlformats.org/officeDocument/2006/relationships" xmlns:p="http://schemas.openxmlformats.org/presentationml/2006/main">
+  <p:cSld>
+    <p:spTree>
+      <p:nvGrpSpPr>
+        <p:cNvPr id="1" name=""/>
+        <p:cNvGrpSpPr/>
+        <p:nvPr/>
+      </p:nvGrpSpPr>
+      <p:grpSpPr>
+        <a:xfrm>
+          <a:off x="0" y="0"/>
+          <a:ext cx="0" cy="0"/>
+          <a:chOff x="0" y="0"/>
+          <a:chExt cx="0" cy="0"/>
+        </a:xfrm>
+      </p:grpSpPr>
+      <p:sp>
+        <p:nvSpPr>
+          <p:cNvPr id="2" name="Title 1"/>
+          <p:cNvSpPr>
+            <a:spLocks noGrp="1"/>
+          </p:cNvSpPr>
+          <p:nvPr>
+            <p:ph type="title"/>
+          </p:nvPr>
+        </p:nvSpPr>
+        <p:spPr/>
+        <p:txBody>
+          <a:bodyPr/>
+          <a:lstStyle/>
+          <a:p>
+            <a:r>
+              <a:rPr lang="en-US" dirty="0" smtClean="0"/>
+              <a:t>COMPONENTS USED</a:t>
+            </a:r>
+            <a:endParaRPr lang="en-US" dirty="0"/>
+          </a:p>
+        </p:txBody>
+      </p:sp>
+      <p:sp>
+        <p:nvSpPr>
+          <p:cNvPr id="3" name="Content Placeholder 2"/>
+          <p:cNvSpPr>
+            <a:spLocks noGrp="1"/>
+          </p:cNvSpPr>
+          <p:nvPr>
+            <p:ph idx="1"/>
+          </p:nvPr>
+        </p:nvSpPr>
+        <p:spPr/>
+        <p:txBody>
+          <a:bodyPr>
+            <a:normAutofit lnSpcReduction="10000"/>
+          </a:bodyPr>
+          <a:lstStyle/>
+          <a:p>
+            <a:r>
+              <a:rPr lang="en-US" dirty="0" smtClean="0"/>
+              <a:t>ARDUINO board</a:t>
+            </a:r>
+          </a:p>
+          <a:p>
+            <a:r>
+              <a:rPr lang="en-US" dirty="0" err="1"/>
+              <a:t>NeoPixel</a:t>
+            </a:r>
+            <a:r>
+              <a:rPr lang="en-US" dirty="0"/>
+              <a:t> digital RGB LED Strip</a:t>
+            </a:r>
+          </a:p>
+          <a:p>
+            <a:pPr marL="0" indent="0">
+              <a:buNone/>
+            </a:pPr>
+            <a:r>
+              <a:rPr lang="en-US" dirty="0"/>
+              <a:t>       </a:t>
+            </a:r>
+            <a:r>
+              <a:rPr lang="en-US" dirty="0">
+                <a:hlinkClick r:id="rId2"/>
+              </a:rPr>
+              <a:t>http://www.adafruit.com/products/1138</a:t>
+            </a:r>
+            <a:r>
+              <a:rPr lang="en-US" dirty="0"/>
+              <a:t> </a:t>
+            </a:r>
+            <a:endParaRPr lang="en-US" dirty="0" smtClean="0"/>
+          </a:p>
+          <a:p>
+            <a:r>
+              <a:rPr lang="en-US" dirty="0"/>
+              <a:t>Temperature Sensors(DS18B20)</a:t>
+            </a:r>
+          </a:p>
+          <a:p>
+            <a:pPr marL="0" indent="0">
+              <a:buNone/>
+            </a:pPr>
+            <a:r>
+              <a:rPr lang="en-US" dirty="0"/>
+              <a:t>       http://</a:t>
+            </a:r>
+            <a:r>
+              <a:rPr lang="en-US" dirty="0" err="1"/>
+              <a:t>www.adafruit.com</a:t>
+            </a:r>
+            <a:r>
+              <a:rPr lang="en-US" dirty="0"/>
+              <a:t>/products/</a:t>
+            </a:r>
+            <a:r>
+              <a:rPr lang="en-US" dirty="0" smtClean="0"/>
+              <a:t>374</a:t>
+            </a:r>
+          </a:p>
+          <a:p>
+            <a:r>
+              <a:rPr lang="en-US" dirty="0" smtClean="0"/>
+              <a:t>Resistors</a:t>
+            </a:r>
+          </a:p>
+          <a:p>
+            <a:r>
+              <a:rPr lang="en-US" dirty="0" smtClean="0"/>
+              <a:t>Jumper wires</a:t>
+            </a:r>
+          </a:p>
+          <a:p>
+            <a:pPr marL="0" indent="0">
+              <a:buNone/>
+            </a:pPr>
+            <a:endParaRPr lang="en-US" dirty="0" smtClean="0"/>
+          </a:p>
+          <a:p>
+            <a:pPr marL="0" indent="0">
+              <a:buNone/>
+            </a:pPr>
+            <a:endParaRPr lang="en-US" dirty="0" smtClean="0"/>
+          </a:p>
+          <a:p>
+            <a:pPr marL="0" indent="0">
+              <a:buNone/>
+            </a:pPr>
+            <a:endParaRPr lang="en-US" dirty="0"/>
+          </a:p>
+          <a:p>
+            <a:pPr marL="0" indent="0">
+              <a:buNone/>
+            </a:pPr>
+            <a:endParaRPr lang="en-US" dirty="0"/>
+          </a:p>
+          <a:p>
+            <a:pPr marL="0" indent="0">
+              <a:buNone/>
+            </a:pPr>
+            <a:endParaRPr lang="en-US" dirty="0" smtClean="0"/>
+          </a:p>
+          <a:p>
+            <a:pPr marL="0" indent="0">
+              <a:buNone/>
+            </a:pPr>
+            <a:endParaRPr lang="en-US" dirty="0" smtClean="0"/>
+          </a:p>
+          <a:p>
+            <a:endParaRPr lang="en-US" dirty="0" smtClean="0"/>
+          </a:p>
+          <a:p>
+            <a:endParaRPr lang="en-US" dirty="0"/>
+          </a:p>
+        </p:txBody>
+      </p:sp>
+    </p:spTree>
+    <p:extLst>
+      <p:ext uri="{BB962C8B-B14F-4D97-AF65-F5344CB8AC3E}">
+        <p14:creationId xmlns:p14="http://schemas.microsoft.com/office/powerpoint/2010/main" val="1986240947"/>
+      </p:ext>
+    </p:extLst>
+  </p:cSld>
+  <p:clrMapOvr>
+    <a:masterClrMapping/>
+  </p:clrMapOvr>
+  <p:timing>
+    <p:tnLst>
+      <p:par>
+        <p:cTn xmlns:p14="http://schemas.microsoft.com/office/powerpoint/2010/main" id="1" dur="indefinite" restart="never" nodeType="tmRoot"/>
+      </p:par>
+    </p:tnLst>
+  </p:timing>
+</p:sld>
+</file>
+
+<file path=ppt/slides/slide19.xml><?xml version="1.0" encoding="utf-8"?>
+<p:sld xmlns:a="http://schemas.openxmlformats.org/drawingml/2006/main" xmlns:r="http://schemas.openxmlformats.org/officeDocument/2006/relationships" xmlns:p="http://schemas.openxmlformats.org/presentationml/2006/main">
+  <p:cSld>
+    <p:spTree>
+      <p:nvGrpSpPr>
+        <p:cNvPr id="1" name=""/>
+        <p:cNvGrpSpPr/>
+        <p:nvPr/>
+      </p:nvGrpSpPr>
+      <p:grpSpPr>
+        <a:xfrm>
+          <a:off x="0" y="0"/>
+          <a:ext cx="0" cy="0"/>
+          <a:chOff x="0" y="0"/>
+          <a:chExt cx="0" cy="0"/>
+        </a:xfrm>
+      </p:grpSpPr>
+      <p:sp>
+        <p:nvSpPr>
+          <p:cNvPr id="2" name="Title 1"/>
+          <p:cNvSpPr>
+            <a:spLocks noGrp="1"/>
+          </p:cNvSpPr>
+          <p:nvPr>
+            <p:ph type="title"/>
+          </p:nvPr>
+        </p:nvSpPr>
+        <p:spPr/>
+        <p:txBody>
+          <a:bodyPr/>
+          <a:lstStyle/>
+          <a:p>
+            <a:r>
+              <a:rPr lang="en-US" dirty="0" smtClean="0"/>
+              <a:t>LIBRARY USED</a:t>
+            </a:r>
+            <a:endParaRPr lang="en-US" dirty="0"/>
+          </a:p>
+        </p:txBody>
+      </p:sp>
+      <p:sp>
+        <p:nvSpPr>
+          <p:cNvPr id="3" name="Content Placeholder 2"/>
+          <p:cNvSpPr>
+            <a:spLocks noGrp="1"/>
+          </p:cNvSpPr>
+          <p:nvPr>
+            <p:ph idx="1"/>
+          </p:nvPr>
+        </p:nvSpPr>
+        <p:spPr/>
+        <p:txBody>
+          <a:bodyPr>
+            <a:normAutofit lnSpcReduction="10000"/>
+          </a:bodyPr>
+          <a:lstStyle/>
+          <a:p>
+            <a:r>
+              <a:rPr lang="en-US" dirty="0" smtClean="0"/>
+              <a:t>Weather API (</a:t>
+            </a:r>
+            <a:r>
+              <a:rPr lang="en-US" dirty="0" err="1" smtClean="0"/>
+              <a:t>pywapi</a:t>
+            </a:r>
+            <a:r>
+              <a:rPr lang="en-US" dirty="0" smtClean="0"/>
+              <a:t>)</a:t>
+            </a:r>
+          </a:p>
+          <a:p>
+            <a:pPr lvl="1"/>
+            <a:r>
+              <a:rPr lang="en-US" dirty="0" smtClean="0"/>
+              <a:t>To get weather data from online</a:t>
+            </a:r>
+          </a:p>
+          <a:p>
+            <a:r>
+              <a:rPr lang="en-US" dirty="0" smtClean="0"/>
+              <a:t>Serial</a:t>
+            </a:r>
+          </a:p>
+          <a:p>
+            <a:pPr lvl="1"/>
+            <a:r>
+              <a:rPr lang="en-US" dirty="0" smtClean="0"/>
+              <a:t>Python module to Communicate between computer and Arduino via serial port</a:t>
+            </a:r>
+          </a:p>
+          <a:p>
+            <a:r>
+              <a:rPr lang="en-US" dirty="0" err="1" smtClean="0"/>
+              <a:t>Onewire</a:t>
+            </a:r>
+            <a:r>
+              <a:rPr lang="en-US" dirty="0" smtClean="0"/>
+              <a:t>	</a:t>
+            </a:r>
+          </a:p>
+          <a:p>
+            <a:pPr lvl="1"/>
+            <a:r>
+              <a:rPr lang="en-US" dirty="0" smtClean="0"/>
+              <a:t>To get temperature data using indoor sensors</a:t>
+            </a:r>
+          </a:p>
+          <a:p>
+            <a:r>
+              <a:rPr lang="en-US" dirty="0" err="1" smtClean="0"/>
+              <a:t>Adafruit_NeoPixel</a:t>
+            </a:r>
+            <a:endParaRPr lang="en-US" dirty="0" smtClean="0"/>
+          </a:p>
+          <a:p>
+            <a:pPr lvl="1"/>
+            <a:r>
+              <a:rPr lang="en-US" dirty="0" smtClean="0"/>
+              <a:t>To light led patterns using led strip</a:t>
+            </a:r>
+          </a:p>
+          <a:p>
+            <a:pPr lvl="1"/>
+            <a:endParaRPr lang="en-US" dirty="0"/>
+          </a:p>
+        </p:txBody>
+      </p:sp>
+    </p:spTree>
+    <p:extLst>
+      <p:ext uri="{BB962C8B-B14F-4D97-AF65-F5344CB8AC3E}">
+        <p14:creationId xmlns:p14="http://schemas.microsoft.com/office/powerpoint/2010/main" val="2796827819"/>
+      </p:ext>
+    </p:extLst>
+  </p:cSld>
+  <p:clrMapOvr>
+    <a:masterClrMapping/>
+  </p:clrMapOvr>
+  <p:timing>
+    <p:tnLst>
+      <p:par>
+        <p:cTn xmlns:p14="http://schemas.microsoft.com/office/powerpoint/2010/main" id="1" dur="indefinite" restart="never" nodeType="tmRoot"/>
+      </p:par>
+    </p:tnLst>
+  </p:timing>
+</p:sld>
+</file>
+
+<file path=ppt/slides/slide2.xml><?xml version="1.0" encoding="utf-8"?>
+<p:sld xmlns:a="http://schemas.openxmlformats.org/drawingml/2006/main" xmlns:r="http://schemas.openxmlformats.org/officeDocument/2006/relationships" xmlns:p="http://schemas.openxmlformats.org/presentationml/2006/main">
+  <p:cSld>
+    <p:spTree>
+      <p:nvGrpSpPr>
+        <p:cNvPr id="1" name=""/>
+        <p:cNvGrpSpPr/>
+        <p:nvPr/>
+      </p:nvGrpSpPr>
+      <p:grpSpPr>
+        <a:xfrm>
+          <a:off x="0" y="0"/>
+          <a:ext cx="0" cy="0"/>
+          <a:chOff x="0" y="0"/>
+          <a:chExt cx="0" cy="0"/>
+        </a:xfrm>
+      </p:grpSpPr>
+      <p:sp>
+        <p:nvSpPr>
+          <p:cNvPr id="2" name="Title 1"/>
+          <p:cNvSpPr>
+            <a:spLocks noGrp="1"/>
+          </p:cNvSpPr>
+          <p:nvPr>
+            <p:ph type="title"/>
+          </p:nvPr>
+        </p:nvSpPr>
+        <p:spPr/>
+        <p:txBody>
+          <a:bodyPr/>
+          <a:lstStyle/>
+          <a:p>
+            <a:r>
+              <a:rPr lang="en-US" dirty="0" smtClean="0"/>
+              <a:t>Project focus:</a:t>
+            </a:r>
+            <a:endParaRPr lang="en-US" dirty="0"/>
+          </a:p>
+        </p:txBody>
+      </p:sp>
+      <p:sp>
+        <p:nvSpPr>
+          <p:cNvPr id="3" name="Content Placeholder 2"/>
+          <p:cNvSpPr>
+            <a:spLocks noGrp="1"/>
+          </p:cNvSpPr>
+          <p:nvPr>
+            <p:ph idx="1"/>
+          </p:nvPr>
+        </p:nvSpPr>
+        <p:spPr/>
+        <p:txBody>
+          <a:bodyPr/>
+          <a:lstStyle/>
+          <a:p>
+            <a:pPr marL="0" indent="0">
+              <a:buNone/>
+            </a:pPr>
+            <a:endParaRPr lang="en-US" dirty="0"/>
+          </a:p>
+          <a:p>
+            <a:pPr marL="0" indent="0">
+              <a:buNone/>
+            </a:pPr>
+            <a:r>
+              <a:rPr lang="en-US" sz="2400" dirty="0" smtClean="0"/>
+              <a:t>Quantifying the input data and displaying various LED patterns based on quantification.</a:t>
+            </a:r>
+          </a:p>
+          <a:p>
+            <a:pPr lvl="4"/>
+            <a:r>
+              <a:rPr lang="en-US" sz="2200" dirty="0" smtClean="0"/>
+              <a:t>Quantifying Weather data</a:t>
+            </a:r>
+            <a:endParaRPr lang="en-US" sz="2200" dirty="0"/>
+          </a:p>
+        </p:txBody>
+      </p:sp>
+    </p:spTree>
+    <p:extLst>
+      <p:ext uri="{BB962C8B-B14F-4D97-AF65-F5344CB8AC3E}">
+        <p14:creationId xmlns:p14="http://schemas.microsoft.com/office/powerpoint/2010/main" val="2830858962"/>
+      </p:ext>
+    </p:extLst>
+  </p:cSld>
+  <p:clrMapOvr>
+    <a:masterClrMapping/>
+  </p:clrMapOvr>
+  <p:timing>
+    <p:tnLst>
+      <p:par>
+        <p:cTn xmlns:p14="http://schemas.microsoft.com/office/powerpoint/2010/main" id="1" dur="indefinite" restart="never" nodeType="tmRoot"/>
+      </p:par>
+    </p:tnLst>
+  </p:timing>
+</p:sld>
+</file>
+
+<file path=ppt/slides/slide20.xml><?xml version="1.0" encoding="utf-8"?>
+<p:sld xmlns:a="http://schemas.openxmlformats.org/drawingml/2006/main" xmlns:r="http://schemas.openxmlformats.org/officeDocument/2006/relationships" xmlns:p="http://schemas.openxmlformats.org/presentationml/2006/main">
+  <p:cSld>
+    <p:spTree>
+      <p:nvGrpSpPr>
+        <p:cNvPr id="1" name=""/>
+        <p:cNvGrpSpPr/>
+        <p:nvPr/>
+      </p:nvGrpSpPr>
+      <p:grpSpPr>
+        <a:xfrm>
+          <a:off x="0" y="0"/>
+          <a:ext cx="0" cy="0"/>
+          <a:chOff x="0" y="0"/>
+          <a:chExt cx="0" cy="0"/>
+        </a:xfrm>
+      </p:grpSpPr>
+      <p:sp>
+        <p:nvSpPr>
+          <p:cNvPr id="2" name="Title 1"/>
+          <p:cNvSpPr>
+            <a:spLocks noGrp="1"/>
+          </p:cNvSpPr>
+          <p:nvPr>
+            <p:ph type="title"/>
+          </p:nvPr>
+        </p:nvSpPr>
+        <p:spPr/>
+        <p:txBody>
+          <a:bodyPr/>
+          <a:lstStyle/>
+          <a:p>
+            <a:r>
+              <a:rPr lang="en-US" dirty="0" smtClean="0"/>
+              <a:t>Challenges</a:t>
+            </a:r>
+            <a:endParaRPr lang="en-US" dirty="0"/>
+          </a:p>
+        </p:txBody>
+      </p:sp>
+      <p:sp>
+        <p:nvSpPr>
+          <p:cNvPr id="3" name="Content Placeholder 2"/>
+          <p:cNvSpPr>
+            <a:spLocks noGrp="1"/>
+          </p:cNvSpPr>
+          <p:nvPr>
+            <p:ph idx="1"/>
+          </p:nvPr>
+        </p:nvSpPr>
+        <p:spPr/>
+        <p:txBody>
+          <a:bodyPr/>
+          <a:lstStyle/>
+          <a:p>
+            <a:r>
+              <a:rPr lang="en-US" dirty="0" smtClean="0"/>
+              <a:t>Making one Arduino sketch to work for both sensor sketch and LED displaying sketch.</a:t>
+            </a:r>
+          </a:p>
+          <a:p>
+            <a:r>
+              <a:rPr lang="en-US" dirty="0" smtClean="0"/>
+              <a:t>Problems with loops every where: Changing LED patterns automatically based on current temperature.</a:t>
+            </a:r>
+          </a:p>
+          <a:p>
+            <a:pPr marL="0" indent="0">
+              <a:buNone/>
+            </a:pPr>
+            <a:endParaRPr lang="en-US" dirty="0" smtClean="0"/>
+          </a:p>
+          <a:p>
+            <a:endParaRPr lang="en-US" dirty="0"/>
+          </a:p>
+        </p:txBody>
+      </p:sp>
+    </p:spTree>
+    <p:extLst>
+      <p:ext uri="{BB962C8B-B14F-4D97-AF65-F5344CB8AC3E}">
+        <p14:creationId xmlns:p14="http://schemas.microsoft.com/office/powerpoint/2010/main" val="3032770816"/>
+      </p:ext>
+    </p:extLst>
+  </p:cSld>
+  <p:clrMapOvr>
+    <a:masterClrMapping/>
+  </p:clrMapOvr>
+  <p:timing>
+    <p:tnLst>
+      <p:par>
+        <p:cTn xmlns:p14="http://schemas.microsoft.com/office/powerpoint/2010/main" id="1" dur="indefinite" restart="never" nodeType="tmRoot"/>
+      </p:par>
+    </p:tnLst>
+  </p:timing>
+</p:sld>
+</file>
+
+<file path=ppt/slides/slide21.xml><?xml version="1.0" encoding="utf-8"?>
+<p:sld xmlns:a="http://schemas.openxmlformats.org/drawingml/2006/main" xmlns:r="http://schemas.openxmlformats.org/officeDocument/2006/relationships" xmlns:p="http://schemas.openxmlformats.org/presentationml/2006/main">
+  <p:cSld>
+    <p:spTree>
+      <p:nvGrpSpPr>
+        <p:cNvPr id="1" name=""/>
+        <p:cNvGrpSpPr/>
+        <p:nvPr/>
+      </p:nvGrpSpPr>
+      <p:grpSpPr>
+        <a:xfrm>
+          <a:off x="0" y="0"/>
+          <a:ext cx="0" cy="0"/>
+          <a:chOff x="0" y="0"/>
+          <a:chExt cx="0" cy="0"/>
+        </a:xfrm>
+      </p:grpSpPr>
+      <p:sp>
+        <p:nvSpPr>
+          <p:cNvPr id="2" name="Title 1"/>
+          <p:cNvSpPr>
+            <a:spLocks noGrp="1"/>
+          </p:cNvSpPr>
+          <p:nvPr>
+            <p:ph type="title"/>
+          </p:nvPr>
+        </p:nvSpPr>
+        <p:spPr/>
+        <p:txBody>
+          <a:bodyPr/>
+          <a:lstStyle/>
+          <a:p>
+            <a:r>
+              <a:rPr lang="en-US" dirty="0" smtClean="0"/>
+              <a:t>Future work</a:t>
+            </a:r>
+            <a:endParaRPr lang="en-US" dirty="0"/>
+          </a:p>
+        </p:txBody>
+      </p:sp>
+      <p:sp>
+        <p:nvSpPr>
+          <p:cNvPr id="3" name="Content Placeholder 2"/>
+          <p:cNvSpPr>
+            <a:spLocks noGrp="1"/>
+          </p:cNvSpPr>
+          <p:nvPr>
+            <p:ph idx="1"/>
+          </p:nvPr>
+        </p:nvSpPr>
+        <p:spPr/>
+        <p:txBody>
+          <a:bodyPr>
+            <a:normAutofit lnSpcReduction="10000"/>
+          </a:bodyPr>
+          <a:lstStyle/>
+          <a:p>
+            <a:r>
+              <a:rPr lang="en-US" dirty="0" smtClean="0"/>
+              <a:t>Creating an App that has following features</a:t>
+            </a:r>
+          </a:p>
+          <a:p>
+            <a:pPr lvl="1"/>
+            <a:r>
+              <a:rPr lang="en-US" dirty="0" smtClean="0"/>
+              <a:t>Picture corresponding to weather data</a:t>
+            </a:r>
+          </a:p>
+          <a:p>
+            <a:pPr lvl="1"/>
+            <a:r>
+              <a:rPr lang="en-US" dirty="0" smtClean="0"/>
+              <a:t>Show temperature, wind , humidity, rain, precipitation</a:t>
+            </a:r>
+          </a:p>
+          <a:p>
+            <a:pPr lvl="1"/>
+            <a:r>
+              <a:rPr lang="en-US" dirty="0" smtClean="0"/>
+              <a:t>Max, Min temp in a day/</a:t>
+            </a:r>
+            <a:r>
+              <a:rPr lang="en-US" dirty="0" smtClean="0"/>
+              <a:t>week</a:t>
+            </a:r>
+          </a:p>
+          <a:p>
+            <a:pPr lvl="1"/>
+            <a:r>
+              <a:rPr lang="en-US" dirty="0" smtClean="0"/>
+              <a:t>Use of other sensors : humidity and wind</a:t>
+            </a:r>
+            <a:endParaRPr lang="en-US" dirty="0" smtClean="0"/>
+          </a:p>
+          <a:p>
+            <a:r>
+              <a:rPr lang="en-US" dirty="0" smtClean="0"/>
+              <a:t>Comparing indoor and outdoor sensors data and coming up with LED patterns to show the differences.</a:t>
+            </a:r>
+          </a:p>
+          <a:p>
+            <a:r>
+              <a:rPr lang="en-US" dirty="0" smtClean="0"/>
+              <a:t>Using </a:t>
+            </a:r>
+            <a:r>
+              <a:rPr lang="en-US" dirty="0" err="1" smtClean="0"/>
+              <a:t>Wifi</a:t>
+            </a:r>
+            <a:r>
+              <a:rPr lang="en-US" dirty="0" smtClean="0"/>
+              <a:t> on Galileo</a:t>
+            </a:r>
+          </a:p>
+          <a:p>
+            <a:r>
+              <a:rPr lang="en-US" dirty="0" smtClean="0"/>
+              <a:t>Get the modules to work for Galileo</a:t>
+            </a:r>
+          </a:p>
+          <a:p>
+            <a:endParaRPr lang="en-US" dirty="0"/>
+          </a:p>
+        </p:txBody>
+      </p:sp>
+    </p:spTree>
+    <p:extLst>
+      <p:ext uri="{BB962C8B-B14F-4D97-AF65-F5344CB8AC3E}">
+        <p14:creationId xmlns:p14="http://schemas.microsoft.com/office/powerpoint/2010/main" val="2640821237"/>
+      </p:ext>
+    </p:extLst>
+  </p:cSld>
+  <p:clrMapOvr>
+    <a:masterClrMapping/>
+  </p:clrMapOvr>
+  <p:timing>
+    <p:tnLst>
+      <p:par>
+        <p:cTn xmlns:p14="http://schemas.microsoft.com/office/powerpoint/2010/main" id="1" dur="indefinite" restart="never" nodeType="tmRoot"/>
+      </p:par>
+    </p:tnLst>
+  </p:timing>
+</p:sld>
+</file>
+
+<file path=ppt/slides/slide22.xml><?xml version="1.0" encoding="utf-8"?>
+<p:sld xmlns:a="http://schemas.openxmlformats.org/drawingml/2006/main" xmlns:r="http://schemas.openxmlformats.org/officeDocument/2006/relationships" xmlns:p="http://schemas.openxmlformats.org/presentationml/2006/main">
+  <p:cSld>
+    <p:spTree>
+      <p:nvGrpSpPr>
+        <p:cNvPr id="1" name=""/>
+        <p:cNvGrpSpPr/>
+        <p:nvPr/>
+      </p:nvGrpSpPr>
+      <p:grpSpPr>
+        <a:xfrm>
+          <a:off x="0" y="0"/>
+          <a:ext cx="0" cy="0"/>
+          <a:chOff x="0" y="0"/>
+          <a:chExt cx="0" cy="0"/>
+        </a:xfrm>
+      </p:grpSpPr>
+      <p:sp>
+        <p:nvSpPr>
+          <p:cNvPr id="2" name="Title 1"/>
+          <p:cNvSpPr>
+            <a:spLocks noGrp="1"/>
+          </p:cNvSpPr>
+          <p:nvPr>
+            <p:ph type="title"/>
+          </p:nvPr>
+        </p:nvSpPr>
+        <p:spPr/>
+        <p:txBody>
+          <a:bodyPr/>
+          <a:lstStyle/>
+          <a:p>
+            <a:r>
+              <a:rPr lang="en-US" dirty="0" smtClean="0"/>
+              <a:t>References</a:t>
+            </a:r>
+            <a:endParaRPr lang="en-US" dirty="0"/>
+          </a:p>
+        </p:txBody>
+      </p:sp>
+      <p:sp>
+        <p:nvSpPr>
+          <p:cNvPr id="3" name="Content Placeholder 2"/>
+          <p:cNvSpPr>
+            <a:spLocks noGrp="1"/>
+          </p:cNvSpPr>
+          <p:nvPr>
+            <p:ph idx="1"/>
+          </p:nvPr>
+        </p:nvSpPr>
+        <p:spPr/>
+        <p:txBody>
+          <a:bodyPr/>
+          <a:lstStyle/>
+          <a:p>
+            <a:r>
+              <a:rPr lang="en-US" dirty="0" smtClean="0"/>
+              <a:t>Our Project </a:t>
+            </a:r>
+            <a:r>
+              <a:rPr lang="en-US" dirty="0" err="1" smtClean="0"/>
+              <a:t>Github</a:t>
+            </a:r>
+            <a:r>
+              <a:rPr lang="en-US" dirty="0" smtClean="0"/>
+              <a:t> link: </a:t>
+            </a:r>
+            <a:r>
+              <a:rPr lang="en-US" dirty="0">
+                <a:hlinkClick r:id="rId2"/>
+              </a:rPr>
+              <a:t>https://github.com/sasmita/</a:t>
+            </a:r>
+            <a:r>
+              <a:rPr lang="en-US" dirty="0" smtClean="0">
+                <a:hlinkClick r:id="rId2"/>
+              </a:rPr>
+              <a:t>QuantumLight</a:t>
+            </a:r>
+            <a:endParaRPr lang="en-US" dirty="0" smtClean="0"/>
+          </a:p>
+          <a:p>
+            <a:r>
+              <a:rPr lang="en-US" dirty="0" smtClean="0">
+                <a:hlinkClick r:id="rId3"/>
+              </a:rPr>
+              <a:t>http</a:t>
+            </a:r>
+            <a:r>
+              <a:rPr lang="en-US" dirty="0">
+                <a:hlinkClick r:id="rId3"/>
+              </a:rPr>
+              <a:t>://arduino.cc/en/Tutorial/</a:t>
+            </a:r>
+            <a:r>
+              <a:rPr lang="en-US" dirty="0" smtClean="0">
+                <a:hlinkClick r:id="rId3"/>
+              </a:rPr>
+              <a:t>HomePage</a:t>
+            </a:r>
+            <a:endParaRPr lang="en-US" dirty="0" smtClean="0"/>
+          </a:p>
+          <a:p>
+            <a:r>
+              <a:rPr lang="en-US" dirty="0">
+                <a:hlinkClick r:id="rId4"/>
+              </a:rPr>
+              <a:t>https://github.com/adafruit/</a:t>
+            </a:r>
+            <a:r>
+              <a:rPr lang="en-US" dirty="0" smtClean="0">
+                <a:hlinkClick r:id="rId4"/>
+              </a:rPr>
+              <a:t>Adafruit_NeoPixel</a:t>
+            </a:r>
+            <a:endParaRPr lang="en-US" dirty="0" smtClean="0"/>
+          </a:p>
+          <a:p>
+            <a:r>
+              <a:rPr lang="en-US" dirty="0"/>
+              <a:t>http://</a:t>
+            </a:r>
+            <a:r>
+              <a:rPr lang="en-US" dirty="0" err="1"/>
+              <a:t>playground.arduino.cc</a:t>
+            </a:r>
+            <a:r>
+              <a:rPr lang="en-US" dirty="0"/>
+              <a:t>/interfacing/python</a:t>
+            </a:r>
+            <a:endParaRPr lang="en-US" dirty="0" smtClean="0"/>
+          </a:p>
+          <a:p>
+            <a:pPr lvl="1"/>
+            <a:endParaRPr lang="en-US" dirty="0" smtClean="0"/>
+          </a:p>
+        </p:txBody>
+      </p:sp>
+    </p:spTree>
+    <p:extLst>
+      <p:ext uri="{BB962C8B-B14F-4D97-AF65-F5344CB8AC3E}">
+        <p14:creationId xmlns:p14="http://schemas.microsoft.com/office/powerpoint/2010/main" val="1935744794"/>
+      </p:ext>
+    </p:extLst>
+  </p:cSld>
+  <p:clrMapOvr>
+    <a:masterClrMapping/>
+  </p:clrMapOvr>
+  <p:timing>
+    <p:tnLst>
+      <p:par>
+        <p:cTn xmlns:p14="http://schemas.microsoft.com/office/powerpoint/2010/main" id="1" dur="indefinite" restart="never" nodeType="tmRoot"/>
+      </p:par>
+    </p:tnLst>
+  </p:timing>
+</p:sld>
+</file>
+
+<file path=ppt/slides/slide23.xml><?xml version="1.0" encoding="utf-8"?>
+<p:sld xmlns:a="http://schemas.openxmlformats.org/drawingml/2006/main" xmlns:r="http://schemas.openxmlformats.org/officeDocument/2006/relationships" xmlns:p="http://schemas.openxmlformats.org/presentationml/2006/main">
+  <p:cSld>
+    <p:spTree>
+      <p:nvGrpSpPr>
+        <p:cNvPr id="1" name=""/>
+        <p:cNvGrpSpPr/>
+        <p:nvPr/>
+      </p:nvGrpSpPr>
+      <p:grpSpPr>
+        <a:xfrm>
+          <a:off x="0" y="0"/>
+          <a:ext cx="0" cy="0"/>
+          <a:chOff x="0" y="0"/>
+          <a:chExt cx="0" cy="0"/>
+        </a:xfrm>
+      </p:grpSpPr>
+      <p:sp>
+        <p:nvSpPr>
+          <p:cNvPr id="3" name="Content Placeholder 2"/>
+          <p:cNvSpPr>
+            <a:spLocks noGrp="1"/>
+          </p:cNvSpPr>
+          <p:nvPr>
+            <p:ph idx="1"/>
+          </p:nvPr>
+        </p:nvSpPr>
+        <p:spPr>
+          <a:xfrm>
+            <a:off x="1114424" y="1995714"/>
+            <a:ext cx="7610476" cy="2697239"/>
+          </a:xfrm>
+        </p:spPr>
+        <p:txBody>
+          <a:bodyPr>
+            <a:normAutofit/>
+          </a:bodyPr>
+          <a:lstStyle/>
+          <a:p>
+            <a:pPr marL="0" indent="0">
+              <a:buNone/>
+            </a:pPr>
+            <a:r>
+              <a:rPr lang="en-US" sz="3200" dirty="0"/>
+              <a:t>	</a:t>
+            </a:r>
+            <a:endParaRPr lang="en-US" sz="5400" dirty="0" smtClean="0"/>
+          </a:p>
+          <a:p>
+            <a:pPr marL="0" indent="0">
+              <a:buNone/>
+            </a:pPr>
+            <a:r>
+              <a:rPr lang="en-US" sz="5400" dirty="0"/>
+              <a:t>	</a:t>
+            </a:r>
+            <a:r>
+              <a:rPr lang="en-US" sz="5400" dirty="0" smtClean="0"/>
+              <a:t>QUESTIONS ??</a:t>
+            </a:r>
+            <a:endParaRPr lang="en-US" sz="5400" dirty="0"/>
+          </a:p>
+        </p:txBody>
+      </p:sp>
+    </p:spTree>
+    <p:extLst>
+      <p:ext uri="{BB962C8B-B14F-4D97-AF65-F5344CB8AC3E}">
+        <p14:creationId xmlns:p14="http://schemas.microsoft.com/office/powerpoint/2010/main" val="3830823051"/>
+      </p:ext>
+    </p:extLst>
+  </p:cSld>
+  <p:clrMapOvr>
+    <a:masterClrMapping/>
+  </p:clrMapOvr>
+  <p:timing>
+    <p:tnLst>
+      <p:par>
+        <p:cTn xmlns:p14="http://schemas.microsoft.com/office/powerpoint/2010/main" id="1" dur="indefinite" restart="never" nodeType="tmRoot"/>
+      </p:par>
+    </p:tnLst>
+  </p:timing>
+</p:sld>
+</file>
+
+<file path=ppt/slides/slide24.xml><?xml version="1.0" encoding="utf-8"?>
+<p:sld xmlns:a="http://schemas.openxmlformats.org/drawingml/2006/main" xmlns:r="http://schemas.openxmlformats.org/officeDocument/2006/relationships" xmlns:p="http://schemas.openxmlformats.org/presentationml/2006/main">
+  <p:cSld>
+    <p:spTree>
+      <p:nvGrpSpPr>
+        <p:cNvPr id="1" name=""/>
+        <p:cNvGrpSpPr/>
+        <p:nvPr/>
+      </p:nvGrpSpPr>
+      <p:grpSpPr>
+        <a:xfrm>
+          <a:off x="0" y="0"/>
+          <a:ext cx="0" cy="0"/>
+          <a:chOff x="0" y="0"/>
+          <a:chExt cx="0" cy="0"/>
+        </a:xfrm>
+      </p:grpSpPr>
+      <p:sp>
+        <p:nvSpPr>
+          <p:cNvPr id="3" name="Content Placeholder 2"/>
+          <p:cNvSpPr>
+            <a:spLocks noGrp="1"/>
+          </p:cNvSpPr>
+          <p:nvPr>
+            <p:ph idx="1"/>
+          </p:nvPr>
+        </p:nvSpPr>
+        <p:spPr>
+          <a:xfrm>
+            <a:off x="1114424" y="1995714"/>
+            <a:ext cx="7610476" cy="2697239"/>
+          </a:xfrm>
+        </p:spPr>
+        <p:txBody>
+          <a:bodyPr>
+            <a:normAutofit/>
+          </a:bodyPr>
+          <a:lstStyle/>
+          <a:p>
+            <a:pPr marL="0" indent="0">
+              <a:buNone/>
+            </a:pPr>
+            <a:r>
+              <a:rPr lang="en-US" sz="3200" dirty="0"/>
+              <a:t>	</a:t>
+            </a:r>
+            <a:endParaRPr lang="en-US" sz="5400" dirty="0" smtClean="0"/>
+          </a:p>
+          <a:p>
+            <a:pPr marL="0" indent="0">
+              <a:buNone/>
+            </a:pPr>
+            <a:r>
+              <a:rPr lang="en-US" sz="5400" dirty="0"/>
+              <a:t>	</a:t>
+            </a:r>
+            <a:r>
+              <a:rPr lang="en-US" sz="5400" dirty="0" smtClean="0"/>
+              <a:t>Thank You</a:t>
+            </a:r>
+            <a:endParaRPr lang="en-US" sz="5400" dirty="0"/>
+          </a:p>
+        </p:txBody>
+      </p:sp>
+    </p:spTree>
+    <p:extLst>
+      <p:ext uri="{BB962C8B-B14F-4D97-AF65-F5344CB8AC3E}">
+        <p14:creationId xmlns:p14="http://schemas.microsoft.com/office/powerpoint/2010/main" val="892904822"/>
+      </p:ext>
+    </p:extLst>
+  </p:cSld>
+  <p:clrMapOvr>
+    <a:masterClrMapping/>
+  </p:clrMapOvr>
+  <p:timing>
+    <p:tnLst>
+      <p:par>
+        <p:cTn xmlns:p14="http://schemas.microsoft.com/office/powerpoint/2010/main" id="1" dur="indefinite" restart="never" nodeType="tmRoot"/>
+      </p:par>
+    </p:tnLst>
+  </p:timing>
+</p:sld>
+</file>
+
+<file path=ppt/slides/slide25.xml><?xml version="1.0" encoding="utf-8"?>
 <p:sld xmlns:a="http://schemas.openxmlformats.org/drawingml/2006/main" xmlns:r="http://schemas.openxmlformats.org/officeDocument/2006/relationships" xmlns:p="http://schemas.openxmlformats.org/presentationml/2006/main">
   <p:cSld>
     <p:spTree>
@@ -11577,7 +12847,6 @@
                         <a:rPr lang="en-US" dirty="0" smtClean="0"/>
                         <a:t>  </a:t>
                       </a:r>
-                      <a:endParaRPr lang="en-US" dirty="0" smtClean="0"/>
                     </a:p>
                     <a:p>
                       <a:pPr marL="0" marR="0" indent="0" algn="l" defTabSz="914400" rtl="0" eaLnBrk="1" fontAlgn="auto" latinLnBrk="0" hangingPunct="1">
@@ -11617,11 +12886,7 @@
                     <a:p>
                       <a:r>
                         <a:rPr lang="en-US" dirty="0" smtClean="0"/>
-                        <a:t>       </a:t>
-                      </a:r>
-                      <a:r>
-                        <a:rPr lang="en-US" dirty="0" smtClean="0"/>
-                        <a:t>CLASSIFICATION</a:t>
+                        <a:t>       CLASSIFICATION</a:t>
                       </a:r>
                       <a:endParaRPr lang="en-US" dirty="0"/>
                     </a:p>
@@ -11637,7 +12902,6 @@
                         <a:rPr lang="en-US" dirty="0" smtClean="0"/>
                         <a:t>    </a:t>
                       </a:r>
-                      <a:endParaRPr lang="en-US" dirty="0" smtClean="0"/>
                     </a:p>
                     <a:p>
                       <a:r>
@@ -11702,14 +12966,6 @@
                         </a:rPr>
                         <a:t>&lt;= 5</a:t>
                       </a:r>
-                      <a:endParaRPr lang="en-US" sz="1800" b="0" i="0" u="none" strike="noStrike" kern="1200" dirty="0" smtClean="0">
-                        <a:solidFill>
-                          <a:schemeClr val="tx1"/>
-                        </a:solidFill>
-                        <a:latin typeface="+mn-lt"/>
-                        <a:ea typeface="+mn-ea"/>
-                        <a:cs typeface="+mn-cs"/>
-                      </a:endParaRPr>
                     </a:p>
                   </a:txBody>
                   <a:tcPr>
@@ -11976,315 +13232,7 @@
 </p:sld>
 </file>
 
-<file path=ppt/slides/slide17.xml><?xml version="1.0" encoding="utf-8"?>
-<p:sld xmlns:a="http://schemas.openxmlformats.org/drawingml/2006/main" xmlns:r="http://schemas.openxmlformats.org/officeDocument/2006/relationships" xmlns:p="http://schemas.openxmlformats.org/presentationml/2006/main">
-  <p:cSld>
-    <p:spTree>
-      <p:nvGrpSpPr>
-        <p:cNvPr id="1" name=""/>
-        <p:cNvGrpSpPr/>
-        <p:nvPr/>
-      </p:nvGrpSpPr>
-      <p:grpSpPr>
-        <a:xfrm>
-          <a:off x="0" y="0"/>
-          <a:ext cx="0" cy="0"/>
-          <a:chOff x="0" y="0"/>
-          <a:chExt cx="0" cy="0"/>
-        </a:xfrm>
-      </p:grpSpPr>
-      <p:sp>
-        <p:nvSpPr>
-          <p:cNvPr id="2" name="Title 1"/>
-          <p:cNvSpPr>
-            <a:spLocks noGrp="1"/>
-          </p:cNvSpPr>
-          <p:nvPr>
-            <p:ph type="title"/>
-          </p:nvPr>
-        </p:nvSpPr>
-        <p:spPr>
-          <a:xfrm>
-            <a:off x="0" y="209456"/>
-            <a:ext cx="8913813" cy="914400"/>
-          </a:xfrm>
-        </p:spPr>
-        <p:txBody>
-          <a:bodyPr/>
-          <a:lstStyle/>
-          <a:p>
-            <a:r>
-              <a:rPr lang="en-US" dirty="0" smtClean="0"/>
-              <a:t>Graphs – Temp Vs Time</a:t>
-            </a:r>
-            <a:endParaRPr lang="en-US" dirty="0"/>
-          </a:p>
-        </p:txBody>
-      </p:sp>
-      <p:pic>
-        <p:nvPicPr>
-          <p:cNvPr id="1027" name="Picture 3" descr="C:\Users\betcy\Desktop\t1.jpg"/>
-          <p:cNvPicPr>
-            <a:picLocks noGrp="1" noChangeAspect="1" noChangeArrowheads="1"/>
-          </p:cNvPicPr>
-          <p:nvPr>
-            <p:ph idx="1"/>
-          </p:nvPr>
-        </p:nvPicPr>
-        <p:blipFill>
-          <a:blip r:embed="rId2" cstate="print"/>
-          <a:srcRect/>
-          <a:stretch>
-            <a:fillRect/>
-          </a:stretch>
-        </p:blipFill>
-        <p:spPr bwMode="auto">
-          <a:xfrm>
-            <a:off x="862884" y="1389051"/>
-            <a:ext cx="7508383" cy="5153417"/>
-          </a:xfrm>
-          <a:prstGeom prst="rect">
-            <a:avLst/>
-          </a:prstGeom>
-          <a:noFill/>
-        </p:spPr>
-      </p:pic>
-    </p:spTree>
-    <p:extLst>
-      <p:ext uri="{BB962C8B-B14F-4D97-AF65-F5344CB8AC3E}">
-        <p14:creationId xmlns:p14="http://schemas.microsoft.com/office/powerpoint/2010/main" val="2177146048"/>
-      </p:ext>
-    </p:extLst>
-  </p:cSld>
-  <p:clrMapOvr>
-    <a:masterClrMapping/>
-  </p:clrMapOvr>
-  <p:timing>
-    <p:tnLst>
-      <p:par>
-        <p:cTn xmlns:p14="http://schemas.microsoft.com/office/powerpoint/2010/main" id="1" dur="indefinite" restart="never" nodeType="tmRoot"/>
-      </p:par>
-    </p:tnLst>
-  </p:timing>
-</p:sld>
-</file>
-
-<file path=ppt/slides/slide18.xml><?xml version="1.0" encoding="utf-8"?>
-<p:sld xmlns:a="http://schemas.openxmlformats.org/drawingml/2006/main" xmlns:r="http://schemas.openxmlformats.org/officeDocument/2006/relationships" xmlns:p="http://schemas.openxmlformats.org/presentationml/2006/main">
-  <p:cSld>
-    <p:spTree>
-      <p:nvGrpSpPr>
-        <p:cNvPr id="1" name=""/>
-        <p:cNvGrpSpPr/>
-        <p:nvPr/>
-      </p:nvGrpSpPr>
-      <p:grpSpPr>
-        <a:xfrm>
-          <a:off x="0" y="0"/>
-          <a:ext cx="0" cy="0"/>
-          <a:chOff x="0" y="0"/>
-          <a:chExt cx="0" cy="0"/>
-        </a:xfrm>
-      </p:grpSpPr>
-      <p:sp>
-        <p:nvSpPr>
-          <p:cNvPr id="2" name="Title 1"/>
-          <p:cNvSpPr>
-            <a:spLocks noGrp="1"/>
-          </p:cNvSpPr>
-          <p:nvPr>
-            <p:ph type="title"/>
-          </p:nvPr>
-        </p:nvSpPr>
-        <p:spPr>
-          <a:xfrm>
-            <a:off x="0" y="209456"/>
-            <a:ext cx="8913813" cy="914400"/>
-          </a:xfrm>
-        </p:spPr>
-        <p:txBody>
-          <a:bodyPr/>
-          <a:lstStyle/>
-          <a:p>
-            <a:r>
-              <a:rPr lang="en-US" dirty="0" err="1" smtClean="0"/>
-              <a:t>WindSpeed</a:t>
-            </a:r>
-            <a:r>
-              <a:rPr lang="en-US" dirty="0" smtClean="0"/>
-              <a:t> Vs Time</a:t>
-            </a:r>
-            <a:endParaRPr lang="en-IN" dirty="0"/>
-          </a:p>
-        </p:txBody>
-      </p:sp>
-      <p:pic>
-        <p:nvPicPr>
-          <p:cNvPr id="2050" name="Picture 2" descr="C:\Psu\QL\final\wt.jpg"/>
-          <p:cNvPicPr>
-            <a:picLocks noGrp="1" noChangeAspect="1" noChangeArrowheads="1"/>
-          </p:cNvPicPr>
-          <p:nvPr>
-            <p:ph idx="1"/>
-          </p:nvPr>
-        </p:nvPicPr>
-        <p:blipFill>
-          <a:blip r:embed="rId2" cstate="print"/>
-          <a:srcRect/>
-          <a:stretch>
-            <a:fillRect/>
-          </a:stretch>
-        </p:blipFill>
-        <p:spPr bwMode="auto">
-          <a:xfrm>
-            <a:off x="837127" y="1380170"/>
-            <a:ext cx="7392473" cy="5175176"/>
-          </a:xfrm>
-          <a:prstGeom prst="rect">
-            <a:avLst/>
-          </a:prstGeom>
-          <a:noFill/>
-        </p:spPr>
-      </p:pic>
-    </p:spTree>
-    <p:extLst>
-      <p:ext uri="{BB962C8B-B14F-4D97-AF65-F5344CB8AC3E}">
-        <p14:creationId xmlns:p14="http://schemas.microsoft.com/office/powerpoint/2010/main" val="4059595715"/>
-      </p:ext>
-    </p:extLst>
-  </p:cSld>
-  <p:clrMapOvr>
-    <a:masterClrMapping/>
-  </p:clrMapOvr>
-  <p:timing>
-    <p:tnLst>
-      <p:par>
-        <p:cTn xmlns:p14="http://schemas.microsoft.com/office/powerpoint/2010/main" id="1" dur="indefinite" restart="never" nodeType="tmRoot"/>
-      </p:par>
-    </p:tnLst>
-  </p:timing>
-</p:sld>
-</file>
-
-<file path=ppt/slides/slide19.xml><?xml version="1.0" encoding="utf-8"?>
-<p:sld xmlns:a="http://schemas.openxmlformats.org/drawingml/2006/main" xmlns:r="http://schemas.openxmlformats.org/officeDocument/2006/relationships" xmlns:p="http://schemas.openxmlformats.org/presentationml/2006/main">
-  <p:cSld>
-    <p:spTree>
-      <p:nvGrpSpPr>
-        <p:cNvPr id="1" name=""/>
-        <p:cNvGrpSpPr/>
-        <p:nvPr/>
-      </p:nvGrpSpPr>
-      <p:grpSpPr>
-        <a:xfrm>
-          <a:off x="0" y="0"/>
-          <a:ext cx="0" cy="0"/>
-          <a:chOff x="0" y="0"/>
-          <a:chExt cx="0" cy="0"/>
-        </a:xfrm>
-      </p:grpSpPr>
-      <p:sp>
-        <p:nvSpPr>
-          <p:cNvPr id="2" name="Title 1"/>
-          <p:cNvSpPr>
-            <a:spLocks noGrp="1"/>
-          </p:cNvSpPr>
-          <p:nvPr>
-            <p:ph type="title"/>
-          </p:nvPr>
-        </p:nvSpPr>
-        <p:spPr>
-          <a:xfrm>
-            <a:off x="0" y="209456"/>
-            <a:ext cx="8913813" cy="914400"/>
-          </a:xfrm>
-        </p:spPr>
-        <p:txBody>
-          <a:bodyPr/>
-          <a:lstStyle/>
-          <a:p>
-            <a:r>
-              <a:rPr lang="en-US" dirty="0" smtClean="0"/>
-              <a:t>Temp/</a:t>
-            </a:r>
-            <a:r>
-              <a:rPr lang="en-US" dirty="0" err="1" smtClean="0"/>
-              <a:t>WindSpeed</a:t>
-            </a:r>
-            <a:r>
-              <a:rPr lang="en-US" dirty="0" smtClean="0"/>
-              <a:t> Vs Time</a:t>
-            </a:r>
-            <a:endParaRPr lang="en-IN" dirty="0"/>
-          </a:p>
-        </p:txBody>
-      </p:sp>
-      <p:sp>
-        <p:nvSpPr>
-          <p:cNvPr id="3" name="Content Placeholder 2"/>
-          <p:cNvSpPr>
-            <a:spLocks noGrp="1"/>
-          </p:cNvSpPr>
-          <p:nvPr>
-            <p:ph idx="1"/>
-          </p:nvPr>
-        </p:nvSpPr>
-        <p:spPr/>
-        <p:txBody>
-          <a:bodyPr/>
-          <a:lstStyle/>
-          <a:p>
-            <a:endParaRPr lang="en-IN"/>
-          </a:p>
-        </p:txBody>
-      </p:sp>
-      <p:pic>
-        <p:nvPicPr>
-          <p:cNvPr id="3074" name="Picture 2" descr="C:\Users\betcy\Desktop\twt.jpg"/>
-          <p:cNvPicPr>
-            <a:picLocks noChangeAspect="1" noChangeArrowheads="1"/>
-          </p:cNvPicPr>
-          <p:nvPr/>
-        </p:nvPicPr>
-        <p:blipFill>
-          <a:blip r:embed="rId2" cstate="print"/>
-          <a:srcRect/>
-          <a:stretch>
-            <a:fillRect/>
-          </a:stretch>
-        </p:blipFill>
-        <p:spPr bwMode="auto">
-          <a:xfrm>
-            <a:off x="505566" y="1371734"/>
-            <a:ext cx="8213434" cy="5267325"/>
-          </a:xfrm>
-          <a:prstGeom prst="rect">
-            <a:avLst/>
-          </a:prstGeom>
-          <a:noFill/>
-        </p:spPr>
-      </p:pic>
-    </p:spTree>
-    <p:extLst>
-      <p:ext uri="{BB962C8B-B14F-4D97-AF65-F5344CB8AC3E}">
-        <p14:creationId xmlns:p14="http://schemas.microsoft.com/office/powerpoint/2010/main" val="397124458"/>
-      </p:ext>
-    </p:extLst>
-  </p:cSld>
-  <p:clrMapOvr>
-    <a:masterClrMapping/>
-  </p:clrMapOvr>
-  <p:timing>
-    <p:tnLst>
-      <p:par>
-        <p:cTn xmlns:p14="http://schemas.microsoft.com/office/powerpoint/2010/main" id="1" dur="indefinite" restart="never" nodeType="tmRoot"/>
-      </p:par>
-    </p:tnLst>
-  </p:timing>
-</p:sld>
-</file>
-
-<file path=ppt/slides/slide2.xml><?xml version="1.0" encoding="utf-8"?>
+<file path=ppt/slides/slide26.xml><?xml version="1.0" encoding="utf-8"?>
 <p:sld xmlns:a="http://schemas.openxmlformats.org/drawingml/2006/main" xmlns:r="http://schemas.openxmlformats.org/officeDocument/2006/relationships" xmlns:p="http://schemas.openxmlformats.org/presentationml/2006/main">
   <p:cSld>
     <p:spTree>
@@ -12318,7 +13266,7 @@
           <a:p>
             <a:r>
               <a:rPr lang="en-US" dirty="0" smtClean="0"/>
-              <a:t>Project focus:</a:t>
+              <a:t>Implementation details</a:t>
             </a:r>
             <a:endParaRPr lang="en-US" dirty="0"/>
           </a:p>
@@ -12326,47 +13274,127 @@
       </p:sp>
       <p:sp>
         <p:nvSpPr>
-          <p:cNvPr id="3" name="Content Placeholder 2"/>
-          <p:cNvSpPr>
-            <a:spLocks noGrp="1"/>
-          </p:cNvSpPr>
-          <p:nvPr>
-            <p:ph idx="1"/>
-          </p:nvPr>
+          <p:cNvPr id="5" name="Rectangle 4"/>
+          <p:cNvSpPr/>
+          <p:nvPr/>
         </p:nvSpPr>
-        <p:spPr/>
+        <p:spPr>
+          <a:xfrm>
+            <a:off x="2286000" y="2698218"/>
+            <a:ext cx="4572000" cy="2585323"/>
+          </a:xfrm>
+          <a:prstGeom prst="rect">
+            <a:avLst/>
+          </a:prstGeom>
+        </p:spPr>
         <p:txBody>
-          <a:bodyPr/>
+          <a:bodyPr>
+            <a:spAutoFit/>
+          </a:bodyPr>
           <a:lstStyle/>
           <a:p>
-            <a:pPr marL="0" indent="0">
-              <a:buNone/>
-            </a:pPr>
+            <a:r>
+              <a:rPr lang="en-US" dirty="0" smtClean="0"/>
+              <a:t>while</a:t>
+            </a:r>
+            <a:r>
+              <a:rPr lang="en-US" dirty="0"/>
+              <a:t>(1)</a:t>
+            </a:r>
+            <a:r>
+              <a:rPr lang="en-US" dirty="0" smtClean="0"/>
+              <a:t>:</a:t>
+            </a:r>
+          </a:p>
+          <a:p>
             <a:endParaRPr lang="en-US" dirty="0"/>
           </a:p>
           <a:p>
-            <a:pPr marL="0" indent="0">
-              <a:buNone/>
-            </a:pPr>
-            <a:r>
-              <a:rPr lang="en-US" sz="2400" dirty="0" smtClean="0"/>
-              <a:t>Quantifying the input data and displaying various LED patterns based on quantification.</a:t>
-            </a:r>
-          </a:p>
-          <a:p>
-            <a:pPr lvl="4"/>
-            <a:r>
-              <a:rPr lang="en-US" sz="2200" dirty="0" smtClean="0"/>
-              <a:t>Quantifying Weather data</a:t>
-            </a:r>
-            <a:endParaRPr lang="en-US" sz="2200" dirty="0"/>
+            <a:r>
+              <a:rPr lang="en-US" dirty="0"/>
+              <a:t>  </a:t>
+            </a:r>
+            <a:r>
+              <a:rPr lang="en-US" dirty="0" smtClean="0"/>
+              <a:t>   </a:t>
+            </a:r>
+            <a:r>
+              <a:rPr lang="en-US" dirty="0" err="1" smtClean="0"/>
+              <a:t>classifyWeather</a:t>
+            </a:r>
+            <a:r>
+              <a:rPr lang="en-US" dirty="0" smtClean="0"/>
+              <a:t>()</a:t>
+            </a:r>
+            <a:endParaRPr lang="en-US" dirty="0"/>
+          </a:p>
+          <a:p>
+            <a:endParaRPr lang="en-US" dirty="0"/>
+          </a:p>
+          <a:p>
+            <a:r>
+              <a:rPr lang="en-US" dirty="0"/>
+              <a:t> </a:t>
+            </a:r>
+            <a:r>
+              <a:rPr lang="en-US" dirty="0" smtClean="0"/>
+              <a:t>    </a:t>
+            </a:r>
+            <a:r>
+              <a:rPr lang="en-US" dirty="0"/>
+              <a:t>pattern = </a:t>
+            </a:r>
+            <a:r>
+              <a:rPr lang="en-US" dirty="0" err="1" smtClean="0"/>
+              <a:t>getPattern</a:t>
+            </a:r>
+            <a:r>
+              <a:rPr lang="en-US" dirty="0" smtClean="0"/>
+              <a:t>()</a:t>
+            </a:r>
+            <a:endParaRPr lang="en-US" dirty="0"/>
+          </a:p>
+          <a:p>
+            <a:endParaRPr lang="en-US" dirty="0"/>
+          </a:p>
+          <a:p>
+            <a:r>
+              <a:rPr lang="en-US" dirty="0" smtClean="0"/>
+              <a:t>     </a:t>
+            </a:r>
+            <a:r>
+              <a:rPr lang="en-US" dirty="0" err="1" smtClean="0"/>
+              <a:t>srl.write</a:t>
+            </a:r>
+            <a:r>
+              <a:rPr lang="en-US" dirty="0"/>
+              <a:t>(pattern)</a:t>
+            </a:r>
+          </a:p>
+          <a:p>
+            <a:endParaRPr lang="en-US" dirty="0"/>
+          </a:p>
+          <a:p>
+            <a:r>
+              <a:rPr lang="en-US" dirty="0" smtClean="0"/>
+              <a:t>     </a:t>
+            </a:r>
+            <a:r>
+              <a:rPr lang="en-US" dirty="0" err="1" smtClean="0"/>
+              <a:t>time.sleep</a:t>
+            </a:r>
+            <a:r>
+              <a:rPr lang="en-US" dirty="0" smtClean="0"/>
+              <a:t>(60)</a:t>
+            </a:r>
+            <a:endParaRPr lang="en-US" dirty="0"/>
           </a:p>
         </p:txBody>
       </p:sp>
     </p:spTree>
     <p:extLst>
       <p:ext uri="{BB962C8B-B14F-4D97-AF65-F5344CB8AC3E}">
-        <p14:creationId xmlns:p14="http://schemas.microsoft.com/office/powerpoint/2010/main" val="2830858962"/>
+        <p14:creationId xmlns:p14="http://schemas.microsoft.com/office/powerpoint/2010/main" val="3452952241"/>
       </p:ext>
     </p:extLst>
   </p:cSld>
@@ -12383,7 +13411,7 @@
 </p:sld>
 </file>
 
-<file path=ppt/slides/slide20.xml><?xml version="1.0" encoding="utf-8"?>
+<file path=ppt/slides/slide27.xml><?xml version="1.0" encoding="utf-8"?>
 <p:sld xmlns:a="http://schemas.openxmlformats.org/drawingml/2006/main" xmlns:r="http://schemas.openxmlformats.org/officeDocument/2006/relationships" xmlns:p="http://schemas.openxmlformats.org/presentationml/2006/main">
   <p:cSld>
     <p:spTree>
@@ -12417,7 +13445,7 @@
           <a:p>
             <a:r>
               <a:rPr lang="en-US" dirty="0" smtClean="0"/>
-              <a:t>COMPONENTS USED</a:t>
+              <a:t>Arduino Sketch</a:t>
             </a:r>
             <a:endParaRPr lang="en-US" dirty="0"/>
           </a:p>
@@ -12433,56 +13461,22 @@
             <p:ph idx="1"/>
           </p:nvPr>
         </p:nvSpPr>
-        <p:spPr/>
+        <p:spPr>
+          <a:xfrm>
+            <a:off x="3056843" y="2595562"/>
+            <a:ext cx="2547409" cy="3670767"/>
+          </a:xfrm>
+        </p:spPr>
         <p:txBody>
-          <a:bodyPr>
-            <a:normAutofit lnSpcReduction="10000"/>
-          </a:bodyPr>
+          <a:bodyPr/>
           <a:lstStyle/>
-          <a:p>
-            <a:r>
-              <a:rPr lang="en-US" dirty="0" smtClean="0"/>
-              <a:t>ARDUINO </a:t>
-            </a:r>
-            <a:r>
-              <a:rPr lang="en-US" dirty="0" smtClean="0"/>
-              <a:t>board</a:t>
-            </a:r>
-          </a:p>
-          <a:p>
-            <a:r>
-              <a:rPr lang="en-US" dirty="0" err="1"/>
-              <a:t>NeoPixel</a:t>
-            </a:r>
-            <a:r>
-              <a:rPr lang="en-US" dirty="0"/>
-              <a:t> digital RGB LED Strip</a:t>
-            </a:r>
-          </a:p>
           <a:p>
             <a:pPr marL="0" indent="0">
               <a:buNone/>
             </a:pPr>
             <a:r>
               <a:rPr lang="en-US" dirty="0"/>
-              <a:t>       </a:t>
-            </a:r>
-            <a:r>
-              <a:rPr lang="en-US" dirty="0">
-                <a:hlinkClick r:id="rId2"/>
-              </a:rPr>
-              <a:t>http://www.adafruit.com/products/1138</a:t>
-            </a:r>
-            <a:r>
-              <a:rPr lang="en-US" dirty="0"/>
-              <a:t> </a:t>
-            </a:r>
-            <a:endParaRPr lang="en-US" dirty="0" smtClean="0"/>
-          </a:p>
-          <a:p>
-            <a:r>
-              <a:rPr lang="en-US" dirty="0"/>
-              <a:t>Temperature Sensors(DS18B20)</a:t>
+              <a:t>void loop() {</a:t>
             </a:r>
           </a:p>
           <a:p>
@@ -12491,698 +13485,53 @@
             </a:pPr>
             <a:r>
               <a:rPr lang="en-US" dirty="0"/>
-              <a:t>       http://</a:t>
-            </a:r>
-            <a:r>
-              <a:rPr lang="en-US" dirty="0" err="1"/>
-              <a:t>www.adafruit.com</a:t>
+              <a:t>  </a:t>
+            </a:r>
+            <a:r>
+              <a:rPr lang="en-US" dirty="0" smtClean="0"/>
+              <a:t>    sensor</a:t>
             </a:r>
             <a:r>
               <a:rPr lang="en-US" dirty="0"/>
-              <a:t>/products/</a:t>
-            </a:r>
-            <a:r>
-              <a:rPr lang="en-US" dirty="0" smtClean="0"/>
-              <a:t>374</a:t>
-            </a:r>
-            <a:endParaRPr lang="en-US" dirty="0" smtClean="0"/>
-          </a:p>
-          <a:p>
-            <a:r>
-              <a:rPr lang="en-US" dirty="0" smtClean="0"/>
-              <a:t>Resistors</a:t>
-            </a:r>
-          </a:p>
-          <a:p>
-            <a:r>
-              <a:rPr lang="en-US" dirty="0" smtClean="0"/>
-              <a:t>Jumper wires</a:t>
+              <a:t>();</a:t>
             </a:r>
           </a:p>
           <a:p>
             <a:pPr marL="0" indent="0">
               <a:buNone/>
             </a:pPr>
-            <a:endParaRPr lang="en-US" dirty="0" smtClean="0"/>
+            <a:r>
+              <a:rPr lang="en-US" dirty="0"/>
+              <a:t>  </a:t>
+            </a:r>
+            <a:r>
+              <a:rPr lang="en-US" dirty="0" smtClean="0"/>
+              <a:t>    </a:t>
+            </a:r>
+            <a:r>
+              <a:rPr lang="en-US" dirty="0" err="1" smtClean="0"/>
+              <a:t>ledPattern</a:t>
+            </a:r>
+            <a:r>
+              <a:rPr lang="en-US" dirty="0"/>
+              <a:t>();</a:t>
+            </a:r>
           </a:p>
           <a:p>
             <a:pPr marL="0" indent="0">
               <a:buNone/>
             </a:pPr>
-            <a:endParaRPr lang="en-US" dirty="0" smtClean="0"/>
-          </a:p>
-          <a:p>
-            <a:pPr marL="0" indent="0">
-              <a:buNone/>
-            </a:pPr>
-            <a:endParaRPr lang="en-US" dirty="0"/>
-          </a:p>
-          <a:p>
-            <a:pPr marL="0" indent="0">
-              <a:buNone/>
-            </a:pPr>
-            <a:endParaRPr lang="en-US" dirty="0"/>
-          </a:p>
-          <a:p>
-            <a:pPr marL="0" indent="0">
-              <a:buNone/>
-            </a:pPr>
-            <a:endParaRPr lang="en-US" dirty="0" smtClean="0"/>
-          </a:p>
-          <a:p>
-            <a:pPr marL="0" indent="0">
-              <a:buNone/>
-            </a:pPr>
-            <a:endParaRPr lang="en-US" dirty="0" smtClean="0"/>
-          </a:p>
-          <a:p>
-            <a:endParaRPr lang="en-US" dirty="0" smtClean="0"/>
-          </a:p>
-          <a:p>
-            <a:endParaRPr lang="en-US" dirty="0"/>
+            <a:r>
+              <a:rPr lang="en-US" dirty="0"/>
+              <a:t>}</a:t>
+            </a:r>
           </a:p>
         </p:txBody>
       </p:sp>
     </p:spTree>
     <p:extLst>
       <p:ext uri="{BB962C8B-B14F-4D97-AF65-F5344CB8AC3E}">
-        <p14:creationId xmlns:p14="http://schemas.microsoft.com/office/powerpoint/2010/main" val="1986240947"/>
-      </p:ext>
-    </p:extLst>
-  </p:cSld>
-  <p:clrMapOvr>
-    <a:masterClrMapping/>
-  </p:clrMapOvr>
-  <p:timing>
-    <p:tnLst>
-      <p:par>
-        <p:cTn xmlns:p14="http://schemas.microsoft.com/office/powerpoint/2010/main" id="1" dur="indefinite" restart="never" nodeType="tmRoot"/>
-      </p:par>
-    </p:tnLst>
-  </p:timing>
-</p:sld>
-</file>
-
-<file path=ppt/slides/slide21.xml><?xml version="1.0" encoding="utf-8"?>
-<p:sld xmlns:a="http://schemas.openxmlformats.org/drawingml/2006/main" xmlns:r="http://schemas.openxmlformats.org/officeDocument/2006/relationships" xmlns:p="http://schemas.openxmlformats.org/presentationml/2006/main">
-  <p:cSld>
-    <p:spTree>
-      <p:nvGrpSpPr>
-        <p:cNvPr id="1" name=""/>
-        <p:cNvGrpSpPr/>
-        <p:nvPr/>
-      </p:nvGrpSpPr>
-      <p:grpSpPr>
-        <a:xfrm>
-          <a:off x="0" y="0"/>
-          <a:ext cx="0" cy="0"/>
-          <a:chOff x="0" y="0"/>
-          <a:chExt cx="0" cy="0"/>
-        </a:xfrm>
-      </p:grpSpPr>
-      <p:sp>
-        <p:nvSpPr>
-          <p:cNvPr id="2" name="Title 1"/>
-          <p:cNvSpPr>
-            <a:spLocks noGrp="1"/>
-          </p:cNvSpPr>
-          <p:nvPr>
-            <p:ph type="title"/>
-          </p:nvPr>
-        </p:nvSpPr>
-        <p:spPr/>
-        <p:txBody>
-          <a:bodyPr/>
-          <a:lstStyle/>
-          <a:p>
-            <a:r>
-              <a:rPr lang="en-US" dirty="0" smtClean="0"/>
-              <a:t>LIBRARY USED</a:t>
-            </a:r>
-            <a:endParaRPr lang="en-US" dirty="0"/>
-          </a:p>
-        </p:txBody>
-      </p:sp>
-      <p:sp>
-        <p:nvSpPr>
-          <p:cNvPr id="3" name="Content Placeholder 2"/>
-          <p:cNvSpPr>
-            <a:spLocks noGrp="1"/>
-          </p:cNvSpPr>
-          <p:nvPr>
-            <p:ph idx="1"/>
-          </p:nvPr>
-        </p:nvSpPr>
-        <p:spPr/>
-        <p:txBody>
-          <a:bodyPr>
-            <a:normAutofit lnSpcReduction="10000"/>
-          </a:bodyPr>
-          <a:lstStyle/>
-          <a:p>
-            <a:r>
-              <a:rPr lang="en-US" dirty="0" smtClean="0"/>
-              <a:t>Weather API (</a:t>
-            </a:r>
-            <a:r>
-              <a:rPr lang="en-US" dirty="0" err="1" smtClean="0"/>
-              <a:t>pywapi</a:t>
-            </a:r>
-            <a:r>
-              <a:rPr lang="en-US" dirty="0" smtClean="0"/>
-              <a:t>)</a:t>
-            </a:r>
-          </a:p>
-          <a:p>
-            <a:pPr lvl="1"/>
-            <a:r>
-              <a:rPr lang="en-US" dirty="0" smtClean="0"/>
-              <a:t>To get weather data from online</a:t>
-            </a:r>
-          </a:p>
-          <a:p>
-            <a:r>
-              <a:rPr lang="en-US" dirty="0" smtClean="0"/>
-              <a:t>Serial</a:t>
-            </a:r>
-          </a:p>
-          <a:p>
-            <a:pPr lvl="1"/>
-            <a:r>
-              <a:rPr lang="en-US" dirty="0" smtClean="0"/>
-              <a:t>Python module to Communicate between computer and Arduino via serial </a:t>
-            </a:r>
-            <a:r>
-              <a:rPr lang="en-US" dirty="0" smtClean="0"/>
-              <a:t>port</a:t>
-            </a:r>
-          </a:p>
-          <a:p>
-            <a:r>
-              <a:rPr lang="en-US" dirty="0" err="1" smtClean="0"/>
-              <a:t>Onewire</a:t>
-            </a:r>
-            <a:r>
-              <a:rPr lang="en-US" dirty="0" smtClean="0"/>
-              <a:t>	</a:t>
-            </a:r>
-            <a:endParaRPr lang="en-US" dirty="0" smtClean="0"/>
-          </a:p>
-          <a:p>
-            <a:pPr lvl="1"/>
-            <a:r>
-              <a:rPr lang="en-US" dirty="0" smtClean="0"/>
-              <a:t>To </a:t>
-            </a:r>
-            <a:r>
-              <a:rPr lang="en-US" dirty="0" smtClean="0"/>
-              <a:t>get temperature data using indoor </a:t>
-            </a:r>
-            <a:r>
-              <a:rPr lang="en-US" dirty="0" smtClean="0"/>
-              <a:t>sensors</a:t>
-            </a:r>
-            <a:endParaRPr lang="en-US" dirty="0" smtClean="0"/>
-          </a:p>
-          <a:p>
-            <a:r>
-              <a:rPr lang="en-US" dirty="0" err="1" smtClean="0"/>
-              <a:t>Adafruit_NeoPixel</a:t>
-            </a:r>
-            <a:endParaRPr lang="en-US" dirty="0" smtClean="0"/>
-          </a:p>
-          <a:p>
-            <a:pPr lvl="1"/>
-            <a:r>
-              <a:rPr lang="en-US" dirty="0" smtClean="0"/>
-              <a:t>To light led patterns using led strip</a:t>
-            </a:r>
-          </a:p>
-          <a:p>
-            <a:pPr lvl="1"/>
-            <a:endParaRPr lang="en-US" dirty="0"/>
-          </a:p>
-        </p:txBody>
-      </p:sp>
-    </p:spTree>
-    <p:extLst>
-      <p:ext uri="{BB962C8B-B14F-4D97-AF65-F5344CB8AC3E}">
-        <p14:creationId xmlns:p14="http://schemas.microsoft.com/office/powerpoint/2010/main" val="2796827819"/>
-      </p:ext>
-    </p:extLst>
-  </p:cSld>
-  <p:clrMapOvr>
-    <a:masterClrMapping/>
-  </p:clrMapOvr>
-  <p:timing>
-    <p:tnLst>
-      <p:par>
-        <p:cTn xmlns:p14="http://schemas.microsoft.com/office/powerpoint/2010/main" id="1" dur="indefinite" restart="never" nodeType="tmRoot"/>
-      </p:par>
-    </p:tnLst>
-  </p:timing>
-</p:sld>
-</file>
-
-<file path=ppt/slides/slide22.xml><?xml version="1.0" encoding="utf-8"?>
-<p:sld xmlns:a="http://schemas.openxmlformats.org/drawingml/2006/main" xmlns:r="http://schemas.openxmlformats.org/officeDocument/2006/relationships" xmlns:p="http://schemas.openxmlformats.org/presentationml/2006/main">
-  <p:cSld>
-    <p:spTree>
-      <p:nvGrpSpPr>
-        <p:cNvPr id="1" name=""/>
-        <p:cNvGrpSpPr/>
-        <p:nvPr/>
-      </p:nvGrpSpPr>
-      <p:grpSpPr>
-        <a:xfrm>
-          <a:off x="0" y="0"/>
-          <a:ext cx="0" cy="0"/>
-          <a:chOff x="0" y="0"/>
-          <a:chExt cx="0" cy="0"/>
-        </a:xfrm>
-      </p:grpSpPr>
-      <p:sp>
-        <p:nvSpPr>
-          <p:cNvPr id="2" name="Title 1"/>
-          <p:cNvSpPr>
-            <a:spLocks noGrp="1"/>
-          </p:cNvSpPr>
-          <p:nvPr>
-            <p:ph type="title"/>
-          </p:nvPr>
-        </p:nvSpPr>
-        <p:spPr/>
-        <p:txBody>
-          <a:bodyPr/>
-          <a:lstStyle/>
-          <a:p>
-            <a:r>
-              <a:rPr lang="en-US" dirty="0" smtClean="0"/>
-              <a:t>Challenges</a:t>
-            </a:r>
-            <a:endParaRPr lang="en-US" dirty="0"/>
-          </a:p>
-        </p:txBody>
-      </p:sp>
-      <p:sp>
-        <p:nvSpPr>
-          <p:cNvPr id="3" name="Content Placeholder 2"/>
-          <p:cNvSpPr>
-            <a:spLocks noGrp="1"/>
-          </p:cNvSpPr>
-          <p:nvPr>
-            <p:ph idx="1"/>
-          </p:nvPr>
-        </p:nvSpPr>
-        <p:spPr/>
-        <p:txBody>
-          <a:bodyPr/>
-          <a:lstStyle/>
-          <a:p>
-            <a:endParaRPr lang="en-US" dirty="0"/>
-          </a:p>
-        </p:txBody>
-      </p:sp>
-    </p:spTree>
-    <p:extLst>
-      <p:ext uri="{BB962C8B-B14F-4D97-AF65-F5344CB8AC3E}">
-        <p14:creationId xmlns:p14="http://schemas.microsoft.com/office/powerpoint/2010/main" val="3032770816"/>
-      </p:ext>
-    </p:extLst>
-  </p:cSld>
-  <p:clrMapOvr>
-    <a:masterClrMapping/>
-  </p:clrMapOvr>
-  <p:timing>
-    <p:tnLst>
-      <p:par>
-        <p:cTn xmlns:p14="http://schemas.microsoft.com/office/powerpoint/2010/main" id="1" dur="indefinite" restart="never" nodeType="tmRoot"/>
-      </p:par>
-    </p:tnLst>
-  </p:timing>
-</p:sld>
-</file>
-
-<file path=ppt/slides/slide23.xml><?xml version="1.0" encoding="utf-8"?>
-<p:sld xmlns:a="http://schemas.openxmlformats.org/drawingml/2006/main" xmlns:r="http://schemas.openxmlformats.org/officeDocument/2006/relationships" xmlns:p="http://schemas.openxmlformats.org/presentationml/2006/main">
-  <p:cSld>
-    <p:spTree>
-      <p:nvGrpSpPr>
-        <p:cNvPr id="1" name=""/>
-        <p:cNvGrpSpPr/>
-        <p:nvPr/>
-      </p:nvGrpSpPr>
-      <p:grpSpPr>
-        <a:xfrm>
-          <a:off x="0" y="0"/>
-          <a:ext cx="0" cy="0"/>
-          <a:chOff x="0" y="0"/>
-          <a:chExt cx="0" cy="0"/>
-        </a:xfrm>
-      </p:grpSpPr>
-      <p:sp>
-        <p:nvSpPr>
-          <p:cNvPr id="2" name="Title 1"/>
-          <p:cNvSpPr>
-            <a:spLocks noGrp="1"/>
-          </p:cNvSpPr>
-          <p:nvPr>
-            <p:ph type="title"/>
-          </p:nvPr>
-        </p:nvSpPr>
-        <p:spPr/>
-        <p:txBody>
-          <a:bodyPr/>
-          <a:lstStyle/>
-          <a:p>
-            <a:r>
-              <a:rPr lang="en-US" dirty="0" smtClean="0"/>
-              <a:t>Future work</a:t>
-            </a:r>
-            <a:endParaRPr lang="en-US" dirty="0"/>
-          </a:p>
-        </p:txBody>
-      </p:sp>
-      <p:sp>
-        <p:nvSpPr>
-          <p:cNvPr id="3" name="Content Placeholder 2"/>
-          <p:cNvSpPr>
-            <a:spLocks noGrp="1"/>
-          </p:cNvSpPr>
-          <p:nvPr>
-            <p:ph idx="1"/>
-          </p:nvPr>
-        </p:nvSpPr>
-        <p:spPr/>
-        <p:txBody>
-          <a:bodyPr>
-            <a:normAutofit/>
-          </a:bodyPr>
-          <a:lstStyle/>
-          <a:p>
-            <a:r>
-              <a:rPr lang="en-US" dirty="0" smtClean="0"/>
-              <a:t>Creating an App that has following features</a:t>
-            </a:r>
-          </a:p>
-          <a:p>
-            <a:pPr lvl="1"/>
-            <a:r>
-              <a:rPr lang="en-US" dirty="0" smtClean="0"/>
-              <a:t>Picture corresponding to weather data</a:t>
-            </a:r>
-          </a:p>
-          <a:p>
-            <a:pPr lvl="1"/>
-            <a:r>
-              <a:rPr lang="en-US" dirty="0" smtClean="0"/>
-              <a:t>Show temperature, wind , humidity, rain, precipitation</a:t>
-            </a:r>
-          </a:p>
-          <a:p>
-            <a:pPr lvl="1"/>
-            <a:r>
-              <a:rPr lang="en-US" dirty="0" smtClean="0"/>
-              <a:t>Max, Min temp in a day/week</a:t>
-            </a:r>
-          </a:p>
-          <a:p>
-            <a:r>
-              <a:rPr lang="en-US" dirty="0" smtClean="0"/>
-              <a:t>Comparing indoor and outdoor sensors data and coming up with LED patterns to show the differences.</a:t>
-            </a:r>
-          </a:p>
-          <a:p>
-            <a:r>
-              <a:rPr lang="en-US" dirty="0" smtClean="0"/>
-              <a:t>Using </a:t>
-            </a:r>
-            <a:r>
-              <a:rPr lang="en-US" dirty="0" err="1" smtClean="0"/>
-              <a:t>Wifi</a:t>
-            </a:r>
-            <a:r>
-              <a:rPr lang="en-US" dirty="0" smtClean="0"/>
-              <a:t> on Galileo</a:t>
-            </a:r>
-          </a:p>
-          <a:p>
-            <a:r>
-              <a:rPr lang="en-US" dirty="0" smtClean="0"/>
-              <a:t>Get the modules to work for Galileo</a:t>
-            </a:r>
-          </a:p>
-          <a:p>
-            <a:endParaRPr lang="en-US" dirty="0"/>
-          </a:p>
-        </p:txBody>
-      </p:sp>
-    </p:spTree>
-    <p:extLst>
-      <p:ext uri="{BB962C8B-B14F-4D97-AF65-F5344CB8AC3E}">
-        <p14:creationId xmlns:p14="http://schemas.microsoft.com/office/powerpoint/2010/main" val="2640821237"/>
-      </p:ext>
-    </p:extLst>
-  </p:cSld>
-  <p:clrMapOvr>
-    <a:masterClrMapping/>
-  </p:clrMapOvr>
-  <p:timing>
-    <p:tnLst>
-      <p:par>
-        <p:cTn xmlns:p14="http://schemas.microsoft.com/office/powerpoint/2010/main" id="1" dur="indefinite" restart="never" nodeType="tmRoot"/>
-      </p:par>
-    </p:tnLst>
-  </p:timing>
-</p:sld>
-</file>
-
-<file path=ppt/slides/slide24.xml><?xml version="1.0" encoding="utf-8"?>
-<p:sld xmlns:a="http://schemas.openxmlformats.org/drawingml/2006/main" xmlns:r="http://schemas.openxmlformats.org/officeDocument/2006/relationships" xmlns:p="http://schemas.openxmlformats.org/presentationml/2006/main">
-  <p:cSld>
-    <p:spTree>
-      <p:nvGrpSpPr>
-        <p:cNvPr id="1" name=""/>
-        <p:cNvGrpSpPr/>
-        <p:nvPr/>
-      </p:nvGrpSpPr>
-      <p:grpSpPr>
-        <a:xfrm>
-          <a:off x="0" y="0"/>
-          <a:ext cx="0" cy="0"/>
-          <a:chOff x="0" y="0"/>
-          <a:chExt cx="0" cy="0"/>
-        </a:xfrm>
-      </p:grpSpPr>
-      <p:sp>
-        <p:nvSpPr>
-          <p:cNvPr id="2" name="Title 1"/>
-          <p:cNvSpPr>
-            <a:spLocks noGrp="1"/>
-          </p:cNvSpPr>
-          <p:nvPr>
-            <p:ph type="title"/>
-          </p:nvPr>
-        </p:nvSpPr>
-        <p:spPr/>
-        <p:txBody>
-          <a:bodyPr/>
-          <a:lstStyle/>
-          <a:p>
-            <a:r>
-              <a:rPr lang="en-US" dirty="0" smtClean="0"/>
-              <a:t>References</a:t>
-            </a:r>
-            <a:endParaRPr lang="en-US" dirty="0"/>
-          </a:p>
-        </p:txBody>
-      </p:sp>
-      <p:sp>
-        <p:nvSpPr>
-          <p:cNvPr id="3" name="Content Placeholder 2"/>
-          <p:cNvSpPr>
-            <a:spLocks noGrp="1"/>
-          </p:cNvSpPr>
-          <p:nvPr>
-            <p:ph idx="1"/>
-          </p:nvPr>
-        </p:nvSpPr>
-        <p:spPr/>
-        <p:txBody>
-          <a:bodyPr/>
-          <a:lstStyle/>
-          <a:p>
-            <a:r>
-              <a:rPr lang="en-US" dirty="0" smtClean="0"/>
-              <a:t>Our Project </a:t>
-            </a:r>
-            <a:r>
-              <a:rPr lang="en-US" dirty="0" err="1" smtClean="0"/>
-              <a:t>Github</a:t>
-            </a:r>
-            <a:r>
-              <a:rPr lang="en-US" dirty="0" smtClean="0"/>
-              <a:t> link: </a:t>
-            </a:r>
-            <a:r>
-              <a:rPr lang="en-US" dirty="0">
-                <a:hlinkClick r:id="rId2"/>
-              </a:rPr>
-              <a:t>https://github.com/sasmita/</a:t>
-            </a:r>
-            <a:r>
-              <a:rPr lang="en-US" dirty="0" smtClean="0">
-                <a:hlinkClick r:id="rId2"/>
-              </a:rPr>
-              <a:t>QuantumLight</a:t>
-            </a:r>
-            <a:endParaRPr lang="en-US" dirty="0" smtClean="0"/>
-          </a:p>
-          <a:p>
-            <a:r>
-              <a:rPr lang="en-US" dirty="0" smtClean="0">
-                <a:hlinkClick r:id="rId3"/>
-              </a:rPr>
-              <a:t>http</a:t>
-            </a:r>
-            <a:r>
-              <a:rPr lang="en-US" dirty="0">
-                <a:hlinkClick r:id="rId3"/>
-              </a:rPr>
-              <a:t>://arduino.cc/en/Tutorial/</a:t>
-            </a:r>
-            <a:r>
-              <a:rPr lang="en-US" dirty="0" smtClean="0">
-                <a:hlinkClick r:id="rId3"/>
-              </a:rPr>
-              <a:t>HomePage</a:t>
-            </a:r>
-            <a:endParaRPr lang="en-US" dirty="0" smtClean="0"/>
-          </a:p>
-          <a:p>
-            <a:r>
-              <a:rPr lang="en-US" dirty="0">
-                <a:hlinkClick r:id="rId4"/>
-              </a:rPr>
-              <a:t>https://github.com/adafruit/</a:t>
-            </a:r>
-            <a:r>
-              <a:rPr lang="en-US" dirty="0" smtClean="0">
-                <a:hlinkClick r:id="rId4"/>
-              </a:rPr>
-              <a:t>Adafruit_NeoPixel</a:t>
-            </a:r>
-            <a:endParaRPr lang="en-US" dirty="0" smtClean="0"/>
-          </a:p>
-          <a:p>
-            <a:r>
-              <a:rPr lang="en-US" dirty="0"/>
-              <a:t>http://</a:t>
-            </a:r>
-            <a:r>
-              <a:rPr lang="en-US" dirty="0" err="1"/>
-              <a:t>playground.arduino.cc</a:t>
-            </a:r>
-            <a:r>
-              <a:rPr lang="en-US" dirty="0"/>
-              <a:t>/interfacing/python</a:t>
-            </a:r>
-            <a:endParaRPr lang="en-US" dirty="0" smtClean="0"/>
-          </a:p>
-          <a:p>
-            <a:pPr lvl="1"/>
-            <a:endParaRPr lang="en-US" dirty="0" smtClean="0"/>
-          </a:p>
-        </p:txBody>
-      </p:sp>
-    </p:spTree>
-    <p:extLst>
-      <p:ext uri="{BB962C8B-B14F-4D97-AF65-F5344CB8AC3E}">
-        <p14:creationId xmlns:p14="http://schemas.microsoft.com/office/powerpoint/2010/main" val="1935744794"/>
-      </p:ext>
-    </p:extLst>
-  </p:cSld>
-  <p:clrMapOvr>
-    <a:masterClrMapping/>
-  </p:clrMapOvr>
-  <p:timing>
-    <p:tnLst>
-      <p:par>
-        <p:cTn xmlns:p14="http://schemas.microsoft.com/office/powerpoint/2010/main" id="1" dur="indefinite" restart="never" nodeType="tmRoot"/>
-      </p:par>
-    </p:tnLst>
-  </p:timing>
-</p:sld>
-</file>
-
-<file path=ppt/slides/slide25.xml><?xml version="1.0" encoding="utf-8"?>
-<p:sld xmlns:a="http://schemas.openxmlformats.org/drawingml/2006/main" xmlns:r="http://schemas.openxmlformats.org/officeDocument/2006/relationships" xmlns:p="http://schemas.openxmlformats.org/presentationml/2006/main">
-  <p:cSld>
-    <p:spTree>
-      <p:nvGrpSpPr>
-        <p:cNvPr id="1" name=""/>
-        <p:cNvGrpSpPr/>
-        <p:nvPr/>
-      </p:nvGrpSpPr>
-      <p:grpSpPr>
-        <a:xfrm>
-          <a:off x="0" y="0"/>
-          <a:ext cx="0" cy="0"/>
-          <a:chOff x="0" y="0"/>
-          <a:chExt cx="0" cy="0"/>
-        </a:xfrm>
-      </p:grpSpPr>
-      <p:sp>
-        <p:nvSpPr>
-          <p:cNvPr id="3" name="Content Placeholder 2"/>
-          <p:cNvSpPr>
-            <a:spLocks noGrp="1"/>
-          </p:cNvSpPr>
-          <p:nvPr>
-            <p:ph idx="1"/>
-          </p:nvPr>
-        </p:nvSpPr>
-        <p:spPr>
-          <a:xfrm>
-            <a:off x="1114424" y="1995714"/>
-            <a:ext cx="7610476" cy="2697239"/>
-          </a:xfrm>
-        </p:spPr>
-        <p:txBody>
-          <a:bodyPr>
-            <a:normAutofit/>
-          </a:bodyPr>
-          <a:lstStyle/>
-          <a:p>
-            <a:pPr marL="0" indent="0">
-              <a:buNone/>
-            </a:pPr>
-            <a:r>
-              <a:rPr lang="en-US" sz="3200" dirty="0"/>
-              <a:t>	</a:t>
-            </a:r>
-            <a:endParaRPr lang="en-US" sz="5400" dirty="0" smtClean="0"/>
-          </a:p>
-          <a:p>
-            <a:pPr marL="0" indent="0">
-              <a:buNone/>
-            </a:pPr>
-            <a:r>
-              <a:rPr lang="en-US" sz="5400" dirty="0"/>
-              <a:t>	</a:t>
-            </a:r>
-            <a:r>
-              <a:rPr lang="en-US" sz="5400" dirty="0" smtClean="0"/>
-              <a:t>QUESTIONS ??</a:t>
-            </a:r>
-            <a:endParaRPr lang="en-US" sz="5400" dirty="0"/>
-          </a:p>
-        </p:txBody>
-      </p:sp>
-    </p:spTree>
-    <p:extLst>
-      <p:ext uri="{BB962C8B-B14F-4D97-AF65-F5344CB8AC3E}">
-        <p14:creationId xmlns:p14="http://schemas.microsoft.com/office/powerpoint/2010/main" val="3830823051"/>
+        <p14:creationId xmlns:p14="http://schemas.microsoft.com/office/powerpoint/2010/main" val="1751587191"/>
       </p:ext>
     </p:extLst>
   </p:cSld>
@@ -13233,11 +13582,7 @@
           <a:p>
             <a:r>
               <a:rPr lang="en-US" dirty="0" smtClean="0"/>
-              <a:t>Quantum Light </a:t>
-            </a:r>
-            <a:r>
-              <a:rPr lang="en-US" dirty="0" smtClean="0"/>
-              <a:t>: Block diagram</a:t>
+              <a:t>Quantum Light : Block diagram</a:t>
             </a:r>
             <a:endParaRPr lang="en-US" dirty="0"/>
           </a:p>
@@ -13279,22 +13624,14 @@
             <a:pPr algn="ctr"/>
             <a:r>
               <a:rPr lang="en-US" dirty="0" smtClean="0"/>
-              <a:t>sensor </a:t>
-            </a:r>
+              <a:t>sensor data</a:t>
+            </a:r>
+          </a:p>
+          <a:p>
+            <a:pPr algn="ctr"/>
             <a:r>
               <a:rPr lang="en-US" dirty="0" smtClean="0"/>
-              <a:t>data</a:t>
-            </a:r>
-          </a:p>
-          <a:p>
-            <a:pPr algn="ctr"/>
-            <a:r>
-              <a:rPr lang="en-US" dirty="0" smtClean="0"/>
-              <a:t>?</a:t>
-            </a:r>
-            <a:r>
-              <a:rPr lang="en-US" dirty="0" smtClean="0"/>
-              <a:t>?</a:t>
+              <a:t>??</a:t>
             </a:r>
             <a:endParaRPr lang="en-US" dirty="0"/>
           </a:p>
@@ -13343,11 +13680,7 @@
             <a:pPr algn="ctr"/>
             <a:r>
               <a:rPr lang="en-US" dirty="0" smtClean="0"/>
-              <a:t>online </a:t>
-            </a:r>
-            <a:r>
-              <a:rPr lang="en-US" dirty="0" smtClean="0"/>
-              <a:t>data</a:t>
+              <a:t>online data</a:t>
             </a:r>
             <a:endParaRPr lang="en-US" dirty="0"/>
           </a:p>
@@ -13426,11 +13759,7 @@
             <a:pPr algn="ctr"/>
             <a:r>
               <a:rPr lang="en-US" dirty="0" smtClean="0"/>
-              <a:t>Using </a:t>
-            </a:r>
-            <a:r>
-              <a:rPr lang="en-US" dirty="0" smtClean="0"/>
-              <a:t>Arduino</a:t>
+              <a:t>(Using Arduino)</a:t>
             </a:r>
             <a:endParaRPr lang="en-US" dirty="0"/>
           </a:p>
@@ -13474,13 +13803,16 @@
               <a:rPr lang="en-US" dirty="0" smtClean="0"/>
               <a:t>Classify</a:t>
             </a:r>
-            <a:endParaRPr lang="en-US" dirty="0" smtClean="0"/>
           </a:p>
           <a:p>
             <a:pPr algn="ctr"/>
             <a:r>
               <a:rPr lang="en-US" dirty="0" smtClean="0"/>
-              <a:t>data using Computer</a:t>
+              <a:t>data </a:t>
+            </a:r>
+            <a:r>
+              <a:rPr lang="en-US" dirty="0" smtClean="0"/>
+              <a:t>(using Computer)</a:t>
             </a:r>
             <a:endParaRPr lang="en-US" dirty="0"/>
           </a:p>
@@ -13781,7 +14113,6 @@
               <a:rPr lang="en-US" dirty="0" smtClean="0"/>
               <a:t>Display</a:t>
             </a:r>
-            <a:endParaRPr lang="en-US" dirty="0" smtClean="0"/>
           </a:p>
           <a:p>
             <a:pPr algn="ctr"/>
@@ -13821,7 +14152,7 @@
             <a:pPr algn="ctr"/>
             <a:r>
               <a:rPr lang="en-US" dirty="0" smtClean="0"/>
-              <a:t>Using ARDUINO</a:t>
+              <a:t>(Using ARDUINO)</a:t>
             </a:r>
             <a:endParaRPr lang="en-US" dirty="0"/>
           </a:p>
@@ -14077,7 +14408,7 @@
             <p:ph idx="1"/>
             <p:extLst>
               <p:ext uri="{D42A27DB-BD31-4B8C-83A1-F6EECF244321}">
-                <p14:modId xmlns:p14="http://schemas.microsoft.com/office/powerpoint/2010/main" val="3524098972"/>
+                <p14:modId xmlns:p14="http://schemas.microsoft.com/office/powerpoint/2010/main" val="474971009"/>
               </p:ext>
             </p:extLst>
           </p:nvPr>
@@ -14198,7 +14529,13 @@
                       <a:endParaRPr lang="en-US" dirty="0"/>
                     </a:p>
                   </a:txBody>
-                  <a:tcPr/>
+                  <a:tcPr>
+                    <a:solidFill>
+                      <a:schemeClr val="accent4">
+                        <a:lumMod val="75000"/>
+                      </a:schemeClr>
+                    </a:solidFill>
+                  </a:tcPr>
                 </a:tc>
               </a:tr>
               <a:tr h="370840">
@@ -14242,7 +14579,13 @@
                       <a:endParaRPr lang="en-US" dirty="0"/>
                     </a:p>
                   </a:txBody>
-                  <a:tcPr/>
+                  <a:tcPr>
+                    <a:solidFill>
+                      <a:schemeClr val="accent4">
+                        <a:lumMod val="75000"/>
+                      </a:schemeClr>
+                    </a:solidFill>
+                  </a:tcPr>
                 </a:tc>
               </a:tr>
               <a:tr h="370840">
@@ -14286,7 +14629,13 @@
                       <a:endParaRPr lang="en-US" dirty="0"/>
                     </a:p>
                   </a:txBody>
-                  <a:tcPr/>
+                  <a:tcPr>
+                    <a:solidFill>
+                      <a:schemeClr val="accent4">
+                        <a:lumMod val="75000"/>
+                      </a:schemeClr>
+                    </a:solidFill>
+                  </a:tcPr>
                 </a:tc>
               </a:tr>
               <a:tr h="370840">
@@ -14330,7 +14679,11 @@
                       <a:endParaRPr lang="en-US" dirty="0"/>
                     </a:p>
                   </a:txBody>
-                  <a:tcPr/>
+                  <a:tcPr>
+                    <a:solidFill>
+                      <a:srgbClr val="FA97FF"/>
+                    </a:solidFill>
+                  </a:tcPr>
                 </a:tc>
               </a:tr>
               <a:tr h="370840">
@@ -14374,7 +14727,11 @@
                       <a:endParaRPr lang="en-US" dirty="0"/>
                     </a:p>
                   </a:txBody>
-                  <a:tcPr/>
+                  <a:tcPr>
+                    <a:solidFill>
+                      <a:srgbClr val="FA97FF"/>
+                    </a:solidFill>
+                  </a:tcPr>
                 </a:tc>
               </a:tr>
               <a:tr h="370840">
@@ -14426,7 +14783,11 @@
                       <a:endParaRPr lang="en-US" dirty="0"/>
                     </a:p>
                   </a:txBody>
-                  <a:tcPr/>
+                  <a:tcPr>
+                    <a:solidFill>
+                      <a:srgbClr val="FA97FF"/>
+                    </a:solidFill>
+                  </a:tcPr>
                 </a:tc>
               </a:tr>
               <a:tr h="370840">
@@ -14470,7 +14831,11 @@
                       <a:endParaRPr lang="en-US" dirty="0"/>
                     </a:p>
                   </a:txBody>
-                  <a:tcPr/>
+                  <a:tcPr>
+                    <a:solidFill>
+                      <a:srgbClr val="FF0000"/>
+                    </a:solidFill>
+                  </a:tcPr>
                 </a:tc>
               </a:tr>
               <a:tr h="370840">
@@ -14514,7 +14879,11 @@
                       <a:endParaRPr lang="en-US" dirty="0"/>
                     </a:p>
                   </a:txBody>
-                  <a:tcPr/>
+                  <a:tcPr>
+                    <a:solidFill>
+                      <a:srgbClr val="FF0000"/>
+                    </a:solidFill>
+                  </a:tcPr>
                 </a:tc>
               </a:tr>
               <a:tr h="370840">
@@ -14558,7 +14927,11 @@
                       <a:endParaRPr lang="en-US" dirty="0"/>
                     </a:p>
                   </a:txBody>
-                  <a:tcPr/>
+                  <a:tcPr>
+                    <a:solidFill>
+                      <a:srgbClr val="FF0000"/>
+                    </a:solidFill>
+                  </a:tcPr>
                 </a:tc>
               </a:tr>
             </a:tbl>
@@ -14800,6 +15173,96 @@
       </p:grpSpPr>
       <p:sp>
         <p:nvSpPr>
+          <p:cNvPr id="12" name="Rectangle 11"/>
+          <p:cNvSpPr/>
+          <p:nvPr/>
+        </p:nvSpPr>
+        <p:spPr>
+          <a:xfrm>
+            <a:off x="162825" y="2138544"/>
+            <a:ext cx="4993311" cy="4570191"/>
+          </a:xfrm>
+          <a:prstGeom prst="rect">
+            <a:avLst/>
+          </a:prstGeom>
+          <a:solidFill>
+            <a:schemeClr val="accent6">
+              <a:lumMod val="60000"/>
+              <a:lumOff val="40000"/>
+              <a:alpha val="24000"/>
+            </a:schemeClr>
+          </a:solidFill>
+        </p:spPr>
+        <p:style>
+          <a:lnRef idx="1">
+            <a:schemeClr val="accent1"/>
+          </a:lnRef>
+          <a:fillRef idx="3">
+            <a:schemeClr val="accent1"/>
+          </a:fillRef>
+          <a:effectRef idx="2">
+            <a:schemeClr val="accent1"/>
+          </a:effectRef>
+          <a:fontRef idx="minor">
+            <a:schemeClr val="lt1"/>
+          </a:fontRef>
+        </p:style>
+        <p:txBody>
+          <a:bodyPr rtlCol="0" anchor="ctr"/>
+          <a:lstStyle/>
+          <a:p>
+            <a:pPr algn="ctr"/>
+            <a:endParaRPr lang="en-US" dirty="0"/>
+          </a:p>
+        </p:txBody>
+      </p:sp>
+      <p:sp>
+        <p:nvSpPr>
+          <p:cNvPr id="13" name="Rectangle 12"/>
+          <p:cNvSpPr/>
+          <p:nvPr/>
+        </p:nvSpPr>
+        <p:spPr>
+          <a:xfrm>
+            <a:off x="5329815" y="2113717"/>
+            <a:ext cx="3583998" cy="4570191"/>
+          </a:xfrm>
+          <a:prstGeom prst="rect">
+            <a:avLst/>
+          </a:prstGeom>
+          <a:solidFill>
+            <a:schemeClr val="accent6">
+              <a:lumMod val="60000"/>
+              <a:lumOff val="40000"/>
+              <a:alpha val="24000"/>
+            </a:schemeClr>
+          </a:solidFill>
+        </p:spPr>
+        <p:style>
+          <a:lnRef idx="1">
+            <a:schemeClr val="accent1"/>
+          </a:lnRef>
+          <a:fillRef idx="3">
+            <a:schemeClr val="accent1"/>
+          </a:fillRef>
+          <a:effectRef idx="2">
+            <a:schemeClr val="accent1"/>
+          </a:effectRef>
+          <a:fontRef idx="minor">
+            <a:schemeClr val="lt1"/>
+          </a:fontRef>
+        </p:style>
+        <p:txBody>
+          <a:bodyPr rtlCol="0" anchor="ctr"/>
+          <a:lstStyle/>
+          <a:p>
+            <a:pPr algn="ctr"/>
+            <a:endParaRPr lang="en-US"/>
+          </a:p>
+        </p:txBody>
+      </p:sp>
+      <p:sp>
+        <p:nvSpPr>
           <p:cNvPr id="2" name="Title 1"/>
           <p:cNvSpPr>
             <a:spLocks noGrp="1"/>
@@ -14823,123 +15286,993 @@
       </p:sp>
       <p:sp>
         <p:nvSpPr>
-          <p:cNvPr id="5" name="Rectangle 4"/>
+          <p:cNvPr id="3" name="Process 2"/>
           <p:cNvSpPr/>
           <p:nvPr/>
         </p:nvSpPr>
         <p:spPr>
           <a:xfrm>
-            <a:off x="2286000" y="2698218"/>
-            <a:ext cx="4572000" cy="2585323"/>
+            <a:off x="2214425" y="4993558"/>
+            <a:ext cx="1639108" cy="499356"/>
+          </a:xfrm>
+          <a:prstGeom prst="flowChartProcess">
+            <a:avLst/>
+          </a:prstGeom>
+        </p:spPr>
+        <p:style>
+          <a:lnRef idx="1">
+            <a:schemeClr val="accent1"/>
+          </a:lnRef>
+          <a:fillRef idx="3">
+            <a:schemeClr val="accent1"/>
+          </a:fillRef>
+          <a:effectRef idx="2">
+            <a:schemeClr val="accent1"/>
+          </a:effectRef>
+          <a:fontRef idx="minor">
+            <a:schemeClr val="lt1"/>
+          </a:fontRef>
+        </p:style>
+        <p:txBody>
+          <a:bodyPr rtlCol="0" anchor="ctr"/>
+          <a:lstStyle/>
+          <a:p>
+            <a:pPr algn="ctr"/>
+            <a:r>
+              <a:rPr lang="en-US" dirty="0" smtClean="0"/>
+              <a:t>Classify</a:t>
+            </a:r>
+            <a:endParaRPr lang="en-US" dirty="0"/>
+          </a:p>
+        </p:txBody>
+      </p:sp>
+      <p:sp>
+        <p:nvSpPr>
+          <p:cNvPr id="6" name="Process 5"/>
+          <p:cNvSpPr/>
+          <p:nvPr/>
+        </p:nvSpPr>
+        <p:spPr>
+          <a:xfrm>
+            <a:off x="2914572" y="3566893"/>
+            <a:ext cx="1573978" cy="645064"/>
+          </a:xfrm>
+          <a:prstGeom prst="flowChartProcess">
+            <a:avLst/>
+          </a:prstGeom>
+        </p:spPr>
+        <p:style>
+          <a:lnRef idx="1">
+            <a:schemeClr val="accent1"/>
+          </a:lnRef>
+          <a:fillRef idx="3">
+            <a:schemeClr val="accent1"/>
+          </a:fillRef>
+          <a:effectRef idx="2">
+            <a:schemeClr val="accent1"/>
+          </a:effectRef>
+          <a:fontRef idx="minor">
+            <a:schemeClr val="lt1"/>
+          </a:fontRef>
+        </p:style>
+        <p:txBody>
+          <a:bodyPr rtlCol="0" anchor="ctr"/>
+          <a:lstStyle/>
+          <a:p>
+            <a:pPr algn="ctr"/>
+            <a:r>
+              <a:rPr lang="en-US" dirty="0" smtClean="0"/>
+              <a:t>Get Sensor Data</a:t>
+            </a:r>
+            <a:endParaRPr lang="en-US" dirty="0"/>
+          </a:p>
+        </p:txBody>
+      </p:sp>
+      <p:sp>
+        <p:nvSpPr>
+          <p:cNvPr id="7" name="Process 6"/>
+          <p:cNvSpPr/>
+          <p:nvPr/>
+        </p:nvSpPr>
+        <p:spPr>
+          <a:xfrm>
+            <a:off x="960669" y="4211957"/>
+            <a:ext cx="1530558" cy="618874"/>
+          </a:xfrm>
+          <a:prstGeom prst="flowChartProcess">
+            <a:avLst/>
+          </a:prstGeom>
+        </p:spPr>
+        <p:style>
+          <a:lnRef idx="1">
+            <a:schemeClr val="accent1"/>
+          </a:lnRef>
+          <a:fillRef idx="3">
+            <a:schemeClr val="accent1"/>
+          </a:fillRef>
+          <a:effectRef idx="2">
+            <a:schemeClr val="accent1"/>
+          </a:effectRef>
+          <a:fontRef idx="minor">
+            <a:schemeClr val="lt1"/>
+          </a:fontRef>
+        </p:style>
+        <p:txBody>
+          <a:bodyPr rtlCol="0" anchor="ctr"/>
+          <a:lstStyle/>
+          <a:p>
+            <a:pPr algn="ctr"/>
+            <a:r>
+              <a:rPr lang="en-US" dirty="0" smtClean="0"/>
+              <a:t>Get Internet Data</a:t>
+            </a:r>
+            <a:endParaRPr lang="en-US" dirty="0"/>
+          </a:p>
+        </p:txBody>
+      </p:sp>
+      <p:sp>
+        <p:nvSpPr>
+          <p:cNvPr id="4" name="Decision 3"/>
+          <p:cNvSpPr/>
+          <p:nvPr/>
+        </p:nvSpPr>
+        <p:spPr>
+          <a:xfrm>
+            <a:off x="1101784" y="2267065"/>
+            <a:ext cx="1812788" cy="1194112"/>
+          </a:xfrm>
+          <a:prstGeom prst="flowChartDecision">
+            <a:avLst/>
+          </a:prstGeom>
+        </p:spPr>
+        <p:style>
+          <a:lnRef idx="1">
+            <a:schemeClr val="accent1"/>
+          </a:lnRef>
+          <a:fillRef idx="3">
+            <a:schemeClr val="accent1"/>
+          </a:fillRef>
+          <a:effectRef idx="2">
+            <a:schemeClr val="accent1"/>
+          </a:effectRef>
+          <a:fontRef idx="minor">
+            <a:schemeClr val="lt1"/>
+          </a:fontRef>
+        </p:style>
+        <p:txBody>
+          <a:bodyPr rtlCol="0" anchor="ctr"/>
+          <a:lstStyle/>
+          <a:p>
+            <a:pPr algn="ctr"/>
+            <a:r>
+              <a:rPr lang="en-US" sz="1400" dirty="0" smtClean="0"/>
+              <a:t>Sensor?</a:t>
+            </a:r>
+            <a:endParaRPr lang="en-US" sz="1400" dirty="0"/>
+          </a:p>
+        </p:txBody>
+      </p:sp>
+      <p:sp>
+        <p:nvSpPr>
+          <p:cNvPr id="8" name="Process 7"/>
+          <p:cNvSpPr/>
+          <p:nvPr/>
+        </p:nvSpPr>
+        <p:spPr>
+          <a:xfrm>
+            <a:off x="2214425" y="5862425"/>
+            <a:ext cx="1639108" cy="499356"/>
+          </a:xfrm>
+          <a:prstGeom prst="flowChartProcess">
+            <a:avLst/>
+          </a:prstGeom>
+        </p:spPr>
+        <p:style>
+          <a:lnRef idx="1">
+            <a:schemeClr val="accent1"/>
+          </a:lnRef>
+          <a:fillRef idx="3">
+            <a:schemeClr val="accent1"/>
+          </a:fillRef>
+          <a:effectRef idx="2">
+            <a:schemeClr val="accent1"/>
+          </a:effectRef>
+          <a:fontRef idx="minor">
+            <a:schemeClr val="lt1"/>
+          </a:fontRef>
+        </p:style>
+        <p:txBody>
+          <a:bodyPr rtlCol="0" anchor="ctr"/>
+          <a:lstStyle/>
+          <a:p>
+            <a:pPr algn="ctr"/>
+            <a:r>
+              <a:rPr lang="en-US" dirty="0" smtClean="0"/>
+              <a:t>Send Pattern</a:t>
+            </a:r>
+            <a:endParaRPr lang="en-US" dirty="0"/>
+          </a:p>
+        </p:txBody>
+      </p:sp>
+      <p:sp>
+        <p:nvSpPr>
+          <p:cNvPr id="9" name="Process 8"/>
+          <p:cNvSpPr/>
+          <p:nvPr/>
+        </p:nvSpPr>
+        <p:spPr>
+          <a:xfrm>
+            <a:off x="5710172" y="3566893"/>
+            <a:ext cx="1768938" cy="645064"/>
+          </a:xfrm>
+          <a:prstGeom prst="flowChartProcess">
+            <a:avLst/>
+          </a:prstGeom>
+        </p:spPr>
+        <p:style>
+          <a:lnRef idx="1">
+            <a:schemeClr val="accent1"/>
+          </a:lnRef>
+          <a:fillRef idx="3">
+            <a:schemeClr val="accent1"/>
+          </a:fillRef>
+          <a:effectRef idx="2">
+            <a:schemeClr val="accent1"/>
+          </a:effectRef>
+          <a:fontRef idx="minor">
+            <a:schemeClr val="lt1"/>
+          </a:fontRef>
+        </p:style>
+        <p:txBody>
+          <a:bodyPr rtlCol="0" anchor="ctr"/>
+          <a:lstStyle/>
+          <a:p>
+            <a:pPr algn="ctr"/>
+            <a:r>
+              <a:rPr lang="en-US" dirty="0" smtClean="0"/>
+              <a:t>Send Sensor Data</a:t>
+            </a:r>
+            <a:endParaRPr lang="en-US" dirty="0"/>
+          </a:p>
+        </p:txBody>
+      </p:sp>
+      <p:sp>
+        <p:nvSpPr>
+          <p:cNvPr id="11" name="Process 10"/>
+          <p:cNvSpPr/>
+          <p:nvPr/>
+        </p:nvSpPr>
+        <p:spPr>
+          <a:xfrm>
+            <a:off x="5742737" y="5716717"/>
+            <a:ext cx="1768938" cy="645064"/>
+          </a:xfrm>
+          <a:prstGeom prst="flowChartProcess">
+            <a:avLst/>
+          </a:prstGeom>
+        </p:spPr>
+        <p:style>
+          <a:lnRef idx="1">
+            <a:schemeClr val="accent1"/>
+          </a:lnRef>
+          <a:fillRef idx="3">
+            <a:schemeClr val="accent1"/>
+          </a:fillRef>
+          <a:effectRef idx="2">
+            <a:schemeClr val="accent1"/>
+          </a:effectRef>
+          <a:fontRef idx="minor">
+            <a:schemeClr val="lt1"/>
+          </a:fontRef>
+        </p:style>
+        <p:txBody>
+          <a:bodyPr rtlCol="0" anchor="ctr"/>
+          <a:lstStyle/>
+          <a:p>
+            <a:pPr algn="ctr"/>
+            <a:r>
+              <a:rPr lang="en-US" dirty="0" smtClean="0"/>
+              <a:t>Display LED Pattern</a:t>
+            </a:r>
+            <a:endParaRPr lang="en-US" dirty="0"/>
+          </a:p>
+        </p:txBody>
+      </p:sp>
+      <p:sp>
+        <p:nvSpPr>
+          <p:cNvPr id="14" name="TextBox 13"/>
+          <p:cNvSpPr txBox="1"/>
+          <p:nvPr/>
+        </p:nvSpPr>
+        <p:spPr>
+          <a:xfrm>
+            <a:off x="3126246" y="2267065"/>
+            <a:ext cx="1880405" cy="369332"/>
           </a:xfrm>
           <a:prstGeom prst="rect">
             <a:avLst/>
           </a:prstGeom>
+          <a:noFill/>
         </p:spPr>
         <p:txBody>
-          <a:bodyPr>
+          <a:bodyPr wrap="none" rtlCol="0">
             <a:spAutoFit/>
           </a:bodyPr>
           <a:lstStyle/>
           <a:p>
             <a:r>
               <a:rPr lang="en-US" dirty="0" smtClean="0"/>
-              <a:t>while</a:t>
-            </a:r>
-            <a:r>
-              <a:rPr lang="en-US" dirty="0"/>
-              <a:t>(1)</a:t>
-            </a:r>
-            <a:r>
-              <a:rPr lang="en-US" dirty="0" smtClean="0"/>
-              <a:t>:</a:t>
-            </a:r>
-          </a:p>
-          <a:p>
-            <a:endParaRPr lang="en-US" dirty="0"/>
-          </a:p>
-          <a:p>
-            <a:r>
-              <a:rPr lang="en-US" dirty="0"/>
-              <a:t>  </a:t>
-            </a:r>
-            <a:r>
-              <a:rPr lang="en-US" dirty="0" smtClean="0"/>
-              <a:t>   </a:t>
-            </a:r>
-            <a:r>
-              <a:rPr lang="en-US" dirty="0" err="1" smtClean="0"/>
-              <a:t>classifyWeather</a:t>
-            </a:r>
-            <a:r>
-              <a:rPr lang="en-US" dirty="0" smtClean="0"/>
-              <a:t>()</a:t>
-            </a:r>
-            <a:endParaRPr lang="en-US" dirty="0"/>
-          </a:p>
-          <a:p>
-            <a:endParaRPr lang="en-US" dirty="0"/>
-          </a:p>
-          <a:p>
-            <a:r>
-              <a:rPr lang="en-US" dirty="0"/>
-              <a:t> </a:t>
-            </a:r>
-            <a:r>
-              <a:rPr lang="en-US" dirty="0" smtClean="0"/>
-              <a:t>    </a:t>
-            </a:r>
-            <a:r>
-              <a:rPr lang="en-US" dirty="0"/>
-              <a:t>pattern = </a:t>
-            </a:r>
-            <a:r>
-              <a:rPr lang="en-US" dirty="0" err="1" smtClean="0"/>
-              <a:t>getPattern</a:t>
-            </a:r>
-            <a:r>
-              <a:rPr lang="en-US" dirty="0" smtClean="0"/>
-              <a:t>()</a:t>
-            </a:r>
-            <a:endParaRPr lang="en-US" dirty="0"/>
-          </a:p>
-          <a:p>
-            <a:endParaRPr lang="en-US" dirty="0"/>
-          </a:p>
-          <a:p>
-            <a:r>
-              <a:rPr lang="en-US" dirty="0" smtClean="0"/>
-              <a:t>     </a:t>
-            </a:r>
-            <a:r>
-              <a:rPr lang="en-US" dirty="0" err="1" smtClean="0"/>
-              <a:t>srl.write</a:t>
-            </a:r>
-            <a:r>
-              <a:rPr lang="en-US" dirty="0"/>
-              <a:t>(pattern)</a:t>
-            </a:r>
-          </a:p>
-          <a:p>
-            <a:endParaRPr lang="en-US" dirty="0"/>
-          </a:p>
-          <a:p>
-            <a:r>
-              <a:rPr lang="en-US" dirty="0" smtClean="0"/>
-              <a:t>     </a:t>
-            </a:r>
-            <a:r>
-              <a:rPr lang="en-US" dirty="0" err="1" smtClean="0"/>
-              <a:t>time.sleep</a:t>
-            </a:r>
-            <a:r>
-              <a:rPr lang="en-US" dirty="0" smtClean="0"/>
-              <a:t>(60)</a:t>
+              <a:t>On the PC Side</a:t>
             </a:r>
             <a:endParaRPr lang="en-US" dirty="0"/>
           </a:p>
         </p:txBody>
       </p:sp>
+      <p:sp>
+        <p:nvSpPr>
+          <p:cNvPr id="15" name="TextBox 14"/>
+          <p:cNvSpPr txBox="1"/>
+          <p:nvPr/>
+        </p:nvSpPr>
+        <p:spPr>
+          <a:xfrm>
+            <a:off x="6507610" y="2267065"/>
+            <a:ext cx="2406203" cy="369332"/>
+          </a:xfrm>
+          <a:prstGeom prst="rect">
+            <a:avLst/>
+          </a:prstGeom>
+          <a:noFill/>
+        </p:spPr>
+        <p:txBody>
+          <a:bodyPr wrap="none" rtlCol="0">
+            <a:spAutoFit/>
+          </a:bodyPr>
+          <a:lstStyle/>
+          <a:p>
+            <a:r>
+              <a:rPr lang="en-US" dirty="0" smtClean="0"/>
+              <a:t>On the Arduino side</a:t>
+            </a:r>
+            <a:endParaRPr lang="en-US" dirty="0"/>
+          </a:p>
+        </p:txBody>
+      </p:sp>
+      <p:cxnSp>
+        <p:nvCxnSpPr>
+          <p:cNvPr id="26" name="Straight Connector 25"/>
+          <p:cNvCxnSpPr/>
+          <p:nvPr/>
+        </p:nvCxnSpPr>
+        <p:spPr>
+          <a:xfrm flipH="1">
+            <a:off x="7479110" y="3745168"/>
+            <a:ext cx="379927" cy="0"/>
+          </a:xfrm>
+          <a:prstGeom prst="line">
+            <a:avLst/>
+          </a:prstGeom>
+        </p:spPr>
+        <p:style>
+          <a:lnRef idx="2">
+            <a:schemeClr val="accent1"/>
+          </a:lnRef>
+          <a:fillRef idx="0">
+            <a:schemeClr val="accent1"/>
+          </a:fillRef>
+          <a:effectRef idx="1">
+            <a:schemeClr val="accent1"/>
+          </a:effectRef>
+          <a:fontRef idx="minor">
+            <a:schemeClr val="tx1"/>
+          </a:fontRef>
+        </p:style>
+      </p:cxnSp>
+      <p:cxnSp>
+        <p:nvCxnSpPr>
+          <p:cNvPr id="27" name="Straight Connector 26"/>
+          <p:cNvCxnSpPr/>
+          <p:nvPr/>
+        </p:nvCxnSpPr>
+        <p:spPr>
+          <a:xfrm flipH="1">
+            <a:off x="7511675" y="6023135"/>
+            <a:ext cx="379927" cy="0"/>
+          </a:xfrm>
+          <a:prstGeom prst="line">
+            <a:avLst/>
+          </a:prstGeom>
+        </p:spPr>
+        <p:style>
+          <a:lnRef idx="2">
+            <a:schemeClr val="accent1"/>
+          </a:lnRef>
+          <a:fillRef idx="0">
+            <a:schemeClr val="accent1"/>
+          </a:fillRef>
+          <a:effectRef idx="1">
+            <a:schemeClr val="accent1"/>
+          </a:effectRef>
+          <a:fontRef idx="minor">
+            <a:schemeClr val="tx1"/>
+          </a:fontRef>
+        </p:style>
+      </p:cxnSp>
+      <p:cxnSp>
+        <p:nvCxnSpPr>
+          <p:cNvPr id="28" name="Straight Connector 27"/>
+          <p:cNvCxnSpPr/>
+          <p:nvPr/>
+        </p:nvCxnSpPr>
+        <p:spPr>
+          <a:xfrm flipH="1">
+            <a:off x="488907" y="2865868"/>
+            <a:ext cx="612877" cy="0"/>
+          </a:xfrm>
+          <a:prstGeom prst="line">
+            <a:avLst/>
+          </a:prstGeom>
+        </p:spPr>
+        <p:style>
+          <a:lnRef idx="2">
+            <a:schemeClr val="accent1"/>
+          </a:lnRef>
+          <a:fillRef idx="0">
+            <a:schemeClr val="accent1"/>
+          </a:fillRef>
+          <a:effectRef idx="1">
+            <a:schemeClr val="accent1"/>
+          </a:effectRef>
+          <a:fontRef idx="minor">
+            <a:schemeClr val="tx1"/>
+          </a:fontRef>
+        </p:style>
+      </p:cxnSp>
+      <p:cxnSp>
+        <p:nvCxnSpPr>
+          <p:cNvPr id="29" name="Straight Connector 28"/>
+          <p:cNvCxnSpPr/>
+          <p:nvPr/>
+        </p:nvCxnSpPr>
+        <p:spPr>
+          <a:xfrm flipH="1">
+            <a:off x="488907" y="6166803"/>
+            <a:ext cx="1725518" cy="0"/>
+          </a:xfrm>
+          <a:prstGeom prst="line">
+            <a:avLst/>
+          </a:prstGeom>
+        </p:spPr>
+        <p:style>
+          <a:lnRef idx="2">
+            <a:schemeClr val="accent1"/>
+          </a:lnRef>
+          <a:fillRef idx="0">
+            <a:schemeClr val="accent1"/>
+          </a:fillRef>
+          <a:effectRef idx="1">
+            <a:schemeClr val="accent1"/>
+          </a:effectRef>
+          <a:fontRef idx="minor">
+            <a:schemeClr val="tx1"/>
+          </a:fontRef>
+        </p:style>
+      </p:cxnSp>
+      <p:sp>
+        <p:nvSpPr>
+          <p:cNvPr id="32" name="TextBox 31"/>
+          <p:cNvSpPr txBox="1"/>
+          <p:nvPr/>
+        </p:nvSpPr>
+        <p:spPr>
+          <a:xfrm>
+            <a:off x="7940898" y="4646165"/>
+            <a:ext cx="921459" cy="369332"/>
+          </a:xfrm>
+          <a:prstGeom prst="rect">
+            <a:avLst/>
+          </a:prstGeom>
+          <a:noFill/>
+        </p:spPr>
+        <p:txBody>
+          <a:bodyPr wrap="none" rtlCol="0">
+            <a:spAutoFit/>
+          </a:bodyPr>
+          <a:lstStyle/>
+          <a:p>
+            <a:r>
+              <a:rPr lang="en-US" dirty="0" smtClean="0"/>
+              <a:t>Loop()</a:t>
+            </a:r>
+            <a:endParaRPr lang="en-US" dirty="0"/>
+          </a:p>
+        </p:txBody>
+      </p:sp>
+      <p:cxnSp>
+        <p:nvCxnSpPr>
+          <p:cNvPr id="34" name="Straight Arrow Connector 33"/>
+          <p:cNvCxnSpPr/>
+          <p:nvPr/>
+        </p:nvCxnSpPr>
+        <p:spPr>
+          <a:xfrm>
+            <a:off x="6599854" y="4211957"/>
+            <a:ext cx="21710" cy="1504760"/>
+          </a:xfrm>
+          <a:prstGeom prst="straightConnector1">
+            <a:avLst/>
+          </a:prstGeom>
+          <a:ln>
+            <a:tailEnd type="arrow"/>
+          </a:ln>
+        </p:spPr>
+        <p:style>
+          <a:lnRef idx="2">
+            <a:schemeClr val="accent1"/>
+          </a:lnRef>
+          <a:fillRef idx="0">
+            <a:schemeClr val="accent1"/>
+          </a:fillRef>
+          <a:effectRef idx="1">
+            <a:schemeClr val="accent1"/>
+          </a:effectRef>
+          <a:fontRef idx="minor">
+            <a:schemeClr val="tx1"/>
+          </a:fontRef>
+        </p:style>
+      </p:cxnSp>
+      <p:cxnSp>
+        <p:nvCxnSpPr>
+          <p:cNvPr id="35" name="Straight Arrow Connector 34"/>
+          <p:cNvCxnSpPr/>
+          <p:nvPr/>
+        </p:nvCxnSpPr>
+        <p:spPr>
+          <a:xfrm>
+            <a:off x="2012289" y="3461177"/>
+            <a:ext cx="0" cy="750780"/>
+          </a:xfrm>
+          <a:prstGeom prst="straightConnector1">
+            <a:avLst/>
+          </a:prstGeom>
+          <a:ln>
+            <a:tailEnd type="arrow"/>
+          </a:ln>
+        </p:spPr>
+        <p:style>
+          <a:lnRef idx="2">
+            <a:schemeClr val="accent1"/>
+          </a:lnRef>
+          <a:fillRef idx="0">
+            <a:schemeClr val="accent1"/>
+          </a:fillRef>
+          <a:effectRef idx="1">
+            <a:schemeClr val="accent1"/>
+          </a:effectRef>
+          <a:fontRef idx="minor">
+            <a:schemeClr val="tx1"/>
+          </a:fontRef>
+        </p:style>
+      </p:cxnSp>
+      <p:cxnSp>
+        <p:nvCxnSpPr>
+          <p:cNvPr id="38" name="Straight Arrow Connector 37"/>
+          <p:cNvCxnSpPr/>
+          <p:nvPr/>
+        </p:nvCxnSpPr>
+        <p:spPr>
+          <a:xfrm>
+            <a:off x="3738667" y="2816113"/>
+            <a:ext cx="0" cy="750780"/>
+          </a:xfrm>
+          <a:prstGeom prst="straightConnector1">
+            <a:avLst/>
+          </a:prstGeom>
+          <a:ln>
+            <a:tailEnd type="arrow"/>
+          </a:ln>
+        </p:spPr>
+        <p:style>
+          <a:lnRef idx="2">
+            <a:schemeClr val="accent1"/>
+          </a:lnRef>
+          <a:fillRef idx="0">
+            <a:schemeClr val="accent1"/>
+          </a:fillRef>
+          <a:effectRef idx="1">
+            <a:schemeClr val="accent1"/>
+          </a:effectRef>
+          <a:fontRef idx="minor">
+            <a:schemeClr val="tx1"/>
+          </a:fontRef>
+        </p:style>
+      </p:cxnSp>
+      <p:cxnSp>
+        <p:nvCxnSpPr>
+          <p:cNvPr id="39" name="Straight Arrow Connector 38"/>
+          <p:cNvCxnSpPr/>
+          <p:nvPr/>
+        </p:nvCxnSpPr>
+        <p:spPr>
+          <a:xfrm>
+            <a:off x="3478146" y="4205899"/>
+            <a:ext cx="0" cy="787659"/>
+          </a:xfrm>
+          <a:prstGeom prst="straightConnector1">
+            <a:avLst/>
+          </a:prstGeom>
+          <a:ln>
+            <a:tailEnd type="arrow"/>
+          </a:ln>
+        </p:spPr>
+        <p:style>
+          <a:lnRef idx="2">
+            <a:schemeClr val="accent1"/>
+          </a:lnRef>
+          <a:fillRef idx="0">
+            <a:schemeClr val="accent1"/>
+          </a:fillRef>
+          <a:effectRef idx="1">
+            <a:schemeClr val="accent1"/>
+          </a:effectRef>
+          <a:fontRef idx="minor">
+            <a:schemeClr val="tx1"/>
+          </a:fontRef>
+        </p:style>
+      </p:cxnSp>
+      <p:cxnSp>
+        <p:nvCxnSpPr>
+          <p:cNvPr id="40" name="Straight Arrow Connector 39"/>
+          <p:cNvCxnSpPr/>
+          <p:nvPr/>
+        </p:nvCxnSpPr>
+        <p:spPr>
+          <a:xfrm>
+            <a:off x="2914572" y="4628359"/>
+            <a:ext cx="0" cy="365199"/>
+          </a:xfrm>
+          <a:prstGeom prst="straightConnector1">
+            <a:avLst/>
+          </a:prstGeom>
+          <a:ln>
+            <a:tailEnd type="arrow"/>
+          </a:ln>
+        </p:spPr>
+        <p:style>
+          <a:lnRef idx="2">
+            <a:schemeClr val="accent1"/>
+          </a:lnRef>
+          <a:fillRef idx="0">
+            <a:schemeClr val="accent1"/>
+          </a:fillRef>
+          <a:effectRef idx="1">
+            <a:schemeClr val="accent1"/>
+          </a:effectRef>
+          <a:fontRef idx="minor">
+            <a:schemeClr val="tx1"/>
+          </a:fontRef>
+        </p:style>
+      </p:cxnSp>
+      <p:cxnSp>
+        <p:nvCxnSpPr>
+          <p:cNvPr id="41" name="Straight Arrow Connector 40"/>
+          <p:cNvCxnSpPr/>
+          <p:nvPr/>
+        </p:nvCxnSpPr>
+        <p:spPr>
+          <a:xfrm>
+            <a:off x="3126246" y="5404322"/>
+            <a:ext cx="0" cy="458103"/>
+          </a:xfrm>
+          <a:prstGeom prst="straightConnector1">
+            <a:avLst/>
+          </a:prstGeom>
+          <a:ln>
+            <a:tailEnd type="arrow"/>
+          </a:ln>
+        </p:spPr>
+        <p:style>
+          <a:lnRef idx="2">
+            <a:schemeClr val="accent1"/>
+          </a:lnRef>
+          <a:fillRef idx="0">
+            <a:schemeClr val="accent1"/>
+          </a:fillRef>
+          <a:effectRef idx="1">
+            <a:schemeClr val="accent1"/>
+          </a:effectRef>
+          <a:fontRef idx="minor">
+            <a:schemeClr val="tx1"/>
+          </a:fontRef>
+        </p:style>
+      </p:cxnSp>
+      <p:cxnSp>
+        <p:nvCxnSpPr>
+          <p:cNvPr id="46" name="Straight Connector 45"/>
+          <p:cNvCxnSpPr/>
+          <p:nvPr/>
+        </p:nvCxnSpPr>
+        <p:spPr>
+          <a:xfrm>
+            <a:off x="2491227" y="4628359"/>
+            <a:ext cx="423345" cy="0"/>
+          </a:xfrm>
+          <a:prstGeom prst="line">
+            <a:avLst/>
+          </a:prstGeom>
+        </p:spPr>
+        <p:style>
+          <a:lnRef idx="2">
+            <a:schemeClr val="accent1"/>
+          </a:lnRef>
+          <a:fillRef idx="0">
+            <a:schemeClr val="accent1"/>
+          </a:fillRef>
+          <a:effectRef idx="1">
+            <a:schemeClr val="accent1"/>
+          </a:effectRef>
+          <a:fontRef idx="minor">
+            <a:schemeClr val="tx1"/>
+          </a:fontRef>
+        </p:style>
+      </p:cxnSp>
+      <p:cxnSp>
+        <p:nvCxnSpPr>
+          <p:cNvPr id="47" name="Straight Connector 46"/>
+          <p:cNvCxnSpPr/>
+          <p:nvPr/>
+        </p:nvCxnSpPr>
+        <p:spPr>
+          <a:xfrm flipV="1">
+            <a:off x="2914573" y="2816113"/>
+            <a:ext cx="824094" cy="32357"/>
+          </a:xfrm>
+          <a:prstGeom prst="line">
+            <a:avLst/>
+          </a:prstGeom>
+        </p:spPr>
+        <p:style>
+          <a:lnRef idx="2">
+            <a:schemeClr val="accent1"/>
+          </a:lnRef>
+          <a:fillRef idx="0">
+            <a:schemeClr val="accent1"/>
+          </a:fillRef>
+          <a:effectRef idx="1">
+            <a:schemeClr val="accent1"/>
+          </a:effectRef>
+          <a:fontRef idx="minor">
+            <a:schemeClr val="tx1"/>
+          </a:fontRef>
+        </p:style>
+      </p:cxnSp>
+      <p:sp>
+        <p:nvSpPr>
+          <p:cNvPr id="49" name="TextBox 48"/>
+          <p:cNvSpPr txBox="1"/>
+          <p:nvPr/>
+        </p:nvSpPr>
+        <p:spPr>
+          <a:xfrm rot="5400000">
+            <a:off x="-335646" y="4507419"/>
+            <a:ext cx="1359341" cy="369332"/>
+          </a:xfrm>
+          <a:prstGeom prst="rect">
+            <a:avLst/>
+          </a:prstGeom>
+          <a:noFill/>
+        </p:spPr>
+        <p:txBody>
+          <a:bodyPr wrap="none" rtlCol="0">
+            <a:spAutoFit/>
+          </a:bodyPr>
+          <a:lstStyle/>
+          <a:p>
+            <a:r>
+              <a:rPr lang="en-US" dirty="0" smtClean="0"/>
+              <a:t>While loop</a:t>
+            </a:r>
+            <a:endParaRPr lang="en-US" dirty="0"/>
+          </a:p>
+        </p:txBody>
+      </p:sp>
+      <p:cxnSp>
+        <p:nvCxnSpPr>
+          <p:cNvPr id="51" name="Straight Arrow Connector 50"/>
+          <p:cNvCxnSpPr/>
+          <p:nvPr/>
+        </p:nvCxnSpPr>
+        <p:spPr>
+          <a:xfrm flipV="1">
+            <a:off x="488907" y="2865868"/>
+            <a:ext cx="0" cy="3300936"/>
+          </a:xfrm>
+          <a:prstGeom prst="straightConnector1">
+            <a:avLst/>
+          </a:prstGeom>
+          <a:ln>
+            <a:tailEnd type="arrow"/>
+          </a:ln>
+        </p:spPr>
+        <p:style>
+          <a:lnRef idx="2">
+            <a:schemeClr val="accent1"/>
+          </a:lnRef>
+          <a:fillRef idx="0">
+            <a:schemeClr val="accent1"/>
+          </a:fillRef>
+          <a:effectRef idx="1">
+            <a:schemeClr val="accent1"/>
+          </a:effectRef>
+          <a:fontRef idx="minor">
+            <a:schemeClr val="tx1"/>
+          </a:fontRef>
+        </p:style>
+      </p:cxnSp>
+      <p:sp>
+        <p:nvSpPr>
+          <p:cNvPr id="53" name="TextBox 52"/>
+          <p:cNvSpPr txBox="1"/>
+          <p:nvPr/>
+        </p:nvSpPr>
+        <p:spPr>
+          <a:xfrm>
+            <a:off x="3742774" y="2967357"/>
+            <a:ext cx="540382" cy="369332"/>
+          </a:xfrm>
+          <a:prstGeom prst="rect">
+            <a:avLst/>
+          </a:prstGeom>
+          <a:noFill/>
+        </p:spPr>
+        <p:txBody>
+          <a:bodyPr wrap="none" rtlCol="0">
+            <a:spAutoFit/>
+          </a:bodyPr>
+          <a:lstStyle/>
+          <a:p>
+            <a:r>
+              <a:rPr lang="en-US" dirty="0" smtClean="0"/>
+              <a:t>Yes</a:t>
+            </a:r>
+            <a:endParaRPr lang="en-US" dirty="0"/>
+          </a:p>
+        </p:txBody>
+      </p:sp>
+      <p:sp>
+        <p:nvSpPr>
+          <p:cNvPr id="54" name="TextBox 53"/>
+          <p:cNvSpPr txBox="1"/>
+          <p:nvPr/>
+        </p:nvSpPr>
+        <p:spPr>
+          <a:xfrm>
+            <a:off x="1471907" y="3643082"/>
+            <a:ext cx="506569" cy="369332"/>
+          </a:xfrm>
+          <a:prstGeom prst="rect">
+            <a:avLst/>
+          </a:prstGeom>
+          <a:noFill/>
+        </p:spPr>
+        <p:txBody>
+          <a:bodyPr wrap="none" rtlCol="0">
+            <a:spAutoFit/>
+          </a:bodyPr>
+          <a:lstStyle/>
+          <a:p>
+            <a:r>
+              <a:rPr lang="en-US" dirty="0" smtClean="0"/>
+              <a:t>No</a:t>
+            </a:r>
+            <a:endParaRPr lang="en-US" dirty="0"/>
+          </a:p>
+        </p:txBody>
+      </p:sp>
+      <p:cxnSp>
+        <p:nvCxnSpPr>
+          <p:cNvPr id="56" name="Straight Arrow Connector 55"/>
+          <p:cNvCxnSpPr/>
+          <p:nvPr/>
+        </p:nvCxnSpPr>
+        <p:spPr>
+          <a:xfrm flipH="1" flipV="1">
+            <a:off x="7859038" y="3745169"/>
+            <a:ext cx="32564" cy="2277966"/>
+          </a:xfrm>
+          <a:prstGeom prst="straightConnector1">
+            <a:avLst/>
+          </a:prstGeom>
+          <a:ln>
+            <a:tailEnd type="arrow"/>
+          </a:ln>
+        </p:spPr>
+        <p:style>
+          <a:lnRef idx="2">
+            <a:schemeClr val="accent1"/>
+          </a:lnRef>
+          <a:fillRef idx="0">
+            <a:schemeClr val="accent1"/>
+          </a:fillRef>
+          <a:effectRef idx="1">
+            <a:schemeClr val="accent1"/>
+          </a:effectRef>
+          <a:fontRef idx="minor">
+            <a:schemeClr val="tx1"/>
+          </a:fontRef>
+        </p:style>
+      </p:cxnSp>
+      <p:cxnSp>
+        <p:nvCxnSpPr>
+          <p:cNvPr id="60" name="Straight Arrow Connector 59"/>
+          <p:cNvCxnSpPr>
+            <a:stCxn id="9" idx="1"/>
+            <a:endCxn id="6" idx="3"/>
+          </p:cNvCxnSpPr>
+          <p:nvPr/>
+        </p:nvCxnSpPr>
+        <p:spPr>
+          <a:xfrm flipH="1">
+            <a:off x="4488550" y="3889425"/>
+            <a:ext cx="1221622" cy="0"/>
+          </a:xfrm>
+          <a:prstGeom prst="straightConnector1">
+            <a:avLst/>
+          </a:prstGeom>
+          <a:ln>
+            <a:prstDash val="sysDash"/>
+            <a:tailEnd type="arrow"/>
+          </a:ln>
+        </p:spPr>
+        <p:style>
+          <a:lnRef idx="2">
+            <a:schemeClr val="accent1"/>
+          </a:lnRef>
+          <a:fillRef idx="0">
+            <a:schemeClr val="accent1"/>
+          </a:fillRef>
+          <a:effectRef idx="1">
+            <a:schemeClr val="accent1"/>
+          </a:effectRef>
+          <a:fontRef idx="minor">
+            <a:schemeClr val="tx1"/>
+          </a:fontRef>
+        </p:style>
+      </p:cxnSp>
+      <p:cxnSp>
+        <p:nvCxnSpPr>
+          <p:cNvPr id="64" name="Straight Arrow Connector 63"/>
+          <p:cNvCxnSpPr/>
+          <p:nvPr/>
+        </p:nvCxnSpPr>
+        <p:spPr>
+          <a:xfrm>
+            <a:off x="3853533" y="6166803"/>
+            <a:ext cx="1889204" cy="1"/>
+          </a:xfrm>
+          <a:prstGeom prst="straightConnector1">
+            <a:avLst/>
+          </a:prstGeom>
+          <a:ln>
+            <a:prstDash val="sysDash"/>
+            <a:tailEnd type="arrow"/>
+          </a:ln>
+        </p:spPr>
+        <p:style>
+          <a:lnRef idx="2">
+            <a:schemeClr val="accent1"/>
+          </a:lnRef>
+          <a:fillRef idx="0">
+            <a:schemeClr val="accent1"/>
+          </a:fillRef>
+          <a:effectRef idx="1">
+            <a:schemeClr val="accent1"/>
+          </a:effectRef>
+          <a:fontRef idx="minor">
+            <a:schemeClr val="tx1"/>
+          </a:fontRef>
+        </p:style>
+      </p:cxnSp>
     </p:spTree>
     <p:extLst>
       <p:ext uri="{BB962C8B-B14F-4D97-AF65-F5344CB8AC3E}">
@@ -14989,12 +16322,14 @@
         </p:nvSpPr>
         <p:spPr/>
         <p:txBody>
-          <a:bodyPr/>
+          <a:bodyPr>
+            <a:normAutofit/>
+          </a:bodyPr>
           <a:lstStyle/>
           <a:p>
             <a:r>
               <a:rPr lang="en-US" dirty="0" smtClean="0"/>
-              <a:t>Arduino Sketch</a:t>
+              <a:t>Results</a:t>
             </a:r>
             <a:endParaRPr lang="en-US" dirty="0"/>
           </a:p>
@@ -15010,77 +16345,50 @@
             <p:ph idx="1"/>
           </p:nvPr>
         </p:nvSpPr>
-        <p:spPr>
-          <a:xfrm>
-            <a:off x="3056843" y="2595562"/>
-            <a:ext cx="2547409" cy="3670767"/>
-          </a:xfrm>
-        </p:spPr>
+        <p:spPr/>
         <p:txBody>
-          <a:bodyPr/>
+          <a:bodyPr>
+            <a:normAutofit/>
+          </a:bodyPr>
           <a:lstStyle/>
           <a:p>
             <a:pPr marL="0" indent="0">
               <a:buNone/>
             </a:pPr>
-            <a:r>
-              <a:rPr lang="en-US" dirty="0"/>
-              <a:t>void loop() {</a:t>
-            </a:r>
+            <a:endParaRPr lang="en-US" sz="2800" dirty="0" smtClean="0"/>
           </a:p>
           <a:p>
             <a:pPr marL="0" indent="0">
               <a:buNone/>
             </a:pPr>
             <a:r>
-              <a:rPr lang="en-US" dirty="0"/>
-              <a:t>  </a:t>
-            </a:r>
-            <a:r>
-              <a:rPr lang="en-US" dirty="0" smtClean="0"/>
-              <a:t>    sensor</a:t>
-            </a:r>
-            <a:r>
-              <a:rPr lang="en-US" dirty="0"/>
-              <a:t>();</a:t>
-            </a:r>
-          </a:p>
-          <a:p>
-            <a:pPr marL="0" indent="0">
-              <a:buNone/>
-            </a:pPr>
-            <a:r>
-              <a:rPr lang="en-US" dirty="0"/>
-              <a:t>  </a:t>
-            </a:r>
-            <a:r>
-              <a:rPr lang="en-US" dirty="0" smtClean="0"/>
-              <a:t>    </a:t>
-            </a:r>
-            <a:r>
-              <a:rPr lang="en-US" dirty="0" err="1" smtClean="0"/>
-              <a:t>ledPattern</a:t>
-            </a:r>
-            <a:r>
-              <a:rPr lang="en-US" dirty="0"/>
-              <a:t>();</a:t>
-            </a:r>
-          </a:p>
-          <a:p>
-            <a:pPr marL="0" indent="0">
-              <a:buNone/>
-            </a:pPr>
-            <a:r>
-              <a:rPr lang="en-US" dirty="0"/>
-              <a:t>}</a:t>
-            </a:r>
+              <a:rPr lang="en-US" sz="2800" dirty="0" smtClean="0"/>
+              <a:t>Small </a:t>
+            </a:r>
+            <a:r>
+              <a:rPr lang="en-US" sz="2800" dirty="0"/>
+              <a:t>Video </a:t>
+            </a:r>
+            <a:r>
+              <a:rPr lang="en-US" sz="2800" dirty="0" smtClean="0"/>
+              <a:t>snippets that show </a:t>
+            </a:r>
+            <a:r>
+              <a:rPr lang="en-US" sz="2800" dirty="0"/>
+              <a:t>LED pattern </a:t>
+            </a:r>
+            <a:r>
+              <a:rPr lang="en-US" sz="2800" dirty="0" smtClean="0"/>
+              <a:t>varies based on the input conditions</a:t>
+            </a:r>
+            <a:endParaRPr lang="en-US" sz="2800" dirty="0"/>
           </a:p>
         </p:txBody>
       </p:sp>
     </p:spTree>
     <p:extLst>
       <p:ext uri="{BB962C8B-B14F-4D97-AF65-F5344CB8AC3E}">
-        <p14:creationId xmlns:p14="http://schemas.microsoft.com/office/powerpoint/2010/main" val="1751587191"/>
+        <p14:creationId xmlns:p14="http://schemas.microsoft.com/office/powerpoint/2010/main" val="3249428159"/>
       </p:ext>
     </p:extLst>
   </p:cSld>

</xml_diff>